<commit_message>
[tp1-colas] Resolucion ej 2
</commit_message>
<xml_diff>
--- a/tp1-colas/Imagenes.pptx
+++ b/tp1-colas/Imagenes.pptx
@@ -7,6 +7,7 @@
   <p:sldIdLst>
     <p:sldId id="256" r:id="rId2"/>
     <p:sldId id="257" r:id="rId3"/>
+    <p:sldId id="258" r:id="rId4"/>
   </p:sldIdLst>
   <p:sldSz cx="12192000" cy="6858000"/>
   <p:notesSz cx="6858000" cy="9144000"/>
@@ -105,6 +106,11 @@
       </a:defRPr>
     </a:lvl9pPr>
   </p:defaultTextStyle>
+  <p:extLst>
+    <p:ext uri="{EFAFB233-063F-42B5-8137-9DF3F51BA10A}">
+      <p15:sldGuideLst xmlns:p15="http://schemas.microsoft.com/office/powerpoint/2012/main"/>
+    </p:ext>
+  </p:extLst>
 </p:presentation>
 </file>
 
@@ -3531,7 +3537,7 @@
             <p:spPr>
               <a:xfrm>
                 <a:off x="3715560" y="1831648"/>
-                <a:ext cx="232884" cy="369332"/>
+                <a:ext cx="177100" cy="276999"/>
               </a:xfrm>
               <a:prstGeom prst="rect">
                 <a:avLst/>
@@ -3544,6 +3550,7 @@
               </a:bodyPr>
               <a:lstStyle/>
               <a:p>
+                <a:pPr/>
                 <a14:m>
                   <m:oMathPara xmlns:m="http://schemas.openxmlformats.org/officeDocument/2006/math">
                     <m:oMathParaPr>
@@ -3551,7 +3558,7 @@
                     </m:oMathParaPr>
                     <m:oMath xmlns:m="http://schemas.openxmlformats.org/officeDocument/2006/math">
                       <m:r>
-                        <a:rPr lang="es-AR" sz="2400" b="0" i="1" smtClean="0">
+                        <a:rPr lang="es-AR" b="0" i="1" smtClean="0">
                           <a:latin typeface="Cambria Math" panose="02040503050406030204" pitchFamily="18" charset="0"/>
                         </a:rPr>
                         <m:t>𝜆</m:t>
@@ -3559,7 +3566,7 @@
                     </m:oMath>
                   </m:oMathPara>
                 </a14:m>
-                <a:endParaRPr lang="es-AR" sz="2400" dirty="0"/>
+                <a:endParaRPr lang="es-AR" dirty="0"/>
               </a:p>
             </p:txBody>
           </p:sp>
@@ -3576,7 +3583,7 @@
             <p:spPr>
               <a:xfrm>
                 <a:off x="3715560" y="1831648"/>
-                <a:ext cx="232884" cy="369332"/>
+                <a:ext cx="177100" cy="276999"/>
               </a:xfrm>
               <a:prstGeom prst="rect">
                 <a:avLst/>
@@ -3584,7 +3591,7 @@
               <a:blipFill rotWithShape="0">
                 <a:blip r:embed="rId4"/>
                 <a:stretch>
-                  <a:fillRect l="-31579" r="-31579" b="-6557"/>
+                  <a:fillRect l="-34483" r="-31034" b="-6522"/>
                 </a:stretch>
               </a:blipFill>
             </p:spPr>
@@ -3614,7 +3621,7 @@
             <p:spPr>
               <a:xfrm>
                 <a:off x="5093559" y="1814279"/>
-                <a:ext cx="232884" cy="377604"/>
+                <a:ext cx="177100" cy="283154"/>
               </a:xfrm>
               <a:prstGeom prst="rect">
                 <a:avLst/>
@@ -3627,6 +3634,7 @@
               </a:bodyPr>
               <a:lstStyle/>
               <a:p>
+                <a:pPr/>
                 <a14:m>
                   <m:oMathPara xmlns:m="http://schemas.openxmlformats.org/officeDocument/2006/math">
                     <m:oMathParaPr>
@@ -3637,14 +3645,14 @@
                         <m:accPr>
                           <m:chr m:val="̅"/>
                           <m:ctrlPr>
-                            <a:rPr lang="es-AR" sz="2400" b="0" i="1" smtClean="0">
+                            <a:rPr lang="es-AR" b="0" i="1" smtClean="0">
                               <a:latin typeface="Cambria Math" panose="02040503050406030204" pitchFamily="18" charset="0"/>
                             </a:rPr>
                           </m:ctrlPr>
                         </m:accPr>
                         <m:e>
                           <m:r>
-                            <a:rPr lang="es-AR" sz="2400" b="0" i="1" smtClean="0">
+                            <a:rPr lang="es-AR" b="0" i="1" smtClean="0">
                               <a:latin typeface="Cambria Math" panose="02040503050406030204" pitchFamily="18" charset="0"/>
                             </a:rPr>
                             <m:t>𝜆</m:t>
@@ -3654,7 +3662,7 @@
                     </m:oMath>
                   </m:oMathPara>
                 </a14:m>
-                <a:endParaRPr lang="es-AR" sz="2400" dirty="0"/>
+                <a:endParaRPr lang="es-AR" dirty="0"/>
               </a:p>
             </p:txBody>
           </p:sp>
@@ -3671,7 +3679,7 @@
             <p:spPr>
               <a:xfrm>
                 <a:off x="5093559" y="1814279"/>
-                <a:ext cx="232884" cy="377604"/>
+                <a:ext cx="177100" cy="283154"/>
               </a:xfrm>
               <a:prstGeom prst="rect">
                 <a:avLst/>
@@ -3679,7 +3687,7 @@
               <a:blipFill rotWithShape="0">
                 <a:blip r:embed="rId5"/>
                 <a:stretch>
-                  <a:fillRect l="-31579" t="-3226" r="-97368" b="-8065"/>
+                  <a:fillRect l="-34483" t="-6522" r="-93103" b="-8696"/>
                 </a:stretch>
               </a:blipFill>
             </p:spPr>
@@ -3709,7 +3717,7 @@
             <p:spPr>
               <a:xfrm>
                 <a:off x="8816337" y="1814279"/>
-                <a:ext cx="245516" cy="369332"/>
+                <a:ext cx="185755" cy="276999"/>
               </a:xfrm>
               <a:prstGeom prst="rect">
                 <a:avLst/>
@@ -3722,6 +3730,7 @@
               </a:bodyPr>
               <a:lstStyle/>
               <a:p>
+                <a:pPr/>
                 <a14:m>
                   <m:oMathPara xmlns:m="http://schemas.openxmlformats.org/officeDocument/2006/math">
                     <m:oMathParaPr>
@@ -3729,7 +3738,7 @@
                     </m:oMathParaPr>
                     <m:oMath xmlns:m="http://schemas.openxmlformats.org/officeDocument/2006/math">
                       <m:r>
-                        <a:rPr lang="es-AR" sz="2400" b="0" i="1" smtClean="0">
+                        <a:rPr lang="es-AR" b="0" i="1" smtClean="0">
                           <a:latin typeface="Cambria Math" panose="02040503050406030204" pitchFamily="18" charset="0"/>
                         </a:rPr>
                         <m:t>𝜇</m:t>
@@ -3737,7 +3746,7 @@
                     </m:oMath>
                   </m:oMathPara>
                 </a14:m>
-                <a:endParaRPr lang="es-AR" sz="2400" dirty="0"/>
+                <a:endParaRPr lang="es-AR" dirty="0"/>
               </a:p>
             </p:txBody>
           </p:sp>
@@ -3754,7 +3763,7 @@
             <p:spPr>
               <a:xfrm>
                 <a:off x="8816337" y="1814279"/>
-                <a:ext cx="245516" cy="369332"/>
+                <a:ext cx="185755" cy="276999"/>
               </a:xfrm>
               <a:prstGeom prst="rect">
                 <a:avLst/>
@@ -3762,7 +3771,7 @@
               <a:blipFill rotWithShape="0">
                 <a:blip r:embed="rId6"/>
                 <a:stretch>
-                  <a:fillRect l="-26829" r="-24390" b="-23333"/>
+                  <a:fillRect l="-29032" r="-25806" b="-22222"/>
                 </a:stretch>
               </a:blipFill>
             </p:spPr>
@@ -3792,7 +3801,7 @@
             <p:spPr>
               <a:xfrm>
                 <a:off x="9980141" y="1814279"/>
-                <a:ext cx="245516" cy="369332"/>
+                <a:ext cx="185755" cy="276999"/>
               </a:xfrm>
               <a:prstGeom prst="rect">
                 <a:avLst/>
@@ -3805,6 +3814,7 @@
               </a:bodyPr>
               <a:lstStyle/>
               <a:p>
+                <a:pPr/>
                 <a14:m>
                   <m:oMathPara xmlns:m="http://schemas.openxmlformats.org/officeDocument/2006/math">
                     <m:oMathParaPr>
@@ -3815,14 +3825,14 @@
                         <m:accPr>
                           <m:chr m:val="̅"/>
                           <m:ctrlPr>
-                            <a:rPr lang="es-AR" sz="2400" b="0" i="1" smtClean="0">
+                            <a:rPr lang="es-AR" b="0" i="1" smtClean="0">
                               <a:latin typeface="Cambria Math" panose="02040503050406030204" pitchFamily="18" charset="0"/>
                             </a:rPr>
                           </m:ctrlPr>
                         </m:accPr>
                         <m:e>
                           <m:r>
-                            <a:rPr lang="es-AR" sz="2400" b="0" i="1" smtClean="0">
+                            <a:rPr lang="es-AR" b="0" i="1" smtClean="0">
                               <a:latin typeface="Cambria Math" panose="02040503050406030204" pitchFamily="18" charset="0"/>
                             </a:rPr>
                             <m:t>𝜇</m:t>
@@ -3832,7 +3842,7 @@
                     </m:oMath>
                   </m:oMathPara>
                 </a14:m>
-                <a:endParaRPr lang="es-AR" sz="2400" dirty="0"/>
+                <a:endParaRPr lang="es-AR" dirty="0"/>
               </a:p>
             </p:txBody>
           </p:sp>
@@ -3849,7 +3859,7 @@
             <p:spPr>
               <a:xfrm>
                 <a:off x="9980141" y="1814279"/>
-                <a:ext cx="245516" cy="369332"/>
+                <a:ext cx="185755" cy="276999"/>
               </a:xfrm>
               <a:prstGeom prst="rect">
                 <a:avLst/>
@@ -3857,7 +3867,7 @@
               <a:blipFill rotWithShape="0">
                 <a:blip r:embed="rId7"/>
                 <a:stretch>
-                  <a:fillRect l="-27500" r="-97500" b="-23333"/>
+                  <a:fillRect l="-29032" r="-90323" b="-22222"/>
                 </a:stretch>
               </a:blipFill>
             </p:spPr>
@@ -4478,7 +4488,7 @@
             </p:nvSpPr>
             <p:spPr>
               <a:xfrm>
-                <a:off x="3234370" y="1635057"/>
+                <a:off x="3374265" y="1635057"/>
                 <a:ext cx="1015727" cy="525913"/>
               </a:xfrm>
               <a:prstGeom prst="rect">
@@ -4492,6 +4502,7 @@
               </a:bodyPr>
               <a:lstStyle/>
               <a:p>
+                <a:pPr/>
                 <a14:m>
                   <m:oMathPara xmlns:m="http://schemas.openxmlformats.org/officeDocument/2006/math">
                     <m:oMathParaPr>
@@ -4554,7 +4565,7 @@
             </p:nvSpPr>
             <p:spPr>
               <a:xfrm>
-                <a:off x="3234370" y="1635057"/>
+                <a:off x="3374265" y="1635057"/>
                 <a:ext cx="1015727" cy="525913"/>
               </a:xfrm>
               <a:prstGeom prst="rect">
@@ -4593,7 +4604,7 @@
             <p:spPr>
               <a:xfrm>
                 <a:off x="4810517" y="1751304"/>
-                <a:ext cx="797013" cy="377604"/>
+                <a:ext cx="602665" cy="283154"/>
               </a:xfrm>
               <a:prstGeom prst="rect">
                 <a:avLst/>
@@ -4606,6 +4617,7 @@
               </a:bodyPr>
               <a:lstStyle/>
               <a:p>
+                <a:pPr/>
                 <a14:m>
                   <m:oMathPara xmlns:m="http://schemas.openxmlformats.org/officeDocument/2006/math">
                     <m:oMathParaPr>
@@ -4616,14 +4628,14 @@
                         <m:accPr>
                           <m:chr m:val="̅"/>
                           <m:ctrlPr>
-                            <a:rPr lang="es-AR" sz="2400" b="0" i="1" smtClean="0">
+                            <a:rPr lang="es-AR" b="0" i="1" smtClean="0">
                               <a:latin typeface="Cambria Math" panose="02040503050406030204" pitchFamily="18" charset="0"/>
                             </a:rPr>
                           </m:ctrlPr>
                         </m:accPr>
                         <m:e>
                           <m:r>
-                            <a:rPr lang="es-AR" sz="2400" b="0" i="1" smtClean="0">
+                            <a:rPr lang="es-AR" b="0" i="1" smtClean="0">
                               <a:latin typeface="Cambria Math" panose="02040503050406030204" pitchFamily="18" charset="0"/>
                             </a:rPr>
                             <m:t>𝜆</m:t>
@@ -4631,13 +4643,13 @@
                         </m:e>
                       </m:acc>
                       <m:r>
-                        <a:rPr lang="es-AR" sz="2400" b="0" i="1" smtClean="0">
+                        <a:rPr lang="es-AR" b="0" i="1" smtClean="0">
                           <a:latin typeface="Cambria Math" panose="02040503050406030204" pitchFamily="18" charset="0"/>
                         </a:rPr>
                         <m:t>=</m:t>
                       </m:r>
                       <m:r>
-                        <a:rPr lang="es-AR" sz="2400" b="0" i="1" smtClean="0">
+                        <a:rPr lang="es-AR" b="0" i="1" smtClean="0">
                           <a:latin typeface="Cambria Math" panose="02040503050406030204" pitchFamily="18" charset="0"/>
                         </a:rPr>
                         <m:t>𝜆</m:t>
@@ -4645,7 +4657,7 @@
                     </m:oMath>
                   </m:oMathPara>
                 </a14:m>
-                <a:endParaRPr lang="es-AR" sz="2400" dirty="0"/>
+                <a:endParaRPr lang="es-AR" dirty="0"/>
               </a:p>
             </p:txBody>
           </p:sp>
@@ -4662,7 +4674,7 @@
             <p:spPr>
               <a:xfrm>
                 <a:off x="4810517" y="1751304"/>
-                <a:ext cx="797013" cy="377604"/>
+                <a:ext cx="602665" cy="283154"/>
               </a:xfrm>
               <a:prstGeom prst="rect">
                 <a:avLst/>
@@ -4670,7 +4682,7 @@
               <a:blipFill rotWithShape="0">
                 <a:blip r:embed="rId5"/>
                 <a:stretch>
-                  <a:fillRect l="-9160" t="-1613" r="-8397" b="-8065"/>
+                  <a:fillRect l="-9091" t="-4255" r="-9091" b="-6383"/>
                 </a:stretch>
               </a:blipFill>
             </p:spPr>
@@ -4699,8 +4711,8 @@
             </p:nvSpPr>
             <p:spPr>
               <a:xfrm>
-                <a:off x="7807566" y="1357550"/>
-                <a:ext cx="2501710" cy="584391"/>
+                <a:off x="7246017" y="1534706"/>
+                <a:ext cx="2124812" cy="525913"/>
               </a:xfrm>
               <a:prstGeom prst="rect">
                 <a:avLst/>
@@ -4713,6 +4725,7 @@
               </a:bodyPr>
               <a:lstStyle/>
               <a:p>
+                <a:pPr/>
                 <a14:m>
                   <m:oMathPara xmlns:m="http://schemas.openxmlformats.org/officeDocument/2006/math">
                     <m:oMathParaPr>
@@ -4720,13 +4733,13 @@
                     </m:oMathParaPr>
                     <m:oMath xmlns:m="http://schemas.openxmlformats.org/officeDocument/2006/math">
                       <m:r>
-                        <a:rPr lang="es-AR" sz="2000" b="0" i="1" smtClean="0">
+                        <a:rPr lang="es-AR" b="0" i="1" smtClean="0">
                           <a:latin typeface="Cambria Math" panose="02040503050406030204" pitchFamily="18" charset="0"/>
                         </a:rPr>
                         <m:t>𝜇</m:t>
                       </m:r>
                       <m:r>
-                        <a:rPr lang="es-AR" sz="2000" b="0" i="1" smtClean="0">
+                        <a:rPr lang="es-AR" b="0" i="1" smtClean="0">
                           <a:latin typeface="Cambria Math" panose="02040503050406030204" pitchFamily="18" charset="0"/>
                         </a:rPr>
                         <m:t>=0,5</m:t>
@@ -4734,14 +4747,14 @@
                       <m:f>
                         <m:fPr>
                           <m:ctrlPr>
-                            <a:rPr lang="es-AR" sz="2000" b="0" i="1" smtClean="0">
+                            <a:rPr lang="es-AR" b="0" i="1" smtClean="0">
                               <a:latin typeface="Cambria Math" panose="02040503050406030204" pitchFamily="18" charset="0"/>
                             </a:rPr>
                           </m:ctrlPr>
                         </m:fPr>
                         <m:num>
                           <m:r>
-                            <a:rPr lang="es-AR" sz="2000" b="0" i="1" smtClean="0">
+                            <a:rPr lang="es-AR" b="0" i="1" smtClean="0">
                               <a:latin typeface="Cambria Math" panose="02040503050406030204" pitchFamily="18" charset="0"/>
                             </a:rPr>
                             <m:t>𝑐𝑙</m:t>
@@ -4749,13 +4762,7 @@
                         </m:num>
                         <m:den>
                           <m:r>
-                            <a:rPr lang="es-AR" sz="2000" b="0" i="1" smtClean="0">
-                              <a:latin typeface="Cambria Math" panose="02040503050406030204" pitchFamily="18" charset="0"/>
-                            </a:rPr>
-                            <m:t>1 </m:t>
-                          </m:r>
-                          <m:r>
-                            <a:rPr lang="es-AR" sz="2000" b="0" i="1" smtClean="0">
+                            <a:rPr lang="es-AR" b="0" i="1" smtClean="0">
                               <a:latin typeface="Cambria Math" panose="02040503050406030204" pitchFamily="18" charset="0"/>
                             </a:rPr>
                             <m:t>𝑚𝑖𝑛</m:t>
@@ -4763,7 +4770,7 @@
                         </m:den>
                       </m:f>
                       <m:r>
-                        <a:rPr lang="es-AR" sz="2000" b="0" i="1" smtClean="0">
+                        <a:rPr lang="es-AR" b="0" i="1" smtClean="0">
                           <a:latin typeface="Cambria Math" panose="02040503050406030204" pitchFamily="18" charset="0"/>
                         </a:rPr>
                         <m:t>=30</m:t>
@@ -4771,14 +4778,14 @@
                       <m:f>
                         <m:fPr>
                           <m:ctrlPr>
-                            <a:rPr lang="es-AR" sz="2000" b="0" i="1" smtClean="0">
+                            <a:rPr lang="es-AR" b="0" i="1" smtClean="0">
                               <a:latin typeface="Cambria Math" panose="02040503050406030204" pitchFamily="18" charset="0"/>
                             </a:rPr>
                           </m:ctrlPr>
                         </m:fPr>
                         <m:num>
                           <m:r>
-                            <a:rPr lang="es-AR" sz="2000" b="0" i="1" smtClean="0">
+                            <a:rPr lang="es-AR" b="0" i="1" smtClean="0">
                               <a:latin typeface="Cambria Math" panose="02040503050406030204" pitchFamily="18" charset="0"/>
                             </a:rPr>
                             <m:t>𝑐𝑙</m:t>
@@ -4786,7 +4793,7 @@
                         </m:num>
                         <m:den>
                           <m:r>
-                            <a:rPr lang="es-AR" sz="2000" b="0" i="1" smtClean="0">
+                            <a:rPr lang="es-AR" b="0" i="1" smtClean="0">
                               <a:latin typeface="Cambria Math" panose="02040503050406030204" pitchFamily="18" charset="0"/>
                             </a:rPr>
                             <m:t>h𝑟</m:t>
@@ -4796,7 +4803,7 @@
                     </m:oMath>
                   </m:oMathPara>
                 </a14:m>
-                <a:endParaRPr lang="es-AR" sz="2000" dirty="0"/>
+                <a:endParaRPr lang="es-AR" dirty="0"/>
               </a:p>
             </p:txBody>
           </p:sp>
@@ -4812,8 +4819,8 @@
             </p:nvSpPr>
             <p:spPr>
               <a:xfrm>
-                <a:off x="7807566" y="1357550"/>
-                <a:ext cx="2501710" cy="584391"/>
+                <a:off x="7246017" y="1534706"/>
+                <a:ext cx="2124812" cy="525913"/>
               </a:xfrm>
               <a:prstGeom prst="rect">
                 <a:avLst/>
@@ -4850,8 +4857,8 @@
             </p:nvSpPr>
             <p:spPr>
               <a:xfrm>
-                <a:off x="9924004" y="3159064"/>
-                <a:ext cx="809644" cy="369332"/>
+                <a:off x="10143797" y="1783620"/>
+                <a:ext cx="611321" cy="276999"/>
               </a:xfrm>
               <a:prstGeom prst="rect">
                 <a:avLst/>
@@ -4864,6 +4871,7 @@
               </a:bodyPr>
               <a:lstStyle/>
               <a:p>
+                <a:pPr/>
                 <a14:m>
                   <m:oMathPara xmlns:m="http://schemas.openxmlformats.org/officeDocument/2006/math">
                     <m:oMathParaPr>
@@ -4874,14 +4882,14 @@
                         <m:accPr>
                           <m:chr m:val="̅"/>
                           <m:ctrlPr>
-                            <a:rPr lang="es-AR" sz="2400" b="0" i="1" smtClean="0">
+                            <a:rPr lang="es-AR" b="0" i="1" smtClean="0">
                               <a:latin typeface="Cambria Math" panose="02040503050406030204" pitchFamily="18" charset="0"/>
                             </a:rPr>
                           </m:ctrlPr>
                         </m:accPr>
                         <m:e>
                           <m:r>
-                            <a:rPr lang="es-AR" sz="2400" b="0" i="1" smtClean="0">
+                            <a:rPr lang="es-AR" b="0" i="1" smtClean="0">
                               <a:latin typeface="Cambria Math" panose="02040503050406030204" pitchFamily="18" charset="0"/>
                             </a:rPr>
                             <m:t>𝜇</m:t>
@@ -4889,13 +4897,13 @@
                         </m:e>
                       </m:acc>
                       <m:r>
-                        <a:rPr lang="es-AR" sz="2400" b="0" i="1" smtClean="0">
+                        <a:rPr lang="es-AR" b="0" i="1" smtClean="0">
                           <a:latin typeface="Cambria Math" panose="02040503050406030204" pitchFamily="18" charset="0"/>
                         </a:rPr>
                         <m:t>=</m:t>
                       </m:r>
                       <m:r>
-                        <a:rPr lang="es-AR" sz="2400" b="0" i="1" smtClean="0">
+                        <a:rPr lang="es-AR" b="0" i="1" smtClean="0">
                           <a:latin typeface="Cambria Math" panose="02040503050406030204" pitchFamily="18" charset="0"/>
                         </a:rPr>
                         <m:t>𝜆</m:t>
@@ -4903,7 +4911,7 @@
                     </m:oMath>
                   </m:oMathPara>
                 </a14:m>
-                <a:endParaRPr lang="es-AR" sz="2400" dirty="0"/>
+                <a:endParaRPr lang="es-AR" dirty="0"/>
               </a:p>
             </p:txBody>
           </p:sp>
@@ -4919,8 +4927,8 @@
             </p:nvSpPr>
             <p:spPr>
               <a:xfrm>
-                <a:off x="9924004" y="3159064"/>
-                <a:ext cx="809644" cy="369332"/>
+                <a:off x="10143797" y="1783620"/>
+                <a:ext cx="611321" cy="276999"/>
               </a:xfrm>
               <a:prstGeom prst="rect">
                 <a:avLst/>
@@ -4928,7 +4936,7 @@
               <a:blipFill rotWithShape="0">
                 <a:blip r:embed="rId7"/>
                 <a:stretch>
-                  <a:fillRect l="-9023" r="-8271" b="-22951"/>
+                  <a:fillRect l="-8000" r="-9000" b="-22222"/>
                 </a:stretch>
               </a:blipFill>
             </p:spPr>
@@ -4951,6 +4959,1100 @@
     <p:extLst>
       <p:ext uri="{BB962C8B-B14F-4D97-AF65-F5344CB8AC3E}">
         <p14:creationId xmlns:p14="http://schemas.microsoft.com/office/powerpoint/2010/main" val="3368485320"/>
+      </p:ext>
+    </p:extLst>
+  </p:cSld>
+  <p:clrMapOvr>
+    <a:masterClrMapping/>
+  </p:clrMapOvr>
+  <p:timing>
+    <p:tnLst>
+      <p:par>
+        <p:cTn id="1" dur="indefinite" restart="never" nodeType="tmRoot"/>
+      </p:par>
+    </p:tnLst>
+  </p:timing>
+</p:sld>
+</file>
+
+<file path=ppt/slides/slide3.xml><?xml version="1.0" encoding="utf-8"?>
+<p:sld xmlns:a="http://schemas.openxmlformats.org/drawingml/2006/main" xmlns:r="http://schemas.openxmlformats.org/officeDocument/2006/relationships" xmlns:p="http://schemas.openxmlformats.org/presentationml/2006/main">
+  <p:cSld>
+    <p:spTree>
+      <p:nvGrpSpPr>
+        <p:cNvPr id="1" name=""/>
+        <p:cNvGrpSpPr/>
+        <p:nvPr/>
+      </p:nvGrpSpPr>
+      <p:grpSpPr>
+        <a:xfrm>
+          <a:off x="0" y="0"/>
+          <a:ext cx="0" cy="0"/>
+          <a:chOff x="0" y="0"/>
+          <a:chExt cx="0" cy="0"/>
+        </a:xfrm>
+      </p:grpSpPr>
+      <p:sp>
+        <p:nvSpPr>
+          <p:cNvPr id="4" name="Oval 3"/>
+          <p:cNvSpPr/>
+          <p:nvPr/>
+        </p:nvSpPr>
+        <p:spPr>
+          <a:xfrm>
+            <a:off x="928632" y="1301325"/>
+            <a:ext cx="2382592" cy="2369712"/>
+          </a:xfrm>
+          <a:prstGeom prst="ellipse">
+            <a:avLst/>
+          </a:prstGeom>
+          <a:ln>
+            <a:solidFill>
+              <a:schemeClr val="tx2"/>
+            </a:solidFill>
+          </a:ln>
+          <a:effectLst>
+            <a:outerShdw blurRad="50800" dist="38100" dir="2700000" algn="tl" rotWithShape="0">
+              <a:prstClr val="black">
+                <a:alpha val="40000"/>
+              </a:prstClr>
+            </a:outerShdw>
+          </a:effectLst>
+        </p:spPr>
+        <p:style>
+          <a:lnRef idx="2">
+            <a:schemeClr val="accent6"/>
+          </a:lnRef>
+          <a:fillRef idx="1">
+            <a:schemeClr val="lt1"/>
+          </a:fillRef>
+          <a:effectRef idx="0">
+            <a:schemeClr val="accent6"/>
+          </a:effectRef>
+          <a:fontRef idx="minor">
+            <a:schemeClr val="dk1"/>
+          </a:fontRef>
+        </p:style>
+        <p:txBody>
+          <a:bodyPr rtlCol="0" anchor="ctr"/>
+          <a:lstStyle/>
+          <a:p>
+            <a:pPr algn="ctr"/>
+            <a:endParaRPr lang="es-AR"/>
+          </a:p>
+        </p:txBody>
+      </p:sp>
+      <p:pic>
+        <p:nvPicPr>
+          <p:cNvPr id="5" name="Picture 4"/>
+          <p:cNvPicPr>
+            <a:picLocks noChangeAspect="1"/>
+          </p:cNvPicPr>
+          <p:nvPr/>
+        </p:nvPicPr>
+        <p:blipFill>
+          <a:blip r:embed="rId2" cstate="print">
+            <a:extLst>
+              <a:ext uri="{28A0092B-C50C-407E-A947-70E740481C1C}">
+                <a14:useLocalDpi xmlns:a14="http://schemas.microsoft.com/office/drawing/2010/main" val="0"/>
+              </a:ext>
+            </a:extLst>
+          </a:blip>
+          <a:stretch>
+            <a:fillRect/>
+          </a:stretch>
+        </p:blipFill>
+        <p:spPr>
+          <a:xfrm>
+            <a:off x="1481585" y="1635057"/>
+            <a:ext cx="425562" cy="425562"/>
+          </a:xfrm>
+          <a:prstGeom prst="rect">
+            <a:avLst/>
+          </a:prstGeom>
+        </p:spPr>
+      </p:pic>
+      <p:pic>
+        <p:nvPicPr>
+          <p:cNvPr id="6" name="Picture 5"/>
+          <p:cNvPicPr>
+            <a:picLocks noChangeAspect="1"/>
+          </p:cNvPicPr>
+          <p:nvPr/>
+        </p:nvPicPr>
+        <p:blipFill>
+          <a:blip r:embed="rId2" cstate="print">
+            <a:extLst>
+              <a:ext uri="{28A0092B-C50C-407E-A947-70E740481C1C}">
+                <a14:useLocalDpi xmlns:a14="http://schemas.microsoft.com/office/drawing/2010/main" val="0"/>
+              </a:ext>
+            </a:extLst>
+          </a:blip>
+          <a:stretch>
+            <a:fillRect/>
+          </a:stretch>
+        </p:blipFill>
+        <p:spPr>
+          <a:xfrm>
+            <a:off x="2427925" y="1847838"/>
+            <a:ext cx="425562" cy="425562"/>
+          </a:xfrm>
+          <a:prstGeom prst="rect">
+            <a:avLst/>
+          </a:prstGeom>
+        </p:spPr>
+      </p:pic>
+      <p:pic>
+        <p:nvPicPr>
+          <p:cNvPr id="7" name="Picture 6"/>
+          <p:cNvPicPr>
+            <a:picLocks noChangeAspect="1"/>
+          </p:cNvPicPr>
+          <p:nvPr/>
+        </p:nvPicPr>
+        <p:blipFill>
+          <a:blip r:embed="rId2" cstate="print">
+            <a:extLst>
+              <a:ext uri="{28A0092B-C50C-407E-A947-70E740481C1C}">
+                <a14:useLocalDpi xmlns:a14="http://schemas.microsoft.com/office/drawing/2010/main" val="0"/>
+              </a:ext>
+            </a:extLst>
+          </a:blip>
+          <a:stretch>
+            <a:fillRect/>
+          </a:stretch>
+        </p:blipFill>
+        <p:spPr>
+          <a:xfrm>
+            <a:off x="1334272" y="2273400"/>
+            <a:ext cx="425562" cy="425562"/>
+          </a:xfrm>
+          <a:prstGeom prst="rect">
+            <a:avLst/>
+          </a:prstGeom>
+        </p:spPr>
+      </p:pic>
+      <p:pic>
+        <p:nvPicPr>
+          <p:cNvPr id="8" name="Picture 7"/>
+          <p:cNvPicPr>
+            <a:picLocks noChangeAspect="1"/>
+          </p:cNvPicPr>
+          <p:nvPr/>
+        </p:nvPicPr>
+        <p:blipFill>
+          <a:blip r:embed="rId2" cstate="print">
+            <a:extLst>
+              <a:ext uri="{28A0092B-C50C-407E-A947-70E740481C1C}">
+                <a14:useLocalDpi xmlns:a14="http://schemas.microsoft.com/office/drawing/2010/main" val="0"/>
+              </a:ext>
+            </a:extLst>
+          </a:blip>
+          <a:stretch>
+            <a:fillRect/>
+          </a:stretch>
+        </p:blipFill>
+        <p:spPr>
+          <a:xfrm>
+            <a:off x="1694366" y="2984817"/>
+            <a:ext cx="425562" cy="425562"/>
+          </a:xfrm>
+          <a:prstGeom prst="rect">
+            <a:avLst/>
+          </a:prstGeom>
+        </p:spPr>
+      </p:pic>
+      <p:pic>
+        <p:nvPicPr>
+          <p:cNvPr id="9" name="Picture 8"/>
+          <p:cNvPicPr>
+            <a:picLocks noChangeAspect="1"/>
+          </p:cNvPicPr>
+          <p:nvPr/>
+        </p:nvPicPr>
+        <p:blipFill>
+          <a:blip r:embed="rId2" cstate="print">
+            <a:extLst>
+              <a:ext uri="{28A0092B-C50C-407E-A947-70E740481C1C}">
+                <a14:useLocalDpi xmlns:a14="http://schemas.microsoft.com/office/drawing/2010/main" val="0"/>
+              </a:ext>
+            </a:extLst>
+          </a:blip>
+          <a:stretch>
+            <a:fillRect/>
+          </a:stretch>
+        </p:blipFill>
+        <p:spPr>
+          <a:xfrm>
+            <a:off x="2354268" y="2520619"/>
+            <a:ext cx="425562" cy="425562"/>
+          </a:xfrm>
+          <a:prstGeom prst="rect">
+            <a:avLst/>
+          </a:prstGeom>
+        </p:spPr>
+      </p:pic>
+      <p:sp>
+        <p:nvSpPr>
+          <p:cNvPr id="10" name="TextBox 9"/>
+          <p:cNvSpPr txBox="1"/>
+          <p:nvPr/>
+        </p:nvSpPr>
+        <p:spPr>
+          <a:xfrm>
+            <a:off x="1212739" y="3980809"/>
+            <a:ext cx="1640748" cy="369332"/>
+          </a:xfrm>
+          <a:prstGeom prst="rect">
+            <a:avLst/>
+          </a:prstGeom>
+          <a:noFill/>
+        </p:spPr>
+        <p:txBody>
+          <a:bodyPr wrap="square" rtlCol="0">
+            <a:spAutoFit/>
+          </a:bodyPr>
+          <a:lstStyle/>
+          <a:p>
+            <a:pPr algn="ctr"/>
+            <a:r>
+              <a:rPr lang="es-AR" dirty="0" smtClean="0">
+                <a:latin typeface="Segoe UI" panose="020B0502040204020203" pitchFamily="34" charset="0"/>
+                <a:cs typeface="Segoe UI" panose="020B0502040204020203" pitchFamily="34" charset="0"/>
+              </a:rPr>
+              <a:t>Población</a:t>
+            </a:r>
+            <a:endParaRPr lang="es-AR" dirty="0">
+              <a:latin typeface="Segoe UI" panose="020B0502040204020203" pitchFamily="34" charset="0"/>
+              <a:cs typeface="Segoe UI" panose="020B0502040204020203" pitchFamily="34" charset="0"/>
+            </a:endParaRPr>
+          </a:p>
+        </p:txBody>
+      </p:sp>
+      <p:sp>
+        <p:nvSpPr>
+          <p:cNvPr id="11" name="Rounded Rectangle 10"/>
+          <p:cNvSpPr/>
+          <p:nvPr/>
+        </p:nvSpPr>
+        <p:spPr>
+          <a:xfrm>
+            <a:off x="4601428" y="1301325"/>
+            <a:ext cx="4971245" cy="2369712"/>
+          </a:xfrm>
+          <a:prstGeom prst="roundRect">
+            <a:avLst/>
+          </a:prstGeom>
+          <a:ln>
+            <a:solidFill>
+              <a:schemeClr val="tx2"/>
+            </a:solidFill>
+          </a:ln>
+          <a:effectLst>
+            <a:outerShdw blurRad="50800" dist="38100" dir="2700000" algn="tl" rotWithShape="0">
+              <a:prstClr val="black">
+                <a:alpha val="40000"/>
+              </a:prstClr>
+            </a:outerShdw>
+          </a:effectLst>
+        </p:spPr>
+        <p:style>
+          <a:lnRef idx="2">
+            <a:schemeClr val="accent4"/>
+          </a:lnRef>
+          <a:fillRef idx="1">
+            <a:schemeClr val="lt1"/>
+          </a:fillRef>
+          <a:effectRef idx="0">
+            <a:schemeClr val="accent4"/>
+          </a:effectRef>
+          <a:fontRef idx="minor">
+            <a:schemeClr val="dk1"/>
+          </a:fontRef>
+        </p:style>
+        <p:txBody>
+          <a:bodyPr rtlCol="0" anchor="ctr"/>
+          <a:lstStyle/>
+          <a:p>
+            <a:pPr algn="ctr"/>
+            <a:endParaRPr lang="es-AR"/>
+          </a:p>
+        </p:txBody>
+      </p:sp>
+      <p:sp>
+        <p:nvSpPr>
+          <p:cNvPr id="12" name="Right Arrow 11"/>
+          <p:cNvSpPr/>
+          <p:nvPr/>
+        </p:nvSpPr>
+        <p:spPr>
+          <a:xfrm>
+            <a:off x="3477296" y="2273400"/>
+            <a:ext cx="875484" cy="672781"/>
+          </a:xfrm>
+          <a:prstGeom prst="rightArrow">
+            <a:avLst/>
+          </a:prstGeom>
+        </p:spPr>
+        <p:style>
+          <a:lnRef idx="1">
+            <a:schemeClr val="accent2"/>
+          </a:lnRef>
+          <a:fillRef idx="2">
+            <a:schemeClr val="accent2"/>
+          </a:fillRef>
+          <a:effectRef idx="1">
+            <a:schemeClr val="accent2"/>
+          </a:effectRef>
+          <a:fontRef idx="minor">
+            <a:schemeClr val="dk1"/>
+          </a:fontRef>
+        </p:style>
+        <p:txBody>
+          <a:bodyPr rtlCol="0" anchor="ctr"/>
+          <a:lstStyle/>
+          <a:p>
+            <a:pPr algn="ctr"/>
+            <a:endParaRPr lang="es-AR"/>
+          </a:p>
+        </p:txBody>
+      </p:sp>
+      <p:sp>
+        <p:nvSpPr>
+          <p:cNvPr id="13" name="Right Arrow 12"/>
+          <p:cNvSpPr/>
+          <p:nvPr/>
+        </p:nvSpPr>
+        <p:spPr>
+          <a:xfrm>
+            <a:off x="9851481" y="2214112"/>
+            <a:ext cx="875484" cy="672781"/>
+          </a:xfrm>
+          <a:prstGeom prst="rightArrow">
+            <a:avLst/>
+          </a:prstGeom>
+        </p:spPr>
+        <p:style>
+          <a:lnRef idx="1">
+            <a:schemeClr val="accent1"/>
+          </a:lnRef>
+          <a:fillRef idx="2">
+            <a:schemeClr val="accent1"/>
+          </a:fillRef>
+          <a:effectRef idx="1">
+            <a:schemeClr val="accent1"/>
+          </a:effectRef>
+          <a:fontRef idx="minor">
+            <a:schemeClr val="dk1"/>
+          </a:fontRef>
+        </p:style>
+        <p:txBody>
+          <a:bodyPr rtlCol="0" anchor="ctr"/>
+          <a:lstStyle/>
+          <a:p>
+            <a:pPr algn="ctr"/>
+            <a:endParaRPr lang="es-AR"/>
+          </a:p>
+        </p:txBody>
+      </p:sp>
+      <p:sp>
+        <p:nvSpPr>
+          <p:cNvPr id="14" name="Right Arrow 13"/>
+          <p:cNvSpPr/>
+          <p:nvPr/>
+        </p:nvSpPr>
+        <p:spPr>
+          <a:xfrm>
+            <a:off x="4777019" y="2249530"/>
+            <a:ext cx="865965" cy="711418"/>
+          </a:xfrm>
+          <a:prstGeom prst="rightArrow">
+            <a:avLst/>
+          </a:prstGeom>
+          <a:gradFill>
+            <a:gsLst>
+              <a:gs pos="0">
+                <a:schemeClr val="accent2">
+                  <a:lumMod val="110000"/>
+                  <a:satMod val="105000"/>
+                  <a:tint val="67000"/>
+                </a:schemeClr>
+              </a:gs>
+              <a:gs pos="100000">
+                <a:schemeClr val="bg2"/>
+              </a:gs>
+            </a:gsLst>
+          </a:gradFill>
+        </p:spPr>
+        <p:style>
+          <a:lnRef idx="1">
+            <a:schemeClr val="accent2"/>
+          </a:lnRef>
+          <a:fillRef idx="2">
+            <a:schemeClr val="accent2"/>
+          </a:fillRef>
+          <a:effectRef idx="1">
+            <a:schemeClr val="accent2"/>
+          </a:effectRef>
+          <a:fontRef idx="minor">
+            <a:schemeClr val="dk1"/>
+          </a:fontRef>
+        </p:style>
+        <p:txBody>
+          <a:bodyPr rtlCol="0" anchor="ctr"/>
+          <a:lstStyle/>
+          <a:p>
+            <a:pPr algn="ctr"/>
+            <a:endParaRPr lang="es-AR"/>
+          </a:p>
+        </p:txBody>
+      </p:sp>
+      <p:sp>
+        <p:nvSpPr>
+          <p:cNvPr id="15" name="TextBox 14"/>
+          <p:cNvSpPr txBox="1"/>
+          <p:nvPr/>
+        </p:nvSpPr>
+        <p:spPr>
+          <a:xfrm>
+            <a:off x="5542671" y="3980461"/>
+            <a:ext cx="2963684" cy="369332"/>
+          </a:xfrm>
+          <a:prstGeom prst="rect">
+            <a:avLst/>
+          </a:prstGeom>
+          <a:noFill/>
+        </p:spPr>
+        <p:txBody>
+          <a:bodyPr wrap="square" rtlCol="0">
+            <a:spAutoFit/>
+          </a:bodyPr>
+          <a:lstStyle/>
+          <a:p>
+            <a:pPr algn="ctr"/>
+            <a:r>
+              <a:rPr lang="es-AR" dirty="0" smtClean="0">
+                <a:latin typeface="Segoe UI" panose="020B0502040204020203" pitchFamily="34" charset="0"/>
+                <a:cs typeface="Segoe UI" panose="020B0502040204020203" pitchFamily="34" charset="0"/>
+              </a:rPr>
+              <a:t>Sistema = cola + canales</a:t>
+            </a:r>
+            <a:endParaRPr lang="es-AR" dirty="0">
+              <a:latin typeface="Segoe UI" panose="020B0502040204020203" pitchFamily="34" charset="0"/>
+              <a:cs typeface="Segoe UI" panose="020B0502040204020203" pitchFamily="34" charset="0"/>
+            </a:endParaRPr>
+          </a:p>
+        </p:txBody>
+      </p:sp>
+      <p:pic>
+        <p:nvPicPr>
+          <p:cNvPr id="17" name="Picture 16"/>
+          <p:cNvPicPr>
+            <a:picLocks noChangeAspect="1"/>
+          </p:cNvPicPr>
+          <p:nvPr/>
+        </p:nvPicPr>
+        <p:blipFill>
+          <a:blip r:embed="rId3" cstate="print">
+            <a:extLst>
+              <a:ext uri="{28A0092B-C50C-407E-A947-70E740481C1C}">
+                <a14:useLocalDpi xmlns:a14="http://schemas.microsoft.com/office/drawing/2010/main" val="0"/>
+              </a:ext>
+            </a:extLst>
+          </a:blip>
+          <a:stretch>
+            <a:fillRect/>
+          </a:stretch>
+        </p:blipFill>
+        <p:spPr>
+          <a:xfrm>
+            <a:off x="8566496" y="2200980"/>
+            <a:ext cx="745199" cy="745199"/>
+          </a:xfrm>
+          <a:prstGeom prst="rect">
+            <a:avLst/>
+          </a:prstGeom>
+        </p:spPr>
+      </p:pic>
+      <p:sp>
+        <p:nvSpPr>
+          <p:cNvPr id="18" name="Rectangle 17"/>
+          <p:cNvSpPr/>
+          <p:nvPr/>
+        </p:nvSpPr>
+        <p:spPr>
+          <a:xfrm>
+            <a:off x="5866227" y="2273399"/>
+            <a:ext cx="2264899" cy="554208"/>
+          </a:xfrm>
+          <a:prstGeom prst="rect">
+            <a:avLst/>
+          </a:prstGeom>
+          <a:ln>
+            <a:solidFill>
+              <a:schemeClr val="tx2"/>
+            </a:solidFill>
+          </a:ln>
+        </p:spPr>
+        <p:style>
+          <a:lnRef idx="2">
+            <a:schemeClr val="accent5"/>
+          </a:lnRef>
+          <a:fillRef idx="1">
+            <a:schemeClr val="lt1"/>
+          </a:fillRef>
+          <a:effectRef idx="0">
+            <a:schemeClr val="accent5"/>
+          </a:effectRef>
+          <a:fontRef idx="minor">
+            <a:schemeClr val="dk1"/>
+          </a:fontRef>
+        </p:style>
+        <p:txBody>
+          <a:bodyPr rtlCol="0" anchor="ctr"/>
+          <a:lstStyle/>
+          <a:p>
+            <a:pPr algn="ctr"/>
+            <a:endParaRPr lang="es-AR"/>
+          </a:p>
+        </p:txBody>
+      </p:sp>
+      <p:sp>
+        <p:nvSpPr>
+          <p:cNvPr id="19" name="TextBox 18"/>
+          <p:cNvSpPr txBox="1"/>
+          <p:nvPr/>
+        </p:nvSpPr>
+        <p:spPr>
+          <a:xfrm>
+            <a:off x="506437" y="239151"/>
+            <a:ext cx="1136658" cy="369332"/>
+          </a:xfrm>
+          <a:prstGeom prst="rect">
+            <a:avLst/>
+          </a:prstGeom>
+          <a:noFill/>
+        </p:spPr>
+        <p:txBody>
+          <a:bodyPr wrap="none" rtlCol="0">
+            <a:spAutoFit/>
+          </a:bodyPr>
+          <a:lstStyle/>
+          <a:p>
+            <a:r>
+              <a:rPr lang="es-AR" dirty="0" smtClean="0"/>
+              <a:t>Ejercicio 2</a:t>
+            </a:r>
+            <a:endParaRPr lang="es-AR" dirty="0"/>
+          </a:p>
+        </p:txBody>
+      </p:sp>
+      <mc:AlternateContent xmlns:mc="http://schemas.openxmlformats.org/markup-compatibility/2006">
+        <mc:Choice xmlns:a14="http://schemas.microsoft.com/office/drawing/2010/main" Requires="a14">
+          <p:sp>
+            <p:nvSpPr>
+              <p:cNvPr id="21" name="TextBox 20"/>
+              <p:cNvSpPr txBox="1"/>
+              <p:nvPr/>
+            </p:nvSpPr>
+            <p:spPr>
+              <a:xfrm>
+                <a:off x="3510208" y="1635057"/>
+                <a:ext cx="887486" cy="525913"/>
+              </a:xfrm>
+              <a:prstGeom prst="rect">
+                <a:avLst/>
+              </a:prstGeom>
+              <a:noFill/>
+            </p:spPr>
+            <p:txBody>
+              <a:bodyPr wrap="none" lIns="0" tIns="0" rIns="0" bIns="0" rtlCol="0">
+                <a:spAutoFit/>
+              </a:bodyPr>
+              <a:lstStyle/>
+              <a:p>
+                <a:pPr/>
+                <a14:m>
+                  <m:oMathPara xmlns:m="http://schemas.openxmlformats.org/officeDocument/2006/math">
+                    <m:oMathParaPr>
+                      <m:jc m:val="centerGroup"/>
+                    </m:oMathParaPr>
+                    <m:oMath xmlns:m="http://schemas.openxmlformats.org/officeDocument/2006/math">
+                      <m:r>
+                        <a:rPr lang="es-AR" b="0" i="1" smtClean="0">
+                          <a:latin typeface="Cambria Math" panose="02040503050406030204" pitchFamily="18" charset="0"/>
+                        </a:rPr>
+                        <m:t>𝜆</m:t>
+                      </m:r>
+                      <m:r>
+                        <a:rPr lang="es-AR" b="0" i="1" smtClean="0">
+                          <a:latin typeface="Cambria Math" panose="02040503050406030204" pitchFamily="18" charset="0"/>
+                        </a:rPr>
+                        <m:t>=3</m:t>
+                      </m:r>
+                      <m:f>
+                        <m:fPr>
+                          <m:ctrlPr>
+                            <a:rPr lang="es-AR" b="0" i="1" smtClean="0">
+                              <a:latin typeface="Cambria Math" panose="02040503050406030204" pitchFamily="18" charset="0"/>
+                            </a:rPr>
+                          </m:ctrlPr>
+                        </m:fPr>
+                        <m:num>
+                          <m:r>
+                            <a:rPr lang="es-AR" b="0" i="1" smtClean="0">
+                              <a:latin typeface="Cambria Math" panose="02040503050406030204" pitchFamily="18" charset="0"/>
+                            </a:rPr>
+                            <m:t>𝑐𝑙</m:t>
+                          </m:r>
+                        </m:num>
+                        <m:den>
+                          <m:r>
+                            <a:rPr lang="es-AR" b="0" i="1" smtClean="0">
+                              <a:latin typeface="Cambria Math" panose="02040503050406030204" pitchFamily="18" charset="0"/>
+                            </a:rPr>
+                            <m:t>h𝑟</m:t>
+                          </m:r>
+                        </m:den>
+                      </m:f>
+                    </m:oMath>
+                  </m:oMathPara>
+                </a14:m>
+                <a:endParaRPr lang="es-AR" dirty="0"/>
+              </a:p>
+            </p:txBody>
+          </p:sp>
+        </mc:Choice>
+        <mc:Fallback>
+          <p:sp>
+            <p:nvSpPr>
+              <p:cNvPr id="21" name="TextBox 20"/>
+              <p:cNvSpPr txBox="1">
+                <a:spLocks noRot="1" noChangeAspect="1" noMove="1" noResize="1" noEditPoints="1" noAdjustHandles="1" noChangeArrowheads="1" noChangeShapeType="1" noTextEdit="1"/>
+              </p:cNvSpPr>
+              <p:nvPr/>
+            </p:nvSpPr>
+            <p:spPr>
+              <a:xfrm>
+                <a:off x="3510208" y="1635057"/>
+                <a:ext cx="887486" cy="525913"/>
+              </a:xfrm>
+              <a:prstGeom prst="rect">
+                <a:avLst/>
+              </a:prstGeom>
+              <a:blipFill rotWithShape="0">
+                <a:blip r:embed="rId4"/>
+                <a:stretch>
+                  <a:fillRect/>
+                </a:stretch>
+              </a:blipFill>
+            </p:spPr>
+            <p:txBody>
+              <a:bodyPr/>
+              <a:lstStyle/>
+              <a:p>
+                <a:r>
+                  <a:rPr lang="es-AR">
+                    <a:noFill/>
+                  </a:rPr>
+                  <a:t> </a:t>
+                </a:r>
+              </a:p>
+            </p:txBody>
+          </p:sp>
+        </mc:Fallback>
+      </mc:AlternateContent>
+      <mc:AlternateContent xmlns:mc="http://schemas.openxmlformats.org/markup-compatibility/2006">
+        <mc:Choice xmlns:a14="http://schemas.microsoft.com/office/drawing/2010/main" Requires="a14">
+          <p:sp>
+            <p:nvSpPr>
+              <p:cNvPr id="22" name="TextBox 21"/>
+              <p:cNvSpPr txBox="1"/>
+              <p:nvPr/>
+            </p:nvSpPr>
+            <p:spPr>
+              <a:xfrm>
+                <a:off x="4890885" y="1751304"/>
+                <a:ext cx="602665" cy="283154"/>
+              </a:xfrm>
+              <a:prstGeom prst="rect">
+                <a:avLst/>
+              </a:prstGeom>
+              <a:noFill/>
+            </p:spPr>
+            <p:txBody>
+              <a:bodyPr wrap="none" lIns="0" tIns="0" rIns="0" bIns="0" rtlCol="0">
+                <a:spAutoFit/>
+              </a:bodyPr>
+              <a:lstStyle/>
+              <a:p>
+                <a:pPr/>
+                <a14:m>
+                  <m:oMathPara xmlns:m="http://schemas.openxmlformats.org/officeDocument/2006/math">
+                    <m:oMathParaPr>
+                      <m:jc m:val="centerGroup"/>
+                    </m:oMathParaPr>
+                    <m:oMath xmlns:m="http://schemas.openxmlformats.org/officeDocument/2006/math">
+                      <m:acc>
+                        <m:accPr>
+                          <m:chr m:val="̅"/>
+                          <m:ctrlPr>
+                            <a:rPr lang="es-AR" b="0" i="1" smtClean="0">
+                              <a:latin typeface="Cambria Math" panose="02040503050406030204" pitchFamily="18" charset="0"/>
+                            </a:rPr>
+                          </m:ctrlPr>
+                        </m:accPr>
+                        <m:e>
+                          <m:r>
+                            <a:rPr lang="es-AR" b="0" i="1" smtClean="0">
+                              <a:latin typeface="Cambria Math" panose="02040503050406030204" pitchFamily="18" charset="0"/>
+                            </a:rPr>
+                            <m:t>𝜆</m:t>
+                          </m:r>
+                        </m:e>
+                      </m:acc>
+                      <m:r>
+                        <a:rPr lang="es-AR" b="0" i="1" smtClean="0">
+                          <a:latin typeface="Cambria Math" panose="02040503050406030204" pitchFamily="18" charset="0"/>
+                        </a:rPr>
+                        <m:t>=</m:t>
+                      </m:r>
+                      <m:r>
+                        <a:rPr lang="es-AR" b="0" i="1" smtClean="0">
+                          <a:latin typeface="Cambria Math" panose="02040503050406030204" pitchFamily="18" charset="0"/>
+                        </a:rPr>
+                        <m:t>𝜆</m:t>
+                      </m:r>
+                    </m:oMath>
+                  </m:oMathPara>
+                </a14:m>
+                <a:endParaRPr lang="es-AR" dirty="0"/>
+              </a:p>
+            </p:txBody>
+          </p:sp>
+        </mc:Choice>
+        <mc:Fallback>
+          <p:sp>
+            <p:nvSpPr>
+              <p:cNvPr id="22" name="TextBox 21"/>
+              <p:cNvSpPr txBox="1">
+                <a:spLocks noRot="1" noChangeAspect="1" noMove="1" noResize="1" noEditPoints="1" noAdjustHandles="1" noChangeArrowheads="1" noChangeShapeType="1" noTextEdit="1"/>
+              </p:cNvSpPr>
+              <p:nvPr/>
+            </p:nvSpPr>
+            <p:spPr>
+              <a:xfrm>
+                <a:off x="4890885" y="1751304"/>
+                <a:ext cx="602665" cy="283154"/>
+              </a:xfrm>
+              <a:prstGeom prst="rect">
+                <a:avLst/>
+              </a:prstGeom>
+              <a:blipFill rotWithShape="0">
+                <a:blip r:embed="rId5"/>
+                <a:stretch>
+                  <a:fillRect l="-9091" t="-4255" r="-9091" b="-6383"/>
+                </a:stretch>
+              </a:blipFill>
+            </p:spPr>
+            <p:txBody>
+              <a:bodyPr/>
+              <a:lstStyle/>
+              <a:p>
+                <a:r>
+                  <a:rPr lang="es-AR">
+                    <a:noFill/>
+                  </a:rPr>
+                  <a:t> </a:t>
+                </a:r>
+              </a:p>
+            </p:txBody>
+          </p:sp>
+        </mc:Fallback>
+      </mc:AlternateContent>
+      <mc:AlternateContent xmlns:mc="http://schemas.openxmlformats.org/markup-compatibility/2006">
+        <mc:Choice xmlns:a14="http://schemas.microsoft.com/office/drawing/2010/main" Requires="a14">
+          <p:sp>
+            <p:nvSpPr>
+              <p:cNvPr id="23" name="TextBox 22"/>
+              <p:cNvSpPr txBox="1"/>
+              <p:nvPr/>
+            </p:nvSpPr>
+            <p:spPr>
+              <a:xfrm>
+                <a:off x="7675487" y="1524406"/>
+                <a:ext cx="1897186" cy="525913"/>
+              </a:xfrm>
+              <a:prstGeom prst="rect">
+                <a:avLst/>
+              </a:prstGeom>
+              <a:noFill/>
+            </p:spPr>
+            <p:txBody>
+              <a:bodyPr wrap="none" lIns="0" tIns="0" rIns="0" bIns="0" rtlCol="0">
+                <a:spAutoFit/>
+              </a:bodyPr>
+              <a:lstStyle/>
+              <a:p>
+                <a:pPr/>
+                <a14:m>
+                  <m:oMathPara xmlns:m="http://schemas.openxmlformats.org/officeDocument/2006/math">
+                    <m:oMathParaPr>
+                      <m:jc m:val="centerGroup"/>
+                    </m:oMathParaPr>
+                    <m:oMath xmlns:m="http://schemas.openxmlformats.org/officeDocument/2006/math">
+                      <m:r>
+                        <a:rPr lang="es-AR" b="0" i="1" smtClean="0">
+                          <a:latin typeface="Cambria Math" panose="02040503050406030204" pitchFamily="18" charset="0"/>
+                        </a:rPr>
+                        <m:t>𝜇</m:t>
+                      </m:r>
+                      <m:r>
+                        <a:rPr lang="es-AR" b="0" i="1" smtClean="0">
+                          <a:latin typeface="Cambria Math" panose="02040503050406030204" pitchFamily="18" charset="0"/>
+                        </a:rPr>
+                        <m:t>=</m:t>
+                      </m:r>
+                      <m:f>
+                        <m:fPr>
+                          <m:ctrlPr>
+                            <a:rPr lang="es-AR" b="0" i="1" smtClean="0">
+                              <a:latin typeface="Cambria Math" panose="02040503050406030204" pitchFamily="18" charset="0"/>
+                            </a:rPr>
+                          </m:ctrlPr>
+                        </m:fPr>
+                        <m:num>
+                          <m:r>
+                            <a:rPr lang="es-AR" b="0" i="1" smtClean="0">
+                              <a:latin typeface="Cambria Math" panose="02040503050406030204" pitchFamily="18" charset="0"/>
+                            </a:rPr>
+                            <m:t>1</m:t>
+                          </m:r>
+                        </m:num>
+                        <m:den>
+                          <m:r>
+                            <a:rPr lang="es-AR" b="0" i="1" smtClean="0">
+                              <a:latin typeface="Cambria Math" panose="02040503050406030204" pitchFamily="18" charset="0"/>
+                            </a:rPr>
+                            <m:t>6</m:t>
+                          </m:r>
+                        </m:den>
+                      </m:f>
+                      <m:f>
+                        <m:fPr>
+                          <m:ctrlPr>
+                            <a:rPr lang="es-AR" b="0" i="1" smtClean="0">
+                              <a:latin typeface="Cambria Math" panose="02040503050406030204" pitchFamily="18" charset="0"/>
+                            </a:rPr>
+                          </m:ctrlPr>
+                        </m:fPr>
+                        <m:num>
+                          <m:r>
+                            <a:rPr lang="es-AR" b="0" i="1" smtClean="0">
+                              <a:latin typeface="Cambria Math" panose="02040503050406030204" pitchFamily="18" charset="0"/>
+                            </a:rPr>
+                            <m:t>𝑐𝑙</m:t>
+                          </m:r>
+                        </m:num>
+                        <m:den>
+                          <m:r>
+                            <a:rPr lang="es-AR" b="0" i="1" smtClean="0">
+                              <a:latin typeface="Cambria Math" panose="02040503050406030204" pitchFamily="18" charset="0"/>
+                            </a:rPr>
+                            <m:t>𝑚𝑖𝑛</m:t>
+                          </m:r>
+                        </m:den>
+                      </m:f>
+                      <m:r>
+                        <a:rPr lang="es-AR" b="0" i="1" smtClean="0">
+                          <a:latin typeface="Cambria Math" panose="02040503050406030204" pitchFamily="18" charset="0"/>
+                        </a:rPr>
+                        <m:t>=10</m:t>
+                      </m:r>
+                      <m:f>
+                        <m:fPr>
+                          <m:ctrlPr>
+                            <a:rPr lang="es-AR" b="0" i="1" smtClean="0">
+                              <a:latin typeface="Cambria Math" panose="02040503050406030204" pitchFamily="18" charset="0"/>
+                            </a:rPr>
+                          </m:ctrlPr>
+                        </m:fPr>
+                        <m:num>
+                          <m:r>
+                            <a:rPr lang="es-AR" b="0" i="1" smtClean="0">
+                              <a:latin typeface="Cambria Math" panose="02040503050406030204" pitchFamily="18" charset="0"/>
+                            </a:rPr>
+                            <m:t>𝑐𝑙</m:t>
+                          </m:r>
+                        </m:num>
+                        <m:den>
+                          <m:r>
+                            <a:rPr lang="es-AR" b="0" i="1" smtClean="0">
+                              <a:latin typeface="Cambria Math" panose="02040503050406030204" pitchFamily="18" charset="0"/>
+                            </a:rPr>
+                            <m:t>h𝑟</m:t>
+                          </m:r>
+                        </m:den>
+                      </m:f>
+                    </m:oMath>
+                  </m:oMathPara>
+                </a14:m>
+                <a:endParaRPr lang="es-AR" dirty="0"/>
+              </a:p>
+            </p:txBody>
+          </p:sp>
+        </mc:Choice>
+        <mc:Fallback>
+          <p:sp>
+            <p:nvSpPr>
+              <p:cNvPr id="23" name="TextBox 22"/>
+              <p:cNvSpPr txBox="1">
+                <a:spLocks noRot="1" noChangeAspect="1" noMove="1" noResize="1" noEditPoints="1" noAdjustHandles="1" noChangeArrowheads="1" noChangeShapeType="1" noTextEdit="1"/>
+              </p:cNvSpPr>
+              <p:nvPr/>
+            </p:nvSpPr>
+            <p:spPr>
+              <a:xfrm>
+                <a:off x="7675487" y="1524406"/>
+                <a:ext cx="1897186" cy="525913"/>
+              </a:xfrm>
+              <a:prstGeom prst="rect">
+                <a:avLst/>
+              </a:prstGeom>
+              <a:blipFill rotWithShape="0">
+                <a:blip r:embed="rId6"/>
+                <a:stretch>
+                  <a:fillRect/>
+                </a:stretch>
+              </a:blipFill>
+            </p:spPr>
+            <p:txBody>
+              <a:bodyPr/>
+              <a:lstStyle/>
+              <a:p>
+                <a:r>
+                  <a:rPr lang="es-AR">
+                    <a:noFill/>
+                  </a:rPr>
+                  <a:t> </a:t>
+                </a:r>
+              </a:p>
+            </p:txBody>
+          </p:sp>
+        </mc:Fallback>
+      </mc:AlternateContent>
+      <mc:AlternateContent xmlns:mc="http://schemas.openxmlformats.org/markup-compatibility/2006">
+        <mc:Choice xmlns:a14="http://schemas.microsoft.com/office/drawing/2010/main" Requires="a14">
+          <p:sp>
+            <p:nvSpPr>
+              <p:cNvPr id="24" name="TextBox 23"/>
+              <p:cNvSpPr txBox="1"/>
+              <p:nvPr/>
+            </p:nvSpPr>
+            <p:spPr>
+              <a:xfrm>
+                <a:off x="9983562" y="1757459"/>
+                <a:ext cx="611321" cy="276999"/>
+              </a:xfrm>
+              <a:prstGeom prst="rect">
+                <a:avLst/>
+              </a:prstGeom>
+              <a:noFill/>
+            </p:spPr>
+            <p:txBody>
+              <a:bodyPr wrap="none" lIns="0" tIns="0" rIns="0" bIns="0" rtlCol="0">
+                <a:spAutoFit/>
+              </a:bodyPr>
+              <a:lstStyle/>
+              <a:p>
+                <a:pPr/>
+                <a14:m>
+                  <m:oMathPara xmlns:m="http://schemas.openxmlformats.org/officeDocument/2006/math">
+                    <m:oMathParaPr>
+                      <m:jc m:val="centerGroup"/>
+                    </m:oMathParaPr>
+                    <m:oMath xmlns:m="http://schemas.openxmlformats.org/officeDocument/2006/math">
+                      <m:acc>
+                        <m:accPr>
+                          <m:chr m:val="̅"/>
+                          <m:ctrlPr>
+                            <a:rPr lang="es-AR" b="0" i="1" smtClean="0">
+                              <a:latin typeface="Cambria Math" panose="02040503050406030204" pitchFamily="18" charset="0"/>
+                            </a:rPr>
+                          </m:ctrlPr>
+                        </m:accPr>
+                        <m:e>
+                          <m:r>
+                            <a:rPr lang="es-AR" b="0" i="1" smtClean="0">
+                              <a:latin typeface="Cambria Math" panose="02040503050406030204" pitchFamily="18" charset="0"/>
+                            </a:rPr>
+                            <m:t>𝜇</m:t>
+                          </m:r>
+                        </m:e>
+                      </m:acc>
+                      <m:r>
+                        <a:rPr lang="es-AR" b="0" i="1" smtClean="0">
+                          <a:latin typeface="Cambria Math" panose="02040503050406030204" pitchFamily="18" charset="0"/>
+                        </a:rPr>
+                        <m:t>=</m:t>
+                      </m:r>
+                      <m:r>
+                        <a:rPr lang="es-AR" b="0" i="1" smtClean="0">
+                          <a:latin typeface="Cambria Math" panose="02040503050406030204" pitchFamily="18" charset="0"/>
+                        </a:rPr>
+                        <m:t>𝜆</m:t>
+                      </m:r>
+                    </m:oMath>
+                  </m:oMathPara>
+                </a14:m>
+                <a:endParaRPr lang="es-AR" dirty="0"/>
+              </a:p>
+            </p:txBody>
+          </p:sp>
+        </mc:Choice>
+        <mc:Fallback>
+          <p:sp>
+            <p:nvSpPr>
+              <p:cNvPr id="24" name="TextBox 23"/>
+              <p:cNvSpPr txBox="1">
+                <a:spLocks noRot="1" noChangeAspect="1" noMove="1" noResize="1" noEditPoints="1" noAdjustHandles="1" noChangeArrowheads="1" noChangeShapeType="1" noTextEdit="1"/>
+              </p:cNvSpPr>
+              <p:nvPr/>
+            </p:nvSpPr>
+            <p:spPr>
+              <a:xfrm>
+                <a:off x="9983562" y="1757459"/>
+                <a:ext cx="611321" cy="276999"/>
+              </a:xfrm>
+              <a:prstGeom prst="rect">
+                <a:avLst/>
+              </a:prstGeom>
+              <a:blipFill rotWithShape="0">
+                <a:blip r:embed="rId7"/>
+                <a:stretch>
+                  <a:fillRect l="-9000" r="-9000" b="-21739"/>
+                </a:stretch>
+              </a:blipFill>
+            </p:spPr>
+            <p:txBody>
+              <a:bodyPr/>
+              <a:lstStyle/>
+              <a:p>
+                <a:r>
+                  <a:rPr lang="es-AR">
+                    <a:noFill/>
+                  </a:rPr>
+                  <a:t> </a:t>
+                </a:r>
+              </a:p>
+            </p:txBody>
+          </p:sp>
+        </mc:Fallback>
+      </mc:AlternateContent>
+    </p:spTree>
+    <p:extLst>
+      <p:ext uri="{BB962C8B-B14F-4D97-AF65-F5344CB8AC3E}">
+        <p14:creationId xmlns:p14="http://schemas.microsoft.com/office/powerpoint/2010/main" val="37058664"/>
       </p:ext>
     </p:extLst>
   </p:cSld>

</xml_diff>

<commit_message>
Ejs 3, 4 y 5
</commit_message>
<xml_diff>
--- a/tp1-colas/Imagenes.pptx
+++ b/tp1-colas/Imagenes.pptx
@@ -8,6 +8,9 @@
     <p:sldId id="256" r:id="rId2"/>
     <p:sldId id="257" r:id="rId3"/>
     <p:sldId id="258" r:id="rId4"/>
+    <p:sldId id="259" r:id="rId5"/>
+    <p:sldId id="260" r:id="rId6"/>
+    <p:sldId id="261" r:id="rId7"/>
   </p:sldIdLst>
   <p:sldSz cx="12192000" cy="6858000"/>
   <p:notesSz cx="6858000" cy="9144000"/>
@@ -108,7 +111,7 @@
   </p:defaultTextStyle>
   <p:extLst>
     <p:ext uri="{EFAFB233-063F-42B5-8137-9DF3F51BA10A}">
-      <p15:sldGuideLst xmlns:p15="http://schemas.microsoft.com/office/powerpoint/2012/main"/>
+      <p15:sldGuideLst xmlns:p15="http://schemas.microsoft.com/office/powerpoint/2012/main" xmlns=""/>
     </p:ext>
   </p:extLst>
 </p:presentation>
@@ -245,7 +248,8 @@
           <a:p>
             <a:fld id="{EAE7EBD3-30FD-4FAB-979E-FE0AAD4807BC}" type="datetimeFigureOut">
               <a:rPr lang="es-AR" smtClean="0"/>
-              <a:t>09/09/2014</a:t>
+              <a:pPr/>
+              <a:t>13/09/2014</a:t>
             </a:fld>
             <a:endParaRPr lang="es-AR"/>
           </a:p>
@@ -287,7 +291,8 @@
           <a:p>
             <a:fld id="{A173DF1F-6FD9-4134-ABE5-0680BC74F2FF}" type="slidenum">
               <a:rPr lang="es-AR" smtClean="0"/>
-              <a:t>‹#›</a:t>
+              <a:pPr/>
+              <a:t>‹Nº›</a:t>
             </a:fld>
             <a:endParaRPr lang="es-AR"/>
           </a:p>
@@ -296,7 +301,7 @@
     </p:spTree>
     <p:extLst>
       <p:ext uri="{BB962C8B-B14F-4D97-AF65-F5344CB8AC3E}">
-        <p14:creationId xmlns:p14="http://schemas.microsoft.com/office/powerpoint/2010/main" val="1478221447"/>
+        <p14:creationId xmlns:p14="http://schemas.microsoft.com/office/powerpoint/2010/main" xmlns="" val="1478221447"/>
       </p:ext>
     </p:extLst>
   </p:cSld>
@@ -415,7 +420,8 @@
           <a:p>
             <a:fld id="{EAE7EBD3-30FD-4FAB-979E-FE0AAD4807BC}" type="datetimeFigureOut">
               <a:rPr lang="es-AR" smtClean="0"/>
-              <a:t>09/09/2014</a:t>
+              <a:pPr/>
+              <a:t>13/09/2014</a:t>
             </a:fld>
             <a:endParaRPr lang="es-AR"/>
           </a:p>
@@ -457,7 +463,8 @@
           <a:p>
             <a:fld id="{A173DF1F-6FD9-4134-ABE5-0680BC74F2FF}" type="slidenum">
               <a:rPr lang="es-AR" smtClean="0"/>
-              <a:t>‹#›</a:t>
+              <a:pPr/>
+              <a:t>‹Nº›</a:t>
             </a:fld>
             <a:endParaRPr lang="es-AR"/>
           </a:p>
@@ -466,7 +473,7 @@
     </p:spTree>
     <p:extLst>
       <p:ext uri="{BB962C8B-B14F-4D97-AF65-F5344CB8AC3E}">
-        <p14:creationId xmlns:p14="http://schemas.microsoft.com/office/powerpoint/2010/main" val="787665529"/>
+        <p14:creationId xmlns:p14="http://schemas.microsoft.com/office/powerpoint/2010/main" xmlns="" val="787665529"/>
       </p:ext>
     </p:extLst>
   </p:cSld>
@@ -595,7 +602,8 @@
           <a:p>
             <a:fld id="{EAE7EBD3-30FD-4FAB-979E-FE0AAD4807BC}" type="datetimeFigureOut">
               <a:rPr lang="es-AR" smtClean="0"/>
-              <a:t>09/09/2014</a:t>
+              <a:pPr/>
+              <a:t>13/09/2014</a:t>
             </a:fld>
             <a:endParaRPr lang="es-AR"/>
           </a:p>
@@ -637,7 +645,8 @@
           <a:p>
             <a:fld id="{A173DF1F-6FD9-4134-ABE5-0680BC74F2FF}" type="slidenum">
               <a:rPr lang="es-AR" smtClean="0"/>
-              <a:t>‹#›</a:t>
+              <a:pPr/>
+              <a:t>‹Nº›</a:t>
             </a:fld>
             <a:endParaRPr lang="es-AR"/>
           </a:p>
@@ -646,7 +655,7 @@
     </p:spTree>
     <p:extLst>
       <p:ext uri="{BB962C8B-B14F-4D97-AF65-F5344CB8AC3E}">
-        <p14:creationId xmlns:p14="http://schemas.microsoft.com/office/powerpoint/2010/main" val="3550571343"/>
+        <p14:creationId xmlns:p14="http://schemas.microsoft.com/office/powerpoint/2010/main" xmlns="" val="3550571343"/>
       </p:ext>
     </p:extLst>
   </p:cSld>
@@ -765,7 +774,8 @@
           <a:p>
             <a:fld id="{EAE7EBD3-30FD-4FAB-979E-FE0AAD4807BC}" type="datetimeFigureOut">
               <a:rPr lang="es-AR" smtClean="0"/>
-              <a:t>09/09/2014</a:t>
+              <a:pPr/>
+              <a:t>13/09/2014</a:t>
             </a:fld>
             <a:endParaRPr lang="es-AR"/>
           </a:p>
@@ -807,7 +817,8 @@
           <a:p>
             <a:fld id="{A173DF1F-6FD9-4134-ABE5-0680BC74F2FF}" type="slidenum">
               <a:rPr lang="es-AR" smtClean="0"/>
-              <a:t>‹#›</a:t>
+              <a:pPr/>
+              <a:t>‹Nº›</a:t>
             </a:fld>
             <a:endParaRPr lang="es-AR"/>
           </a:p>
@@ -816,7 +827,7 @@
     </p:spTree>
     <p:extLst>
       <p:ext uri="{BB962C8B-B14F-4D97-AF65-F5344CB8AC3E}">
-        <p14:creationId xmlns:p14="http://schemas.microsoft.com/office/powerpoint/2010/main" val="1090226818"/>
+        <p14:creationId xmlns:p14="http://schemas.microsoft.com/office/powerpoint/2010/main" xmlns="" val="1090226818"/>
       </p:ext>
     </p:extLst>
   </p:cSld>
@@ -1011,7 +1022,8 @@
           <a:p>
             <a:fld id="{EAE7EBD3-30FD-4FAB-979E-FE0AAD4807BC}" type="datetimeFigureOut">
               <a:rPr lang="es-AR" smtClean="0"/>
-              <a:t>09/09/2014</a:t>
+              <a:pPr/>
+              <a:t>13/09/2014</a:t>
             </a:fld>
             <a:endParaRPr lang="es-AR"/>
           </a:p>
@@ -1053,7 +1065,8 @@
           <a:p>
             <a:fld id="{A173DF1F-6FD9-4134-ABE5-0680BC74F2FF}" type="slidenum">
               <a:rPr lang="es-AR" smtClean="0"/>
-              <a:t>‹#›</a:t>
+              <a:pPr/>
+              <a:t>‹Nº›</a:t>
             </a:fld>
             <a:endParaRPr lang="es-AR"/>
           </a:p>
@@ -1062,7 +1075,7 @@
     </p:spTree>
     <p:extLst>
       <p:ext uri="{BB962C8B-B14F-4D97-AF65-F5344CB8AC3E}">
-        <p14:creationId xmlns:p14="http://schemas.microsoft.com/office/powerpoint/2010/main" val="1797381584"/>
+        <p14:creationId xmlns:p14="http://schemas.microsoft.com/office/powerpoint/2010/main" xmlns="" val="1797381584"/>
       </p:ext>
     </p:extLst>
   </p:cSld>
@@ -1243,7 +1256,8 @@
           <a:p>
             <a:fld id="{EAE7EBD3-30FD-4FAB-979E-FE0AAD4807BC}" type="datetimeFigureOut">
               <a:rPr lang="es-AR" smtClean="0"/>
-              <a:t>09/09/2014</a:t>
+              <a:pPr/>
+              <a:t>13/09/2014</a:t>
             </a:fld>
             <a:endParaRPr lang="es-AR"/>
           </a:p>
@@ -1285,7 +1299,8 @@
           <a:p>
             <a:fld id="{A173DF1F-6FD9-4134-ABE5-0680BC74F2FF}" type="slidenum">
               <a:rPr lang="es-AR" smtClean="0"/>
-              <a:t>‹#›</a:t>
+              <a:pPr/>
+              <a:t>‹Nº›</a:t>
             </a:fld>
             <a:endParaRPr lang="es-AR"/>
           </a:p>
@@ -1294,7 +1309,7 @@
     </p:spTree>
     <p:extLst>
       <p:ext uri="{BB962C8B-B14F-4D97-AF65-F5344CB8AC3E}">
-        <p14:creationId xmlns:p14="http://schemas.microsoft.com/office/powerpoint/2010/main" val="141320725"/>
+        <p14:creationId xmlns:p14="http://schemas.microsoft.com/office/powerpoint/2010/main" xmlns="" val="141320725"/>
       </p:ext>
     </p:extLst>
   </p:cSld>
@@ -1610,7 +1625,8 @@
           <a:p>
             <a:fld id="{EAE7EBD3-30FD-4FAB-979E-FE0AAD4807BC}" type="datetimeFigureOut">
               <a:rPr lang="es-AR" smtClean="0"/>
-              <a:t>09/09/2014</a:t>
+              <a:pPr/>
+              <a:t>13/09/2014</a:t>
             </a:fld>
             <a:endParaRPr lang="es-AR"/>
           </a:p>
@@ -1652,7 +1668,8 @@
           <a:p>
             <a:fld id="{A173DF1F-6FD9-4134-ABE5-0680BC74F2FF}" type="slidenum">
               <a:rPr lang="es-AR" smtClean="0"/>
-              <a:t>‹#›</a:t>
+              <a:pPr/>
+              <a:t>‹Nº›</a:t>
             </a:fld>
             <a:endParaRPr lang="es-AR"/>
           </a:p>
@@ -1661,7 +1678,7 @@
     </p:spTree>
     <p:extLst>
       <p:ext uri="{BB962C8B-B14F-4D97-AF65-F5344CB8AC3E}">
-        <p14:creationId xmlns:p14="http://schemas.microsoft.com/office/powerpoint/2010/main" val="898217691"/>
+        <p14:creationId xmlns:p14="http://schemas.microsoft.com/office/powerpoint/2010/main" xmlns="" val="898217691"/>
       </p:ext>
     </p:extLst>
   </p:cSld>
@@ -1728,7 +1745,8 @@
           <a:p>
             <a:fld id="{EAE7EBD3-30FD-4FAB-979E-FE0AAD4807BC}" type="datetimeFigureOut">
               <a:rPr lang="es-AR" smtClean="0"/>
-              <a:t>09/09/2014</a:t>
+              <a:pPr/>
+              <a:t>13/09/2014</a:t>
             </a:fld>
             <a:endParaRPr lang="es-AR"/>
           </a:p>
@@ -1770,7 +1788,8 @@
           <a:p>
             <a:fld id="{A173DF1F-6FD9-4134-ABE5-0680BC74F2FF}" type="slidenum">
               <a:rPr lang="es-AR" smtClean="0"/>
-              <a:t>‹#›</a:t>
+              <a:pPr/>
+              <a:t>‹Nº›</a:t>
             </a:fld>
             <a:endParaRPr lang="es-AR"/>
           </a:p>
@@ -1779,7 +1798,7 @@
     </p:spTree>
     <p:extLst>
       <p:ext uri="{BB962C8B-B14F-4D97-AF65-F5344CB8AC3E}">
-        <p14:creationId xmlns:p14="http://schemas.microsoft.com/office/powerpoint/2010/main" val="1734197303"/>
+        <p14:creationId xmlns:p14="http://schemas.microsoft.com/office/powerpoint/2010/main" xmlns="" val="1734197303"/>
       </p:ext>
     </p:extLst>
   </p:cSld>
@@ -1823,7 +1842,8 @@
           <a:p>
             <a:fld id="{EAE7EBD3-30FD-4FAB-979E-FE0AAD4807BC}" type="datetimeFigureOut">
               <a:rPr lang="es-AR" smtClean="0"/>
-              <a:t>09/09/2014</a:t>
+              <a:pPr/>
+              <a:t>13/09/2014</a:t>
             </a:fld>
             <a:endParaRPr lang="es-AR"/>
           </a:p>
@@ -1865,7 +1885,8 @@
           <a:p>
             <a:fld id="{A173DF1F-6FD9-4134-ABE5-0680BC74F2FF}" type="slidenum">
               <a:rPr lang="es-AR" smtClean="0"/>
-              <a:t>‹#›</a:t>
+              <a:pPr/>
+              <a:t>‹Nº›</a:t>
             </a:fld>
             <a:endParaRPr lang="es-AR"/>
           </a:p>
@@ -1874,7 +1895,7 @@
     </p:spTree>
     <p:extLst>
       <p:ext uri="{BB962C8B-B14F-4D97-AF65-F5344CB8AC3E}">
-        <p14:creationId xmlns:p14="http://schemas.microsoft.com/office/powerpoint/2010/main" val="2733380732"/>
+        <p14:creationId xmlns:p14="http://schemas.microsoft.com/office/powerpoint/2010/main" xmlns="" val="2733380732"/>
       </p:ext>
     </p:extLst>
   </p:cSld>
@@ -2100,7 +2121,8 @@
           <a:p>
             <a:fld id="{EAE7EBD3-30FD-4FAB-979E-FE0AAD4807BC}" type="datetimeFigureOut">
               <a:rPr lang="es-AR" smtClean="0"/>
-              <a:t>09/09/2014</a:t>
+              <a:pPr/>
+              <a:t>13/09/2014</a:t>
             </a:fld>
             <a:endParaRPr lang="es-AR"/>
           </a:p>
@@ -2142,7 +2164,8 @@
           <a:p>
             <a:fld id="{A173DF1F-6FD9-4134-ABE5-0680BC74F2FF}" type="slidenum">
               <a:rPr lang="es-AR" smtClean="0"/>
-              <a:t>‹#›</a:t>
+              <a:pPr/>
+              <a:t>‹Nº›</a:t>
             </a:fld>
             <a:endParaRPr lang="es-AR"/>
           </a:p>
@@ -2151,7 +2174,7 @@
     </p:spTree>
     <p:extLst>
       <p:ext uri="{BB962C8B-B14F-4D97-AF65-F5344CB8AC3E}">
-        <p14:creationId xmlns:p14="http://schemas.microsoft.com/office/powerpoint/2010/main" val="201515298"/>
+        <p14:creationId xmlns:p14="http://schemas.microsoft.com/office/powerpoint/2010/main" xmlns="" val="201515298"/>
       </p:ext>
     </p:extLst>
   </p:cSld>
@@ -2353,7 +2376,8 @@
           <a:p>
             <a:fld id="{EAE7EBD3-30FD-4FAB-979E-FE0AAD4807BC}" type="datetimeFigureOut">
               <a:rPr lang="es-AR" smtClean="0"/>
-              <a:t>09/09/2014</a:t>
+              <a:pPr/>
+              <a:t>13/09/2014</a:t>
             </a:fld>
             <a:endParaRPr lang="es-AR"/>
           </a:p>
@@ -2395,7 +2419,8 @@
           <a:p>
             <a:fld id="{A173DF1F-6FD9-4134-ABE5-0680BC74F2FF}" type="slidenum">
               <a:rPr lang="es-AR" smtClean="0"/>
-              <a:t>‹#›</a:t>
+              <a:pPr/>
+              <a:t>‹Nº›</a:t>
             </a:fld>
             <a:endParaRPr lang="es-AR"/>
           </a:p>
@@ -2404,7 +2429,7 @@
     </p:spTree>
     <p:extLst>
       <p:ext uri="{BB962C8B-B14F-4D97-AF65-F5344CB8AC3E}">
-        <p14:creationId xmlns:p14="http://schemas.microsoft.com/office/powerpoint/2010/main" val="976262354"/>
+        <p14:creationId xmlns:p14="http://schemas.microsoft.com/office/powerpoint/2010/main" xmlns="" val="976262354"/>
       </p:ext>
     </p:extLst>
   </p:cSld>
@@ -2566,7 +2591,8 @@
           <a:p>
             <a:fld id="{EAE7EBD3-30FD-4FAB-979E-FE0AAD4807BC}" type="datetimeFigureOut">
               <a:rPr lang="es-AR" smtClean="0"/>
-              <a:t>09/09/2014</a:t>
+              <a:pPr/>
+              <a:t>13/09/2014</a:t>
             </a:fld>
             <a:endParaRPr lang="es-AR"/>
           </a:p>
@@ -2644,7 +2670,8 @@
           <a:p>
             <a:fld id="{A173DF1F-6FD9-4134-ABE5-0680BC74F2FF}" type="slidenum">
               <a:rPr lang="es-AR" smtClean="0"/>
-              <a:t>‹#›</a:t>
+              <a:pPr/>
+              <a:t>‹Nº›</a:t>
             </a:fld>
             <a:endParaRPr lang="es-AR"/>
           </a:p>
@@ -2653,7 +2680,7 @@
     </p:spTree>
     <p:extLst>
       <p:ext uri="{BB962C8B-B14F-4D97-AF65-F5344CB8AC3E}">
-        <p14:creationId xmlns:p14="http://schemas.microsoft.com/office/powerpoint/2010/main" val="2905328256"/>
+        <p14:creationId xmlns:p14="http://schemas.microsoft.com/office/powerpoint/2010/main" xmlns="" val="2905328256"/>
       </p:ext>
     </p:extLst>
   </p:cSld>
@@ -3033,7 +3060,7 @@
           <a:blip r:embed="rId2" cstate="print">
             <a:extLst>
               <a:ext uri="{28A0092B-C50C-407E-A947-70E740481C1C}">
-                <a14:useLocalDpi xmlns:a14="http://schemas.microsoft.com/office/drawing/2010/main" val="0"/>
+                <a14:useLocalDpi xmlns:a14="http://schemas.microsoft.com/office/drawing/2010/main" xmlns="" val="0"/>
               </a:ext>
             </a:extLst>
           </a:blip>
@@ -3063,7 +3090,7 @@
           <a:blip r:embed="rId2" cstate="print">
             <a:extLst>
               <a:ext uri="{28A0092B-C50C-407E-A947-70E740481C1C}">
-                <a14:useLocalDpi xmlns:a14="http://schemas.microsoft.com/office/drawing/2010/main" val="0"/>
+                <a14:useLocalDpi xmlns:a14="http://schemas.microsoft.com/office/drawing/2010/main" xmlns="" val="0"/>
               </a:ext>
             </a:extLst>
           </a:blip>
@@ -3093,7 +3120,7 @@
           <a:blip r:embed="rId2" cstate="print">
             <a:extLst>
               <a:ext uri="{28A0092B-C50C-407E-A947-70E740481C1C}">
-                <a14:useLocalDpi xmlns:a14="http://schemas.microsoft.com/office/drawing/2010/main" val="0"/>
+                <a14:useLocalDpi xmlns:a14="http://schemas.microsoft.com/office/drawing/2010/main" xmlns="" val="0"/>
               </a:ext>
             </a:extLst>
           </a:blip>
@@ -3123,7 +3150,7 @@
           <a:blip r:embed="rId2" cstate="print">
             <a:extLst>
               <a:ext uri="{28A0092B-C50C-407E-A947-70E740481C1C}">
-                <a14:useLocalDpi xmlns:a14="http://schemas.microsoft.com/office/drawing/2010/main" val="0"/>
+                <a14:useLocalDpi xmlns:a14="http://schemas.microsoft.com/office/drawing/2010/main" xmlns="" val="0"/>
               </a:ext>
             </a:extLst>
           </a:blip>
@@ -3153,7 +3180,7 @@
           <a:blip r:embed="rId2" cstate="print">
             <a:extLst>
               <a:ext uri="{28A0092B-C50C-407E-A947-70E740481C1C}">
-                <a14:useLocalDpi xmlns:a14="http://schemas.microsoft.com/office/drawing/2010/main" val="0"/>
+                <a14:useLocalDpi xmlns:a14="http://schemas.microsoft.com/office/drawing/2010/main" xmlns="" val="0"/>
               </a:ext>
             </a:extLst>
           </a:blip>
@@ -3435,7 +3462,7 @@
           <a:blip r:embed="rId3" cstate="print">
             <a:extLst>
               <a:ext uri="{28A0092B-C50C-407E-A947-70E740481C1C}">
-                <a14:useLocalDpi xmlns:a14="http://schemas.microsoft.com/office/drawing/2010/main" val="0"/>
+                <a14:useLocalDpi xmlns:a14="http://schemas.microsoft.com/office/drawing/2010/main" xmlns="" val="0"/>
               </a:ext>
             </a:extLst>
           </a:blip>
@@ -3527,7 +3554,7 @@
         </p:txBody>
       </p:sp>
       <mc:AlternateContent xmlns:mc="http://schemas.openxmlformats.org/markup-compatibility/2006">
-        <mc:Choice xmlns:a14="http://schemas.microsoft.com/office/drawing/2010/main" Requires="a14">
+        <mc:Choice xmlns:a14="http://schemas.microsoft.com/office/drawing/2010/main" xmlns="" Requires="a14">
           <p:sp>
             <p:nvSpPr>
               <p:cNvPr id="21" name="TextBox 20"/>
@@ -3589,7 +3616,7 @@
                 <a:avLst/>
               </a:prstGeom>
               <a:blipFill rotWithShape="0">
-                <a:blip r:embed="rId4"/>
+                <a:blip r:embed="rId4" cstate="print"/>
                 <a:stretch>
                   <a:fillRect l="-34483" r="-31034" b="-6522"/>
                 </a:stretch>
@@ -3611,7 +3638,7 @@
         </mc:Fallback>
       </mc:AlternateContent>
       <mc:AlternateContent xmlns:mc="http://schemas.openxmlformats.org/markup-compatibility/2006">
-        <mc:Choice xmlns:a14="http://schemas.microsoft.com/office/drawing/2010/main" Requires="a14">
+        <mc:Choice xmlns:a14="http://schemas.microsoft.com/office/drawing/2010/main" xmlns="" Requires="a14">
           <p:sp>
             <p:nvSpPr>
               <p:cNvPr id="22" name="TextBox 21"/>
@@ -3685,7 +3712,7 @@
                 <a:avLst/>
               </a:prstGeom>
               <a:blipFill rotWithShape="0">
-                <a:blip r:embed="rId5"/>
+                <a:blip r:embed="rId5" cstate="print"/>
                 <a:stretch>
                   <a:fillRect l="-34483" t="-6522" r="-93103" b="-8696"/>
                 </a:stretch>
@@ -3707,7 +3734,7 @@
         </mc:Fallback>
       </mc:AlternateContent>
       <mc:AlternateContent xmlns:mc="http://schemas.openxmlformats.org/markup-compatibility/2006">
-        <mc:Choice xmlns:a14="http://schemas.microsoft.com/office/drawing/2010/main" Requires="a14">
+        <mc:Choice xmlns:a14="http://schemas.microsoft.com/office/drawing/2010/main" xmlns="" Requires="a14">
           <p:sp>
             <p:nvSpPr>
               <p:cNvPr id="23" name="TextBox 22"/>
@@ -3769,7 +3796,7 @@
                 <a:avLst/>
               </a:prstGeom>
               <a:blipFill rotWithShape="0">
-                <a:blip r:embed="rId6"/>
+                <a:blip r:embed="rId6" cstate="print"/>
                 <a:stretch>
                   <a:fillRect l="-29032" r="-25806" b="-22222"/>
                 </a:stretch>
@@ -3791,7 +3818,7 @@
         </mc:Fallback>
       </mc:AlternateContent>
       <mc:AlternateContent xmlns:mc="http://schemas.openxmlformats.org/markup-compatibility/2006">
-        <mc:Choice xmlns:a14="http://schemas.microsoft.com/office/drawing/2010/main" Requires="a14">
+        <mc:Choice xmlns:a14="http://schemas.microsoft.com/office/drawing/2010/main" xmlns="" Requires="a14">
           <p:sp>
             <p:nvSpPr>
               <p:cNvPr id="24" name="TextBox 23"/>
@@ -3865,7 +3892,7 @@
                 <a:avLst/>
               </a:prstGeom>
               <a:blipFill rotWithShape="0">
-                <a:blip r:embed="rId7"/>
+                <a:blip r:embed="rId7" cstate="print"/>
                 <a:stretch>
                   <a:fillRect l="-29032" r="-90323" b="-22222"/>
                 </a:stretch>
@@ -3889,7 +3916,7 @@
     </p:spTree>
     <p:extLst>
       <p:ext uri="{BB962C8B-B14F-4D97-AF65-F5344CB8AC3E}">
-        <p14:creationId xmlns:p14="http://schemas.microsoft.com/office/powerpoint/2010/main" val="546631854"/>
+        <p14:creationId xmlns:p14="http://schemas.microsoft.com/office/powerpoint/2010/main" xmlns="" val="546631854"/>
       </p:ext>
     </p:extLst>
   </p:cSld>
@@ -3985,7 +4012,7 @@
           <a:blip r:embed="rId2" cstate="print">
             <a:extLst>
               <a:ext uri="{28A0092B-C50C-407E-A947-70E740481C1C}">
-                <a14:useLocalDpi xmlns:a14="http://schemas.microsoft.com/office/drawing/2010/main" val="0"/>
+                <a14:useLocalDpi xmlns:a14="http://schemas.microsoft.com/office/drawing/2010/main" xmlns="" val="0"/>
               </a:ext>
             </a:extLst>
           </a:blip>
@@ -4015,7 +4042,7 @@
           <a:blip r:embed="rId2" cstate="print">
             <a:extLst>
               <a:ext uri="{28A0092B-C50C-407E-A947-70E740481C1C}">
-                <a14:useLocalDpi xmlns:a14="http://schemas.microsoft.com/office/drawing/2010/main" val="0"/>
+                <a14:useLocalDpi xmlns:a14="http://schemas.microsoft.com/office/drawing/2010/main" xmlns="" val="0"/>
               </a:ext>
             </a:extLst>
           </a:blip>
@@ -4045,7 +4072,7 @@
           <a:blip r:embed="rId2" cstate="print">
             <a:extLst>
               <a:ext uri="{28A0092B-C50C-407E-A947-70E740481C1C}">
-                <a14:useLocalDpi xmlns:a14="http://schemas.microsoft.com/office/drawing/2010/main" val="0"/>
+                <a14:useLocalDpi xmlns:a14="http://schemas.microsoft.com/office/drawing/2010/main" xmlns="" val="0"/>
               </a:ext>
             </a:extLst>
           </a:blip>
@@ -4075,7 +4102,7 @@
           <a:blip r:embed="rId2" cstate="print">
             <a:extLst>
               <a:ext uri="{28A0092B-C50C-407E-A947-70E740481C1C}">
-                <a14:useLocalDpi xmlns:a14="http://schemas.microsoft.com/office/drawing/2010/main" val="0"/>
+                <a14:useLocalDpi xmlns:a14="http://schemas.microsoft.com/office/drawing/2010/main" xmlns="" val="0"/>
               </a:ext>
             </a:extLst>
           </a:blip>
@@ -4105,7 +4132,7 @@
           <a:blip r:embed="rId2" cstate="print">
             <a:extLst>
               <a:ext uri="{28A0092B-C50C-407E-A947-70E740481C1C}">
-                <a14:useLocalDpi xmlns:a14="http://schemas.microsoft.com/office/drawing/2010/main" val="0"/>
+                <a14:useLocalDpi xmlns:a14="http://schemas.microsoft.com/office/drawing/2010/main" xmlns="" val="0"/>
               </a:ext>
             </a:extLst>
           </a:blip>
@@ -4387,7 +4414,7 @@
           <a:blip r:embed="rId3" cstate="print">
             <a:extLst>
               <a:ext uri="{28A0092B-C50C-407E-A947-70E740481C1C}">
-                <a14:useLocalDpi xmlns:a14="http://schemas.microsoft.com/office/drawing/2010/main" val="0"/>
+                <a14:useLocalDpi xmlns:a14="http://schemas.microsoft.com/office/drawing/2010/main" xmlns="" val="0"/>
               </a:ext>
             </a:extLst>
           </a:blip>
@@ -4479,7 +4506,7 @@
         </p:txBody>
       </p:sp>
       <mc:AlternateContent xmlns:mc="http://schemas.openxmlformats.org/markup-compatibility/2006">
-        <mc:Choice xmlns:a14="http://schemas.microsoft.com/office/drawing/2010/main" Requires="a14">
+        <mc:Choice xmlns:a14="http://schemas.microsoft.com/office/drawing/2010/main" xmlns="" Requires="a14">
           <p:sp>
             <p:nvSpPr>
               <p:cNvPr id="21" name="TextBox 20"/>
@@ -4572,7 +4599,7 @@
                 <a:avLst/>
               </a:prstGeom>
               <a:blipFill rotWithShape="0">
-                <a:blip r:embed="rId4"/>
+                <a:blip r:embed="rId4" cstate="print"/>
                 <a:stretch>
                   <a:fillRect/>
                 </a:stretch>
@@ -4594,7 +4621,7 @@
         </mc:Fallback>
       </mc:AlternateContent>
       <mc:AlternateContent xmlns:mc="http://schemas.openxmlformats.org/markup-compatibility/2006">
-        <mc:Choice xmlns:a14="http://schemas.microsoft.com/office/drawing/2010/main" Requires="a14">
+        <mc:Choice xmlns:a14="http://schemas.microsoft.com/office/drawing/2010/main" xmlns="" Requires="a14">
           <p:sp>
             <p:nvSpPr>
               <p:cNvPr id="22" name="TextBox 21"/>
@@ -4680,7 +4707,7 @@
                 <a:avLst/>
               </a:prstGeom>
               <a:blipFill rotWithShape="0">
-                <a:blip r:embed="rId5"/>
+                <a:blip r:embed="rId5" cstate="print"/>
                 <a:stretch>
                   <a:fillRect l="-9091" t="-4255" r="-9091" b="-6383"/>
                 </a:stretch>
@@ -4702,7 +4729,7 @@
         </mc:Fallback>
       </mc:AlternateContent>
       <mc:AlternateContent xmlns:mc="http://schemas.openxmlformats.org/markup-compatibility/2006">
-        <mc:Choice xmlns:a14="http://schemas.microsoft.com/office/drawing/2010/main" Requires="a14">
+        <mc:Choice xmlns:a14="http://schemas.microsoft.com/office/drawing/2010/main" xmlns="" Requires="a14">
           <p:sp>
             <p:nvSpPr>
               <p:cNvPr id="23" name="TextBox 22"/>
@@ -4826,7 +4853,7 @@
                 <a:avLst/>
               </a:prstGeom>
               <a:blipFill rotWithShape="0">
-                <a:blip r:embed="rId6"/>
+                <a:blip r:embed="rId6" cstate="print"/>
                 <a:stretch>
                   <a:fillRect/>
                 </a:stretch>
@@ -4848,7 +4875,7 @@
         </mc:Fallback>
       </mc:AlternateContent>
       <mc:AlternateContent xmlns:mc="http://schemas.openxmlformats.org/markup-compatibility/2006">
-        <mc:Choice xmlns:a14="http://schemas.microsoft.com/office/drawing/2010/main" Requires="a14">
+        <mc:Choice xmlns:a14="http://schemas.microsoft.com/office/drawing/2010/main" xmlns="" Requires="a14">
           <p:sp>
             <p:nvSpPr>
               <p:cNvPr id="24" name="TextBox 23"/>
@@ -4934,7 +4961,7 @@
                 <a:avLst/>
               </a:prstGeom>
               <a:blipFill rotWithShape="0">
-                <a:blip r:embed="rId7"/>
+                <a:blip r:embed="rId7" cstate="print"/>
                 <a:stretch>
                   <a:fillRect l="-8000" r="-9000" b="-22222"/>
                 </a:stretch>
@@ -4958,7 +4985,7 @@
     </p:spTree>
     <p:extLst>
       <p:ext uri="{BB962C8B-B14F-4D97-AF65-F5344CB8AC3E}">
-        <p14:creationId xmlns:p14="http://schemas.microsoft.com/office/powerpoint/2010/main" val="3368485320"/>
+        <p14:creationId xmlns:p14="http://schemas.microsoft.com/office/powerpoint/2010/main" xmlns="" val="3368485320"/>
       </p:ext>
     </p:extLst>
   </p:cSld>
@@ -5054,7 +5081,7 @@
           <a:blip r:embed="rId2" cstate="print">
             <a:extLst>
               <a:ext uri="{28A0092B-C50C-407E-A947-70E740481C1C}">
-                <a14:useLocalDpi xmlns:a14="http://schemas.microsoft.com/office/drawing/2010/main" val="0"/>
+                <a14:useLocalDpi xmlns:a14="http://schemas.microsoft.com/office/drawing/2010/main" xmlns="" val="0"/>
               </a:ext>
             </a:extLst>
           </a:blip>
@@ -5084,7 +5111,7 @@
           <a:blip r:embed="rId2" cstate="print">
             <a:extLst>
               <a:ext uri="{28A0092B-C50C-407E-A947-70E740481C1C}">
-                <a14:useLocalDpi xmlns:a14="http://schemas.microsoft.com/office/drawing/2010/main" val="0"/>
+                <a14:useLocalDpi xmlns:a14="http://schemas.microsoft.com/office/drawing/2010/main" xmlns="" val="0"/>
               </a:ext>
             </a:extLst>
           </a:blip>
@@ -5114,7 +5141,7 @@
           <a:blip r:embed="rId2" cstate="print">
             <a:extLst>
               <a:ext uri="{28A0092B-C50C-407E-A947-70E740481C1C}">
-                <a14:useLocalDpi xmlns:a14="http://schemas.microsoft.com/office/drawing/2010/main" val="0"/>
+                <a14:useLocalDpi xmlns:a14="http://schemas.microsoft.com/office/drawing/2010/main" xmlns="" val="0"/>
               </a:ext>
             </a:extLst>
           </a:blip>
@@ -5144,7 +5171,7 @@
           <a:blip r:embed="rId2" cstate="print">
             <a:extLst>
               <a:ext uri="{28A0092B-C50C-407E-A947-70E740481C1C}">
-                <a14:useLocalDpi xmlns:a14="http://schemas.microsoft.com/office/drawing/2010/main" val="0"/>
+                <a14:useLocalDpi xmlns:a14="http://schemas.microsoft.com/office/drawing/2010/main" xmlns="" val="0"/>
               </a:ext>
             </a:extLst>
           </a:blip>
@@ -5174,7 +5201,7 @@
           <a:blip r:embed="rId2" cstate="print">
             <a:extLst>
               <a:ext uri="{28A0092B-C50C-407E-A947-70E740481C1C}">
-                <a14:useLocalDpi xmlns:a14="http://schemas.microsoft.com/office/drawing/2010/main" val="0"/>
+                <a14:useLocalDpi xmlns:a14="http://schemas.microsoft.com/office/drawing/2010/main" xmlns="" val="0"/>
               </a:ext>
             </a:extLst>
           </a:blip>
@@ -5456,7 +5483,7 @@
           <a:blip r:embed="rId3" cstate="print">
             <a:extLst>
               <a:ext uri="{28A0092B-C50C-407E-A947-70E740481C1C}">
-                <a14:useLocalDpi xmlns:a14="http://schemas.microsoft.com/office/drawing/2010/main" val="0"/>
+                <a14:useLocalDpi xmlns:a14="http://schemas.microsoft.com/office/drawing/2010/main" xmlns="" val="0"/>
               </a:ext>
             </a:extLst>
           </a:blip>
@@ -5548,7 +5575,7 @@
         </p:txBody>
       </p:sp>
       <mc:AlternateContent xmlns:mc="http://schemas.openxmlformats.org/markup-compatibility/2006">
-        <mc:Choice xmlns:a14="http://schemas.microsoft.com/office/drawing/2010/main" Requires="a14">
+        <mc:Choice xmlns:a14="http://schemas.microsoft.com/office/drawing/2010/main" xmlns="" Requires="a14">
           <p:sp>
             <p:nvSpPr>
               <p:cNvPr id="21" name="TextBox 20"/>
@@ -5641,7 +5668,7 @@
                 <a:avLst/>
               </a:prstGeom>
               <a:blipFill rotWithShape="0">
-                <a:blip r:embed="rId4"/>
+                <a:blip r:embed="rId4" cstate="print"/>
                 <a:stretch>
                   <a:fillRect/>
                 </a:stretch>
@@ -5663,7 +5690,7 @@
         </mc:Fallback>
       </mc:AlternateContent>
       <mc:AlternateContent xmlns:mc="http://schemas.openxmlformats.org/markup-compatibility/2006">
-        <mc:Choice xmlns:a14="http://schemas.microsoft.com/office/drawing/2010/main" Requires="a14">
+        <mc:Choice xmlns:a14="http://schemas.microsoft.com/office/drawing/2010/main" xmlns="" Requires="a14">
           <p:sp>
             <p:nvSpPr>
               <p:cNvPr id="22" name="TextBox 21"/>
@@ -5749,7 +5776,7 @@
                 <a:avLst/>
               </a:prstGeom>
               <a:blipFill rotWithShape="0">
-                <a:blip r:embed="rId5"/>
+                <a:blip r:embed="rId5" cstate="print"/>
                 <a:stretch>
                   <a:fillRect l="-9091" t="-4255" r="-9091" b="-6383"/>
                 </a:stretch>
@@ -5771,7 +5798,7 @@
         </mc:Fallback>
       </mc:AlternateContent>
       <mc:AlternateContent xmlns:mc="http://schemas.openxmlformats.org/markup-compatibility/2006">
-        <mc:Choice xmlns:a14="http://schemas.microsoft.com/office/drawing/2010/main" Requires="a14">
+        <mc:Choice xmlns:a14="http://schemas.microsoft.com/office/drawing/2010/main" xmlns="" Requires="a14">
           <p:sp>
             <p:nvSpPr>
               <p:cNvPr id="23" name="TextBox 22"/>
@@ -5920,7 +5947,7 @@
                 <a:avLst/>
               </a:prstGeom>
               <a:blipFill rotWithShape="0">
-                <a:blip r:embed="rId6"/>
+                <a:blip r:embed="rId6" cstate="print"/>
                 <a:stretch>
                   <a:fillRect/>
                 </a:stretch>
@@ -5942,7 +5969,7 @@
         </mc:Fallback>
       </mc:AlternateContent>
       <mc:AlternateContent xmlns:mc="http://schemas.openxmlformats.org/markup-compatibility/2006">
-        <mc:Choice xmlns:a14="http://schemas.microsoft.com/office/drawing/2010/main" Requires="a14">
+        <mc:Choice xmlns:a14="http://schemas.microsoft.com/office/drawing/2010/main" xmlns="" Requires="a14">
           <p:sp>
             <p:nvSpPr>
               <p:cNvPr id="24" name="TextBox 23"/>
@@ -6028,7 +6055,7 @@
                 <a:avLst/>
               </a:prstGeom>
               <a:blipFill rotWithShape="0">
-                <a:blip r:embed="rId7"/>
+                <a:blip r:embed="rId7" cstate="print"/>
                 <a:stretch>
                   <a:fillRect l="-9000" r="-9000" b="-21739"/>
                 </a:stretch>
@@ -6052,7 +6079,7 @@
     </p:spTree>
     <p:extLst>
       <p:ext uri="{BB962C8B-B14F-4D97-AF65-F5344CB8AC3E}">
-        <p14:creationId xmlns:p14="http://schemas.microsoft.com/office/powerpoint/2010/main" val="37058664"/>
+        <p14:creationId xmlns:p14="http://schemas.microsoft.com/office/powerpoint/2010/main" xmlns="" val="37058664"/>
       </p:ext>
     </p:extLst>
   </p:cSld>
@@ -6066,6 +6093,2947 @@
       </p:par>
     </p:tnLst>
   </p:timing>
+</p:sld>
+</file>
+
+<file path=ppt/slides/slide4.xml><?xml version="1.0" encoding="utf-8"?>
+<p:sld xmlns:a="http://schemas.openxmlformats.org/drawingml/2006/main" xmlns:r="http://schemas.openxmlformats.org/officeDocument/2006/relationships" xmlns:p="http://schemas.openxmlformats.org/presentationml/2006/main">
+  <p:cSld>
+    <p:spTree>
+      <p:nvGrpSpPr>
+        <p:cNvPr id="1" name=""/>
+        <p:cNvGrpSpPr/>
+        <p:nvPr/>
+      </p:nvGrpSpPr>
+      <p:grpSpPr>
+        <a:xfrm>
+          <a:off x="0" y="0"/>
+          <a:ext cx="0" cy="0"/>
+          <a:chOff x="0" y="0"/>
+          <a:chExt cx="0" cy="0"/>
+        </a:xfrm>
+      </p:grpSpPr>
+      <p:sp>
+        <p:nvSpPr>
+          <p:cNvPr id="5" name="Oval 3"/>
+          <p:cNvSpPr/>
+          <p:nvPr/>
+        </p:nvSpPr>
+        <p:spPr>
+          <a:xfrm>
+            <a:off x="928632" y="1301325"/>
+            <a:ext cx="2382592" cy="2369712"/>
+          </a:xfrm>
+          <a:prstGeom prst="ellipse">
+            <a:avLst/>
+          </a:prstGeom>
+          <a:ln>
+            <a:solidFill>
+              <a:schemeClr val="tx2"/>
+            </a:solidFill>
+          </a:ln>
+          <a:effectLst>
+            <a:outerShdw blurRad="50800" dist="38100" dir="2700000" algn="tl" rotWithShape="0">
+              <a:prstClr val="black">
+                <a:alpha val="40000"/>
+              </a:prstClr>
+            </a:outerShdw>
+          </a:effectLst>
+        </p:spPr>
+        <p:style>
+          <a:lnRef idx="2">
+            <a:schemeClr val="accent6"/>
+          </a:lnRef>
+          <a:fillRef idx="1">
+            <a:schemeClr val="lt1"/>
+          </a:fillRef>
+          <a:effectRef idx="0">
+            <a:schemeClr val="accent6"/>
+          </a:effectRef>
+          <a:fontRef idx="minor">
+            <a:schemeClr val="dk1"/>
+          </a:fontRef>
+        </p:style>
+        <p:txBody>
+          <a:bodyPr rtlCol="0" anchor="ctr"/>
+          <a:lstStyle/>
+          <a:p>
+            <a:pPr algn="ctr"/>
+            <a:endParaRPr lang="es-AR"/>
+          </a:p>
+        </p:txBody>
+      </p:sp>
+      <p:pic>
+        <p:nvPicPr>
+          <p:cNvPr id="6" name="Picture 4"/>
+          <p:cNvPicPr>
+            <a:picLocks noChangeAspect="1"/>
+          </p:cNvPicPr>
+          <p:nvPr/>
+        </p:nvPicPr>
+        <p:blipFill>
+          <a:blip r:embed="rId2" cstate="print">
+            <a:extLst>
+              <a:ext uri="{28A0092B-C50C-407E-A947-70E740481C1C}">
+                <a14:useLocalDpi xmlns:a14="http://schemas.microsoft.com/office/drawing/2010/main" xmlns="" val="0"/>
+              </a:ext>
+            </a:extLst>
+          </a:blip>
+          <a:stretch>
+            <a:fillRect/>
+          </a:stretch>
+        </p:blipFill>
+        <p:spPr>
+          <a:xfrm>
+            <a:off x="1481585" y="1635057"/>
+            <a:ext cx="425562" cy="425562"/>
+          </a:xfrm>
+          <a:prstGeom prst="rect">
+            <a:avLst/>
+          </a:prstGeom>
+        </p:spPr>
+      </p:pic>
+      <p:pic>
+        <p:nvPicPr>
+          <p:cNvPr id="7" name="Picture 5"/>
+          <p:cNvPicPr>
+            <a:picLocks noChangeAspect="1"/>
+          </p:cNvPicPr>
+          <p:nvPr/>
+        </p:nvPicPr>
+        <p:blipFill>
+          <a:blip r:embed="rId2" cstate="print">
+            <a:extLst>
+              <a:ext uri="{28A0092B-C50C-407E-A947-70E740481C1C}">
+                <a14:useLocalDpi xmlns:a14="http://schemas.microsoft.com/office/drawing/2010/main" xmlns="" val="0"/>
+              </a:ext>
+            </a:extLst>
+          </a:blip>
+          <a:stretch>
+            <a:fillRect/>
+          </a:stretch>
+        </p:blipFill>
+        <p:spPr>
+          <a:xfrm>
+            <a:off x="2427925" y="1847838"/>
+            <a:ext cx="425562" cy="425562"/>
+          </a:xfrm>
+          <a:prstGeom prst="rect">
+            <a:avLst/>
+          </a:prstGeom>
+        </p:spPr>
+      </p:pic>
+      <p:pic>
+        <p:nvPicPr>
+          <p:cNvPr id="8" name="Picture 6"/>
+          <p:cNvPicPr>
+            <a:picLocks noChangeAspect="1"/>
+          </p:cNvPicPr>
+          <p:nvPr/>
+        </p:nvPicPr>
+        <p:blipFill>
+          <a:blip r:embed="rId2" cstate="print">
+            <a:extLst>
+              <a:ext uri="{28A0092B-C50C-407E-A947-70E740481C1C}">
+                <a14:useLocalDpi xmlns:a14="http://schemas.microsoft.com/office/drawing/2010/main" xmlns="" val="0"/>
+              </a:ext>
+            </a:extLst>
+          </a:blip>
+          <a:stretch>
+            <a:fillRect/>
+          </a:stretch>
+        </p:blipFill>
+        <p:spPr>
+          <a:xfrm>
+            <a:off x="1334272" y="2273400"/>
+            <a:ext cx="425562" cy="425562"/>
+          </a:xfrm>
+          <a:prstGeom prst="rect">
+            <a:avLst/>
+          </a:prstGeom>
+        </p:spPr>
+      </p:pic>
+      <p:pic>
+        <p:nvPicPr>
+          <p:cNvPr id="9" name="Picture 7"/>
+          <p:cNvPicPr>
+            <a:picLocks noChangeAspect="1"/>
+          </p:cNvPicPr>
+          <p:nvPr/>
+        </p:nvPicPr>
+        <p:blipFill>
+          <a:blip r:embed="rId2" cstate="print">
+            <a:extLst>
+              <a:ext uri="{28A0092B-C50C-407E-A947-70E740481C1C}">
+                <a14:useLocalDpi xmlns:a14="http://schemas.microsoft.com/office/drawing/2010/main" xmlns="" val="0"/>
+              </a:ext>
+            </a:extLst>
+          </a:blip>
+          <a:stretch>
+            <a:fillRect/>
+          </a:stretch>
+        </p:blipFill>
+        <p:spPr>
+          <a:xfrm>
+            <a:off x="1694366" y="2984817"/>
+            <a:ext cx="425562" cy="425562"/>
+          </a:xfrm>
+          <a:prstGeom prst="rect">
+            <a:avLst/>
+          </a:prstGeom>
+        </p:spPr>
+      </p:pic>
+      <p:pic>
+        <p:nvPicPr>
+          <p:cNvPr id="10" name="Picture 8"/>
+          <p:cNvPicPr>
+            <a:picLocks noChangeAspect="1"/>
+          </p:cNvPicPr>
+          <p:nvPr/>
+        </p:nvPicPr>
+        <p:blipFill>
+          <a:blip r:embed="rId2" cstate="print">
+            <a:extLst>
+              <a:ext uri="{28A0092B-C50C-407E-A947-70E740481C1C}">
+                <a14:useLocalDpi xmlns:a14="http://schemas.microsoft.com/office/drawing/2010/main" xmlns="" val="0"/>
+              </a:ext>
+            </a:extLst>
+          </a:blip>
+          <a:stretch>
+            <a:fillRect/>
+          </a:stretch>
+        </p:blipFill>
+        <p:spPr>
+          <a:xfrm>
+            <a:off x="2354268" y="2520619"/>
+            <a:ext cx="425562" cy="425562"/>
+          </a:xfrm>
+          <a:prstGeom prst="rect">
+            <a:avLst/>
+          </a:prstGeom>
+        </p:spPr>
+      </p:pic>
+      <p:sp>
+        <p:nvSpPr>
+          <p:cNvPr id="11" name="TextBox 9"/>
+          <p:cNvSpPr txBox="1"/>
+          <p:nvPr/>
+        </p:nvSpPr>
+        <p:spPr>
+          <a:xfrm>
+            <a:off x="1212739" y="3980809"/>
+            <a:ext cx="1640748" cy="369332"/>
+          </a:xfrm>
+          <a:prstGeom prst="rect">
+            <a:avLst/>
+          </a:prstGeom>
+          <a:noFill/>
+        </p:spPr>
+        <p:txBody>
+          <a:bodyPr wrap="square" rtlCol="0">
+            <a:spAutoFit/>
+          </a:bodyPr>
+          <a:lstStyle/>
+          <a:p>
+            <a:pPr algn="ctr"/>
+            <a:r>
+              <a:rPr lang="es-AR" dirty="0" smtClean="0">
+                <a:latin typeface="Segoe UI" panose="020B0502040204020203" pitchFamily="34" charset="0"/>
+                <a:cs typeface="Segoe UI" panose="020B0502040204020203" pitchFamily="34" charset="0"/>
+              </a:rPr>
+              <a:t>Población</a:t>
+            </a:r>
+            <a:endParaRPr lang="es-AR" dirty="0">
+              <a:latin typeface="Segoe UI" panose="020B0502040204020203" pitchFamily="34" charset="0"/>
+              <a:cs typeface="Segoe UI" panose="020B0502040204020203" pitchFamily="34" charset="0"/>
+            </a:endParaRPr>
+          </a:p>
+        </p:txBody>
+      </p:sp>
+      <p:sp>
+        <p:nvSpPr>
+          <p:cNvPr id="12" name="Rounded Rectangle 10"/>
+          <p:cNvSpPr/>
+          <p:nvPr/>
+        </p:nvSpPr>
+        <p:spPr>
+          <a:xfrm>
+            <a:off x="4569897" y="1280305"/>
+            <a:ext cx="4971245" cy="2369712"/>
+          </a:xfrm>
+          <a:prstGeom prst="roundRect">
+            <a:avLst/>
+          </a:prstGeom>
+          <a:ln>
+            <a:solidFill>
+              <a:schemeClr val="tx2"/>
+            </a:solidFill>
+          </a:ln>
+          <a:effectLst>
+            <a:outerShdw blurRad="50800" dist="38100" dir="2700000" algn="tl" rotWithShape="0">
+              <a:prstClr val="black">
+                <a:alpha val="40000"/>
+              </a:prstClr>
+            </a:outerShdw>
+          </a:effectLst>
+        </p:spPr>
+        <p:style>
+          <a:lnRef idx="2">
+            <a:schemeClr val="accent4"/>
+          </a:lnRef>
+          <a:fillRef idx="1">
+            <a:schemeClr val="lt1"/>
+          </a:fillRef>
+          <a:effectRef idx="0">
+            <a:schemeClr val="accent4"/>
+          </a:effectRef>
+          <a:fontRef idx="minor">
+            <a:schemeClr val="dk1"/>
+          </a:fontRef>
+        </p:style>
+        <p:txBody>
+          <a:bodyPr rtlCol="0" anchor="ctr"/>
+          <a:lstStyle/>
+          <a:p>
+            <a:pPr algn="ctr"/>
+            <a:endParaRPr lang="es-AR"/>
+          </a:p>
+        </p:txBody>
+      </p:sp>
+      <p:sp>
+        <p:nvSpPr>
+          <p:cNvPr id="13" name="Right Arrow 11"/>
+          <p:cNvSpPr/>
+          <p:nvPr/>
+        </p:nvSpPr>
+        <p:spPr>
+          <a:xfrm>
+            <a:off x="3477296" y="2273400"/>
+            <a:ext cx="875484" cy="672781"/>
+          </a:xfrm>
+          <a:prstGeom prst="rightArrow">
+            <a:avLst/>
+          </a:prstGeom>
+        </p:spPr>
+        <p:style>
+          <a:lnRef idx="1">
+            <a:schemeClr val="accent2"/>
+          </a:lnRef>
+          <a:fillRef idx="2">
+            <a:schemeClr val="accent2"/>
+          </a:fillRef>
+          <a:effectRef idx="1">
+            <a:schemeClr val="accent2"/>
+          </a:effectRef>
+          <a:fontRef idx="minor">
+            <a:schemeClr val="dk1"/>
+          </a:fontRef>
+        </p:style>
+        <p:txBody>
+          <a:bodyPr rtlCol="0" anchor="ctr"/>
+          <a:lstStyle/>
+          <a:p>
+            <a:pPr algn="ctr"/>
+            <a:endParaRPr lang="es-AR"/>
+          </a:p>
+        </p:txBody>
+      </p:sp>
+      <p:sp>
+        <p:nvSpPr>
+          <p:cNvPr id="14" name="Right Arrow 13"/>
+          <p:cNvSpPr/>
+          <p:nvPr/>
+        </p:nvSpPr>
+        <p:spPr>
+          <a:xfrm>
+            <a:off x="4777019" y="2249530"/>
+            <a:ext cx="865965" cy="711418"/>
+          </a:xfrm>
+          <a:prstGeom prst="rightArrow">
+            <a:avLst/>
+          </a:prstGeom>
+          <a:gradFill>
+            <a:gsLst>
+              <a:gs pos="0">
+                <a:schemeClr val="accent2">
+                  <a:lumMod val="110000"/>
+                  <a:satMod val="105000"/>
+                  <a:tint val="67000"/>
+                </a:schemeClr>
+              </a:gs>
+              <a:gs pos="100000">
+                <a:schemeClr val="bg2"/>
+              </a:gs>
+            </a:gsLst>
+          </a:gradFill>
+        </p:spPr>
+        <p:style>
+          <a:lnRef idx="1">
+            <a:schemeClr val="accent2"/>
+          </a:lnRef>
+          <a:fillRef idx="2">
+            <a:schemeClr val="accent2"/>
+          </a:fillRef>
+          <a:effectRef idx="1">
+            <a:schemeClr val="accent2"/>
+          </a:effectRef>
+          <a:fontRef idx="minor">
+            <a:schemeClr val="dk1"/>
+          </a:fontRef>
+        </p:style>
+        <p:txBody>
+          <a:bodyPr rtlCol="0" anchor="ctr"/>
+          <a:lstStyle/>
+          <a:p>
+            <a:pPr algn="ctr"/>
+            <a:endParaRPr lang="es-AR"/>
+          </a:p>
+        </p:txBody>
+      </p:sp>
+      <p:sp>
+        <p:nvSpPr>
+          <p:cNvPr id="15" name="TextBox 14"/>
+          <p:cNvSpPr txBox="1"/>
+          <p:nvPr/>
+        </p:nvSpPr>
+        <p:spPr>
+          <a:xfrm>
+            <a:off x="5542671" y="3980461"/>
+            <a:ext cx="2963684" cy="369332"/>
+          </a:xfrm>
+          <a:prstGeom prst="rect">
+            <a:avLst/>
+          </a:prstGeom>
+          <a:noFill/>
+        </p:spPr>
+        <p:txBody>
+          <a:bodyPr wrap="square" rtlCol="0">
+            <a:spAutoFit/>
+          </a:bodyPr>
+          <a:lstStyle/>
+          <a:p>
+            <a:pPr algn="ctr"/>
+            <a:r>
+              <a:rPr lang="es-AR" dirty="0" smtClean="0">
+                <a:latin typeface="Segoe UI" panose="020B0502040204020203" pitchFamily="34" charset="0"/>
+                <a:cs typeface="Segoe UI" panose="020B0502040204020203" pitchFamily="34" charset="0"/>
+              </a:rPr>
+              <a:t>Sistema = cola + canales</a:t>
+            </a:r>
+            <a:endParaRPr lang="es-AR" dirty="0">
+              <a:latin typeface="Segoe UI" panose="020B0502040204020203" pitchFamily="34" charset="0"/>
+              <a:cs typeface="Segoe UI" panose="020B0502040204020203" pitchFamily="34" charset="0"/>
+            </a:endParaRPr>
+          </a:p>
+        </p:txBody>
+      </p:sp>
+      <p:pic>
+        <p:nvPicPr>
+          <p:cNvPr id="16" name="Picture 16"/>
+          <p:cNvPicPr>
+            <a:picLocks noChangeAspect="1"/>
+          </p:cNvPicPr>
+          <p:nvPr/>
+        </p:nvPicPr>
+        <p:blipFill>
+          <a:blip r:embed="rId3" cstate="print">
+            <a:extLst>
+              <a:ext uri="{28A0092B-C50C-407E-A947-70E740481C1C}">
+                <a14:useLocalDpi xmlns:a14="http://schemas.microsoft.com/office/drawing/2010/main" xmlns="" val="0"/>
+              </a:ext>
+            </a:extLst>
+          </a:blip>
+          <a:stretch>
+            <a:fillRect/>
+          </a:stretch>
+        </p:blipFill>
+        <p:spPr>
+          <a:xfrm>
+            <a:off x="8566496" y="2200980"/>
+            <a:ext cx="745199" cy="745199"/>
+          </a:xfrm>
+          <a:prstGeom prst="rect">
+            <a:avLst/>
+          </a:prstGeom>
+        </p:spPr>
+      </p:pic>
+      <p:sp>
+        <p:nvSpPr>
+          <p:cNvPr id="17" name="Rectangle 17"/>
+          <p:cNvSpPr/>
+          <p:nvPr/>
+        </p:nvSpPr>
+        <p:spPr>
+          <a:xfrm>
+            <a:off x="5866227" y="2273399"/>
+            <a:ext cx="2264899" cy="554208"/>
+          </a:xfrm>
+          <a:prstGeom prst="rect">
+            <a:avLst/>
+          </a:prstGeom>
+          <a:ln>
+            <a:solidFill>
+              <a:schemeClr val="tx2"/>
+            </a:solidFill>
+          </a:ln>
+        </p:spPr>
+        <p:style>
+          <a:lnRef idx="2">
+            <a:schemeClr val="accent5"/>
+          </a:lnRef>
+          <a:fillRef idx="1">
+            <a:schemeClr val="lt1"/>
+          </a:fillRef>
+          <a:effectRef idx="0">
+            <a:schemeClr val="accent5"/>
+          </a:effectRef>
+          <a:fontRef idx="minor">
+            <a:schemeClr val="dk1"/>
+          </a:fontRef>
+        </p:style>
+        <p:txBody>
+          <a:bodyPr rtlCol="0" anchor="ctr"/>
+          <a:lstStyle/>
+          <a:p>
+            <a:pPr algn="ctr"/>
+            <a:endParaRPr lang="es-AR"/>
+          </a:p>
+        </p:txBody>
+      </p:sp>
+      <p:sp>
+        <p:nvSpPr>
+          <p:cNvPr id="19" name="TextBox 21"/>
+          <p:cNvSpPr txBox="1">
+            <a:spLocks noRot="1" noChangeAspect="1" noMove="1" noResize="1" noEditPoints="1" noAdjustHandles="1" noChangeArrowheads="1" noChangeShapeType="1" noTextEdit="1"/>
+          </p:cNvSpPr>
+          <p:nvPr/>
+        </p:nvSpPr>
+        <p:spPr>
+          <a:xfrm>
+            <a:off x="4810517" y="1751304"/>
+            <a:ext cx="602665" cy="283154"/>
+          </a:xfrm>
+          <a:prstGeom prst="rect">
+            <a:avLst/>
+          </a:prstGeom>
+          <a:blipFill rotWithShape="0">
+            <a:blip r:embed="rId4" cstate="print"/>
+            <a:stretch>
+              <a:fillRect l="-9091" t="-4255" r="-9091" b="-6383"/>
+            </a:stretch>
+          </a:blipFill>
+        </p:spPr>
+        <p:txBody>
+          <a:bodyPr/>
+          <a:lstStyle/>
+          <a:p>
+            <a:r>
+              <a:rPr lang="es-AR">
+                <a:noFill/>
+              </a:rPr>
+              <a:t> </a:t>
+            </a:r>
+          </a:p>
+        </p:txBody>
+      </p:sp>
+      <p:sp>
+        <p:nvSpPr>
+          <p:cNvPr id="21" name="TextBox 18"/>
+          <p:cNvSpPr txBox="1"/>
+          <p:nvPr/>
+        </p:nvSpPr>
+        <p:spPr>
+          <a:xfrm>
+            <a:off x="506437" y="239151"/>
+            <a:ext cx="1136658" cy="369332"/>
+          </a:xfrm>
+          <a:prstGeom prst="rect">
+            <a:avLst/>
+          </a:prstGeom>
+          <a:noFill/>
+        </p:spPr>
+        <p:txBody>
+          <a:bodyPr wrap="none" rtlCol="0">
+            <a:spAutoFit/>
+          </a:bodyPr>
+          <a:lstStyle/>
+          <a:p>
+            <a:r>
+              <a:rPr lang="es-AR" dirty="0" smtClean="0"/>
+              <a:t>Ejercicio </a:t>
+            </a:r>
+            <a:r>
+              <a:rPr lang="es-AR" dirty="0" smtClean="0"/>
+              <a:t>3</a:t>
+            </a:r>
+            <a:endParaRPr lang="es-AR" dirty="0"/>
+          </a:p>
+        </p:txBody>
+      </p:sp>
+      <p:sp>
+        <p:nvSpPr>
+          <p:cNvPr id="1028" name="Rectangle 4"/>
+          <p:cNvSpPr>
+            <a:spLocks noChangeArrowheads="1"/>
+          </p:cNvSpPr>
+          <p:nvPr/>
+        </p:nvSpPr>
+        <p:spPr bwMode="auto">
+          <a:xfrm>
+            <a:off x="0" y="0"/>
+            <a:ext cx="12192000" cy="0"/>
+          </a:xfrm>
+          <a:prstGeom prst="rect">
+            <a:avLst/>
+          </a:prstGeom>
+          <a:noFill/>
+          <a:ln w="9525">
+            <a:noFill/>
+            <a:miter lim="800000"/>
+            <a:headEnd/>
+            <a:tailEnd/>
+          </a:ln>
+          <a:effectLst/>
+        </p:spPr>
+        <p:txBody>
+          <a:bodyPr vert="horz" wrap="none" lIns="91440" tIns="45720" rIns="91440" bIns="45720" numCol="1" anchor="ctr" anchorCtr="0" compatLnSpc="1">
+            <a:prstTxWarp prst="textNoShape">
+              <a:avLst/>
+            </a:prstTxWarp>
+            <a:spAutoFit/>
+          </a:bodyPr>
+          <a:lstStyle/>
+          <a:p>
+            <a:endParaRPr lang="es-AR"/>
+          </a:p>
+        </p:txBody>
+      </p:sp>
+      <p:pic>
+        <p:nvPicPr>
+          <p:cNvPr id="1027" name="Picture 3"/>
+          <p:cNvPicPr>
+            <a:picLocks noChangeAspect="1" noChangeArrowheads="1"/>
+          </p:cNvPicPr>
+          <p:nvPr/>
+        </p:nvPicPr>
+        <p:blipFill>
+          <a:blip r:embed="rId5" cstate="print">
+            <a:clrChange>
+              <a:clrFrom>
+                <a:srgbClr val="FFFFFF"/>
+              </a:clrFrom>
+              <a:clrTo>
+                <a:srgbClr val="FFFFFF">
+                  <a:alpha val="0"/>
+                </a:srgbClr>
+              </a:clrTo>
+            </a:clrChange>
+          </a:blip>
+          <a:srcRect/>
+          <a:stretch>
+            <a:fillRect/>
+          </a:stretch>
+        </p:blipFill>
+        <p:spPr bwMode="auto">
+          <a:xfrm>
+            <a:off x="3531476" y="1723698"/>
+            <a:ext cx="756745" cy="401304"/>
+          </a:xfrm>
+          <a:prstGeom prst="rect">
+            <a:avLst/>
+          </a:prstGeom>
+          <a:noFill/>
+        </p:spPr>
+      </p:pic>
+      <p:sp>
+        <p:nvSpPr>
+          <p:cNvPr id="1030" name="Rectangle 6"/>
+          <p:cNvSpPr>
+            <a:spLocks noChangeArrowheads="1"/>
+          </p:cNvSpPr>
+          <p:nvPr/>
+        </p:nvSpPr>
+        <p:spPr bwMode="auto">
+          <a:xfrm>
+            <a:off x="0" y="0"/>
+            <a:ext cx="12192000" cy="0"/>
+          </a:xfrm>
+          <a:prstGeom prst="rect">
+            <a:avLst/>
+          </a:prstGeom>
+          <a:noFill/>
+          <a:ln w="9525">
+            <a:noFill/>
+            <a:miter lim="800000"/>
+            <a:headEnd/>
+            <a:tailEnd/>
+          </a:ln>
+          <a:effectLst/>
+        </p:spPr>
+        <p:txBody>
+          <a:bodyPr vert="horz" wrap="none" lIns="91440" tIns="45720" rIns="91440" bIns="45720" numCol="1" anchor="ctr" anchorCtr="0" compatLnSpc="1">
+            <a:prstTxWarp prst="textNoShape">
+              <a:avLst/>
+            </a:prstTxWarp>
+            <a:spAutoFit/>
+          </a:bodyPr>
+          <a:lstStyle/>
+          <a:p>
+            <a:endParaRPr lang="es-AR"/>
+          </a:p>
+        </p:txBody>
+      </p:sp>
+      <p:pic>
+        <p:nvPicPr>
+          <p:cNvPr id="1029" name="Picture 5"/>
+          <p:cNvPicPr>
+            <a:picLocks noChangeAspect="1" noChangeArrowheads="1"/>
+          </p:cNvPicPr>
+          <p:nvPr/>
+        </p:nvPicPr>
+        <p:blipFill>
+          <a:blip r:embed="rId6" cstate="print">
+            <a:clrChange>
+              <a:clrFrom>
+                <a:srgbClr val="FFFFFF"/>
+              </a:clrFrom>
+              <a:clrTo>
+                <a:srgbClr val="FFFFFF">
+                  <a:alpha val="0"/>
+                </a:srgbClr>
+              </a:clrTo>
+            </a:clrChange>
+          </a:blip>
+          <a:srcRect/>
+          <a:stretch>
+            <a:fillRect/>
+          </a:stretch>
+        </p:blipFill>
+        <p:spPr bwMode="auto">
+          <a:xfrm>
+            <a:off x="8429296" y="1639614"/>
+            <a:ext cx="826412" cy="451944"/>
+          </a:xfrm>
+          <a:prstGeom prst="rect">
+            <a:avLst/>
+          </a:prstGeom>
+          <a:noFill/>
+        </p:spPr>
+      </p:pic>
+      <p:sp>
+        <p:nvSpPr>
+          <p:cNvPr id="26" name="Right Arrow 12"/>
+          <p:cNvSpPr/>
+          <p:nvPr/>
+        </p:nvSpPr>
+        <p:spPr>
+          <a:xfrm>
+            <a:off x="9851481" y="2214112"/>
+            <a:ext cx="875484" cy="672781"/>
+          </a:xfrm>
+          <a:prstGeom prst="rightArrow">
+            <a:avLst/>
+          </a:prstGeom>
+        </p:spPr>
+        <p:style>
+          <a:lnRef idx="1">
+            <a:schemeClr val="accent1"/>
+          </a:lnRef>
+          <a:fillRef idx="2">
+            <a:schemeClr val="accent1"/>
+          </a:fillRef>
+          <a:effectRef idx="1">
+            <a:schemeClr val="accent1"/>
+          </a:effectRef>
+          <a:fontRef idx="minor">
+            <a:schemeClr val="dk1"/>
+          </a:fontRef>
+        </p:style>
+        <p:txBody>
+          <a:bodyPr rtlCol="0" anchor="ctr"/>
+          <a:lstStyle/>
+          <a:p>
+            <a:pPr algn="ctr"/>
+            <a:endParaRPr lang="es-AR"/>
+          </a:p>
+        </p:txBody>
+      </p:sp>
+      <p:sp>
+        <p:nvSpPr>
+          <p:cNvPr id="27" name="TextBox 23"/>
+          <p:cNvSpPr txBox="1">
+            <a:spLocks noRot="1" noChangeAspect="1" noMove="1" noResize="1" noEditPoints="1" noAdjustHandles="1" noChangeArrowheads="1" noChangeShapeType="1" noTextEdit="1"/>
+          </p:cNvSpPr>
+          <p:nvPr/>
+        </p:nvSpPr>
+        <p:spPr>
+          <a:xfrm>
+            <a:off x="9983562" y="1757459"/>
+            <a:ext cx="611321" cy="276999"/>
+          </a:xfrm>
+          <a:prstGeom prst="rect">
+            <a:avLst/>
+          </a:prstGeom>
+          <a:blipFill rotWithShape="0">
+            <a:blip r:embed="rId7" cstate="print"/>
+            <a:stretch>
+              <a:fillRect l="-9000" r="-9000" b="-21739"/>
+            </a:stretch>
+          </a:blipFill>
+        </p:spPr>
+        <p:txBody>
+          <a:bodyPr/>
+          <a:lstStyle/>
+          <a:p>
+            <a:r>
+              <a:rPr lang="es-AR">
+                <a:noFill/>
+              </a:rPr>
+              <a:t> </a:t>
+            </a:r>
+          </a:p>
+        </p:txBody>
+      </p:sp>
+    </p:spTree>
+  </p:cSld>
+  <p:clrMapOvr>
+    <a:masterClrMapping/>
+  </p:clrMapOvr>
+</p:sld>
+</file>
+
+<file path=ppt/slides/slide5.xml><?xml version="1.0" encoding="utf-8"?>
+<p:sld xmlns:a="http://schemas.openxmlformats.org/drawingml/2006/main" xmlns:r="http://schemas.openxmlformats.org/officeDocument/2006/relationships" xmlns:p="http://schemas.openxmlformats.org/presentationml/2006/main">
+  <p:cSld>
+    <p:spTree>
+      <p:nvGrpSpPr>
+        <p:cNvPr id="1" name=""/>
+        <p:cNvGrpSpPr/>
+        <p:nvPr/>
+      </p:nvGrpSpPr>
+      <p:grpSpPr>
+        <a:xfrm>
+          <a:off x="0" y="0"/>
+          <a:ext cx="0" cy="0"/>
+          <a:chOff x="0" y="0"/>
+          <a:chExt cx="0" cy="0"/>
+        </a:xfrm>
+      </p:grpSpPr>
+      <p:sp>
+        <p:nvSpPr>
+          <p:cNvPr id="4" name="Oval 3"/>
+          <p:cNvSpPr/>
+          <p:nvPr/>
+        </p:nvSpPr>
+        <p:spPr>
+          <a:xfrm>
+            <a:off x="928632" y="1301325"/>
+            <a:ext cx="2382592" cy="2369712"/>
+          </a:xfrm>
+          <a:prstGeom prst="ellipse">
+            <a:avLst/>
+          </a:prstGeom>
+          <a:ln>
+            <a:solidFill>
+              <a:schemeClr val="tx2"/>
+            </a:solidFill>
+          </a:ln>
+          <a:effectLst>
+            <a:outerShdw blurRad="50800" dist="38100" dir="2700000" algn="tl" rotWithShape="0">
+              <a:prstClr val="black">
+                <a:alpha val="40000"/>
+              </a:prstClr>
+            </a:outerShdw>
+          </a:effectLst>
+        </p:spPr>
+        <p:style>
+          <a:lnRef idx="2">
+            <a:schemeClr val="accent6"/>
+          </a:lnRef>
+          <a:fillRef idx="1">
+            <a:schemeClr val="lt1"/>
+          </a:fillRef>
+          <a:effectRef idx="0">
+            <a:schemeClr val="accent6"/>
+          </a:effectRef>
+          <a:fontRef idx="minor">
+            <a:schemeClr val="dk1"/>
+          </a:fontRef>
+        </p:style>
+        <p:txBody>
+          <a:bodyPr rtlCol="0" anchor="ctr"/>
+          <a:lstStyle/>
+          <a:p>
+            <a:pPr algn="ctr"/>
+            <a:endParaRPr lang="es-AR"/>
+          </a:p>
+        </p:txBody>
+      </p:sp>
+      <p:pic>
+        <p:nvPicPr>
+          <p:cNvPr id="5" name="Picture 4"/>
+          <p:cNvPicPr>
+            <a:picLocks noChangeAspect="1"/>
+          </p:cNvPicPr>
+          <p:nvPr/>
+        </p:nvPicPr>
+        <p:blipFill>
+          <a:blip r:embed="rId2" cstate="print">
+            <a:extLst>
+              <a:ext uri="{28A0092B-C50C-407E-A947-70E740481C1C}">
+                <a14:useLocalDpi xmlns:a14="http://schemas.microsoft.com/office/drawing/2010/main" xmlns="" val="0"/>
+              </a:ext>
+            </a:extLst>
+          </a:blip>
+          <a:stretch>
+            <a:fillRect/>
+          </a:stretch>
+        </p:blipFill>
+        <p:spPr>
+          <a:xfrm>
+            <a:off x="1481585" y="1635057"/>
+            <a:ext cx="425562" cy="425562"/>
+          </a:xfrm>
+          <a:prstGeom prst="rect">
+            <a:avLst/>
+          </a:prstGeom>
+        </p:spPr>
+      </p:pic>
+      <p:pic>
+        <p:nvPicPr>
+          <p:cNvPr id="6" name="Picture 5"/>
+          <p:cNvPicPr>
+            <a:picLocks noChangeAspect="1"/>
+          </p:cNvPicPr>
+          <p:nvPr/>
+        </p:nvPicPr>
+        <p:blipFill>
+          <a:blip r:embed="rId2" cstate="print">
+            <a:extLst>
+              <a:ext uri="{28A0092B-C50C-407E-A947-70E740481C1C}">
+                <a14:useLocalDpi xmlns:a14="http://schemas.microsoft.com/office/drawing/2010/main" xmlns="" val="0"/>
+              </a:ext>
+            </a:extLst>
+          </a:blip>
+          <a:stretch>
+            <a:fillRect/>
+          </a:stretch>
+        </p:blipFill>
+        <p:spPr>
+          <a:xfrm>
+            <a:off x="2427925" y="1847838"/>
+            <a:ext cx="425562" cy="425562"/>
+          </a:xfrm>
+          <a:prstGeom prst="rect">
+            <a:avLst/>
+          </a:prstGeom>
+        </p:spPr>
+      </p:pic>
+      <p:pic>
+        <p:nvPicPr>
+          <p:cNvPr id="7" name="Picture 6"/>
+          <p:cNvPicPr>
+            <a:picLocks noChangeAspect="1"/>
+          </p:cNvPicPr>
+          <p:nvPr/>
+        </p:nvPicPr>
+        <p:blipFill>
+          <a:blip r:embed="rId2" cstate="print">
+            <a:extLst>
+              <a:ext uri="{28A0092B-C50C-407E-A947-70E740481C1C}">
+                <a14:useLocalDpi xmlns:a14="http://schemas.microsoft.com/office/drawing/2010/main" xmlns="" val="0"/>
+              </a:ext>
+            </a:extLst>
+          </a:blip>
+          <a:stretch>
+            <a:fillRect/>
+          </a:stretch>
+        </p:blipFill>
+        <p:spPr>
+          <a:xfrm>
+            <a:off x="1334272" y="2273400"/>
+            <a:ext cx="425562" cy="425562"/>
+          </a:xfrm>
+          <a:prstGeom prst="rect">
+            <a:avLst/>
+          </a:prstGeom>
+        </p:spPr>
+      </p:pic>
+      <p:pic>
+        <p:nvPicPr>
+          <p:cNvPr id="8" name="Picture 7"/>
+          <p:cNvPicPr>
+            <a:picLocks noChangeAspect="1"/>
+          </p:cNvPicPr>
+          <p:nvPr/>
+        </p:nvPicPr>
+        <p:blipFill>
+          <a:blip r:embed="rId2" cstate="print">
+            <a:extLst>
+              <a:ext uri="{28A0092B-C50C-407E-A947-70E740481C1C}">
+                <a14:useLocalDpi xmlns:a14="http://schemas.microsoft.com/office/drawing/2010/main" xmlns="" val="0"/>
+              </a:ext>
+            </a:extLst>
+          </a:blip>
+          <a:stretch>
+            <a:fillRect/>
+          </a:stretch>
+        </p:blipFill>
+        <p:spPr>
+          <a:xfrm>
+            <a:off x="1694366" y="2984817"/>
+            <a:ext cx="425562" cy="425562"/>
+          </a:xfrm>
+          <a:prstGeom prst="rect">
+            <a:avLst/>
+          </a:prstGeom>
+        </p:spPr>
+      </p:pic>
+      <p:pic>
+        <p:nvPicPr>
+          <p:cNvPr id="9" name="Picture 8"/>
+          <p:cNvPicPr>
+            <a:picLocks noChangeAspect="1"/>
+          </p:cNvPicPr>
+          <p:nvPr/>
+        </p:nvPicPr>
+        <p:blipFill>
+          <a:blip r:embed="rId2" cstate="print">
+            <a:extLst>
+              <a:ext uri="{28A0092B-C50C-407E-A947-70E740481C1C}">
+                <a14:useLocalDpi xmlns:a14="http://schemas.microsoft.com/office/drawing/2010/main" xmlns="" val="0"/>
+              </a:ext>
+            </a:extLst>
+          </a:blip>
+          <a:stretch>
+            <a:fillRect/>
+          </a:stretch>
+        </p:blipFill>
+        <p:spPr>
+          <a:xfrm>
+            <a:off x="2354268" y="2520619"/>
+            <a:ext cx="425562" cy="425562"/>
+          </a:xfrm>
+          <a:prstGeom prst="rect">
+            <a:avLst/>
+          </a:prstGeom>
+        </p:spPr>
+      </p:pic>
+      <p:sp>
+        <p:nvSpPr>
+          <p:cNvPr id="10" name="TextBox 9"/>
+          <p:cNvSpPr txBox="1"/>
+          <p:nvPr/>
+        </p:nvSpPr>
+        <p:spPr>
+          <a:xfrm>
+            <a:off x="1212739" y="3980809"/>
+            <a:ext cx="1640748" cy="369332"/>
+          </a:xfrm>
+          <a:prstGeom prst="rect">
+            <a:avLst/>
+          </a:prstGeom>
+          <a:noFill/>
+        </p:spPr>
+        <p:txBody>
+          <a:bodyPr wrap="square" rtlCol="0">
+            <a:spAutoFit/>
+          </a:bodyPr>
+          <a:lstStyle/>
+          <a:p>
+            <a:pPr algn="ctr"/>
+            <a:r>
+              <a:rPr lang="es-AR" dirty="0" smtClean="0">
+                <a:latin typeface="Segoe UI" panose="020B0502040204020203" pitchFamily="34" charset="0"/>
+                <a:cs typeface="Segoe UI" panose="020B0502040204020203" pitchFamily="34" charset="0"/>
+              </a:rPr>
+              <a:t>Población</a:t>
+            </a:r>
+            <a:endParaRPr lang="es-AR" dirty="0">
+              <a:latin typeface="Segoe UI" panose="020B0502040204020203" pitchFamily="34" charset="0"/>
+              <a:cs typeface="Segoe UI" panose="020B0502040204020203" pitchFamily="34" charset="0"/>
+            </a:endParaRPr>
+          </a:p>
+        </p:txBody>
+      </p:sp>
+      <p:sp>
+        <p:nvSpPr>
+          <p:cNvPr id="11" name="Rounded Rectangle 10"/>
+          <p:cNvSpPr/>
+          <p:nvPr/>
+        </p:nvSpPr>
+        <p:spPr>
+          <a:xfrm>
+            <a:off x="4569897" y="1280305"/>
+            <a:ext cx="4971245" cy="2369712"/>
+          </a:xfrm>
+          <a:prstGeom prst="roundRect">
+            <a:avLst/>
+          </a:prstGeom>
+          <a:ln>
+            <a:solidFill>
+              <a:schemeClr val="tx2"/>
+            </a:solidFill>
+          </a:ln>
+          <a:effectLst>
+            <a:outerShdw blurRad="50800" dist="38100" dir="2700000" algn="tl" rotWithShape="0">
+              <a:prstClr val="black">
+                <a:alpha val="40000"/>
+              </a:prstClr>
+            </a:outerShdw>
+          </a:effectLst>
+        </p:spPr>
+        <p:style>
+          <a:lnRef idx="2">
+            <a:schemeClr val="accent4"/>
+          </a:lnRef>
+          <a:fillRef idx="1">
+            <a:schemeClr val="lt1"/>
+          </a:fillRef>
+          <a:effectRef idx="0">
+            <a:schemeClr val="accent4"/>
+          </a:effectRef>
+          <a:fontRef idx="minor">
+            <a:schemeClr val="dk1"/>
+          </a:fontRef>
+        </p:style>
+        <p:txBody>
+          <a:bodyPr rtlCol="0" anchor="ctr"/>
+          <a:lstStyle/>
+          <a:p>
+            <a:pPr algn="ctr"/>
+            <a:endParaRPr lang="es-AR"/>
+          </a:p>
+        </p:txBody>
+      </p:sp>
+      <p:sp>
+        <p:nvSpPr>
+          <p:cNvPr id="12" name="Right Arrow 11"/>
+          <p:cNvSpPr/>
+          <p:nvPr/>
+        </p:nvSpPr>
+        <p:spPr>
+          <a:xfrm>
+            <a:off x="3477296" y="2273400"/>
+            <a:ext cx="875484" cy="672781"/>
+          </a:xfrm>
+          <a:prstGeom prst="rightArrow">
+            <a:avLst/>
+          </a:prstGeom>
+        </p:spPr>
+        <p:style>
+          <a:lnRef idx="1">
+            <a:schemeClr val="accent2"/>
+          </a:lnRef>
+          <a:fillRef idx="2">
+            <a:schemeClr val="accent2"/>
+          </a:fillRef>
+          <a:effectRef idx="1">
+            <a:schemeClr val="accent2"/>
+          </a:effectRef>
+          <a:fontRef idx="minor">
+            <a:schemeClr val="dk1"/>
+          </a:fontRef>
+        </p:style>
+        <p:txBody>
+          <a:bodyPr rtlCol="0" anchor="ctr"/>
+          <a:lstStyle/>
+          <a:p>
+            <a:pPr algn="ctr"/>
+            <a:endParaRPr lang="es-AR"/>
+          </a:p>
+        </p:txBody>
+      </p:sp>
+      <p:sp>
+        <p:nvSpPr>
+          <p:cNvPr id="13" name="Right Arrow 13"/>
+          <p:cNvSpPr/>
+          <p:nvPr/>
+        </p:nvSpPr>
+        <p:spPr>
+          <a:xfrm>
+            <a:off x="4777019" y="2249530"/>
+            <a:ext cx="865965" cy="711418"/>
+          </a:xfrm>
+          <a:prstGeom prst="rightArrow">
+            <a:avLst/>
+          </a:prstGeom>
+          <a:gradFill>
+            <a:gsLst>
+              <a:gs pos="0">
+                <a:schemeClr val="accent2">
+                  <a:lumMod val="110000"/>
+                  <a:satMod val="105000"/>
+                  <a:tint val="67000"/>
+                </a:schemeClr>
+              </a:gs>
+              <a:gs pos="100000">
+                <a:schemeClr val="bg2"/>
+              </a:gs>
+            </a:gsLst>
+          </a:gradFill>
+        </p:spPr>
+        <p:style>
+          <a:lnRef idx="1">
+            <a:schemeClr val="accent2"/>
+          </a:lnRef>
+          <a:fillRef idx="2">
+            <a:schemeClr val="accent2"/>
+          </a:fillRef>
+          <a:effectRef idx="1">
+            <a:schemeClr val="accent2"/>
+          </a:effectRef>
+          <a:fontRef idx="minor">
+            <a:schemeClr val="dk1"/>
+          </a:fontRef>
+        </p:style>
+        <p:txBody>
+          <a:bodyPr rtlCol="0" anchor="ctr"/>
+          <a:lstStyle/>
+          <a:p>
+            <a:pPr algn="ctr"/>
+            <a:endParaRPr lang="es-AR"/>
+          </a:p>
+        </p:txBody>
+      </p:sp>
+      <p:sp>
+        <p:nvSpPr>
+          <p:cNvPr id="14" name="TextBox 14"/>
+          <p:cNvSpPr txBox="1"/>
+          <p:nvPr/>
+        </p:nvSpPr>
+        <p:spPr>
+          <a:xfrm>
+            <a:off x="5542671" y="3980461"/>
+            <a:ext cx="2963684" cy="369332"/>
+          </a:xfrm>
+          <a:prstGeom prst="rect">
+            <a:avLst/>
+          </a:prstGeom>
+          <a:noFill/>
+        </p:spPr>
+        <p:txBody>
+          <a:bodyPr wrap="square" rtlCol="0">
+            <a:spAutoFit/>
+          </a:bodyPr>
+          <a:lstStyle/>
+          <a:p>
+            <a:pPr algn="ctr"/>
+            <a:r>
+              <a:rPr lang="es-AR" dirty="0" smtClean="0">
+                <a:latin typeface="Segoe UI" panose="020B0502040204020203" pitchFamily="34" charset="0"/>
+                <a:cs typeface="Segoe UI" panose="020B0502040204020203" pitchFamily="34" charset="0"/>
+              </a:rPr>
+              <a:t>Sistema = cola + canales</a:t>
+            </a:r>
+            <a:endParaRPr lang="es-AR" dirty="0">
+              <a:latin typeface="Segoe UI" panose="020B0502040204020203" pitchFamily="34" charset="0"/>
+              <a:cs typeface="Segoe UI" panose="020B0502040204020203" pitchFamily="34" charset="0"/>
+            </a:endParaRPr>
+          </a:p>
+        </p:txBody>
+      </p:sp>
+      <p:pic>
+        <p:nvPicPr>
+          <p:cNvPr id="15" name="Picture 16"/>
+          <p:cNvPicPr>
+            <a:picLocks noChangeAspect="1"/>
+          </p:cNvPicPr>
+          <p:nvPr/>
+        </p:nvPicPr>
+        <p:blipFill>
+          <a:blip r:embed="rId3" cstate="print">
+            <a:extLst>
+              <a:ext uri="{28A0092B-C50C-407E-A947-70E740481C1C}">
+                <a14:useLocalDpi xmlns:a14="http://schemas.microsoft.com/office/drawing/2010/main" xmlns="" val="0"/>
+              </a:ext>
+            </a:extLst>
+          </a:blip>
+          <a:stretch>
+            <a:fillRect/>
+          </a:stretch>
+        </p:blipFill>
+        <p:spPr>
+          <a:xfrm>
+            <a:off x="8566496" y="2200980"/>
+            <a:ext cx="745199" cy="745199"/>
+          </a:xfrm>
+          <a:prstGeom prst="rect">
+            <a:avLst/>
+          </a:prstGeom>
+        </p:spPr>
+      </p:pic>
+      <p:sp>
+        <p:nvSpPr>
+          <p:cNvPr id="16" name="Rectangle 17"/>
+          <p:cNvSpPr/>
+          <p:nvPr/>
+        </p:nvSpPr>
+        <p:spPr>
+          <a:xfrm>
+            <a:off x="5866227" y="2273399"/>
+            <a:ext cx="2264899" cy="554208"/>
+          </a:xfrm>
+          <a:prstGeom prst="rect">
+            <a:avLst/>
+          </a:prstGeom>
+          <a:ln>
+            <a:solidFill>
+              <a:schemeClr val="tx2"/>
+            </a:solidFill>
+          </a:ln>
+        </p:spPr>
+        <p:style>
+          <a:lnRef idx="2">
+            <a:schemeClr val="accent5"/>
+          </a:lnRef>
+          <a:fillRef idx="1">
+            <a:schemeClr val="lt1"/>
+          </a:fillRef>
+          <a:effectRef idx="0">
+            <a:schemeClr val="accent5"/>
+          </a:effectRef>
+          <a:fontRef idx="minor">
+            <a:schemeClr val="dk1"/>
+          </a:fontRef>
+        </p:style>
+        <p:txBody>
+          <a:bodyPr rtlCol="0" anchor="ctr"/>
+          <a:lstStyle/>
+          <a:p>
+            <a:pPr algn="ctr"/>
+            <a:endParaRPr lang="es-AR"/>
+          </a:p>
+        </p:txBody>
+      </p:sp>
+      <p:sp>
+        <p:nvSpPr>
+          <p:cNvPr id="18" name="TextBox 18"/>
+          <p:cNvSpPr txBox="1"/>
+          <p:nvPr/>
+        </p:nvSpPr>
+        <p:spPr>
+          <a:xfrm>
+            <a:off x="506437" y="239151"/>
+            <a:ext cx="1136658" cy="369332"/>
+          </a:xfrm>
+          <a:prstGeom prst="rect">
+            <a:avLst/>
+          </a:prstGeom>
+          <a:noFill/>
+        </p:spPr>
+        <p:txBody>
+          <a:bodyPr wrap="none" rtlCol="0">
+            <a:spAutoFit/>
+          </a:bodyPr>
+          <a:lstStyle/>
+          <a:p>
+            <a:r>
+              <a:rPr lang="es-AR" dirty="0" smtClean="0"/>
+              <a:t>Ejercicio </a:t>
+            </a:r>
+            <a:r>
+              <a:rPr lang="es-AR" dirty="0" smtClean="0"/>
+              <a:t>4</a:t>
+            </a:r>
+            <a:endParaRPr lang="es-AR" dirty="0"/>
+          </a:p>
+        </p:txBody>
+      </p:sp>
+      <p:sp>
+        <p:nvSpPr>
+          <p:cNvPr id="21" name="Right Arrow 12"/>
+          <p:cNvSpPr/>
+          <p:nvPr/>
+        </p:nvSpPr>
+        <p:spPr>
+          <a:xfrm>
+            <a:off x="9851481" y="2214112"/>
+            <a:ext cx="875484" cy="672781"/>
+          </a:xfrm>
+          <a:prstGeom prst="rightArrow">
+            <a:avLst/>
+          </a:prstGeom>
+        </p:spPr>
+        <p:style>
+          <a:lnRef idx="1">
+            <a:schemeClr val="accent1"/>
+          </a:lnRef>
+          <a:fillRef idx="2">
+            <a:schemeClr val="accent1"/>
+          </a:fillRef>
+          <a:effectRef idx="1">
+            <a:schemeClr val="accent1"/>
+          </a:effectRef>
+          <a:fontRef idx="minor">
+            <a:schemeClr val="dk1"/>
+          </a:fontRef>
+        </p:style>
+        <p:txBody>
+          <a:bodyPr rtlCol="0" anchor="ctr"/>
+          <a:lstStyle/>
+          <a:p>
+            <a:pPr algn="ctr"/>
+            <a:endParaRPr lang="es-AR"/>
+          </a:p>
+        </p:txBody>
+      </p:sp>
+      <p:sp>
+        <p:nvSpPr>
+          <p:cNvPr id="17410" name="Rectangle 2"/>
+          <p:cNvSpPr>
+            <a:spLocks noChangeArrowheads="1"/>
+          </p:cNvSpPr>
+          <p:nvPr/>
+        </p:nvSpPr>
+        <p:spPr bwMode="auto">
+          <a:xfrm>
+            <a:off x="0" y="0"/>
+            <a:ext cx="12192000" cy="0"/>
+          </a:xfrm>
+          <a:prstGeom prst="rect">
+            <a:avLst/>
+          </a:prstGeom>
+          <a:noFill/>
+          <a:ln w="9525">
+            <a:noFill/>
+            <a:miter lim="800000"/>
+            <a:headEnd/>
+            <a:tailEnd/>
+          </a:ln>
+          <a:effectLst/>
+        </p:spPr>
+        <p:txBody>
+          <a:bodyPr vert="horz" wrap="none" lIns="91440" tIns="45720" rIns="91440" bIns="45720" numCol="1" anchor="ctr" anchorCtr="0" compatLnSpc="1">
+            <a:prstTxWarp prst="textNoShape">
+              <a:avLst/>
+            </a:prstTxWarp>
+            <a:spAutoFit/>
+          </a:bodyPr>
+          <a:lstStyle/>
+          <a:p>
+            <a:endParaRPr lang="es-AR"/>
+          </a:p>
+        </p:txBody>
+      </p:sp>
+      <p:sp>
+        <p:nvSpPr>
+          <p:cNvPr id="17412" name="Rectangle 4"/>
+          <p:cNvSpPr>
+            <a:spLocks noChangeArrowheads="1"/>
+          </p:cNvSpPr>
+          <p:nvPr/>
+        </p:nvSpPr>
+        <p:spPr bwMode="auto">
+          <a:xfrm>
+            <a:off x="0" y="0"/>
+            <a:ext cx="12192000" cy="0"/>
+          </a:xfrm>
+          <a:prstGeom prst="rect">
+            <a:avLst/>
+          </a:prstGeom>
+          <a:noFill/>
+          <a:ln w="9525">
+            <a:noFill/>
+            <a:miter lim="800000"/>
+            <a:headEnd/>
+            <a:tailEnd/>
+          </a:ln>
+          <a:effectLst/>
+        </p:spPr>
+        <p:txBody>
+          <a:bodyPr vert="horz" wrap="none" lIns="91440" tIns="45720" rIns="91440" bIns="45720" numCol="1" anchor="ctr" anchorCtr="0" compatLnSpc="1">
+            <a:prstTxWarp prst="textNoShape">
+              <a:avLst/>
+            </a:prstTxWarp>
+            <a:spAutoFit/>
+          </a:bodyPr>
+          <a:lstStyle/>
+          <a:p>
+            <a:endParaRPr lang="es-AR"/>
+          </a:p>
+        </p:txBody>
+      </p:sp>
+      <p:pic>
+        <p:nvPicPr>
+          <p:cNvPr id="17411" name="Picture 3"/>
+          <p:cNvPicPr>
+            <a:picLocks noChangeAspect="1" noChangeArrowheads="1"/>
+          </p:cNvPicPr>
+          <p:nvPr/>
+        </p:nvPicPr>
+        <p:blipFill>
+          <a:blip r:embed="rId4" cstate="print">
+            <a:clrChange>
+              <a:clrFrom>
+                <a:srgbClr val="FFFFFF"/>
+              </a:clrFrom>
+              <a:clrTo>
+                <a:srgbClr val="FFFFFF">
+                  <a:alpha val="0"/>
+                </a:srgbClr>
+              </a:clrTo>
+            </a:clrChange>
+          </a:blip>
+          <a:srcRect/>
+          <a:stretch>
+            <a:fillRect/>
+          </a:stretch>
+        </p:blipFill>
+        <p:spPr bwMode="auto">
+          <a:xfrm>
+            <a:off x="3520965" y="1548025"/>
+            <a:ext cx="697953" cy="498538"/>
+          </a:xfrm>
+          <a:prstGeom prst="rect">
+            <a:avLst/>
+          </a:prstGeom>
+          <a:noFill/>
+        </p:spPr>
+      </p:pic>
+      <p:sp>
+        <p:nvSpPr>
+          <p:cNvPr id="17414" name="Rectangle 6"/>
+          <p:cNvSpPr>
+            <a:spLocks noChangeArrowheads="1"/>
+          </p:cNvSpPr>
+          <p:nvPr/>
+        </p:nvSpPr>
+        <p:spPr bwMode="auto">
+          <a:xfrm>
+            <a:off x="0" y="0"/>
+            <a:ext cx="12192000" cy="0"/>
+          </a:xfrm>
+          <a:prstGeom prst="rect">
+            <a:avLst/>
+          </a:prstGeom>
+          <a:noFill/>
+          <a:ln w="9525">
+            <a:noFill/>
+            <a:miter lim="800000"/>
+            <a:headEnd/>
+            <a:tailEnd/>
+          </a:ln>
+          <a:effectLst/>
+        </p:spPr>
+        <p:txBody>
+          <a:bodyPr vert="horz" wrap="none" lIns="91440" tIns="45720" rIns="91440" bIns="45720" numCol="1" anchor="ctr" anchorCtr="0" compatLnSpc="1">
+            <a:prstTxWarp prst="textNoShape">
+              <a:avLst/>
+            </a:prstTxWarp>
+            <a:spAutoFit/>
+          </a:bodyPr>
+          <a:lstStyle/>
+          <a:p>
+            <a:endParaRPr lang="es-AR"/>
+          </a:p>
+        </p:txBody>
+      </p:sp>
+      <p:pic>
+        <p:nvPicPr>
+          <p:cNvPr id="17413" name="Picture 5"/>
+          <p:cNvPicPr>
+            <a:picLocks noChangeAspect="1" noChangeArrowheads="1"/>
+          </p:cNvPicPr>
+          <p:nvPr/>
+        </p:nvPicPr>
+        <p:blipFill>
+          <a:blip r:embed="rId5" cstate="print">
+            <a:clrChange>
+              <a:clrFrom>
+                <a:srgbClr val="FFFFFF"/>
+              </a:clrFrom>
+              <a:clrTo>
+                <a:srgbClr val="FFFFFF">
+                  <a:alpha val="0"/>
+                </a:srgbClr>
+              </a:clrTo>
+            </a:clrChange>
+          </a:blip>
+          <a:srcRect/>
+          <a:stretch>
+            <a:fillRect/>
+          </a:stretch>
+        </p:blipFill>
+        <p:spPr bwMode="auto">
+          <a:xfrm>
+            <a:off x="4918841" y="1713186"/>
+            <a:ext cx="128337" cy="304799"/>
+          </a:xfrm>
+          <a:prstGeom prst="rect">
+            <a:avLst/>
+          </a:prstGeom>
+          <a:noFill/>
+        </p:spPr>
+      </p:pic>
+      <p:sp>
+        <p:nvSpPr>
+          <p:cNvPr id="17416" name="Rectangle 8"/>
+          <p:cNvSpPr>
+            <a:spLocks noChangeArrowheads="1"/>
+          </p:cNvSpPr>
+          <p:nvPr/>
+        </p:nvSpPr>
+        <p:spPr bwMode="auto">
+          <a:xfrm>
+            <a:off x="0" y="0"/>
+            <a:ext cx="12192000" cy="0"/>
+          </a:xfrm>
+          <a:prstGeom prst="rect">
+            <a:avLst/>
+          </a:prstGeom>
+          <a:noFill/>
+          <a:ln w="9525">
+            <a:noFill/>
+            <a:miter lim="800000"/>
+            <a:headEnd/>
+            <a:tailEnd/>
+          </a:ln>
+          <a:effectLst/>
+        </p:spPr>
+        <p:txBody>
+          <a:bodyPr vert="horz" wrap="none" lIns="91440" tIns="45720" rIns="91440" bIns="45720" numCol="1" anchor="ctr" anchorCtr="0" compatLnSpc="1">
+            <a:prstTxWarp prst="textNoShape">
+              <a:avLst/>
+            </a:prstTxWarp>
+            <a:spAutoFit/>
+          </a:bodyPr>
+          <a:lstStyle/>
+          <a:p>
+            <a:endParaRPr lang="es-AR"/>
+          </a:p>
+        </p:txBody>
+      </p:sp>
+      <p:pic>
+        <p:nvPicPr>
+          <p:cNvPr id="17415" name="Picture 7"/>
+          <p:cNvPicPr>
+            <a:picLocks noChangeAspect="1" noChangeArrowheads="1"/>
+          </p:cNvPicPr>
+          <p:nvPr/>
+        </p:nvPicPr>
+        <p:blipFill>
+          <a:blip r:embed="rId6" cstate="print">
+            <a:clrChange>
+              <a:clrFrom>
+                <a:srgbClr val="FFFFFF"/>
+              </a:clrFrom>
+              <a:clrTo>
+                <a:srgbClr val="FFFFFF">
+                  <a:alpha val="0"/>
+                </a:srgbClr>
+              </a:clrTo>
+            </a:clrChange>
+          </a:blip>
+          <a:srcRect/>
+          <a:stretch>
+            <a:fillRect/>
+          </a:stretch>
+        </p:blipFill>
+        <p:spPr bwMode="auto">
+          <a:xfrm>
+            <a:off x="8492357" y="1587062"/>
+            <a:ext cx="801189" cy="483476"/>
+          </a:xfrm>
+          <a:prstGeom prst="rect">
+            <a:avLst/>
+          </a:prstGeom>
+          <a:noFill/>
+        </p:spPr>
+      </p:pic>
+      <p:sp>
+        <p:nvSpPr>
+          <p:cNvPr id="17418" name="Rectangle 10"/>
+          <p:cNvSpPr>
+            <a:spLocks noChangeArrowheads="1"/>
+          </p:cNvSpPr>
+          <p:nvPr/>
+        </p:nvSpPr>
+        <p:spPr bwMode="auto">
+          <a:xfrm>
+            <a:off x="0" y="0"/>
+            <a:ext cx="12192000" cy="0"/>
+          </a:xfrm>
+          <a:prstGeom prst="rect">
+            <a:avLst/>
+          </a:prstGeom>
+          <a:noFill/>
+          <a:ln w="9525">
+            <a:noFill/>
+            <a:miter lim="800000"/>
+            <a:headEnd/>
+            <a:tailEnd/>
+          </a:ln>
+          <a:effectLst/>
+        </p:spPr>
+        <p:txBody>
+          <a:bodyPr vert="horz" wrap="none" lIns="91440" tIns="45720" rIns="91440" bIns="45720" numCol="1" anchor="ctr" anchorCtr="0" compatLnSpc="1">
+            <a:prstTxWarp prst="textNoShape">
+              <a:avLst/>
+            </a:prstTxWarp>
+            <a:spAutoFit/>
+          </a:bodyPr>
+          <a:lstStyle/>
+          <a:p>
+            <a:endParaRPr lang="es-AR"/>
+          </a:p>
+        </p:txBody>
+      </p:sp>
+      <p:pic>
+        <p:nvPicPr>
+          <p:cNvPr id="17417" name="Picture 9"/>
+          <p:cNvPicPr>
+            <a:picLocks noChangeAspect="1" noChangeArrowheads="1"/>
+          </p:cNvPicPr>
+          <p:nvPr/>
+        </p:nvPicPr>
+        <p:blipFill>
+          <a:blip r:embed="rId7" cstate="print">
+            <a:clrChange>
+              <a:clrFrom>
+                <a:srgbClr val="FFFFFF"/>
+              </a:clrFrom>
+              <a:clrTo>
+                <a:srgbClr val="FFFFFF">
+                  <a:alpha val="0"/>
+                </a:srgbClr>
+              </a:clrTo>
+            </a:clrChange>
+          </a:blip>
+          <a:srcRect/>
+          <a:stretch>
+            <a:fillRect/>
+          </a:stretch>
+        </p:blipFill>
+        <p:spPr bwMode="auto">
+          <a:xfrm>
+            <a:off x="10026869" y="1639614"/>
+            <a:ext cx="128337" cy="304800"/>
+          </a:xfrm>
+          <a:prstGeom prst="rect">
+            <a:avLst/>
+          </a:prstGeom>
+          <a:noFill/>
+        </p:spPr>
+      </p:pic>
+      <p:sp>
+        <p:nvSpPr>
+          <p:cNvPr id="34" name="Right Arrow 11"/>
+          <p:cNvSpPr/>
+          <p:nvPr/>
+        </p:nvSpPr>
+        <p:spPr>
+          <a:xfrm rot="5400000">
+            <a:off x="3451020" y="3382242"/>
+            <a:ext cx="875484" cy="672781"/>
+          </a:xfrm>
+          <a:prstGeom prst="rightArrow">
+            <a:avLst>
+              <a:gd name="adj1" fmla="val 53124"/>
+              <a:gd name="adj2" fmla="val 50000"/>
+            </a:avLst>
+          </a:prstGeom>
+        </p:spPr>
+        <p:style>
+          <a:lnRef idx="1">
+            <a:schemeClr val="accent2"/>
+          </a:lnRef>
+          <a:fillRef idx="2">
+            <a:schemeClr val="accent2"/>
+          </a:fillRef>
+          <a:effectRef idx="1">
+            <a:schemeClr val="accent2"/>
+          </a:effectRef>
+          <a:fontRef idx="minor">
+            <a:schemeClr val="dk1"/>
+          </a:fontRef>
+        </p:style>
+        <p:txBody>
+          <a:bodyPr rtlCol="0" anchor="ctr"/>
+          <a:lstStyle/>
+          <a:p>
+            <a:pPr algn="ctr"/>
+            <a:endParaRPr lang="es-AR"/>
+          </a:p>
+        </p:txBody>
+      </p:sp>
+      <p:sp>
+        <p:nvSpPr>
+          <p:cNvPr id="17420" name="Rectangle 12"/>
+          <p:cNvSpPr>
+            <a:spLocks noChangeArrowheads="1"/>
+          </p:cNvSpPr>
+          <p:nvPr/>
+        </p:nvSpPr>
+        <p:spPr bwMode="auto">
+          <a:xfrm>
+            <a:off x="0" y="0"/>
+            <a:ext cx="12192000" cy="0"/>
+          </a:xfrm>
+          <a:prstGeom prst="rect">
+            <a:avLst/>
+          </a:prstGeom>
+          <a:noFill/>
+          <a:ln w="9525">
+            <a:noFill/>
+            <a:miter lim="800000"/>
+            <a:headEnd/>
+            <a:tailEnd/>
+          </a:ln>
+          <a:effectLst/>
+        </p:spPr>
+        <p:txBody>
+          <a:bodyPr vert="horz" wrap="none" lIns="91440" tIns="45720" rIns="91440" bIns="45720" numCol="1" anchor="ctr" anchorCtr="0" compatLnSpc="1">
+            <a:prstTxWarp prst="textNoShape">
+              <a:avLst/>
+            </a:prstTxWarp>
+            <a:spAutoFit/>
+          </a:bodyPr>
+          <a:lstStyle/>
+          <a:p>
+            <a:endParaRPr lang="es-AR"/>
+          </a:p>
+        </p:txBody>
+      </p:sp>
+      <p:pic>
+        <p:nvPicPr>
+          <p:cNvPr id="17419" name="Picture 11"/>
+          <p:cNvPicPr>
+            <a:picLocks noChangeAspect="1" noChangeArrowheads="1"/>
+          </p:cNvPicPr>
+          <p:nvPr/>
+        </p:nvPicPr>
+        <p:blipFill>
+          <a:blip r:embed="rId8" cstate="print">
+            <a:clrChange>
+              <a:clrFrom>
+                <a:srgbClr val="FFFFFF"/>
+              </a:clrFrom>
+              <a:clrTo>
+                <a:srgbClr val="FFFFFF">
+                  <a:alpha val="0"/>
+                </a:srgbClr>
+              </a:clrTo>
+            </a:clrChange>
+          </a:blip>
+          <a:srcRect/>
+          <a:stretch>
+            <a:fillRect/>
+          </a:stretch>
+        </p:blipFill>
+        <p:spPr bwMode="auto">
+          <a:xfrm>
+            <a:off x="3783724" y="4256690"/>
+            <a:ext cx="168165" cy="319514"/>
+          </a:xfrm>
+          <a:prstGeom prst="rect">
+            <a:avLst/>
+          </a:prstGeom>
+          <a:noFill/>
+        </p:spPr>
+      </p:pic>
+      <p:cxnSp>
+        <p:nvCxnSpPr>
+          <p:cNvPr id="38" name="37 Conector recto"/>
+          <p:cNvCxnSpPr/>
+          <p:nvPr/>
+        </p:nvCxnSpPr>
+        <p:spPr>
+          <a:xfrm>
+            <a:off x="6611008" y="2270235"/>
+            <a:ext cx="0" cy="557048"/>
+          </a:xfrm>
+          <a:prstGeom prst="line">
+            <a:avLst/>
+          </a:prstGeom>
+        </p:spPr>
+        <p:style>
+          <a:lnRef idx="1">
+            <a:schemeClr val="accent1"/>
+          </a:lnRef>
+          <a:fillRef idx="0">
+            <a:schemeClr val="accent1"/>
+          </a:fillRef>
+          <a:effectRef idx="0">
+            <a:schemeClr val="accent1"/>
+          </a:effectRef>
+          <a:fontRef idx="minor">
+            <a:schemeClr val="tx1"/>
+          </a:fontRef>
+        </p:style>
+      </p:cxnSp>
+      <p:cxnSp>
+        <p:nvCxnSpPr>
+          <p:cNvPr id="39" name="38 Conector recto"/>
+          <p:cNvCxnSpPr/>
+          <p:nvPr/>
+        </p:nvCxnSpPr>
+        <p:spPr>
+          <a:xfrm>
+            <a:off x="7394028" y="2264979"/>
+            <a:ext cx="0" cy="557048"/>
+          </a:xfrm>
+          <a:prstGeom prst="line">
+            <a:avLst/>
+          </a:prstGeom>
+        </p:spPr>
+        <p:style>
+          <a:lnRef idx="1">
+            <a:schemeClr val="accent1"/>
+          </a:lnRef>
+          <a:fillRef idx="0">
+            <a:schemeClr val="accent1"/>
+          </a:fillRef>
+          <a:effectRef idx="0">
+            <a:schemeClr val="accent1"/>
+          </a:effectRef>
+          <a:fontRef idx="minor">
+            <a:schemeClr val="tx1"/>
+          </a:fontRef>
+        </p:style>
+      </p:cxnSp>
+    </p:spTree>
+  </p:cSld>
+  <p:clrMapOvr>
+    <a:masterClrMapping/>
+  </p:clrMapOvr>
+</p:sld>
+</file>
+
+<file path=ppt/slides/slide6.xml><?xml version="1.0" encoding="utf-8"?>
+<p:sld xmlns:a="http://schemas.openxmlformats.org/drawingml/2006/main" xmlns:r="http://schemas.openxmlformats.org/officeDocument/2006/relationships" xmlns:p="http://schemas.openxmlformats.org/presentationml/2006/main">
+  <p:cSld>
+    <p:spTree>
+      <p:nvGrpSpPr>
+        <p:cNvPr id="1" name=""/>
+        <p:cNvGrpSpPr/>
+        <p:nvPr/>
+      </p:nvGrpSpPr>
+      <p:grpSpPr>
+        <a:xfrm>
+          <a:off x="0" y="0"/>
+          <a:ext cx="0" cy="0"/>
+          <a:chOff x="0" y="0"/>
+          <a:chExt cx="0" cy="0"/>
+        </a:xfrm>
+      </p:grpSpPr>
+      <p:sp>
+        <p:nvSpPr>
+          <p:cNvPr id="4" name="Oval 3"/>
+          <p:cNvSpPr/>
+          <p:nvPr/>
+        </p:nvSpPr>
+        <p:spPr>
+          <a:xfrm>
+            <a:off x="928632" y="1301325"/>
+            <a:ext cx="2382592" cy="2369712"/>
+          </a:xfrm>
+          <a:prstGeom prst="ellipse">
+            <a:avLst/>
+          </a:prstGeom>
+          <a:ln>
+            <a:solidFill>
+              <a:schemeClr val="tx2"/>
+            </a:solidFill>
+          </a:ln>
+          <a:effectLst>
+            <a:outerShdw blurRad="50800" dist="38100" dir="2700000" algn="tl" rotWithShape="0">
+              <a:prstClr val="black">
+                <a:alpha val="40000"/>
+              </a:prstClr>
+            </a:outerShdw>
+          </a:effectLst>
+        </p:spPr>
+        <p:style>
+          <a:lnRef idx="2">
+            <a:schemeClr val="accent6"/>
+          </a:lnRef>
+          <a:fillRef idx="1">
+            <a:schemeClr val="lt1"/>
+          </a:fillRef>
+          <a:effectRef idx="0">
+            <a:schemeClr val="accent6"/>
+          </a:effectRef>
+          <a:fontRef idx="minor">
+            <a:schemeClr val="dk1"/>
+          </a:fontRef>
+        </p:style>
+        <p:txBody>
+          <a:bodyPr rtlCol="0" anchor="ctr"/>
+          <a:lstStyle/>
+          <a:p>
+            <a:pPr algn="ctr"/>
+            <a:endParaRPr lang="es-AR"/>
+          </a:p>
+        </p:txBody>
+      </p:sp>
+      <p:pic>
+        <p:nvPicPr>
+          <p:cNvPr id="5" name="Picture 4"/>
+          <p:cNvPicPr>
+            <a:picLocks noChangeAspect="1"/>
+          </p:cNvPicPr>
+          <p:nvPr/>
+        </p:nvPicPr>
+        <p:blipFill>
+          <a:blip r:embed="rId2" cstate="print">
+            <a:extLst>
+              <a:ext uri="{28A0092B-C50C-407E-A947-70E740481C1C}">
+                <a14:useLocalDpi xmlns:a14="http://schemas.microsoft.com/office/drawing/2010/main" xmlns="" val="0"/>
+              </a:ext>
+            </a:extLst>
+          </a:blip>
+          <a:stretch>
+            <a:fillRect/>
+          </a:stretch>
+        </p:blipFill>
+        <p:spPr>
+          <a:xfrm>
+            <a:off x="1481585" y="1635057"/>
+            <a:ext cx="425562" cy="425562"/>
+          </a:xfrm>
+          <a:prstGeom prst="rect">
+            <a:avLst/>
+          </a:prstGeom>
+        </p:spPr>
+      </p:pic>
+      <p:pic>
+        <p:nvPicPr>
+          <p:cNvPr id="6" name="Picture 5"/>
+          <p:cNvPicPr>
+            <a:picLocks noChangeAspect="1"/>
+          </p:cNvPicPr>
+          <p:nvPr/>
+        </p:nvPicPr>
+        <p:blipFill>
+          <a:blip r:embed="rId2" cstate="print">
+            <a:extLst>
+              <a:ext uri="{28A0092B-C50C-407E-A947-70E740481C1C}">
+                <a14:useLocalDpi xmlns:a14="http://schemas.microsoft.com/office/drawing/2010/main" xmlns="" val="0"/>
+              </a:ext>
+            </a:extLst>
+          </a:blip>
+          <a:stretch>
+            <a:fillRect/>
+          </a:stretch>
+        </p:blipFill>
+        <p:spPr>
+          <a:xfrm>
+            <a:off x="2427925" y="1847838"/>
+            <a:ext cx="425562" cy="425562"/>
+          </a:xfrm>
+          <a:prstGeom prst="rect">
+            <a:avLst/>
+          </a:prstGeom>
+        </p:spPr>
+      </p:pic>
+      <p:pic>
+        <p:nvPicPr>
+          <p:cNvPr id="7" name="Picture 6"/>
+          <p:cNvPicPr>
+            <a:picLocks noChangeAspect="1"/>
+          </p:cNvPicPr>
+          <p:nvPr/>
+        </p:nvPicPr>
+        <p:blipFill>
+          <a:blip r:embed="rId2" cstate="print">
+            <a:extLst>
+              <a:ext uri="{28A0092B-C50C-407E-A947-70E740481C1C}">
+                <a14:useLocalDpi xmlns:a14="http://schemas.microsoft.com/office/drawing/2010/main" xmlns="" val="0"/>
+              </a:ext>
+            </a:extLst>
+          </a:blip>
+          <a:stretch>
+            <a:fillRect/>
+          </a:stretch>
+        </p:blipFill>
+        <p:spPr>
+          <a:xfrm>
+            <a:off x="1334272" y="2273400"/>
+            <a:ext cx="425562" cy="425562"/>
+          </a:xfrm>
+          <a:prstGeom prst="rect">
+            <a:avLst/>
+          </a:prstGeom>
+        </p:spPr>
+      </p:pic>
+      <p:pic>
+        <p:nvPicPr>
+          <p:cNvPr id="8" name="Picture 7"/>
+          <p:cNvPicPr>
+            <a:picLocks noChangeAspect="1"/>
+          </p:cNvPicPr>
+          <p:nvPr/>
+        </p:nvPicPr>
+        <p:blipFill>
+          <a:blip r:embed="rId2" cstate="print">
+            <a:extLst>
+              <a:ext uri="{28A0092B-C50C-407E-A947-70E740481C1C}">
+                <a14:useLocalDpi xmlns:a14="http://schemas.microsoft.com/office/drawing/2010/main" xmlns="" val="0"/>
+              </a:ext>
+            </a:extLst>
+          </a:blip>
+          <a:stretch>
+            <a:fillRect/>
+          </a:stretch>
+        </p:blipFill>
+        <p:spPr>
+          <a:xfrm>
+            <a:off x="1694366" y="2984817"/>
+            <a:ext cx="425562" cy="425562"/>
+          </a:xfrm>
+          <a:prstGeom prst="rect">
+            <a:avLst/>
+          </a:prstGeom>
+        </p:spPr>
+      </p:pic>
+      <p:pic>
+        <p:nvPicPr>
+          <p:cNvPr id="9" name="Picture 8"/>
+          <p:cNvPicPr>
+            <a:picLocks noChangeAspect="1"/>
+          </p:cNvPicPr>
+          <p:nvPr/>
+        </p:nvPicPr>
+        <p:blipFill>
+          <a:blip r:embed="rId2" cstate="print">
+            <a:extLst>
+              <a:ext uri="{28A0092B-C50C-407E-A947-70E740481C1C}">
+                <a14:useLocalDpi xmlns:a14="http://schemas.microsoft.com/office/drawing/2010/main" xmlns="" val="0"/>
+              </a:ext>
+            </a:extLst>
+          </a:blip>
+          <a:stretch>
+            <a:fillRect/>
+          </a:stretch>
+        </p:blipFill>
+        <p:spPr>
+          <a:xfrm>
+            <a:off x="2354268" y="2520619"/>
+            <a:ext cx="425562" cy="425562"/>
+          </a:xfrm>
+          <a:prstGeom prst="rect">
+            <a:avLst/>
+          </a:prstGeom>
+        </p:spPr>
+      </p:pic>
+      <p:sp>
+        <p:nvSpPr>
+          <p:cNvPr id="10" name="TextBox 9"/>
+          <p:cNvSpPr txBox="1"/>
+          <p:nvPr/>
+        </p:nvSpPr>
+        <p:spPr>
+          <a:xfrm>
+            <a:off x="1212739" y="3980809"/>
+            <a:ext cx="1640748" cy="923330"/>
+          </a:xfrm>
+          <a:prstGeom prst="rect">
+            <a:avLst/>
+          </a:prstGeom>
+          <a:noFill/>
+        </p:spPr>
+        <p:txBody>
+          <a:bodyPr wrap="square" rtlCol="0">
+            <a:spAutoFit/>
+          </a:bodyPr>
+          <a:lstStyle/>
+          <a:p>
+            <a:pPr algn="ctr"/>
+            <a:r>
+              <a:rPr lang="es-AR" dirty="0" smtClean="0">
+                <a:latin typeface="Segoe UI" panose="020B0502040204020203" pitchFamily="34" charset="0"/>
+                <a:cs typeface="Segoe UI" panose="020B0502040204020203" pitchFamily="34" charset="0"/>
+              </a:rPr>
+              <a:t>Población fuera del sistema (J)</a:t>
+            </a:r>
+            <a:endParaRPr lang="es-AR" dirty="0">
+              <a:latin typeface="Segoe UI" panose="020B0502040204020203" pitchFamily="34" charset="0"/>
+              <a:cs typeface="Segoe UI" panose="020B0502040204020203" pitchFamily="34" charset="0"/>
+            </a:endParaRPr>
+          </a:p>
+        </p:txBody>
+      </p:sp>
+      <p:sp>
+        <p:nvSpPr>
+          <p:cNvPr id="11" name="Rounded Rectangle 10"/>
+          <p:cNvSpPr/>
+          <p:nvPr/>
+        </p:nvSpPr>
+        <p:spPr>
+          <a:xfrm>
+            <a:off x="4601428" y="1301325"/>
+            <a:ext cx="4971245" cy="2369712"/>
+          </a:xfrm>
+          <a:prstGeom prst="roundRect">
+            <a:avLst/>
+          </a:prstGeom>
+          <a:ln>
+            <a:solidFill>
+              <a:schemeClr val="tx2"/>
+            </a:solidFill>
+          </a:ln>
+          <a:effectLst>
+            <a:outerShdw blurRad="50800" dist="38100" dir="2700000" algn="tl" rotWithShape="0">
+              <a:prstClr val="black">
+                <a:alpha val="40000"/>
+              </a:prstClr>
+            </a:outerShdw>
+          </a:effectLst>
+        </p:spPr>
+        <p:style>
+          <a:lnRef idx="2">
+            <a:schemeClr val="accent4"/>
+          </a:lnRef>
+          <a:fillRef idx="1">
+            <a:schemeClr val="lt1"/>
+          </a:fillRef>
+          <a:effectRef idx="0">
+            <a:schemeClr val="accent4"/>
+          </a:effectRef>
+          <a:fontRef idx="minor">
+            <a:schemeClr val="dk1"/>
+          </a:fontRef>
+        </p:style>
+        <p:txBody>
+          <a:bodyPr rtlCol="0" anchor="ctr"/>
+          <a:lstStyle/>
+          <a:p>
+            <a:pPr algn="ctr"/>
+            <a:endParaRPr lang="es-AR"/>
+          </a:p>
+        </p:txBody>
+      </p:sp>
+      <p:sp>
+        <p:nvSpPr>
+          <p:cNvPr id="12" name="Right Arrow 11"/>
+          <p:cNvSpPr/>
+          <p:nvPr/>
+        </p:nvSpPr>
+        <p:spPr>
+          <a:xfrm>
+            <a:off x="3477296" y="2273400"/>
+            <a:ext cx="875484" cy="672781"/>
+          </a:xfrm>
+          <a:prstGeom prst="rightArrow">
+            <a:avLst/>
+          </a:prstGeom>
+        </p:spPr>
+        <p:style>
+          <a:lnRef idx="1">
+            <a:schemeClr val="accent2"/>
+          </a:lnRef>
+          <a:fillRef idx="2">
+            <a:schemeClr val="accent2"/>
+          </a:fillRef>
+          <a:effectRef idx="1">
+            <a:schemeClr val="accent2"/>
+          </a:effectRef>
+          <a:fontRef idx="minor">
+            <a:schemeClr val="dk1"/>
+          </a:fontRef>
+        </p:style>
+        <p:txBody>
+          <a:bodyPr rtlCol="0" anchor="ctr"/>
+          <a:lstStyle/>
+          <a:p>
+            <a:pPr algn="ctr"/>
+            <a:endParaRPr lang="es-AR"/>
+          </a:p>
+        </p:txBody>
+      </p:sp>
+      <p:sp>
+        <p:nvSpPr>
+          <p:cNvPr id="13" name="Right Arrow 12"/>
+          <p:cNvSpPr/>
+          <p:nvPr/>
+        </p:nvSpPr>
+        <p:spPr>
+          <a:xfrm>
+            <a:off x="9851481" y="2214112"/>
+            <a:ext cx="875484" cy="672781"/>
+          </a:xfrm>
+          <a:prstGeom prst="rightArrow">
+            <a:avLst/>
+          </a:prstGeom>
+        </p:spPr>
+        <p:style>
+          <a:lnRef idx="1">
+            <a:schemeClr val="accent1"/>
+          </a:lnRef>
+          <a:fillRef idx="2">
+            <a:schemeClr val="accent1"/>
+          </a:fillRef>
+          <a:effectRef idx="1">
+            <a:schemeClr val="accent1"/>
+          </a:effectRef>
+          <a:fontRef idx="minor">
+            <a:schemeClr val="dk1"/>
+          </a:fontRef>
+        </p:style>
+        <p:txBody>
+          <a:bodyPr rtlCol="0" anchor="ctr"/>
+          <a:lstStyle/>
+          <a:p>
+            <a:pPr algn="ctr"/>
+            <a:endParaRPr lang="es-AR"/>
+          </a:p>
+        </p:txBody>
+      </p:sp>
+      <p:sp>
+        <p:nvSpPr>
+          <p:cNvPr id="14" name="Right Arrow 13"/>
+          <p:cNvSpPr/>
+          <p:nvPr/>
+        </p:nvSpPr>
+        <p:spPr>
+          <a:xfrm>
+            <a:off x="4777019" y="2249530"/>
+            <a:ext cx="865965" cy="711418"/>
+          </a:xfrm>
+          <a:prstGeom prst="rightArrow">
+            <a:avLst/>
+          </a:prstGeom>
+          <a:gradFill>
+            <a:gsLst>
+              <a:gs pos="0">
+                <a:schemeClr val="accent2">
+                  <a:lumMod val="110000"/>
+                  <a:satMod val="105000"/>
+                  <a:tint val="67000"/>
+                </a:schemeClr>
+              </a:gs>
+              <a:gs pos="100000">
+                <a:schemeClr val="bg2"/>
+              </a:gs>
+            </a:gsLst>
+          </a:gradFill>
+        </p:spPr>
+        <p:style>
+          <a:lnRef idx="1">
+            <a:schemeClr val="accent2"/>
+          </a:lnRef>
+          <a:fillRef idx="2">
+            <a:schemeClr val="accent2"/>
+          </a:fillRef>
+          <a:effectRef idx="1">
+            <a:schemeClr val="accent2"/>
+          </a:effectRef>
+          <a:fontRef idx="minor">
+            <a:schemeClr val="dk1"/>
+          </a:fontRef>
+        </p:style>
+        <p:txBody>
+          <a:bodyPr rtlCol="0" anchor="ctr"/>
+          <a:lstStyle/>
+          <a:p>
+            <a:pPr algn="ctr"/>
+            <a:endParaRPr lang="es-AR"/>
+          </a:p>
+        </p:txBody>
+      </p:sp>
+      <p:sp>
+        <p:nvSpPr>
+          <p:cNvPr id="15" name="TextBox 14"/>
+          <p:cNvSpPr txBox="1"/>
+          <p:nvPr/>
+        </p:nvSpPr>
+        <p:spPr>
+          <a:xfrm>
+            <a:off x="5542671" y="3980461"/>
+            <a:ext cx="2963684" cy="369332"/>
+          </a:xfrm>
+          <a:prstGeom prst="rect">
+            <a:avLst/>
+          </a:prstGeom>
+          <a:noFill/>
+        </p:spPr>
+        <p:txBody>
+          <a:bodyPr wrap="square" rtlCol="0">
+            <a:spAutoFit/>
+          </a:bodyPr>
+          <a:lstStyle/>
+          <a:p>
+            <a:pPr algn="ctr"/>
+            <a:r>
+              <a:rPr lang="es-AR" dirty="0" smtClean="0">
+                <a:latin typeface="Segoe UI" panose="020B0502040204020203" pitchFamily="34" charset="0"/>
+                <a:cs typeface="Segoe UI" panose="020B0502040204020203" pitchFamily="34" charset="0"/>
+              </a:rPr>
+              <a:t>Sistema = cola + canales</a:t>
+            </a:r>
+            <a:endParaRPr lang="es-AR" dirty="0">
+              <a:latin typeface="Segoe UI" panose="020B0502040204020203" pitchFamily="34" charset="0"/>
+              <a:cs typeface="Segoe UI" panose="020B0502040204020203" pitchFamily="34" charset="0"/>
+            </a:endParaRPr>
+          </a:p>
+        </p:txBody>
+      </p:sp>
+      <p:pic>
+        <p:nvPicPr>
+          <p:cNvPr id="16" name="Picture 16"/>
+          <p:cNvPicPr>
+            <a:picLocks noChangeAspect="1"/>
+          </p:cNvPicPr>
+          <p:nvPr/>
+        </p:nvPicPr>
+        <p:blipFill>
+          <a:blip r:embed="rId3" cstate="print">
+            <a:extLst>
+              <a:ext uri="{28A0092B-C50C-407E-A947-70E740481C1C}">
+                <a14:useLocalDpi xmlns:a14="http://schemas.microsoft.com/office/drawing/2010/main" xmlns="" val="0"/>
+              </a:ext>
+            </a:extLst>
+          </a:blip>
+          <a:stretch>
+            <a:fillRect/>
+          </a:stretch>
+        </p:blipFill>
+        <p:spPr>
+          <a:xfrm>
+            <a:off x="8566496" y="2200980"/>
+            <a:ext cx="745199" cy="745199"/>
+          </a:xfrm>
+          <a:prstGeom prst="rect">
+            <a:avLst/>
+          </a:prstGeom>
+        </p:spPr>
+      </p:pic>
+      <p:sp>
+        <p:nvSpPr>
+          <p:cNvPr id="17" name="Rectangle 17"/>
+          <p:cNvSpPr/>
+          <p:nvPr/>
+        </p:nvSpPr>
+        <p:spPr>
+          <a:xfrm>
+            <a:off x="5866227" y="2273399"/>
+            <a:ext cx="2264899" cy="554208"/>
+          </a:xfrm>
+          <a:prstGeom prst="rect">
+            <a:avLst/>
+          </a:prstGeom>
+          <a:ln>
+            <a:solidFill>
+              <a:schemeClr val="tx2"/>
+            </a:solidFill>
+          </a:ln>
+        </p:spPr>
+        <p:style>
+          <a:lnRef idx="2">
+            <a:schemeClr val="accent5"/>
+          </a:lnRef>
+          <a:fillRef idx="1">
+            <a:schemeClr val="lt1"/>
+          </a:fillRef>
+          <a:effectRef idx="0">
+            <a:schemeClr val="accent5"/>
+          </a:effectRef>
+          <a:fontRef idx="minor">
+            <a:schemeClr val="dk1"/>
+          </a:fontRef>
+        </p:style>
+        <p:txBody>
+          <a:bodyPr rtlCol="0" anchor="ctr"/>
+          <a:lstStyle/>
+          <a:p>
+            <a:pPr algn="ctr"/>
+            <a:endParaRPr lang="es-AR"/>
+          </a:p>
+        </p:txBody>
+      </p:sp>
+      <p:sp>
+        <p:nvSpPr>
+          <p:cNvPr id="22" name="TextBox 18"/>
+          <p:cNvSpPr txBox="1"/>
+          <p:nvPr/>
+        </p:nvSpPr>
+        <p:spPr>
+          <a:xfrm>
+            <a:off x="506437" y="239151"/>
+            <a:ext cx="1136658" cy="369332"/>
+          </a:xfrm>
+          <a:prstGeom prst="rect">
+            <a:avLst/>
+          </a:prstGeom>
+          <a:noFill/>
+        </p:spPr>
+        <p:txBody>
+          <a:bodyPr wrap="none" rtlCol="0">
+            <a:spAutoFit/>
+          </a:bodyPr>
+          <a:lstStyle/>
+          <a:p>
+            <a:r>
+              <a:rPr lang="es-AR" dirty="0" smtClean="0"/>
+              <a:t>Ejercicio </a:t>
+            </a:r>
+            <a:r>
+              <a:rPr lang="es-AR" dirty="0" smtClean="0"/>
+              <a:t>5</a:t>
+            </a:r>
+            <a:endParaRPr lang="es-AR" dirty="0"/>
+          </a:p>
+        </p:txBody>
+      </p:sp>
+      <p:sp>
+        <p:nvSpPr>
+          <p:cNvPr id="23" name="Right Arrow 12"/>
+          <p:cNvSpPr/>
+          <p:nvPr/>
+        </p:nvSpPr>
+        <p:spPr>
+          <a:xfrm rot="5400000">
+            <a:off x="9877757" y="3354486"/>
+            <a:ext cx="875484" cy="672781"/>
+          </a:xfrm>
+          <a:prstGeom prst="rightArrow">
+            <a:avLst/>
+          </a:prstGeom>
+        </p:spPr>
+        <p:style>
+          <a:lnRef idx="1">
+            <a:schemeClr val="accent1"/>
+          </a:lnRef>
+          <a:fillRef idx="2">
+            <a:schemeClr val="accent1"/>
+          </a:fillRef>
+          <a:effectRef idx="1">
+            <a:schemeClr val="accent1"/>
+          </a:effectRef>
+          <a:fontRef idx="minor">
+            <a:schemeClr val="dk1"/>
+          </a:fontRef>
+        </p:style>
+        <p:txBody>
+          <a:bodyPr rtlCol="0" anchor="ctr"/>
+          <a:lstStyle/>
+          <a:p>
+            <a:pPr algn="ctr"/>
+            <a:endParaRPr lang="es-AR"/>
+          </a:p>
+        </p:txBody>
+      </p:sp>
+      <p:sp>
+        <p:nvSpPr>
+          <p:cNvPr id="24" name="Right Arrow 12"/>
+          <p:cNvSpPr/>
+          <p:nvPr/>
+        </p:nvSpPr>
+        <p:spPr>
+          <a:xfrm rot="5400000">
+            <a:off x="9883012" y="4452818"/>
+            <a:ext cx="875484" cy="672781"/>
+          </a:xfrm>
+          <a:prstGeom prst="rightArrow">
+            <a:avLst/>
+          </a:prstGeom>
+        </p:spPr>
+        <p:style>
+          <a:lnRef idx="1">
+            <a:schemeClr val="accent1"/>
+          </a:lnRef>
+          <a:fillRef idx="2">
+            <a:schemeClr val="accent1"/>
+          </a:fillRef>
+          <a:effectRef idx="1">
+            <a:schemeClr val="accent1"/>
+          </a:effectRef>
+          <a:fontRef idx="minor">
+            <a:schemeClr val="dk1"/>
+          </a:fontRef>
+        </p:style>
+        <p:txBody>
+          <a:bodyPr rtlCol="0" anchor="ctr"/>
+          <a:lstStyle/>
+          <a:p>
+            <a:pPr algn="ctr"/>
+            <a:endParaRPr lang="es-AR"/>
+          </a:p>
+        </p:txBody>
+      </p:sp>
+      <p:sp>
+        <p:nvSpPr>
+          <p:cNvPr id="25" name="Right Arrow 12"/>
+          <p:cNvSpPr/>
+          <p:nvPr/>
+        </p:nvSpPr>
+        <p:spPr>
+          <a:xfrm rot="10800000">
+            <a:off x="8700598" y="4741850"/>
+            <a:ext cx="875484" cy="672781"/>
+          </a:xfrm>
+          <a:prstGeom prst="rightArrow">
+            <a:avLst/>
+          </a:prstGeom>
+        </p:spPr>
+        <p:style>
+          <a:lnRef idx="1">
+            <a:schemeClr val="accent1"/>
+          </a:lnRef>
+          <a:fillRef idx="2">
+            <a:schemeClr val="accent1"/>
+          </a:fillRef>
+          <a:effectRef idx="1">
+            <a:schemeClr val="accent1"/>
+          </a:effectRef>
+          <a:fontRef idx="minor">
+            <a:schemeClr val="dk1"/>
+          </a:fontRef>
+        </p:style>
+        <p:txBody>
+          <a:bodyPr rtlCol="0" anchor="ctr"/>
+          <a:lstStyle/>
+          <a:p>
+            <a:pPr algn="ctr"/>
+            <a:endParaRPr lang="es-AR"/>
+          </a:p>
+        </p:txBody>
+      </p:sp>
+      <p:sp>
+        <p:nvSpPr>
+          <p:cNvPr id="26" name="Right Arrow 12"/>
+          <p:cNvSpPr/>
+          <p:nvPr/>
+        </p:nvSpPr>
+        <p:spPr>
+          <a:xfrm rot="10800000">
+            <a:off x="5069274" y="4778635"/>
+            <a:ext cx="875484" cy="672781"/>
+          </a:xfrm>
+          <a:prstGeom prst="rightArrow">
+            <a:avLst/>
+          </a:prstGeom>
+        </p:spPr>
+        <p:style>
+          <a:lnRef idx="1">
+            <a:schemeClr val="accent1"/>
+          </a:lnRef>
+          <a:fillRef idx="2">
+            <a:schemeClr val="accent1"/>
+          </a:fillRef>
+          <a:effectRef idx="1">
+            <a:schemeClr val="accent1"/>
+          </a:effectRef>
+          <a:fontRef idx="minor">
+            <a:schemeClr val="dk1"/>
+          </a:fontRef>
+        </p:style>
+        <p:txBody>
+          <a:bodyPr rtlCol="0" anchor="ctr"/>
+          <a:lstStyle/>
+          <a:p>
+            <a:pPr algn="ctr"/>
+            <a:endParaRPr lang="es-AR"/>
+          </a:p>
+        </p:txBody>
+      </p:sp>
+      <p:sp>
+        <p:nvSpPr>
+          <p:cNvPr id="27" name="Right Arrow 12"/>
+          <p:cNvSpPr/>
+          <p:nvPr/>
+        </p:nvSpPr>
+        <p:spPr>
+          <a:xfrm rot="10800000">
+            <a:off x="7628543" y="4762871"/>
+            <a:ext cx="875484" cy="672781"/>
+          </a:xfrm>
+          <a:prstGeom prst="rightArrow">
+            <a:avLst/>
+          </a:prstGeom>
+        </p:spPr>
+        <p:style>
+          <a:lnRef idx="1">
+            <a:schemeClr val="accent1"/>
+          </a:lnRef>
+          <a:fillRef idx="2">
+            <a:schemeClr val="accent1"/>
+          </a:fillRef>
+          <a:effectRef idx="1">
+            <a:schemeClr val="accent1"/>
+          </a:effectRef>
+          <a:fontRef idx="minor">
+            <a:schemeClr val="dk1"/>
+          </a:fontRef>
+        </p:style>
+        <p:txBody>
+          <a:bodyPr rtlCol="0" anchor="ctr"/>
+          <a:lstStyle/>
+          <a:p>
+            <a:pPr algn="ctr"/>
+            <a:endParaRPr lang="es-AR"/>
+          </a:p>
+        </p:txBody>
+      </p:sp>
+      <p:sp>
+        <p:nvSpPr>
+          <p:cNvPr id="28" name="Right Arrow 12"/>
+          <p:cNvSpPr/>
+          <p:nvPr/>
+        </p:nvSpPr>
+        <p:spPr>
+          <a:xfrm rot="10800000">
+            <a:off x="6383067" y="4757616"/>
+            <a:ext cx="875484" cy="672781"/>
+          </a:xfrm>
+          <a:prstGeom prst="rightArrow">
+            <a:avLst/>
+          </a:prstGeom>
+        </p:spPr>
+        <p:style>
+          <a:lnRef idx="1">
+            <a:schemeClr val="accent1"/>
+          </a:lnRef>
+          <a:fillRef idx="2">
+            <a:schemeClr val="accent1"/>
+          </a:fillRef>
+          <a:effectRef idx="1">
+            <a:schemeClr val="accent1"/>
+          </a:effectRef>
+          <a:fontRef idx="minor">
+            <a:schemeClr val="dk1"/>
+          </a:fontRef>
+        </p:style>
+        <p:txBody>
+          <a:bodyPr rtlCol="0" anchor="ctr"/>
+          <a:lstStyle/>
+          <a:p>
+            <a:pPr algn="ctr"/>
+            <a:endParaRPr lang="es-AR"/>
+          </a:p>
+        </p:txBody>
+      </p:sp>
+      <p:sp>
+        <p:nvSpPr>
+          <p:cNvPr id="29" name="Right Arrow 12"/>
+          <p:cNvSpPr/>
+          <p:nvPr/>
+        </p:nvSpPr>
+        <p:spPr>
+          <a:xfrm rot="13208264">
+            <a:off x="3897369" y="4416029"/>
+            <a:ext cx="875484" cy="672781"/>
+          </a:xfrm>
+          <a:prstGeom prst="rightArrow">
+            <a:avLst/>
+          </a:prstGeom>
+        </p:spPr>
+        <p:style>
+          <a:lnRef idx="1">
+            <a:schemeClr val="accent1"/>
+          </a:lnRef>
+          <a:fillRef idx="2">
+            <a:schemeClr val="accent1"/>
+          </a:fillRef>
+          <a:effectRef idx="1">
+            <a:schemeClr val="accent1"/>
+          </a:effectRef>
+          <a:fontRef idx="minor">
+            <a:schemeClr val="dk1"/>
+          </a:fontRef>
+        </p:style>
+        <p:txBody>
+          <a:bodyPr rtlCol="0" anchor="ctr"/>
+          <a:lstStyle/>
+          <a:p>
+            <a:pPr algn="ctr"/>
+            <a:endParaRPr lang="es-AR"/>
+          </a:p>
+        </p:txBody>
+      </p:sp>
+      <p:sp>
+        <p:nvSpPr>
+          <p:cNvPr id="30" name="Right Arrow 12"/>
+          <p:cNvSpPr/>
+          <p:nvPr/>
+        </p:nvSpPr>
+        <p:spPr>
+          <a:xfrm rot="13208264">
+            <a:off x="3009245" y="3633010"/>
+            <a:ext cx="875484" cy="672781"/>
+          </a:xfrm>
+          <a:prstGeom prst="rightArrow">
+            <a:avLst/>
+          </a:prstGeom>
+        </p:spPr>
+        <p:style>
+          <a:lnRef idx="1">
+            <a:schemeClr val="accent1"/>
+          </a:lnRef>
+          <a:fillRef idx="2">
+            <a:schemeClr val="accent1"/>
+          </a:fillRef>
+          <a:effectRef idx="1">
+            <a:schemeClr val="accent1"/>
+          </a:effectRef>
+          <a:fontRef idx="minor">
+            <a:schemeClr val="dk1"/>
+          </a:fontRef>
+        </p:style>
+        <p:txBody>
+          <a:bodyPr rtlCol="0" anchor="ctr"/>
+          <a:lstStyle/>
+          <a:p>
+            <a:pPr algn="ctr"/>
+            <a:endParaRPr lang="es-AR"/>
+          </a:p>
+        </p:txBody>
+      </p:sp>
+      <p:sp>
+        <p:nvSpPr>
+          <p:cNvPr id="32" name="31 Cerrar llave"/>
+          <p:cNvSpPr/>
+          <p:nvPr/>
+        </p:nvSpPr>
+        <p:spPr>
+          <a:xfrm rot="16200000">
+            <a:off x="5733393" y="-3662857"/>
+            <a:ext cx="451943" cy="9627476"/>
+          </a:xfrm>
+          <a:prstGeom prst="rightBrace">
+            <a:avLst/>
+          </a:prstGeom>
+        </p:spPr>
+        <p:style>
+          <a:lnRef idx="1">
+            <a:schemeClr val="accent1"/>
+          </a:lnRef>
+          <a:fillRef idx="0">
+            <a:schemeClr val="accent1"/>
+          </a:fillRef>
+          <a:effectRef idx="0">
+            <a:schemeClr val="accent1"/>
+          </a:effectRef>
+          <a:fontRef idx="minor">
+            <a:schemeClr val="tx1"/>
+          </a:fontRef>
+        </p:style>
+        <p:txBody>
+          <a:bodyPr rtlCol="0" anchor="ctr"/>
+          <a:lstStyle/>
+          <a:p>
+            <a:pPr algn="ctr"/>
+            <a:endParaRPr lang="es-AR"/>
+          </a:p>
+        </p:txBody>
+      </p:sp>
+      <p:sp>
+        <p:nvSpPr>
+          <p:cNvPr id="33" name="TextBox 9"/>
+          <p:cNvSpPr txBox="1"/>
+          <p:nvPr/>
+        </p:nvSpPr>
+        <p:spPr>
+          <a:xfrm>
+            <a:off x="5159373" y="402036"/>
+            <a:ext cx="2134806" cy="369332"/>
+          </a:xfrm>
+          <a:prstGeom prst="rect">
+            <a:avLst/>
+          </a:prstGeom>
+          <a:noFill/>
+        </p:spPr>
+        <p:txBody>
+          <a:bodyPr wrap="square" rtlCol="0">
+            <a:spAutoFit/>
+          </a:bodyPr>
+          <a:lstStyle/>
+          <a:p>
+            <a:pPr algn="ctr"/>
+            <a:r>
+              <a:rPr lang="es-AR" dirty="0" smtClean="0">
+                <a:latin typeface="Segoe UI" panose="020B0502040204020203" pitchFamily="34" charset="0"/>
+                <a:cs typeface="Segoe UI" panose="020B0502040204020203" pitchFamily="34" charset="0"/>
+              </a:rPr>
+              <a:t>Población total(N’)</a:t>
+            </a:r>
+            <a:endParaRPr lang="es-AR" dirty="0">
+              <a:latin typeface="Segoe UI" panose="020B0502040204020203" pitchFamily="34" charset="0"/>
+              <a:cs typeface="Segoe UI" panose="020B0502040204020203" pitchFamily="34" charset="0"/>
+            </a:endParaRPr>
+          </a:p>
+        </p:txBody>
+      </p:sp>
+      <p:pic>
+        <p:nvPicPr>
+          <p:cNvPr id="34" name="Picture 9"/>
+          <p:cNvPicPr>
+            <a:picLocks noChangeAspect="1" noChangeArrowheads="1"/>
+          </p:cNvPicPr>
+          <p:nvPr/>
+        </p:nvPicPr>
+        <p:blipFill>
+          <a:blip r:embed="rId4" cstate="print">
+            <a:clrChange>
+              <a:clrFrom>
+                <a:srgbClr val="FFFFFF"/>
+              </a:clrFrom>
+              <a:clrTo>
+                <a:srgbClr val="FFFFFF">
+                  <a:alpha val="0"/>
+                </a:srgbClr>
+              </a:clrTo>
+            </a:clrChange>
+          </a:blip>
+          <a:srcRect/>
+          <a:stretch>
+            <a:fillRect/>
+          </a:stretch>
+        </p:blipFill>
+        <p:spPr bwMode="auto">
+          <a:xfrm>
+            <a:off x="10205545" y="1713186"/>
+            <a:ext cx="128337" cy="304800"/>
+          </a:xfrm>
+          <a:prstGeom prst="rect">
+            <a:avLst/>
+          </a:prstGeom>
+          <a:noFill/>
+        </p:spPr>
+      </p:pic>
+      <p:pic>
+        <p:nvPicPr>
+          <p:cNvPr id="35" name="Picture 5"/>
+          <p:cNvPicPr>
+            <a:picLocks noChangeAspect="1" noChangeArrowheads="1"/>
+          </p:cNvPicPr>
+          <p:nvPr/>
+        </p:nvPicPr>
+        <p:blipFill>
+          <a:blip r:embed="rId5" cstate="print">
+            <a:clrChange>
+              <a:clrFrom>
+                <a:srgbClr val="FFFFFF"/>
+              </a:clrFrom>
+              <a:clrTo>
+                <a:srgbClr val="FFFFFF">
+                  <a:alpha val="0"/>
+                </a:srgbClr>
+              </a:clrTo>
+            </a:clrChange>
+          </a:blip>
+          <a:srcRect/>
+          <a:stretch>
+            <a:fillRect/>
+          </a:stretch>
+        </p:blipFill>
+        <p:spPr bwMode="auto">
+          <a:xfrm>
+            <a:off x="5129048" y="1723696"/>
+            <a:ext cx="128337" cy="304799"/>
+          </a:xfrm>
+          <a:prstGeom prst="rect">
+            <a:avLst/>
+          </a:prstGeom>
+          <a:noFill/>
+        </p:spPr>
+      </p:pic>
+    </p:spTree>
+  </p:cSld>
+  <p:clrMapOvr>
+    <a:masterClrMapping/>
+  </p:clrMapOvr>
 </p:sld>
 </file>
 
@@ -6112,7 +9080,7 @@
     </a:clrScheme>
     <a:fontScheme name="Office">
       <a:majorFont>
-        <a:latin typeface="Calibri Light" panose="020F0302020204030204"/>
+        <a:latin typeface="Calibri Light"/>
         <a:ea typeface=""/>
         <a:cs typeface=""/>
         <a:font script="Jpan" typeface="ＭＳ Ｐゴシック"/>
@@ -6147,7 +9115,7 @@
         <a:font script="Geor" typeface="Sylfaen"/>
       </a:majorFont>
       <a:minorFont>
-        <a:latin typeface="Calibri" panose="020F0502020204030204"/>
+        <a:latin typeface="Calibri"/>
         <a:ea typeface=""/>
         <a:cs typeface=""/>
         <a:font script="Jpan" typeface="ＭＳ Ｐゴシック"/>
@@ -6324,7 +9292,7 @@
   <a:extraClrSchemeLst/>
   <a:extLst>
     <a:ext uri="{05A4C25C-085E-4340-85A3-A5531E510DB2}">
-      <thm15:themeFamily xmlns:thm15="http://schemas.microsoft.com/office/thememl/2012/main" name="Office Theme" id="{62F939B6-93AF-4DB8-9C6B-D6C7DFDC589F}" vid="{4A3C46E8-61CC-4603-A589-7422A47A8E4A}"/>
+      <thm15:themeFamily xmlns:thm15="http://schemas.microsoft.com/office/thememl/2012/main" xmlns="" name="Office Theme" id="{62F939B6-93AF-4DB8-9C6B-D6C7DFDC589F}" vid="{4A3C46E8-61CC-4603-A589-7422A47A8E4A}"/>
     </a:ext>
   </a:extLst>
 </a:theme>

</xml_diff>

<commit_message>
arreglo imagen del ej 4 porque N es 3, no 4
</commit_message>
<xml_diff>
--- a/tp1-colas/Imagenes.pptx
+++ b/tp1-colas/Imagenes.pptx
@@ -111,7 +111,18 @@
   </p:defaultTextStyle>
   <p:extLst>
     <p:ext uri="{EFAFB233-063F-42B5-8137-9DF3F51BA10A}">
-      <p15:sldGuideLst xmlns:p15="http://schemas.microsoft.com/office/powerpoint/2012/main" xmlns=""/>
+      <p15:sldGuideLst xmlns:p15="http://schemas.microsoft.com/office/powerpoint/2012/main">
+        <p15:guide id="1" orient="horz" pos="2160">
+          <p15:clr>
+            <a:srgbClr val="A4A3A4"/>
+          </p15:clr>
+        </p15:guide>
+        <p15:guide id="2" pos="3840">
+          <p15:clr>
+            <a:srgbClr val="A4A3A4"/>
+          </p15:clr>
+        </p15:guide>
+      </p15:sldGuideLst>
     </p:ext>
   </p:extLst>
 </p:presentation>
@@ -249,7 +260,7 @@
             <a:fld id="{EAE7EBD3-30FD-4FAB-979E-FE0AAD4807BC}" type="datetimeFigureOut">
               <a:rPr lang="es-AR" smtClean="0"/>
               <a:pPr/>
-              <a:t>13/09/2014</a:t>
+              <a:t>17/09/2014</a:t>
             </a:fld>
             <a:endParaRPr lang="es-AR"/>
           </a:p>
@@ -292,7 +303,7 @@
             <a:fld id="{A173DF1F-6FD9-4134-ABE5-0680BC74F2FF}" type="slidenum">
               <a:rPr lang="es-AR" smtClean="0"/>
               <a:pPr/>
-              <a:t>‹Nº›</a:t>
+              <a:t>‹#›</a:t>
             </a:fld>
             <a:endParaRPr lang="es-AR"/>
           </a:p>
@@ -301,7 +312,7 @@
     </p:spTree>
     <p:extLst>
       <p:ext uri="{BB962C8B-B14F-4D97-AF65-F5344CB8AC3E}">
-        <p14:creationId xmlns:p14="http://schemas.microsoft.com/office/powerpoint/2010/main" xmlns="" val="1478221447"/>
+        <p14:creationId xmlns:p14="http://schemas.microsoft.com/office/powerpoint/2010/main" val="1478221447"/>
       </p:ext>
     </p:extLst>
   </p:cSld>
@@ -421,7 +432,7 @@
             <a:fld id="{EAE7EBD3-30FD-4FAB-979E-FE0AAD4807BC}" type="datetimeFigureOut">
               <a:rPr lang="es-AR" smtClean="0"/>
               <a:pPr/>
-              <a:t>13/09/2014</a:t>
+              <a:t>17/09/2014</a:t>
             </a:fld>
             <a:endParaRPr lang="es-AR"/>
           </a:p>
@@ -464,7 +475,7 @@
             <a:fld id="{A173DF1F-6FD9-4134-ABE5-0680BC74F2FF}" type="slidenum">
               <a:rPr lang="es-AR" smtClean="0"/>
               <a:pPr/>
-              <a:t>‹Nº›</a:t>
+              <a:t>‹#›</a:t>
             </a:fld>
             <a:endParaRPr lang="es-AR"/>
           </a:p>
@@ -473,7 +484,7 @@
     </p:spTree>
     <p:extLst>
       <p:ext uri="{BB962C8B-B14F-4D97-AF65-F5344CB8AC3E}">
-        <p14:creationId xmlns:p14="http://schemas.microsoft.com/office/powerpoint/2010/main" xmlns="" val="787665529"/>
+        <p14:creationId xmlns:p14="http://schemas.microsoft.com/office/powerpoint/2010/main" val="787665529"/>
       </p:ext>
     </p:extLst>
   </p:cSld>
@@ -603,7 +614,7 @@
             <a:fld id="{EAE7EBD3-30FD-4FAB-979E-FE0AAD4807BC}" type="datetimeFigureOut">
               <a:rPr lang="es-AR" smtClean="0"/>
               <a:pPr/>
-              <a:t>13/09/2014</a:t>
+              <a:t>17/09/2014</a:t>
             </a:fld>
             <a:endParaRPr lang="es-AR"/>
           </a:p>
@@ -646,7 +657,7 @@
             <a:fld id="{A173DF1F-6FD9-4134-ABE5-0680BC74F2FF}" type="slidenum">
               <a:rPr lang="es-AR" smtClean="0"/>
               <a:pPr/>
-              <a:t>‹Nº›</a:t>
+              <a:t>‹#›</a:t>
             </a:fld>
             <a:endParaRPr lang="es-AR"/>
           </a:p>
@@ -655,7 +666,7 @@
     </p:spTree>
     <p:extLst>
       <p:ext uri="{BB962C8B-B14F-4D97-AF65-F5344CB8AC3E}">
-        <p14:creationId xmlns:p14="http://schemas.microsoft.com/office/powerpoint/2010/main" xmlns="" val="3550571343"/>
+        <p14:creationId xmlns:p14="http://schemas.microsoft.com/office/powerpoint/2010/main" val="3550571343"/>
       </p:ext>
     </p:extLst>
   </p:cSld>
@@ -775,7 +786,7 @@
             <a:fld id="{EAE7EBD3-30FD-4FAB-979E-FE0AAD4807BC}" type="datetimeFigureOut">
               <a:rPr lang="es-AR" smtClean="0"/>
               <a:pPr/>
-              <a:t>13/09/2014</a:t>
+              <a:t>17/09/2014</a:t>
             </a:fld>
             <a:endParaRPr lang="es-AR"/>
           </a:p>
@@ -818,7 +829,7 @@
             <a:fld id="{A173DF1F-6FD9-4134-ABE5-0680BC74F2FF}" type="slidenum">
               <a:rPr lang="es-AR" smtClean="0"/>
               <a:pPr/>
-              <a:t>‹Nº›</a:t>
+              <a:t>‹#›</a:t>
             </a:fld>
             <a:endParaRPr lang="es-AR"/>
           </a:p>
@@ -827,7 +838,7 @@
     </p:spTree>
     <p:extLst>
       <p:ext uri="{BB962C8B-B14F-4D97-AF65-F5344CB8AC3E}">
-        <p14:creationId xmlns:p14="http://schemas.microsoft.com/office/powerpoint/2010/main" xmlns="" val="1090226818"/>
+        <p14:creationId xmlns:p14="http://schemas.microsoft.com/office/powerpoint/2010/main" val="1090226818"/>
       </p:ext>
     </p:extLst>
   </p:cSld>
@@ -1023,7 +1034,7 @@
             <a:fld id="{EAE7EBD3-30FD-4FAB-979E-FE0AAD4807BC}" type="datetimeFigureOut">
               <a:rPr lang="es-AR" smtClean="0"/>
               <a:pPr/>
-              <a:t>13/09/2014</a:t>
+              <a:t>17/09/2014</a:t>
             </a:fld>
             <a:endParaRPr lang="es-AR"/>
           </a:p>
@@ -1066,7 +1077,7 @@
             <a:fld id="{A173DF1F-6FD9-4134-ABE5-0680BC74F2FF}" type="slidenum">
               <a:rPr lang="es-AR" smtClean="0"/>
               <a:pPr/>
-              <a:t>‹Nº›</a:t>
+              <a:t>‹#›</a:t>
             </a:fld>
             <a:endParaRPr lang="es-AR"/>
           </a:p>
@@ -1075,7 +1086,7 @@
     </p:spTree>
     <p:extLst>
       <p:ext uri="{BB962C8B-B14F-4D97-AF65-F5344CB8AC3E}">
-        <p14:creationId xmlns:p14="http://schemas.microsoft.com/office/powerpoint/2010/main" xmlns="" val="1797381584"/>
+        <p14:creationId xmlns:p14="http://schemas.microsoft.com/office/powerpoint/2010/main" val="1797381584"/>
       </p:ext>
     </p:extLst>
   </p:cSld>
@@ -1257,7 +1268,7 @@
             <a:fld id="{EAE7EBD3-30FD-4FAB-979E-FE0AAD4807BC}" type="datetimeFigureOut">
               <a:rPr lang="es-AR" smtClean="0"/>
               <a:pPr/>
-              <a:t>13/09/2014</a:t>
+              <a:t>17/09/2014</a:t>
             </a:fld>
             <a:endParaRPr lang="es-AR"/>
           </a:p>
@@ -1300,7 +1311,7 @@
             <a:fld id="{A173DF1F-6FD9-4134-ABE5-0680BC74F2FF}" type="slidenum">
               <a:rPr lang="es-AR" smtClean="0"/>
               <a:pPr/>
-              <a:t>‹Nº›</a:t>
+              <a:t>‹#›</a:t>
             </a:fld>
             <a:endParaRPr lang="es-AR"/>
           </a:p>
@@ -1309,7 +1320,7 @@
     </p:spTree>
     <p:extLst>
       <p:ext uri="{BB962C8B-B14F-4D97-AF65-F5344CB8AC3E}">
-        <p14:creationId xmlns:p14="http://schemas.microsoft.com/office/powerpoint/2010/main" xmlns="" val="141320725"/>
+        <p14:creationId xmlns:p14="http://schemas.microsoft.com/office/powerpoint/2010/main" val="141320725"/>
       </p:ext>
     </p:extLst>
   </p:cSld>
@@ -1626,7 +1637,7 @@
             <a:fld id="{EAE7EBD3-30FD-4FAB-979E-FE0AAD4807BC}" type="datetimeFigureOut">
               <a:rPr lang="es-AR" smtClean="0"/>
               <a:pPr/>
-              <a:t>13/09/2014</a:t>
+              <a:t>17/09/2014</a:t>
             </a:fld>
             <a:endParaRPr lang="es-AR"/>
           </a:p>
@@ -1669,7 +1680,7 @@
             <a:fld id="{A173DF1F-6FD9-4134-ABE5-0680BC74F2FF}" type="slidenum">
               <a:rPr lang="es-AR" smtClean="0"/>
               <a:pPr/>
-              <a:t>‹Nº›</a:t>
+              <a:t>‹#›</a:t>
             </a:fld>
             <a:endParaRPr lang="es-AR"/>
           </a:p>
@@ -1678,7 +1689,7 @@
     </p:spTree>
     <p:extLst>
       <p:ext uri="{BB962C8B-B14F-4D97-AF65-F5344CB8AC3E}">
-        <p14:creationId xmlns:p14="http://schemas.microsoft.com/office/powerpoint/2010/main" xmlns="" val="898217691"/>
+        <p14:creationId xmlns:p14="http://schemas.microsoft.com/office/powerpoint/2010/main" val="898217691"/>
       </p:ext>
     </p:extLst>
   </p:cSld>
@@ -1746,7 +1757,7 @@
             <a:fld id="{EAE7EBD3-30FD-4FAB-979E-FE0AAD4807BC}" type="datetimeFigureOut">
               <a:rPr lang="es-AR" smtClean="0"/>
               <a:pPr/>
-              <a:t>13/09/2014</a:t>
+              <a:t>17/09/2014</a:t>
             </a:fld>
             <a:endParaRPr lang="es-AR"/>
           </a:p>
@@ -1789,7 +1800,7 @@
             <a:fld id="{A173DF1F-6FD9-4134-ABE5-0680BC74F2FF}" type="slidenum">
               <a:rPr lang="es-AR" smtClean="0"/>
               <a:pPr/>
-              <a:t>‹Nº›</a:t>
+              <a:t>‹#›</a:t>
             </a:fld>
             <a:endParaRPr lang="es-AR"/>
           </a:p>
@@ -1798,7 +1809,7 @@
     </p:spTree>
     <p:extLst>
       <p:ext uri="{BB962C8B-B14F-4D97-AF65-F5344CB8AC3E}">
-        <p14:creationId xmlns:p14="http://schemas.microsoft.com/office/powerpoint/2010/main" xmlns="" val="1734197303"/>
+        <p14:creationId xmlns:p14="http://schemas.microsoft.com/office/powerpoint/2010/main" val="1734197303"/>
       </p:ext>
     </p:extLst>
   </p:cSld>
@@ -1843,7 +1854,7 @@
             <a:fld id="{EAE7EBD3-30FD-4FAB-979E-FE0AAD4807BC}" type="datetimeFigureOut">
               <a:rPr lang="es-AR" smtClean="0"/>
               <a:pPr/>
-              <a:t>13/09/2014</a:t>
+              <a:t>17/09/2014</a:t>
             </a:fld>
             <a:endParaRPr lang="es-AR"/>
           </a:p>
@@ -1886,7 +1897,7 @@
             <a:fld id="{A173DF1F-6FD9-4134-ABE5-0680BC74F2FF}" type="slidenum">
               <a:rPr lang="es-AR" smtClean="0"/>
               <a:pPr/>
-              <a:t>‹Nº›</a:t>
+              <a:t>‹#›</a:t>
             </a:fld>
             <a:endParaRPr lang="es-AR"/>
           </a:p>
@@ -1895,7 +1906,7 @@
     </p:spTree>
     <p:extLst>
       <p:ext uri="{BB962C8B-B14F-4D97-AF65-F5344CB8AC3E}">
-        <p14:creationId xmlns:p14="http://schemas.microsoft.com/office/powerpoint/2010/main" xmlns="" val="2733380732"/>
+        <p14:creationId xmlns:p14="http://schemas.microsoft.com/office/powerpoint/2010/main" val="2733380732"/>
       </p:ext>
     </p:extLst>
   </p:cSld>
@@ -2122,7 +2133,7 @@
             <a:fld id="{EAE7EBD3-30FD-4FAB-979E-FE0AAD4807BC}" type="datetimeFigureOut">
               <a:rPr lang="es-AR" smtClean="0"/>
               <a:pPr/>
-              <a:t>13/09/2014</a:t>
+              <a:t>17/09/2014</a:t>
             </a:fld>
             <a:endParaRPr lang="es-AR"/>
           </a:p>
@@ -2165,7 +2176,7 @@
             <a:fld id="{A173DF1F-6FD9-4134-ABE5-0680BC74F2FF}" type="slidenum">
               <a:rPr lang="es-AR" smtClean="0"/>
               <a:pPr/>
-              <a:t>‹Nº›</a:t>
+              <a:t>‹#›</a:t>
             </a:fld>
             <a:endParaRPr lang="es-AR"/>
           </a:p>
@@ -2174,7 +2185,7 @@
     </p:spTree>
     <p:extLst>
       <p:ext uri="{BB962C8B-B14F-4D97-AF65-F5344CB8AC3E}">
-        <p14:creationId xmlns:p14="http://schemas.microsoft.com/office/powerpoint/2010/main" xmlns="" val="201515298"/>
+        <p14:creationId xmlns:p14="http://schemas.microsoft.com/office/powerpoint/2010/main" val="201515298"/>
       </p:ext>
     </p:extLst>
   </p:cSld>
@@ -2377,7 +2388,7 @@
             <a:fld id="{EAE7EBD3-30FD-4FAB-979E-FE0AAD4807BC}" type="datetimeFigureOut">
               <a:rPr lang="es-AR" smtClean="0"/>
               <a:pPr/>
-              <a:t>13/09/2014</a:t>
+              <a:t>17/09/2014</a:t>
             </a:fld>
             <a:endParaRPr lang="es-AR"/>
           </a:p>
@@ -2420,7 +2431,7 @@
             <a:fld id="{A173DF1F-6FD9-4134-ABE5-0680BC74F2FF}" type="slidenum">
               <a:rPr lang="es-AR" smtClean="0"/>
               <a:pPr/>
-              <a:t>‹Nº›</a:t>
+              <a:t>‹#›</a:t>
             </a:fld>
             <a:endParaRPr lang="es-AR"/>
           </a:p>
@@ -2429,7 +2440,7 @@
     </p:spTree>
     <p:extLst>
       <p:ext uri="{BB962C8B-B14F-4D97-AF65-F5344CB8AC3E}">
-        <p14:creationId xmlns:p14="http://schemas.microsoft.com/office/powerpoint/2010/main" xmlns="" val="976262354"/>
+        <p14:creationId xmlns:p14="http://schemas.microsoft.com/office/powerpoint/2010/main" val="976262354"/>
       </p:ext>
     </p:extLst>
   </p:cSld>
@@ -2592,7 +2603,7 @@
             <a:fld id="{EAE7EBD3-30FD-4FAB-979E-FE0AAD4807BC}" type="datetimeFigureOut">
               <a:rPr lang="es-AR" smtClean="0"/>
               <a:pPr/>
-              <a:t>13/09/2014</a:t>
+              <a:t>17/09/2014</a:t>
             </a:fld>
             <a:endParaRPr lang="es-AR"/>
           </a:p>
@@ -2671,7 +2682,7 @@
             <a:fld id="{A173DF1F-6FD9-4134-ABE5-0680BC74F2FF}" type="slidenum">
               <a:rPr lang="es-AR" smtClean="0"/>
               <a:pPr/>
-              <a:t>‹Nº›</a:t>
+              <a:t>‹#›</a:t>
             </a:fld>
             <a:endParaRPr lang="es-AR"/>
           </a:p>
@@ -2680,7 +2691,7 @@
     </p:spTree>
     <p:extLst>
       <p:ext uri="{BB962C8B-B14F-4D97-AF65-F5344CB8AC3E}">
-        <p14:creationId xmlns:p14="http://schemas.microsoft.com/office/powerpoint/2010/main" xmlns="" val="2905328256"/>
+        <p14:creationId xmlns:p14="http://schemas.microsoft.com/office/powerpoint/2010/main" val="2905328256"/>
       </p:ext>
     </p:extLst>
   </p:cSld>
@@ -3060,7 +3071,7 @@
           <a:blip r:embed="rId2" cstate="print">
             <a:extLst>
               <a:ext uri="{28A0092B-C50C-407E-A947-70E740481C1C}">
-                <a14:useLocalDpi xmlns:a14="http://schemas.microsoft.com/office/drawing/2010/main" xmlns="" val="0"/>
+                <a14:useLocalDpi xmlns:a14="http://schemas.microsoft.com/office/drawing/2010/main" val="0"/>
               </a:ext>
             </a:extLst>
           </a:blip>
@@ -3090,7 +3101,7 @@
           <a:blip r:embed="rId2" cstate="print">
             <a:extLst>
               <a:ext uri="{28A0092B-C50C-407E-A947-70E740481C1C}">
-                <a14:useLocalDpi xmlns:a14="http://schemas.microsoft.com/office/drawing/2010/main" xmlns="" val="0"/>
+                <a14:useLocalDpi xmlns:a14="http://schemas.microsoft.com/office/drawing/2010/main" val="0"/>
               </a:ext>
             </a:extLst>
           </a:blip>
@@ -3120,7 +3131,7 @@
           <a:blip r:embed="rId2" cstate="print">
             <a:extLst>
               <a:ext uri="{28A0092B-C50C-407E-A947-70E740481C1C}">
-                <a14:useLocalDpi xmlns:a14="http://schemas.microsoft.com/office/drawing/2010/main" xmlns="" val="0"/>
+                <a14:useLocalDpi xmlns:a14="http://schemas.microsoft.com/office/drawing/2010/main" val="0"/>
               </a:ext>
             </a:extLst>
           </a:blip>
@@ -3150,7 +3161,7 @@
           <a:blip r:embed="rId2" cstate="print">
             <a:extLst>
               <a:ext uri="{28A0092B-C50C-407E-A947-70E740481C1C}">
-                <a14:useLocalDpi xmlns:a14="http://schemas.microsoft.com/office/drawing/2010/main" xmlns="" val="0"/>
+                <a14:useLocalDpi xmlns:a14="http://schemas.microsoft.com/office/drawing/2010/main" val="0"/>
               </a:ext>
             </a:extLst>
           </a:blip>
@@ -3180,7 +3191,7 @@
           <a:blip r:embed="rId2" cstate="print">
             <a:extLst>
               <a:ext uri="{28A0092B-C50C-407E-A947-70E740481C1C}">
-                <a14:useLocalDpi xmlns:a14="http://schemas.microsoft.com/office/drawing/2010/main" xmlns="" val="0"/>
+                <a14:useLocalDpi xmlns:a14="http://schemas.microsoft.com/office/drawing/2010/main" val="0"/>
               </a:ext>
             </a:extLst>
           </a:blip>
@@ -3462,7 +3473,7 @@
           <a:blip r:embed="rId3" cstate="print">
             <a:extLst>
               <a:ext uri="{28A0092B-C50C-407E-A947-70E740481C1C}">
-                <a14:useLocalDpi xmlns:a14="http://schemas.microsoft.com/office/drawing/2010/main" xmlns="" val="0"/>
+                <a14:useLocalDpi xmlns:a14="http://schemas.microsoft.com/office/drawing/2010/main" val="0"/>
               </a:ext>
             </a:extLst>
           </a:blip>
@@ -3553,8 +3564,8 @@
           </a:p>
         </p:txBody>
       </p:sp>
-      <mc:AlternateContent xmlns:mc="http://schemas.openxmlformats.org/markup-compatibility/2006">
-        <mc:Choice xmlns:a14="http://schemas.microsoft.com/office/drawing/2010/main" xmlns="" Requires="a14">
+      <mc:AlternateContent xmlns:mc="http://schemas.openxmlformats.org/markup-compatibility/2006" xmlns:a14="http://schemas.microsoft.com/office/drawing/2010/main">
+        <mc:Choice Requires="a14">
           <p:sp>
             <p:nvSpPr>
               <p:cNvPr id="21" name="TextBox 20"/>
@@ -3598,7 +3609,7 @@
             </p:txBody>
           </p:sp>
         </mc:Choice>
-        <mc:Fallback>
+        <mc:Fallback xmlns="">
           <p:sp>
             <p:nvSpPr>
               <p:cNvPr id="21" name="TextBox 20"/>
@@ -3637,8 +3648,8 @@
           </p:sp>
         </mc:Fallback>
       </mc:AlternateContent>
-      <mc:AlternateContent xmlns:mc="http://schemas.openxmlformats.org/markup-compatibility/2006">
-        <mc:Choice xmlns:a14="http://schemas.microsoft.com/office/drawing/2010/main" xmlns="" Requires="a14">
+      <mc:AlternateContent xmlns:mc="http://schemas.openxmlformats.org/markup-compatibility/2006" xmlns:a14="http://schemas.microsoft.com/office/drawing/2010/main">
+        <mc:Choice Requires="a14">
           <p:sp>
             <p:nvSpPr>
               <p:cNvPr id="22" name="TextBox 21"/>
@@ -3694,7 +3705,7 @@
             </p:txBody>
           </p:sp>
         </mc:Choice>
-        <mc:Fallback>
+        <mc:Fallback xmlns="">
           <p:sp>
             <p:nvSpPr>
               <p:cNvPr id="22" name="TextBox 21"/>
@@ -3733,8 +3744,8 @@
           </p:sp>
         </mc:Fallback>
       </mc:AlternateContent>
-      <mc:AlternateContent xmlns:mc="http://schemas.openxmlformats.org/markup-compatibility/2006">
-        <mc:Choice xmlns:a14="http://schemas.microsoft.com/office/drawing/2010/main" xmlns="" Requires="a14">
+      <mc:AlternateContent xmlns:mc="http://schemas.openxmlformats.org/markup-compatibility/2006" xmlns:a14="http://schemas.microsoft.com/office/drawing/2010/main">
+        <mc:Choice Requires="a14">
           <p:sp>
             <p:nvSpPr>
               <p:cNvPr id="23" name="TextBox 22"/>
@@ -3778,7 +3789,7 @@
             </p:txBody>
           </p:sp>
         </mc:Choice>
-        <mc:Fallback>
+        <mc:Fallback xmlns="">
           <p:sp>
             <p:nvSpPr>
               <p:cNvPr id="23" name="TextBox 22"/>
@@ -3817,8 +3828,8 @@
           </p:sp>
         </mc:Fallback>
       </mc:AlternateContent>
-      <mc:AlternateContent xmlns:mc="http://schemas.openxmlformats.org/markup-compatibility/2006">
-        <mc:Choice xmlns:a14="http://schemas.microsoft.com/office/drawing/2010/main" xmlns="" Requires="a14">
+      <mc:AlternateContent xmlns:mc="http://schemas.openxmlformats.org/markup-compatibility/2006" xmlns:a14="http://schemas.microsoft.com/office/drawing/2010/main">
+        <mc:Choice Requires="a14">
           <p:sp>
             <p:nvSpPr>
               <p:cNvPr id="24" name="TextBox 23"/>
@@ -3874,7 +3885,7 @@
             </p:txBody>
           </p:sp>
         </mc:Choice>
-        <mc:Fallback>
+        <mc:Fallback xmlns="">
           <p:sp>
             <p:nvSpPr>
               <p:cNvPr id="24" name="TextBox 23"/>
@@ -3916,7 +3927,7 @@
     </p:spTree>
     <p:extLst>
       <p:ext uri="{BB962C8B-B14F-4D97-AF65-F5344CB8AC3E}">
-        <p14:creationId xmlns:p14="http://schemas.microsoft.com/office/powerpoint/2010/main" xmlns="" val="546631854"/>
+        <p14:creationId xmlns:p14="http://schemas.microsoft.com/office/powerpoint/2010/main" val="546631854"/>
       </p:ext>
     </p:extLst>
   </p:cSld>
@@ -4012,7 +4023,7 @@
           <a:blip r:embed="rId2" cstate="print">
             <a:extLst>
               <a:ext uri="{28A0092B-C50C-407E-A947-70E740481C1C}">
-                <a14:useLocalDpi xmlns:a14="http://schemas.microsoft.com/office/drawing/2010/main" xmlns="" val="0"/>
+                <a14:useLocalDpi xmlns:a14="http://schemas.microsoft.com/office/drawing/2010/main" val="0"/>
               </a:ext>
             </a:extLst>
           </a:blip>
@@ -4042,7 +4053,7 @@
           <a:blip r:embed="rId2" cstate="print">
             <a:extLst>
               <a:ext uri="{28A0092B-C50C-407E-A947-70E740481C1C}">
-                <a14:useLocalDpi xmlns:a14="http://schemas.microsoft.com/office/drawing/2010/main" xmlns="" val="0"/>
+                <a14:useLocalDpi xmlns:a14="http://schemas.microsoft.com/office/drawing/2010/main" val="0"/>
               </a:ext>
             </a:extLst>
           </a:blip>
@@ -4072,7 +4083,7 @@
           <a:blip r:embed="rId2" cstate="print">
             <a:extLst>
               <a:ext uri="{28A0092B-C50C-407E-A947-70E740481C1C}">
-                <a14:useLocalDpi xmlns:a14="http://schemas.microsoft.com/office/drawing/2010/main" xmlns="" val="0"/>
+                <a14:useLocalDpi xmlns:a14="http://schemas.microsoft.com/office/drawing/2010/main" val="0"/>
               </a:ext>
             </a:extLst>
           </a:blip>
@@ -4102,7 +4113,7 @@
           <a:blip r:embed="rId2" cstate="print">
             <a:extLst>
               <a:ext uri="{28A0092B-C50C-407E-A947-70E740481C1C}">
-                <a14:useLocalDpi xmlns:a14="http://schemas.microsoft.com/office/drawing/2010/main" xmlns="" val="0"/>
+                <a14:useLocalDpi xmlns:a14="http://schemas.microsoft.com/office/drawing/2010/main" val="0"/>
               </a:ext>
             </a:extLst>
           </a:blip>
@@ -4132,7 +4143,7 @@
           <a:blip r:embed="rId2" cstate="print">
             <a:extLst>
               <a:ext uri="{28A0092B-C50C-407E-A947-70E740481C1C}">
-                <a14:useLocalDpi xmlns:a14="http://schemas.microsoft.com/office/drawing/2010/main" xmlns="" val="0"/>
+                <a14:useLocalDpi xmlns:a14="http://schemas.microsoft.com/office/drawing/2010/main" val="0"/>
               </a:ext>
             </a:extLst>
           </a:blip>
@@ -4414,7 +4425,7 @@
           <a:blip r:embed="rId3" cstate="print">
             <a:extLst>
               <a:ext uri="{28A0092B-C50C-407E-A947-70E740481C1C}">
-                <a14:useLocalDpi xmlns:a14="http://schemas.microsoft.com/office/drawing/2010/main" xmlns="" val="0"/>
+                <a14:useLocalDpi xmlns:a14="http://schemas.microsoft.com/office/drawing/2010/main" val="0"/>
               </a:ext>
             </a:extLst>
           </a:blip>
@@ -4505,8 +4516,8 @@
           </a:p>
         </p:txBody>
       </p:sp>
-      <mc:AlternateContent xmlns:mc="http://schemas.openxmlformats.org/markup-compatibility/2006">
-        <mc:Choice xmlns:a14="http://schemas.microsoft.com/office/drawing/2010/main" xmlns="" Requires="a14">
+      <mc:AlternateContent xmlns:mc="http://schemas.openxmlformats.org/markup-compatibility/2006" xmlns:a14="http://schemas.microsoft.com/office/drawing/2010/main">
+        <mc:Choice Requires="a14">
           <p:sp>
             <p:nvSpPr>
               <p:cNvPr id="21" name="TextBox 20"/>
@@ -4581,7 +4592,7 @@
             </p:txBody>
           </p:sp>
         </mc:Choice>
-        <mc:Fallback>
+        <mc:Fallback xmlns="">
           <p:sp>
             <p:nvSpPr>
               <p:cNvPr id="21" name="TextBox 20"/>
@@ -4620,8 +4631,8 @@
           </p:sp>
         </mc:Fallback>
       </mc:AlternateContent>
-      <mc:AlternateContent xmlns:mc="http://schemas.openxmlformats.org/markup-compatibility/2006">
-        <mc:Choice xmlns:a14="http://schemas.microsoft.com/office/drawing/2010/main" xmlns="" Requires="a14">
+      <mc:AlternateContent xmlns:mc="http://schemas.openxmlformats.org/markup-compatibility/2006" xmlns:a14="http://schemas.microsoft.com/office/drawing/2010/main">
+        <mc:Choice Requires="a14">
           <p:sp>
             <p:nvSpPr>
               <p:cNvPr id="22" name="TextBox 21"/>
@@ -4689,7 +4700,7 @@
             </p:txBody>
           </p:sp>
         </mc:Choice>
-        <mc:Fallback>
+        <mc:Fallback xmlns="">
           <p:sp>
             <p:nvSpPr>
               <p:cNvPr id="22" name="TextBox 21"/>
@@ -4728,8 +4739,8 @@
           </p:sp>
         </mc:Fallback>
       </mc:AlternateContent>
-      <mc:AlternateContent xmlns:mc="http://schemas.openxmlformats.org/markup-compatibility/2006">
-        <mc:Choice xmlns:a14="http://schemas.microsoft.com/office/drawing/2010/main" xmlns="" Requires="a14">
+      <mc:AlternateContent xmlns:mc="http://schemas.openxmlformats.org/markup-compatibility/2006" xmlns:a14="http://schemas.microsoft.com/office/drawing/2010/main">
+        <mc:Choice Requires="a14">
           <p:sp>
             <p:nvSpPr>
               <p:cNvPr id="23" name="TextBox 22"/>
@@ -4835,7 +4846,7 @@
             </p:txBody>
           </p:sp>
         </mc:Choice>
-        <mc:Fallback>
+        <mc:Fallback xmlns="">
           <p:sp>
             <p:nvSpPr>
               <p:cNvPr id="23" name="TextBox 22"/>
@@ -4874,8 +4885,8 @@
           </p:sp>
         </mc:Fallback>
       </mc:AlternateContent>
-      <mc:AlternateContent xmlns:mc="http://schemas.openxmlformats.org/markup-compatibility/2006">
-        <mc:Choice xmlns:a14="http://schemas.microsoft.com/office/drawing/2010/main" xmlns="" Requires="a14">
+      <mc:AlternateContent xmlns:mc="http://schemas.openxmlformats.org/markup-compatibility/2006" xmlns:a14="http://schemas.microsoft.com/office/drawing/2010/main">
+        <mc:Choice Requires="a14">
           <p:sp>
             <p:nvSpPr>
               <p:cNvPr id="24" name="TextBox 23"/>
@@ -4943,7 +4954,7 @@
             </p:txBody>
           </p:sp>
         </mc:Choice>
-        <mc:Fallback>
+        <mc:Fallback xmlns="">
           <p:sp>
             <p:nvSpPr>
               <p:cNvPr id="24" name="TextBox 23"/>
@@ -4985,7 +4996,7 @@
     </p:spTree>
     <p:extLst>
       <p:ext uri="{BB962C8B-B14F-4D97-AF65-F5344CB8AC3E}">
-        <p14:creationId xmlns:p14="http://schemas.microsoft.com/office/powerpoint/2010/main" xmlns="" val="3368485320"/>
+        <p14:creationId xmlns:p14="http://schemas.microsoft.com/office/powerpoint/2010/main" val="3368485320"/>
       </p:ext>
     </p:extLst>
   </p:cSld>
@@ -5081,7 +5092,7 @@
           <a:blip r:embed="rId2" cstate="print">
             <a:extLst>
               <a:ext uri="{28A0092B-C50C-407E-A947-70E740481C1C}">
-                <a14:useLocalDpi xmlns:a14="http://schemas.microsoft.com/office/drawing/2010/main" xmlns="" val="0"/>
+                <a14:useLocalDpi xmlns:a14="http://schemas.microsoft.com/office/drawing/2010/main" val="0"/>
               </a:ext>
             </a:extLst>
           </a:blip>
@@ -5111,7 +5122,7 @@
           <a:blip r:embed="rId2" cstate="print">
             <a:extLst>
               <a:ext uri="{28A0092B-C50C-407E-A947-70E740481C1C}">
-                <a14:useLocalDpi xmlns:a14="http://schemas.microsoft.com/office/drawing/2010/main" xmlns="" val="0"/>
+                <a14:useLocalDpi xmlns:a14="http://schemas.microsoft.com/office/drawing/2010/main" val="0"/>
               </a:ext>
             </a:extLst>
           </a:blip>
@@ -5141,7 +5152,7 @@
           <a:blip r:embed="rId2" cstate="print">
             <a:extLst>
               <a:ext uri="{28A0092B-C50C-407E-A947-70E740481C1C}">
-                <a14:useLocalDpi xmlns:a14="http://schemas.microsoft.com/office/drawing/2010/main" xmlns="" val="0"/>
+                <a14:useLocalDpi xmlns:a14="http://schemas.microsoft.com/office/drawing/2010/main" val="0"/>
               </a:ext>
             </a:extLst>
           </a:blip>
@@ -5171,7 +5182,7 @@
           <a:blip r:embed="rId2" cstate="print">
             <a:extLst>
               <a:ext uri="{28A0092B-C50C-407E-A947-70E740481C1C}">
-                <a14:useLocalDpi xmlns:a14="http://schemas.microsoft.com/office/drawing/2010/main" xmlns="" val="0"/>
+                <a14:useLocalDpi xmlns:a14="http://schemas.microsoft.com/office/drawing/2010/main" val="0"/>
               </a:ext>
             </a:extLst>
           </a:blip>
@@ -5201,7 +5212,7 @@
           <a:blip r:embed="rId2" cstate="print">
             <a:extLst>
               <a:ext uri="{28A0092B-C50C-407E-A947-70E740481C1C}">
-                <a14:useLocalDpi xmlns:a14="http://schemas.microsoft.com/office/drawing/2010/main" xmlns="" val="0"/>
+                <a14:useLocalDpi xmlns:a14="http://schemas.microsoft.com/office/drawing/2010/main" val="0"/>
               </a:ext>
             </a:extLst>
           </a:blip>
@@ -5483,7 +5494,7 @@
           <a:blip r:embed="rId3" cstate="print">
             <a:extLst>
               <a:ext uri="{28A0092B-C50C-407E-A947-70E740481C1C}">
-                <a14:useLocalDpi xmlns:a14="http://schemas.microsoft.com/office/drawing/2010/main" xmlns="" val="0"/>
+                <a14:useLocalDpi xmlns:a14="http://schemas.microsoft.com/office/drawing/2010/main" val="0"/>
               </a:ext>
             </a:extLst>
           </a:blip>
@@ -5574,8 +5585,8 @@
           </a:p>
         </p:txBody>
       </p:sp>
-      <mc:AlternateContent xmlns:mc="http://schemas.openxmlformats.org/markup-compatibility/2006">
-        <mc:Choice xmlns:a14="http://schemas.microsoft.com/office/drawing/2010/main" xmlns="" Requires="a14">
+      <mc:AlternateContent xmlns:mc="http://schemas.openxmlformats.org/markup-compatibility/2006" xmlns:a14="http://schemas.microsoft.com/office/drawing/2010/main">
+        <mc:Choice Requires="a14">
           <p:sp>
             <p:nvSpPr>
               <p:cNvPr id="21" name="TextBox 20"/>
@@ -5650,7 +5661,7 @@
             </p:txBody>
           </p:sp>
         </mc:Choice>
-        <mc:Fallback>
+        <mc:Fallback xmlns="">
           <p:sp>
             <p:nvSpPr>
               <p:cNvPr id="21" name="TextBox 20"/>
@@ -5689,8 +5700,8 @@
           </p:sp>
         </mc:Fallback>
       </mc:AlternateContent>
-      <mc:AlternateContent xmlns:mc="http://schemas.openxmlformats.org/markup-compatibility/2006">
-        <mc:Choice xmlns:a14="http://schemas.microsoft.com/office/drawing/2010/main" xmlns="" Requires="a14">
+      <mc:AlternateContent xmlns:mc="http://schemas.openxmlformats.org/markup-compatibility/2006" xmlns:a14="http://schemas.microsoft.com/office/drawing/2010/main">
+        <mc:Choice Requires="a14">
           <p:sp>
             <p:nvSpPr>
               <p:cNvPr id="22" name="TextBox 21"/>
@@ -5758,7 +5769,7 @@
             </p:txBody>
           </p:sp>
         </mc:Choice>
-        <mc:Fallback>
+        <mc:Fallback xmlns="">
           <p:sp>
             <p:nvSpPr>
               <p:cNvPr id="22" name="TextBox 21"/>
@@ -5797,8 +5808,8 @@
           </p:sp>
         </mc:Fallback>
       </mc:AlternateContent>
-      <mc:AlternateContent xmlns:mc="http://schemas.openxmlformats.org/markup-compatibility/2006">
-        <mc:Choice xmlns:a14="http://schemas.microsoft.com/office/drawing/2010/main" xmlns="" Requires="a14">
+      <mc:AlternateContent xmlns:mc="http://schemas.openxmlformats.org/markup-compatibility/2006" xmlns:a14="http://schemas.microsoft.com/office/drawing/2010/main">
+        <mc:Choice Requires="a14">
           <p:sp>
             <p:nvSpPr>
               <p:cNvPr id="23" name="TextBox 22"/>
@@ -5929,7 +5940,7 @@
             </p:txBody>
           </p:sp>
         </mc:Choice>
-        <mc:Fallback>
+        <mc:Fallback xmlns="">
           <p:sp>
             <p:nvSpPr>
               <p:cNvPr id="23" name="TextBox 22"/>
@@ -5968,8 +5979,8 @@
           </p:sp>
         </mc:Fallback>
       </mc:AlternateContent>
-      <mc:AlternateContent xmlns:mc="http://schemas.openxmlformats.org/markup-compatibility/2006">
-        <mc:Choice xmlns:a14="http://schemas.microsoft.com/office/drawing/2010/main" xmlns="" Requires="a14">
+      <mc:AlternateContent xmlns:mc="http://schemas.openxmlformats.org/markup-compatibility/2006" xmlns:a14="http://schemas.microsoft.com/office/drawing/2010/main">
+        <mc:Choice Requires="a14">
           <p:sp>
             <p:nvSpPr>
               <p:cNvPr id="24" name="TextBox 23"/>
@@ -6037,7 +6048,7 @@
             </p:txBody>
           </p:sp>
         </mc:Choice>
-        <mc:Fallback>
+        <mc:Fallback xmlns="">
           <p:sp>
             <p:nvSpPr>
               <p:cNvPr id="24" name="TextBox 23"/>
@@ -6079,7 +6090,7 @@
     </p:spTree>
     <p:extLst>
       <p:ext uri="{BB962C8B-B14F-4D97-AF65-F5344CB8AC3E}">
-        <p14:creationId xmlns:p14="http://schemas.microsoft.com/office/powerpoint/2010/main" xmlns="" val="37058664"/>
+        <p14:creationId xmlns:p14="http://schemas.microsoft.com/office/powerpoint/2010/main" val="37058664"/>
       </p:ext>
     </p:extLst>
   </p:cSld>
@@ -6175,7 +6186,7 @@
           <a:blip r:embed="rId2" cstate="print">
             <a:extLst>
               <a:ext uri="{28A0092B-C50C-407E-A947-70E740481C1C}">
-                <a14:useLocalDpi xmlns:a14="http://schemas.microsoft.com/office/drawing/2010/main" xmlns="" val="0"/>
+                <a14:useLocalDpi xmlns:a14="http://schemas.microsoft.com/office/drawing/2010/main" val="0"/>
               </a:ext>
             </a:extLst>
           </a:blip>
@@ -6205,7 +6216,7 @@
           <a:blip r:embed="rId2" cstate="print">
             <a:extLst>
               <a:ext uri="{28A0092B-C50C-407E-A947-70E740481C1C}">
-                <a14:useLocalDpi xmlns:a14="http://schemas.microsoft.com/office/drawing/2010/main" xmlns="" val="0"/>
+                <a14:useLocalDpi xmlns:a14="http://schemas.microsoft.com/office/drawing/2010/main" val="0"/>
               </a:ext>
             </a:extLst>
           </a:blip>
@@ -6235,7 +6246,7 @@
           <a:blip r:embed="rId2" cstate="print">
             <a:extLst>
               <a:ext uri="{28A0092B-C50C-407E-A947-70E740481C1C}">
-                <a14:useLocalDpi xmlns:a14="http://schemas.microsoft.com/office/drawing/2010/main" xmlns="" val="0"/>
+                <a14:useLocalDpi xmlns:a14="http://schemas.microsoft.com/office/drawing/2010/main" val="0"/>
               </a:ext>
             </a:extLst>
           </a:blip>
@@ -6265,7 +6276,7 @@
           <a:blip r:embed="rId2" cstate="print">
             <a:extLst>
               <a:ext uri="{28A0092B-C50C-407E-A947-70E740481C1C}">
-                <a14:useLocalDpi xmlns:a14="http://schemas.microsoft.com/office/drawing/2010/main" xmlns="" val="0"/>
+                <a14:useLocalDpi xmlns:a14="http://schemas.microsoft.com/office/drawing/2010/main" val="0"/>
               </a:ext>
             </a:extLst>
           </a:blip>
@@ -6295,7 +6306,7 @@
           <a:blip r:embed="rId2" cstate="print">
             <a:extLst>
               <a:ext uri="{28A0092B-C50C-407E-A947-70E740481C1C}">
-                <a14:useLocalDpi xmlns:a14="http://schemas.microsoft.com/office/drawing/2010/main" xmlns="" val="0"/>
+                <a14:useLocalDpi xmlns:a14="http://schemas.microsoft.com/office/drawing/2010/main" val="0"/>
               </a:ext>
             </a:extLst>
           </a:blip>
@@ -6539,7 +6550,7 @@
           <a:blip r:embed="rId3" cstate="print">
             <a:extLst>
               <a:ext uri="{28A0092B-C50C-407E-A947-70E740481C1C}">
-                <a14:useLocalDpi xmlns:a14="http://schemas.microsoft.com/office/drawing/2010/main" xmlns="" val="0"/>
+                <a14:useLocalDpi xmlns:a14="http://schemas.microsoft.com/office/drawing/2010/main" val="0"/>
               </a:ext>
             </a:extLst>
           </a:blip>
@@ -6660,11 +6671,7 @@
           <a:p>
             <a:r>
               <a:rPr lang="es-AR" dirty="0" smtClean="0"/>
-              <a:t>Ejercicio </a:t>
-            </a:r>
-            <a:r>
-              <a:rPr lang="es-AR" dirty="0" smtClean="0"/>
-              <a:t>3</a:t>
+              <a:t>Ejercicio 3</a:t>
             </a:r>
             <a:endParaRPr lang="es-AR" dirty="0"/>
           </a:p>
@@ -6899,6 +6906,13 @@
   <p:clrMapOvr>
     <a:masterClrMapping/>
   </p:clrMapOvr>
+  <p:timing>
+    <p:tnLst>
+      <p:par>
+        <p:cTn id="1" dur="indefinite" restart="never" nodeType="tmRoot"/>
+      </p:par>
+    </p:tnLst>
+  </p:timing>
 </p:sld>
 </file>
 
@@ -6981,7 +6995,7 @@
           <a:blip r:embed="rId2" cstate="print">
             <a:extLst>
               <a:ext uri="{28A0092B-C50C-407E-A947-70E740481C1C}">
-                <a14:useLocalDpi xmlns:a14="http://schemas.microsoft.com/office/drawing/2010/main" xmlns="" val="0"/>
+                <a14:useLocalDpi xmlns:a14="http://schemas.microsoft.com/office/drawing/2010/main" val="0"/>
               </a:ext>
             </a:extLst>
           </a:blip>
@@ -7011,7 +7025,7 @@
           <a:blip r:embed="rId2" cstate="print">
             <a:extLst>
               <a:ext uri="{28A0092B-C50C-407E-A947-70E740481C1C}">
-                <a14:useLocalDpi xmlns:a14="http://schemas.microsoft.com/office/drawing/2010/main" xmlns="" val="0"/>
+                <a14:useLocalDpi xmlns:a14="http://schemas.microsoft.com/office/drawing/2010/main" val="0"/>
               </a:ext>
             </a:extLst>
           </a:blip>
@@ -7041,7 +7055,7 @@
           <a:blip r:embed="rId2" cstate="print">
             <a:extLst>
               <a:ext uri="{28A0092B-C50C-407E-A947-70E740481C1C}">
-                <a14:useLocalDpi xmlns:a14="http://schemas.microsoft.com/office/drawing/2010/main" xmlns="" val="0"/>
+                <a14:useLocalDpi xmlns:a14="http://schemas.microsoft.com/office/drawing/2010/main" val="0"/>
               </a:ext>
             </a:extLst>
           </a:blip>
@@ -7071,7 +7085,7 @@
           <a:blip r:embed="rId2" cstate="print">
             <a:extLst>
               <a:ext uri="{28A0092B-C50C-407E-A947-70E740481C1C}">
-                <a14:useLocalDpi xmlns:a14="http://schemas.microsoft.com/office/drawing/2010/main" xmlns="" val="0"/>
+                <a14:useLocalDpi xmlns:a14="http://schemas.microsoft.com/office/drawing/2010/main" val="0"/>
               </a:ext>
             </a:extLst>
           </a:blip>
@@ -7101,7 +7115,7 @@
           <a:blip r:embed="rId2" cstate="print">
             <a:extLst>
               <a:ext uri="{28A0092B-C50C-407E-A947-70E740481C1C}">
-                <a14:useLocalDpi xmlns:a14="http://schemas.microsoft.com/office/drawing/2010/main" xmlns="" val="0"/>
+                <a14:useLocalDpi xmlns:a14="http://schemas.microsoft.com/office/drawing/2010/main" val="0"/>
               </a:ext>
             </a:extLst>
           </a:blip>
@@ -7345,7 +7359,7 @@
           <a:blip r:embed="rId3" cstate="print">
             <a:extLst>
               <a:ext uri="{28A0092B-C50C-407E-A947-70E740481C1C}">
-                <a14:useLocalDpi xmlns:a14="http://schemas.microsoft.com/office/drawing/2010/main" xmlns="" val="0"/>
+                <a14:useLocalDpi xmlns:a14="http://schemas.microsoft.com/office/drawing/2010/main" val="0"/>
               </a:ext>
             </a:extLst>
           </a:blip>
@@ -7371,8 +7385,8 @@
         </p:nvSpPr>
         <p:spPr>
           <a:xfrm>
-            <a:off x="5866227" y="2273399"/>
-            <a:ext cx="2264899" cy="554208"/>
+            <a:off x="6671256" y="2273399"/>
+            <a:ext cx="1459870" cy="554208"/>
           </a:xfrm>
           <a:prstGeom prst="rect">
             <a:avLst/>
@@ -7430,11 +7444,7 @@
           <a:p>
             <a:r>
               <a:rPr lang="es-AR" dirty="0" smtClean="0"/>
-              <a:t>Ejercicio </a:t>
-            </a:r>
-            <a:r>
-              <a:rPr lang="es-AR" dirty="0" smtClean="0"/>
-              <a:t>4</a:t>
+              <a:t>Ejercicio 4</a:t>
             </a:r>
             <a:endParaRPr lang="es-AR" dirty="0"/>
           </a:p>
@@ -7934,36 +7944,6 @@
       </p:pic>
       <p:cxnSp>
         <p:nvCxnSpPr>
-          <p:cNvPr id="38" name="37 Conector recto"/>
-          <p:cNvCxnSpPr/>
-          <p:nvPr/>
-        </p:nvCxnSpPr>
-        <p:spPr>
-          <a:xfrm>
-            <a:off x="6611008" y="2270235"/>
-            <a:ext cx="0" cy="557048"/>
-          </a:xfrm>
-          <a:prstGeom prst="line">
-            <a:avLst/>
-          </a:prstGeom>
-        </p:spPr>
-        <p:style>
-          <a:lnRef idx="1">
-            <a:schemeClr val="accent1"/>
-          </a:lnRef>
-          <a:fillRef idx="0">
-            <a:schemeClr val="accent1"/>
-          </a:fillRef>
-          <a:effectRef idx="0">
-            <a:schemeClr val="accent1"/>
-          </a:effectRef>
-          <a:fontRef idx="minor">
-            <a:schemeClr val="tx1"/>
-          </a:fontRef>
-        </p:style>
-      </p:cxnSp>
-      <p:cxnSp>
-        <p:nvCxnSpPr>
           <p:cNvPr id="39" name="38 Conector recto"/>
           <p:cNvCxnSpPr/>
           <p:nvPr/>
@@ -7997,6 +7977,13 @@
   <p:clrMapOvr>
     <a:masterClrMapping/>
   </p:clrMapOvr>
+  <p:timing>
+    <p:tnLst>
+      <p:par>
+        <p:cTn id="1" dur="indefinite" restart="never" nodeType="tmRoot"/>
+      </p:par>
+    </p:tnLst>
+  </p:timing>
 </p:sld>
 </file>
 
@@ -8079,7 +8066,7 @@
           <a:blip r:embed="rId2" cstate="print">
             <a:extLst>
               <a:ext uri="{28A0092B-C50C-407E-A947-70E740481C1C}">
-                <a14:useLocalDpi xmlns:a14="http://schemas.microsoft.com/office/drawing/2010/main" xmlns="" val="0"/>
+                <a14:useLocalDpi xmlns:a14="http://schemas.microsoft.com/office/drawing/2010/main" val="0"/>
               </a:ext>
             </a:extLst>
           </a:blip>
@@ -8109,7 +8096,7 @@
           <a:blip r:embed="rId2" cstate="print">
             <a:extLst>
               <a:ext uri="{28A0092B-C50C-407E-A947-70E740481C1C}">
-                <a14:useLocalDpi xmlns:a14="http://schemas.microsoft.com/office/drawing/2010/main" xmlns="" val="0"/>
+                <a14:useLocalDpi xmlns:a14="http://schemas.microsoft.com/office/drawing/2010/main" val="0"/>
               </a:ext>
             </a:extLst>
           </a:blip>
@@ -8139,7 +8126,7 @@
           <a:blip r:embed="rId2" cstate="print">
             <a:extLst>
               <a:ext uri="{28A0092B-C50C-407E-A947-70E740481C1C}">
-                <a14:useLocalDpi xmlns:a14="http://schemas.microsoft.com/office/drawing/2010/main" xmlns="" val="0"/>
+                <a14:useLocalDpi xmlns:a14="http://schemas.microsoft.com/office/drawing/2010/main" val="0"/>
               </a:ext>
             </a:extLst>
           </a:blip>
@@ -8169,7 +8156,7 @@
           <a:blip r:embed="rId2" cstate="print">
             <a:extLst>
               <a:ext uri="{28A0092B-C50C-407E-A947-70E740481C1C}">
-                <a14:useLocalDpi xmlns:a14="http://schemas.microsoft.com/office/drawing/2010/main" xmlns="" val="0"/>
+                <a14:useLocalDpi xmlns:a14="http://schemas.microsoft.com/office/drawing/2010/main" val="0"/>
               </a:ext>
             </a:extLst>
           </a:blip>
@@ -8199,7 +8186,7 @@
           <a:blip r:embed="rId2" cstate="print">
             <a:extLst>
               <a:ext uri="{28A0092B-C50C-407E-A947-70E740481C1C}">
-                <a14:useLocalDpi xmlns:a14="http://schemas.microsoft.com/office/drawing/2010/main" xmlns="" val="0"/>
+                <a14:useLocalDpi xmlns:a14="http://schemas.microsoft.com/office/drawing/2010/main" val="0"/>
               </a:ext>
             </a:extLst>
           </a:blip>
@@ -8481,7 +8468,7 @@
           <a:blip r:embed="rId3" cstate="print">
             <a:extLst>
               <a:ext uri="{28A0092B-C50C-407E-A947-70E740481C1C}">
-                <a14:useLocalDpi xmlns:a14="http://schemas.microsoft.com/office/drawing/2010/main" xmlns="" val="0"/>
+                <a14:useLocalDpi xmlns:a14="http://schemas.microsoft.com/office/drawing/2010/main" val="0"/>
               </a:ext>
             </a:extLst>
           </a:blip>
@@ -8566,11 +8553,7 @@
           <a:p>
             <a:r>
               <a:rPr lang="es-AR" dirty="0" smtClean="0"/>
-              <a:t>Ejercicio </a:t>
-            </a:r>
-            <a:r>
-              <a:rPr lang="es-AR" dirty="0" smtClean="0"/>
-              <a:t>5</a:t>
+              <a:t>Ejercicio 5</a:t>
             </a:r>
             <a:endParaRPr lang="es-AR" dirty="0"/>
           </a:p>
@@ -9292,7 +9275,7 @@
   <a:extraClrSchemeLst/>
   <a:extLst>
     <a:ext uri="{05A4C25C-085E-4340-85A3-A5531E510DB2}">
-      <thm15:themeFamily xmlns:thm15="http://schemas.microsoft.com/office/thememl/2012/main" xmlns="" name="Office Theme" id="{62F939B6-93AF-4DB8-9C6B-D6C7DFDC589F}" vid="{4A3C46E8-61CC-4603-A589-7422A47A8E4A}"/>
+      <thm15:themeFamily xmlns:thm15="http://schemas.microsoft.com/office/thememl/2012/main" name="Office Theme" id="{62F939B6-93AF-4DB8-9C6B-D6C7DFDC589F}" vid="{4A3C46E8-61CC-4603-A589-7422A47A8E4A}"/>
     </a:ext>
   </a:extLst>
 </a:theme>

</xml_diff>

<commit_message>
empiezo el ej 6
</commit_message>
<xml_diff>
--- a/tp1-colas/Imagenes.pptx
+++ b/tp1-colas/Imagenes.pptx
@@ -11,6 +11,7 @@
     <p:sldId id="259" r:id="rId5"/>
     <p:sldId id="260" r:id="rId6"/>
     <p:sldId id="261" r:id="rId7"/>
+    <p:sldId id="262" r:id="rId8"/>
   </p:sldIdLst>
   <p:sldSz cx="12192000" cy="6858000"/>
   <p:notesSz cx="6858000" cy="9144000"/>
@@ -8901,16 +8902,549 @@
           </a:p>
         </p:txBody>
       </p:sp>
-      <p:sp>
-        <p:nvSpPr>
-          <p:cNvPr id="33" name="TextBox 9"/>
+      <mc:AlternateContent xmlns:mc="http://schemas.openxmlformats.org/markup-compatibility/2006">
+        <mc:Choice xmlns:a14="http://schemas.microsoft.com/office/drawing/2010/main" Requires="a14">
+          <p:sp>
+            <p:nvSpPr>
+              <p:cNvPr id="33" name="TextBox 9"/>
+              <p:cNvSpPr txBox="1"/>
+              <p:nvPr/>
+            </p:nvSpPr>
+            <p:spPr>
+              <a:xfrm>
+                <a:off x="4463380" y="422619"/>
+                <a:ext cx="2805693" cy="369332"/>
+              </a:xfrm>
+              <a:prstGeom prst="rect">
+                <a:avLst/>
+              </a:prstGeom>
+              <a:noFill/>
+            </p:spPr>
+            <p:txBody>
+              <a:bodyPr wrap="square" rtlCol="0">
+                <a:spAutoFit/>
+              </a:bodyPr>
+              <a:lstStyle/>
+              <a:p>
+                <a:pPr algn="ctr"/>
+                <a:r>
+                  <a:rPr lang="es-AR" dirty="0" smtClean="0">
+                    <a:latin typeface="Segoe UI" panose="020B0502040204020203" pitchFamily="34" charset="0"/>
+                    <a:cs typeface="Segoe UI" panose="020B0502040204020203" pitchFamily="34" charset="0"/>
+                  </a:rPr>
+                  <a:t>Población </a:t>
+                </a:r>
+                <a:r>
+                  <a:rPr lang="es-AR" dirty="0" smtClean="0">
+                    <a:latin typeface="Segoe UI" panose="020B0502040204020203" pitchFamily="34" charset="0"/>
+                    <a:cs typeface="Segoe UI" panose="020B0502040204020203" pitchFamily="34" charset="0"/>
+                  </a:rPr>
+                  <a:t>total (</a:t>
+                </a:r>
+                <a14:m>
+                  <m:oMath xmlns:m="http://schemas.openxmlformats.org/officeDocument/2006/math">
+                    <m:r>
+                      <a:rPr lang="es-AR" i="1" dirty="0" smtClean="0">
+                        <a:latin typeface="Cambria Math" panose="02040503050406030204" pitchFamily="18" charset="0"/>
+                        <a:cs typeface="Segoe UI" panose="020B0502040204020203" pitchFamily="34" charset="0"/>
+                      </a:rPr>
+                      <m:t>𝑁</m:t>
+                    </m:r>
+                    <m:r>
+                      <a:rPr lang="es-AR" i="1" dirty="0" smtClean="0">
+                        <a:latin typeface="Cambria Math" panose="02040503050406030204" pitchFamily="18" charset="0"/>
+                        <a:cs typeface="Segoe UI" panose="020B0502040204020203" pitchFamily="34" charset="0"/>
+                      </a:rPr>
+                      <m:t>’=4</m:t>
+                    </m:r>
+                  </m:oMath>
+                </a14:m>
+                <a:r>
+                  <a:rPr lang="es-AR" dirty="0" smtClean="0">
+                    <a:latin typeface="Segoe UI" panose="020B0502040204020203" pitchFamily="34" charset="0"/>
+                    <a:cs typeface="Segoe UI" panose="020B0502040204020203" pitchFamily="34" charset="0"/>
+                  </a:rPr>
+                  <a:t>)</a:t>
+                </a:r>
+                <a:endParaRPr lang="es-AR" dirty="0">
+                  <a:latin typeface="Segoe UI" panose="020B0502040204020203" pitchFamily="34" charset="0"/>
+                  <a:cs typeface="Segoe UI" panose="020B0502040204020203" pitchFamily="34" charset="0"/>
+                </a:endParaRPr>
+              </a:p>
+            </p:txBody>
+          </p:sp>
+        </mc:Choice>
+        <mc:Fallback>
+          <p:sp>
+            <p:nvSpPr>
+              <p:cNvPr id="33" name="TextBox 9"/>
+              <p:cNvSpPr txBox="1">
+                <a:spLocks noRot="1" noChangeAspect="1" noMove="1" noResize="1" noEditPoints="1" noAdjustHandles="1" noChangeArrowheads="1" noChangeShapeType="1" noTextEdit="1"/>
+              </p:cNvSpPr>
+              <p:nvPr/>
+            </p:nvSpPr>
+            <p:spPr>
+              <a:xfrm>
+                <a:off x="4463380" y="422619"/>
+                <a:ext cx="2805693" cy="369332"/>
+              </a:xfrm>
+              <a:prstGeom prst="rect">
+                <a:avLst/>
+              </a:prstGeom>
+              <a:blipFill rotWithShape="0">
+                <a:blip r:embed="rId4"/>
+                <a:stretch>
+                  <a:fillRect t="-6557" b="-26230"/>
+                </a:stretch>
+              </a:blipFill>
+            </p:spPr>
+            <p:txBody>
+              <a:bodyPr/>
+              <a:lstStyle/>
+              <a:p>
+                <a:r>
+                  <a:rPr lang="es-AR">
+                    <a:noFill/>
+                  </a:rPr>
+                  <a:t> </a:t>
+                </a:r>
+              </a:p>
+            </p:txBody>
+          </p:sp>
+        </mc:Fallback>
+      </mc:AlternateContent>
+      <mc:AlternateContent xmlns:mc="http://schemas.openxmlformats.org/markup-compatibility/2006">
+        <mc:Choice xmlns:a14="http://schemas.microsoft.com/office/drawing/2010/main" Requires="a14">
+          <p:sp>
+            <p:nvSpPr>
+              <p:cNvPr id="31" name="TextBox 30"/>
+              <p:cNvSpPr txBox="1"/>
+              <p:nvPr/>
+            </p:nvSpPr>
+            <p:spPr>
+              <a:xfrm>
+                <a:off x="5069273" y="1702980"/>
+                <a:ext cx="177100" cy="283154"/>
+              </a:xfrm>
+              <a:prstGeom prst="rect">
+                <a:avLst/>
+              </a:prstGeom>
+              <a:noFill/>
+            </p:spPr>
+            <p:txBody>
+              <a:bodyPr wrap="none" lIns="0" tIns="0" rIns="0" bIns="0" rtlCol="0">
+                <a:spAutoFit/>
+              </a:bodyPr>
+              <a:lstStyle/>
+              <a:p>
+                <a14:m>
+                  <m:oMathPara xmlns:m="http://schemas.openxmlformats.org/officeDocument/2006/math">
+                    <m:oMathParaPr>
+                      <m:jc m:val="centerGroup"/>
+                    </m:oMathParaPr>
+                    <m:oMath xmlns:m="http://schemas.openxmlformats.org/officeDocument/2006/math">
+                      <m:acc>
+                        <m:accPr>
+                          <m:chr m:val="̅"/>
+                          <m:ctrlPr>
+                            <a:rPr lang="es-AR" i="1" smtClean="0">
+                              <a:latin typeface="Cambria Math" panose="02040503050406030204" pitchFamily="18" charset="0"/>
+                            </a:rPr>
+                          </m:ctrlPr>
+                        </m:accPr>
+                        <m:e>
+                          <m:r>
+                            <a:rPr lang="es-AR" b="0" i="1" smtClean="0">
+                              <a:latin typeface="Cambria Math" panose="02040503050406030204" pitchFamily="18" charset="0"/>
+                            </a:rPr>
+                            <m:t>𝜆</m:t>
+                          </m:r>
+                        </m:e>
+                      </m:acc>
+                    </m:oMath>
+                  </m:oMathPara>
+                </a14:m>
+                <a:endParaRPr lang="es-AR" dirty="0"/>
+              </a:p>
+            </p:txBody>
+          </p:sp>
+        </mc:Choice>
+        <mc:Fallback>
+          <p:sp>
+            <p:nvSpPr>
+              <p:cNvPr id="31" name="TextBox 30"/>
+              <p:cNvSpPr txBox="1">
+                <a:spLocks noRot="1" noChangeAspect="1" noMove="1" noResize="1" noEditPoints="1" noAdjustHandles="1" noChangeArrowheads="1" noChangeShapeType="1" noTextEdit="1"/>
+              </p:cNvSpPr>
+              <p:nvPr/>
+            </p:nvSpPr>
+            <p:spPr>
+              <a:xfrm>
+                <a:off x="5069273" y="1702980"/>
+                <a:ext cx="177100" cy="283154"/>
+              </a:xfrm>
+              <a:prstGeom prst="rect">
+                <a:avLst/>
+              </a:prstGeom>
+              <a:blipFill rotWithShape="0">
+                <a:blip r:embed="rId5"/>
+                <a:stretch>
+                  <a:fillRect l="-34483" t="-4255" r="-93103" b="-6383"/>
+                </a:stretch>
+              </a:blipFill>
+            </p:spPr>
+            <p:txBody>
+              <a:bodyPr/>
+              <a:lstStyle/>
+              <a:p>
+                <a:r>
+                  <a:rPr lang="es-AR">
+                    <a:noFill/>
+                  </a:rPr>
+                  <a:t> </a:t>
+                </a:r>
+              </a:p>
+            </p:txBody>
+          </p:sp>
+        </mc:Fallback>
+      </mc:AlternateContent>
+      <mc:AlternateContent xmlns:mc="http://schemas.openxmlformats.org/markup-compatibility/2006">
+        <mc:Choice xmlns:a14="http://schemas.microsoft.com/office/drawing/2010/main" Requires="a14">
+          <p:sp>
+            <p:nvSpPr>
+              <p:cNvPr id="36" name="TextBox 35"/>
+              <p:cNvSpPr txBox="1"/>
+              <p:nvPr/>
+            </p:nvSpPr>
+            <p:spPr>
+              <a:xfrm>
+                <a:off x="10075362" y="1656372"/>
+                <a:ext cx="185755" cy="276999"/>
+              </a:xfrm>
+              <a:prstGeom prst="rect">
+                <a:avLst/>
+              </a:prstGeom>
+              <a:noFill/>
+            </p:spPr>
+            <p:txBody>
+              <a:bodyPr wrap="none" lIns="0" tIns="0" rIns="0" bIns="0" rtlCol="0">
+                <a:spAutoFit/>
+              </a:bodyPr>
+              <a:lstStyle/>
+              <a:p>
+                <a14:m>
+                  <m:oMathPara xmlns:m="http://schemas.openxmlformats.org/officeDocument/2006/math">
+                    <m:oMathParaPr>
+                      <m:jc m:val="centerGroup"/>
+                    </m:oMathParaPr>
+                    <m:oMath xmlns:m="http://schemas.openxmlformats.org/officeDocument/2006/math">
+                      <m:acc>
+                        <m:accPr>
+                          <m:chr m:val="̅"/>
+                          <m:ctrlPr>
+                            <a:rPr lang="es-AR" i="1" smtClean="0">
+                              <a:latin typeface="Cambria Math" panose="02040503050406030204" pitchFamily="18" charset="0"/>
+                            </a:rPr>
+                          </m:ctrlPr>
+                        </m:accPr>
+                        <m:e>
+                          <m:r>
+                            <a:rPr lang="es-AR" b="0" i="1" smtClean="0">
+                              <a:latin typeface="Cambria Math" panose="02040503050406030204" pitchFamily="18" charset="0"/>
+                            </a:rPr>
+                            <m:t>𝜇</m:t>
+                          </m:r>
+                        </m:e>
+                      </m:acc>
+                    </m:oMath>
+                  </m:oMathPara>
+                </a14:m>
+                <a:endParaRPr lang="es-AR" dirty="0"/>
+              </a:p>
+            </p:txBody>
+          </p:sp>
+        </mc:Choice>
+        <mc:Fallback>
+          <p:sp>
+            <p:nvSpPr>
+              <p:cNvPr id="36" name="TextBox 35"/>
+              <p:cNvSpPr txBox="1">
+                <a:spLocks noRot="1" noChangeAspect="1" noMove="1" noResize="1" noEditPoints="1" noAdjustHandles="1" noChangeArrowheads="1" noChangeShapeType="1" noTextEdit="1"/>
+              </p:cNvSpPr>
+              <p:nvPr/>
+            </p:nvSpPr>
+            <p:spPr>
+              <a:xfrm>
+                <a:off x="10075362" y="1656372"/>
+                <a:ext cx="185755" cy="276999"/>
+              </a:xfrm>
+              <a:prstGeom prst="rect">
+                <a:avLst/>
+              </a:prstGeom>
+              <a:blipFill rotWithShape="0">
+                <a:blip r:embed="rId6"/>
+                <a:stretch>
+                  <a:fillRect l="-33333" r="-93333" b="-22222"/>
+                </a:stretch>
+              </a:blipFill>
+            </p:spPr>
+            <p:txBody>
+              <a:bodyPr/>
+              <a:lstStyle/>
+              <a:p>
+                <a:r>
+                  <a:rPr lang="es-AR">
+                    <a:noFill/>
+                  </a:rPr>
+                  <a:t> </a:t>
+                </a:r>
+              </a:p>
+            </p:txBody>
+          </p:sp>
+        </mc:Fallback>
+      </mc:AlternateContent>
+    </p:spTree>
+  </p:cSld>
+  <p:clrMapOvr>
+    <a:masterClrMapping/>
+  </p:clrMapOvr>
+  <p:timing>
+    <p:tnLst>
+      <p:par>
+        <p:cTn id="1" dur="indefinite" restart="never" nodeType="tmRoot"/>
+      </p:par>
+    </p:tnLst>
+  </p:timing>
+</p:sld>
+</file>
+
+<file path=ppt/slides/slide7.xml><?xml version="1.0" encoding="utf-8"?>
+<p:sld xmlns:a="http://schemas.openxmlformats.org/drawingml/2006/main" xmlns:r="http://schemas.openxmlformats.org/officeDocument/2006/relationships" xmlns:p="http://schemas.openxmlformats.org/presentationml/2006/main">
+  <p:cSld>
+    <p:spTree>
+      <p:nvGrpSpPr>
+        <p:cNvPr id="1" name=""/>
+        <p:cNvGrpSpPr/>
+        <p:nvPr/>
+      </p:nvGrpSpPr>
+      <p:grpSpPr>
+        <a:xfrm>
+          <a:off x="0" y="0"/>
+          <a:ext cx="0" cy="0"/>
+          <a:chOff x="0" y="0"/>
+          <a:chExt cx="0" cy="0"/>
+        </a:xfrm>
+      </p:grpSpPr>
+      <p:sp>
+        <p:nvSpPr>
+          <p:cNvPr id="4" name="Oval 3"/>
+          <p:cNvSpPr/>
+          <p:nvPr/>
+        </p:nvSpPr>
+        <p:spPr>
+          <a:xfrm>
+            <a:off x="928632" y="1301325"/>
+            <a:ext cx="2382592" cy="2369712"/>
+          </a:xfrm>
+          <a:prstGeom prst="ellipse">
+            <a:avLst/>
+          </a:prstGeom>
+          <a:ln>
+            <a:solidFill>
+              <a:schemeClr val="tx2"/>
+            </a:solidFill>
+          </a:ln>
+          <a:effectLst>
+            <a:outerShdw blurRad="50800" dist="38100" dir="2700000" algn="tl" rotWithShape="0">
+              <a:prstClr val="black">
+                <a:alpha val="40000"/>
+              </a:prstClr>
+            </a:outerShdw>
+          </a:effectLst>
+        </p:spPr>
+        <p:style>
+          <a:lnRef idx="2">
+            <a:schemeClr val="accent6"/>
+          </a:lnRef>
+          <a:fillRef idx="1">
+            <a:schemeClr val="lt1"/>
+          </a:fillRef>
+          <a:effectRef idx="0">
+            <a:schemeClr val="accent6"/>
+          </a:effectRef>
+          <a:fontRef idx="minor">
+            <a:schemeClr val="dk1"/>
+          </a:fontRef>
+        </p:style>
+        <p:txBody>
+          <a:bodyPr rtlCol="0" anchor="ctr"/>
+          <a:lstStyle/>
+          <a:p>
+            <a:pPr algn="ctr"/>
+            <a:endParaRPr lang="es-AR"/>
+          </a:p>
+        </p:txBody>
+      </p:sp>
+      <p:pic>
+        <p:nvPicPr>
+          <p:cNvPr id="5" name="Picture 4"/>
+          <p:cNvPicPr>
+            <a:picLocks noChangeAspect="1"/>
+          </p:cNvPicPr>
+          <p:nvPr/>
+        </p:nvPicPr>
+        <p:blipFill>
+          <a:blip r:embed="rId2" cstate="print">
+            <a:extLst>
+              <a:ext uri="{28A0092B-C50C-407E-A947-70E740481C1C}">
+                <a14:useLocalDpi xmlns:a14="http://schemas.microsoft.com/office/drawing/2010/main" val="0"/>
+              </a:ext>
+            </a:extLst>
+          </a:blip>
+          <a:stretch>
+            <a:fillRect/>
+          </a:stretch>
+        </p:blipFill>
+        <p:spPr>
+          <a:xfrm>
+            <a:off x="1481585" y="1635057"/>
+            <a:ext cx="425562" cy="425562"/>
+          </a:xfrm>
+          <a:prstGeom prst="rect">
+            <a:avLst/>
+          </a:prstGeom>
+        </p:spPr>
+      </p:pic>
+      <p:pic>
+        <p:nvPicPr>
+          <p:cNvPr id="6" name="Picture 5"/>
+          <p:cNvPicPr>
+            <a:picLocks noChangeAspect="1"/>
+          </p:cNvPicPr>
+          <p:nvPr/>
+        </p:nvPicPr>
+        <p:blipFill>
+          <a:blip r:embed="rId2" cstate="print">
+            <a:extLst>
+              <a:ext uri="{28A0092B-C50C-407E-A947-70E740481C1C}">
+                <a14:useLocalDpi xmlns:a14="http://schemas.microsoft.com/office/drawing/2010/main" val="0"/>
+              </a:ext>
+            </a:extLst>
+          </a:blip>
+          <a:stretch>
+            <a:fillRect/>
+          </a:stretch>
+        </p:blipFill>
+        <p:spPr>
+          <a:xfrm>
+            <a:off x="2427925" y="1847838"/>
+            <a:ext cx="425562" cy="425562"/>
+          </a:xfrm>
+          <a:prstGeom prst="rect">
+            <a:avLst/>
+          </a:prstGeom>
+        </p:spPr>
+      </p:pic>
+      <p:pic>
+        <p:nvPicPr>
+          <p:cNvPr id="7" name="Picture 6"/>
+          <p:cNvPicPr>
+            <a:picLocks noChangeAspect="1"/>
+          </p:cNvPicPr>
+          <p:nvPr/>
+        </p:nvPicPr>
+        <p:blipFill>
+          <a:blip r:embed="rId2" cstate="print">
+            <a:extLst>
+              <a:ext uri="{28A0092B-C50C-407E-A947-70E740481C1C}">
+                <a14:useLocalDpi xmlns:a14="http://schemas.microsoft.com/office/drawing/2010/main" val="0"/>
+              </a:ext>
+            </a:extLst>
+          </a:blip>
+          <a:stretch>
+            <a:fillRect/>
+          </a:stretch>
+        </p:blipFill>
+        <p:spPr>
+          <a:xfrm>
+            <a:off x="1334272" y="2273400"/>
+            <a:ext cx="425562" cy="425562"/>
+          </a:xfrm>
+          <a:prstGeom prst="rect">
+            <a:avLst/>
+          </a:prstGeom>
+        </p:spPr>
+      </p:pic>
+      <p:pic>
+        <p:nvPicPr>
+          <p:cNvPr id="8" name="Picture 7"/>
+          <p:cNvPicPr>
+            <a:picLocks noChangeAspect="1"/>
+          </p:cNvPicPr>
+          <p:nvPr/>
+        </p:nvPicPr>
+        <p:blipFill>
+          <a:blip r:embed="rId2" cstate="print">
+            <a:extLst>
+              <a:ext uri="{28A0092B-C50C-407E-A947-70E740481C1C}">
+                <a14:useLocalDpi xmlns:a14="http://schemas.microsoft.com/office/drawing/2010/main" val="0"/>
+              </a:ext>
+            </a:extLst>
+          </a:blip>
+          <a:stretch>
+            <a:fillRect/>
+          </a:stretch>
+        </p:blipFill>
+        <p:spPr>
+          <a:xfrm>
+            <a:off x="1694366" y="2984817"/>
+            <a:ext cx="425562" cy="425562"/>
+          </a:xfrm>
+          <a:prstGeom prst="rect">
+            <a:avLst/>
+          </a:prstGeom>
+        </p:spPr>
+      </p:pic>
+      <p:pic>
+        <p:nvPicPr>
+          <p:cNvPr id="9" name="Picture 8"/>
+          <p:cNvPicPr>
+            <a:picLocks noChangeAspect="1"/>
+          </p:cNvPicPr>
+          <p:nvPr/>
+        </p:nvPicPr>
+        <p:blipFill>
+          <a:blip r:embed="rId2" cstate="print">
+            <a:extLst>
+              <a:ext uri="{28A0092B-C50C-407E-A947-70E740481C1C}">
+                <a14:useLocalDpi xmlns:a14="http://schemas.microsoft.com/office/drawing/2010/main" val="0"/>
+              </a:ext>
+            </a:extLst>
+          </a:blip>
+          <a:stretch>
+            <a:fillRect/>
+          </a:stretch>
+        </p:blipFill>
+        <p:spPr>
+          <a:xfrm>
+            <a:off x="2354268" y="2520619"/>
+            <a:ext cx="425562" cy="425562"/>
+          </a:xfrm>
+          <a:prstGeom prst="rect">
+            <a:avLst/>
+          </a:prstGeom>
+        </p:spPr>
+      </p:pic>
+      <p:sp>
+        <p:nvSpPr>
+          <p:cNvPr id="10" name="TextBox 9"/>
           <p:cNvSpPr txBox="1"/>
           <p:nvPr/>
         </p:nvSpPr>
         <p:spPr>
           <a:xfrm>
-            <a:off x="5159373" y="402036"/>
-            <a:ext cx="2134806" cy="369332"/>
+            <a:off x="1212739" y="3980809"/>
+            <a:ext cx="1640748" cy="923330"/>
           </a:xfrm>
           <a:prstGeom prst="rect">
             <a:avLst/>
@@ -8929,7 +9463,7 @@
                 <a:latin typeface="Segoe UI" panose="020B0502040204020203" pitchFamily="34" charset="0"/>
                 <a:cs typeface="Segoe UI" panose="020B0502040204020203" pitchFamily="34" charset="0"/>
               </a:rPr>
-              <a:t>Población total(N’)</a:t>
+              <a:t>Población fuera del sistema (J)</a:t>
             </a:r>
             <a:endParaRPr lang="es-AR" dirty="0">
               <a:latin typeface="Segoe UI" panose="020B0502040204020203" pitchFamily="34" charset="0"/>
@@ -8938,85 +9472,1211 @@
           </a:p>
         </p:txBody>
       </p:sp>
+      <p:sp>
+        <p:nvSpPr>
+          <p:cNvPr id="11" name="Rounded Rectangle 10"/>
+          <p:cNvSpPr/>
+          <p:nvPr/>
+        </p:nvSpPr>
+        <p:spPr>
+          <a:xfrm>
+            <a:off x="4601428" y="1301325"/>
+            <a:ext cx="4971245" cy="2369712"/>
+          </a:xfrm>
+          <a:prstGeom prst="roundRect">
+            <a:avLst/>
+          </a:prstGeom>
+          <a:ln>
+            <a:solidFill>
+              <a:schemeClr val="tx2"/>
+            </a:solidFill>
+          </a:ln>
+          <a:effectLst>
+            <a:outerShdw blurRad="50800" dist="38100" dir="2700000" algn="tl" rotWithShape="0">
+              <a:prstClr val="black">
+                <a:alpha val="40000"/>
+              </a:prstClr>
+            </a:outerShdw>
+          </a:effectLst>
+        </p:spPr>
+        <p:style>
+          <a:lnRef idx="2">
+            <a:schemeClr val="accent4"/>
+          </a:lnRef>
+          <a:fillRef idx="1">
+            <a:schemeClr val="lt1"/>
+          </a:fillRef>
+          <a:effectRef idx="0">
+            <a:schemeClr val="accent4"/>
+          </a:effectRef>
+          <a:fontRef idx="minor">
+            <a:schemeClr val="dk1"/>
+          </a:fontRef>
+        </p:style>
+        <p:txBody>
+          <a:bodyPr rtlCol="0" anchor="ctr"/>
+          <a:lstStyle/>
+          <a:p>
+            <a:pPr algn="ctr"/>
+            <a:endParaRPr lang="es-AR"/>
+          </a:p>
+        </p:txBody>
+      </p:sp>
+      <p:sp>
+        <p:nvSpPr>
+          <p:cNvPr id="12" name="Right Arrow 11"/>
+          <p:cNvSpPr/>
+          <p:nvPr/>
+        </p:nvSpPr>
+        <p:spPr>
+          <a:xfrm>
+            <a:off x="3477296" y="2273400"/>
+            <a:ext cx="875484" cy="672781"/>
+          </a:xfrm>
+          <a:prstGeom prst="rightArrow">
+            <a:avLst/>
+          </a:prstGeom>
+        </p:spPr>
+        <p:style>
+          <a:lnRef idx="1">
+            <a:schemeClr val="accent2"/>
+          </a:lnRef>
+          <a:fillRef idx="2">
+            <a:schemeClr val="accent2"/>
+          </a:fillRef>
+          <a:effectRef idx="1">
+            <a:schemeClr val="accent2"/>
+          </a:effectRef>
+          <a:fontRef idx="minor">
+            <a:schemeClr val="dk1"/>
+          </a:fontRef>
+        </p:style>
+        <p:txBody>
+          <a:bodyPr rtlCol="0" anchor="ctr"/>
+          <a:lstStyle/>
+          <a:p>
+            <a:pPr algn="ctr"/>
+            <a:endParaRPr lang="es-AR"/>
+          </a:p>
+        </p:txBody>
+      </p:sp>
+      <p:sp>
+        <p:nvSpPr>
+          <p:cNvPr id="13" name="Right Arrow 12"/>
+          <p:cNvSpPr/>
+          <p:nvPr/>
+        </p:nvSpPr>
+        <p:spPr>
+          <a:xfrm>
+            <a:off x="9851481" y="2214112"/>
+            <a:ext cx="875484" cy="672781"/>
+          </a:xfrm>
+          <a:prstGeom prst="rightArrow">
+            <a:avLst/>
+          </a:prstGeom>
+        </p:spPr>
+        <p:style>
+          <a:lnRef idx="1">
+            <a:schemeClr val="accent1"/>
+          </a:lnRef>
+          <a:fillRef idx="2">
+            <a:schemeClr val="accent1"/>
+          </a:fillRef>
+          <a:effectRef idx="1">
+            <a:schemeClr val="accent1"/>
+          </a:effectRef>
+          <a:fontRef idx="minor">
+            <a:schemeClr val="dk1"/>
+          </a:fontRef>
+        </p:style>
+        <p:txBody>
+          <a:bodyPr rtlCol="0" anchor="ctr"/>
+          <a:lstStyle/>
+          <a:p>
+            <a:pPr algn="ctr"/>
+            <a:endParaRPr lang="es-AR"/>
+          </a:p>
+        </p:txBody>
+      </p:sp>
+      <p:sp>
+        <p:nvSpPr>
+          <p:cNvPr id="14" name="Right Arrow 13"/>
+          <p:cNvSpPr/>
+          <p:nvPr/>
+        </p:nvSpPr>
+        <p:spPr>
+          <a:xfrm>
+            <a:off x="4777019" y="2249530"/>
+            <a:ext cx="865965" cy="711418"/>
+          </a:xfrm>
+          <a:prstGeom prst="rightArrow">
+            <a:avLst/>
+          </a:prstGeom>
+          <a:gradFill>
+            <a:gsLst>
+              <a:gs pos="0">
+                <a:schemeClr val="accent2">
+                  <a:lumMod val="110000"/>
+                  <a:satMod val="105000"/>
+                  <a:tint val="67000"/>
+                </a:schemeClr>
+              </a:gs>
+              <a:gs pos="100000">
+                <a:schemeClr val="bg2"/>
+              </a:gs>
+            </a:gsLst>
+          </a:gradFill>
+        </p:spPr>
+        <p:style>
+          <a:lnRef idx="1">
+            <a:schemeClr val="accent2"/>
+          </a:lnRef>
+          <a:fillRef idx="2">
+            <a:schemeClr val="accent2"/>
+          </a:fillRef>
+          <a:effectRef idx="1">
+            <a:schemeClr val="accent2"/>
+          </a:effectRef>
+          <a:fontRef idx="minor">
+            <a:schemeClr val="dk1"/>
+          </a:fontRef>
+        </p:style>
+        <p:txBody>
+          <a:bodyPr rtlCol="0" anchor="ctr"/>
+          <a:lstStyle/>
+          <a:p>
+            <a:pPr algn="ctr"/>
+            <a:endParaRPr lang="es-AR"/>
+          </a:p>
+        </p:txBody>
+      </p:sp>
+      <p:sp>
+        <p:nvSpPr>
+          <p:cNvPr id="15" name="TextBox 14"/>
+          <p:cNvSpPr txBox="1"/>
+          <p:nvPr/>
+        </p:nvSpPr>
+        <p:spPr>
+          <a:xfrm>
+            <a:off x="5542671" y="3980461"/>
+            <a:ext cx="2963684" cy="369332"/>
+          </a:xfrm>
+          <a:prstGeom prst="rect">
+            <a:avLst/>
+          </a:prstGeom>
+          <a:noFill/>
+        </p:spPr>
+        <p:txBody>
+          <a:bodyPr wrap="square" rtlCol="0">
+            <a:spAutoFit/>
+          </a:bodyPr>
+          <a:lstStyle/>
+          <a:p>
+            <a:pPr algn="ctr"/>
+            <a:r>
+              <a:rPr lang="es-AR" dirty="0" smtClean="0">
+                <a:latin typeface="Segoe UI" panose="020B0502040204020203" pitchFamily="34" charset="0"/>
+                <a:cs typeface="Segoe UI" panose="020B0502040204020203" pitchFamily="34" charset="0"/>
+              </a:rPr>
+              <a:t>Sistema = cola + canales</a:t>
+            </a:r>
+            <a:endParaRPr lang="es-AR" dirty="0">
+              <a:latin typeface="Segoe UI" panose="020B0502040204020203" pitchFamily="34" charset="0"/>
+              <a:cs typeface="Segoe UI" panose="020B0502040204020203" pitchFamily="34" charset="0"/>
+            </a:endParaRPr>
+          </a:p>
+        </p:txBody>
+      </p:sp>
       <p:pic>
         <p:nvPicPr>
-          <p:cNvPr id="34" name="Picture 9"/>
+          <p:cNvPr id="16" name="Picture 16"/>
           <p:cNvPicPr>
-            <a:picLocks noChangeAspect="1" noChangeArrowheads="1"/>
+            <a:picLocks noChangeAspect="1"/>
           </p:cNvPicPr>
           <p:nvPr/>
         </p:nvPicPr>
         <p:blipFill>
-          <a:blip r:embed="rId4" cstate="print">
-            <a:clrChange>
-              <a:clrFrom>
-                <a:srgbClr val="FFFFFF"/>
-              </a:clrFrom>
-              <a:clrTo>
-                <a:srgbClr val="FFFFFF">
-                  <a:alpha val="0"/>
-                </a:srgbClr>
-              </a:clrTo>
-            </a:clrChange>
+          <a:blip r:embed="rId3" cstate="print">
+            <a:extLst>
+              <a:ext uri="{28A0092B-C50C-407E-A947-70E740481C1C}">
+                <a14:useLocalDpi xmlns:a14="http://schemas.microsoft.com/office/drawing/2010/main" val="0"/>
+              </a:ext>
+            </a:extLst>
           </a:blip>
-          <a:srcRect/>
           <a:stretch>
             <a:fillRect/>
           </a:stretch>
         </p:blipFill>
-        <p:spPr bwMode="auto">
-          <a:xfrm>
-            <a:off x="10205545" y="1713186"/>
-            <a:ext cx="128337" cy="304800"/>
+        <p:spPr>
+          <a:xfrm>
+            <a:off x="8552332" y="1852363"/>
+            <a:ext cx="745199" cy="745199"/>
           </a:xfrm>
           <a:prstGeom prst="rect">
             <a:avLst/>
           </a:prstGeom>
+        </p:spPr>
+      </p:pic>
+      <p:sp>
+        <p:nvSpPr>
+          <p:cNvPr id="22" name="TextBox 18"/>
+          <p:cNvSpPr txBox="1"/>
+          <p:nvPr/>
+        </p:nvSpPr>
+        <p:spPr>
+          <a:xfrm>
+            <a:off x="506437" y="239151"/>
+            <a:ext cx="1136658" cy="369332"/>
+          </a:xfrm>
+          <a:prstGeom prst="rect">
+            <a:avLst/>
+          </a:prstGeom>
           <a:noFill/>
         </p:spPr>
-      </p:pic>
+        <p:txBody>
+          <a:bodyPr wrap="none" rtlCol="0">
+            <a:spAutoFit/>
+          </a:bodyPr>
+          <a:lstStyle/>
+          <a:p>
+            <a:r>
+              <a:rPr lang="es-AR" dirty="0" smtClean="0"/>
+              <a:t>Ejercicio </a:t>
+            </a:r>
+            <a:r>
+              <a:rPr lang="es-AR" dirty="0" smtClean="0"/>
+              <a:t>6</a:t>
+            </a:r>
+            <a:endParaRPr lang="es-AR" dirty="0"/>
+          </a:p>
+        </p:txBody>
+      </p:sp>
+      <mc:AlternateContent xmlns:mc="http://schemas.openxmlformats.org/markup-compatibility/2006">
+        <mc:Choice xmlns:a14="http://schemas.microsoft.com/office/drawing/2010/main" Requires="a14">
+          <p:sp>
+            <p:nvSpPr>
+              <p:cNvPr id="2" name="TextBox 1"/>
+              <p:cNvSpPr txBox="1"/>
+              <p:nvPr/>
+            </p:nvSpPr>
+            <p:spPr>
+              <a:xfrm>
+                <a:off x="5121451" y="1764745"/>
+                <a:ext cx="177100" cy="283154"/>
+              </a:xfrm>
+              <a:prstGeom prst="rect">
+                <a:avLst/>
+              </a:prstGeom>
+              <a:noFill/>
+            </p:spPr>
+            <p:txBody>
+              <a:bodyPr wrap="none" lIns="0" tIns="0" rIns="0" bIns="0" rtlCol="0">
+                <a:spAutoFit/>
+              </a:bodyPr>
+              <a:lstStyle/>
+              <a:p>
+                <a14:m>
+                  <m:oMathPara xmlns:m="http://schemas.openxmlformats.org/officeDocument/2006/math">
+                    <m:oMathParaPr>
+                      <m:jc m:val="centerGroup"/>
+                    </m:oMathParaPr>
+                    <m:oMath xmlns:m="http://schemas.openxmlformats.org/officeDocument/2006/math">
+                      <m:acc>
+                        <m:accPr>
+                          <m:chr m:val="̅"/>
+                          <m:ctrlPr>
+                            <a:rPr lang="es-AR" i="1" smtClean="0">
+                              <a:latin typeface="Cambria Math" panose="02040503050406030204" pitchFamily="18" charset="0"/>
+                            </a:rPr>
+                          </m:ctrlPr>
+                        </m:accPr>
+                        <m:e>
+                          <m:r>
+                            <a:rPr lang="es-AR" b="0" i="1" smtClean="0">
+                              <a:latin typeface="Cambria Math" panose="02040503050406030204" pitchFamily="18" charset="0"/>
+                            </a:rPr>
+                            <m:t>𝜆</m:t>
+                          </m:r>
+                        </m:e>
+                      </m:acc>
+                    </m:oMath>
+                  </m:oMathPara>
+                </a14:m>
+                <a:endParaRPr lang="es-AR" dirty="0"/>
+              </a:p>
+            </p:txBody>
+          </p:sp>
+        </mc:Choice>
+        <mc:Fallback>
+          <p:sp>
+            <p:nvSpPr>
+              <p:cNvPr id="2" name="TextBox 1"/>
+              <p:cNvSpPr txBox="1">
+                <a:spLocks noRot="1" noChangeAspect="1" noMove="1" noResize="1" noEditPoints="1" noAdjustHandles="1" noChangeArrowheads="1" noChangeShapeType="1" noTextEdit="1"/>
+              </p:cNvSpPr>
+              <p:nvPr/>
+            </p:nvSpPr>
+            <p:spPr>
+              <a:xfrm>
+                <a:off x="5121451" y="1764745"/>
+                <a:ext cx="177100" cy="283154"/>
+              </a:xfrm>
+              <a:prstGeom prst="rect">
+                <a:avLst/>
+              </a:prstGeom>
+              <a:blipFill rotWithShape="0">
+                <a:blip r:embed="rId4"/>
+                <a:stretch>
+                  <a:fillRect l="-34483" t="-4255" r="-96552" b="-6383"/>
+                </a:stretch>
+              </a:blipFill>
+            </p:spPr>
+            <p:txBody>
+              <a:bodyPr/>
+              <a:lstStyle/>
+              <a:p>
+                <a:r>
+                  <a:rPr lang="es-AR">
+                    <a:noFill/>
+                  </a:rPr>
+                  <a:t> </a:t>
+                </a:r>
+              </a:p>
+            </p:txBody>
+          </p:sp>
+        </mc:Fallback>
+      </mc:AlternateContent>
+      <mc:AlternateContent xmlns:mc="http://schemas.openxmlformats.org/markup-compatibility/2006">
+        <mc:Choice xmlns:a14="http://schemas.microsoft.com/office/drawing/2010/main" Requires="a14">
+          <p:sp>
+            <p:nvSpPr>
+              <p:cNvPr id="3" name="TextBox 2"/>
+              <p:cNvSpPr txBox="1"/>
+              <p:nvPr/>
+            </p:nvSpPr>
+            <p:spPr>
+              <a:xfrm>
+                <a:off x="3547377" y="1662527"/>
+                <a:ext cx="887487" cy="525913"/>
+              </a:xfrm>
+              <a:prstGeom prst="rect">
+                <a:avLst/>
+              </a:prstGeom>
+              <a:noFill/>
+            </p:spPr>
+            <p:txBody>
+              <a:bodyPr wrap="none" lIns="0" tIns="0" rIns="0" bIns="0" rtlCol="0">
+                <a:spAutoFit/>
+              </a:bodyPr>
+              <a:lstStyle/>
+              <a:p>
+                <a14:m>
+                  <m:oMathPara xmlns:m="http://schemas.openxmlformats.org/officeDocument/2006/math">
+                    <m:oMathParaPr>
+                      <m:jc m:val="centerGroup"/>
+                    </m:oMathParaPr>
+                    <m:oMath xmlns:m="http://schemas.openxmlformats.org/officeDocument/2006/math">
+                      <m:r>
+                        <a:rPr lang="es-AR" b="0" i="1" smtClean="0">
+                          <a:latin typeface="Cambria Math" panose="02040503050406030204" pitchFamily="18" charset="0"/>
+                        </a:rPr>
+                        <m:t>𝜆</m:t>
+                      </m:r>
+                      <m:r>
+                        <a:rPr lang="es-AR" b="0" i="1" smtClean="0">
+                          <a:latin typeface="Cambria Math" panose="02040503050406030204" pitchFamily="18" charset="0"/>
+                        </a:rPr>
+                        <m:t>=5</m:t>
+                      </m:r>
+                      <m:f>
+                        <m:fPr>
+                          <m:ctrlPr>
+                            <a:rPr lang="es-AR" b="0" i="1" smtClean="0">
+                              <a:latin typeface="Cambria Math" panose="02040503050406030204" pitchFamily="18" charset="0"/>
+                            </a:rPr>
+                          </m:ctrlPr>
+                        </m:fPr>
+                        <m:num>
+                          <m:r>
+                            <a:rPr lang="es-AR" b="0" i="1" smtClean="0">
+                              <a:latin typeface="Cambria Math" panose="02040503050406030204" pitchFamily="18" charset="0"/>
+                            </a:rPr>
+                            <m:t>𝑐𝑙</m:t>
+                          </m:r>
+                        </m:num>
+                        <m:den>
+                          <m:r>
+                            <a:rPr lang="es-AR" b="0" i="1" smtClean="0">
+                              <a:latin typeface="Cambria Math" panose="02040503050406030204" pitchFamily="18" charset="0"/>
+                            </a:rPr>
+                            <m:t>h𝑟</m:t>
+                          </m:r>
+                        </m:den>
+                      </m:f>
+                    </m:oMath>
+                  </m:oMathPara>
+                </a14:m>
+                <a:endParaRPr lang="es-AR" dirty="0"/>
+              </a:p>
+            </p:txBody>
+          </p:sp>
+        </mc:Choice>
+        <mc:Fallback>
+          <p:sp>
+            <p:nvSpPr>
+              <p:cNvPr id="3" name="TextBox 2"/>
+              <p:cNvSpPr txBox="1">
+                <a:spLocks noRot="1" noChangeAspect="1" noMove="1" noResize="1" noEditPoints="1" noAdjustHandles="1" noChangeArrowheads="1" noChangeShapeType="1" noTextEdit="1"/>
+              </p:cNvSpPr>
+              <p:nvPr/>
+            </p:nvSpPr>
+            <p:spPr>
+              <a:xfrm>
+                <a:off x="3547377" y="1662527"/>
+                <a:ext cx="887487" cy="525913"/>
+              </a:xfrm>
+              <a:prstGeom prst="rect">
+                <a:avLst/>
+              </a:prstGeom>
+              <a:blipFill rotWithShape="0">
+                <a:blip r:embed="rId5"/>
+                <a:stretch>
+                  <a:fillRect/>
+                </a:stretch>
+              </a:blipFill>
+            </p:spPr>
+            <p:txBody>
+              <a:bodyPr/>
+              <a:lstStyle/>
+              <a:p>
+                <a:r>
+                  <a:rPr lang="es-AR">
+                    <a:noFill/>
+                  </a:rPr>
+                  <a:t> </a:t>
+                </a:r>
+              </a:p>
+            </p:txBody>
+          </p:sp>
+        </mc:Fallback>
+      </mc:AlternateContent>
+      <mc:AlternateContent xmlns:mc="http://schemas.openxmlformats.org/markup-compatibility/2006">
+        <mc:Choice xmlns:a14="http://schemas.microsoft.com/office/drawing/2010/main" Requires="a14">
+          <p:sp>
+            <p:nvSpPr>
+              <p:cNvPr id="36" name="TextBox 35"/>
+              <p:cNvSpPr txBox="1"/>
+              <p:nvPr/>
+            </p:nvSpPr>
+            <p:spPr>
+              <a:xfrm>
+                <a:off x="10127540" y="1718137"/>
+                <a:ext cx="185755" cy="276999"/>
+              </a:xfrm>
+              <a:prstGeom prst="rect">
+                <a:avLst/>
+              </a:prstGeom>
+              <a:noFill/>
+            </p:spPr>
+            <p:txBody>
+              <a:bodyPr wrap="none" lIns="0" tIns="0" rIns="0" bIns="0" rtlCol="0">
+                <a:spAutoFit/>
+              </a:bodyPr>
+              <a:lstStyle/>
+              <a:p>
+                <a14:m>
+                  <m:oMathPara xmlns:m="http://schemas.openxmlformats.org/officeDocument/2006/math">
+                    <m:oMathParaPr>
+                      <m:jc m:val="centerGroup"/>
+                    </m:oMathParaPr>
+                    <m:oMath xmlns:m="http://schemas.openxmlformats.org/officeDocument/2006/math">
+                      <m:acc>
+                        <m:accPr>
+                          <m:chr m:val="̅"/>
+                          <m:ctrlPr>
+                            <a:rPr lang="es-AR" i="1" smtClean="0">
+                              <a:latin typeface="Cambria Math" panose="02040503050406030204" pitchFamily="18" charset="0"/>
+                            </a:rPr>
+                          </m:ctrlPr>
+                        </m:accPr>
+                        <m:e>
+                          <m:r>
+                            <a:rPr lang="es-AR" b="0" i="1" smtClean="0">
+                              <a:latin typeface="Cambria Math" panose="02040503050406030204" pitchFamily="18" charset="0"/>
+                            </a:rPr>
+                            <m:t>𝜇</m:t>
+                          </m:r>
+                        </m:e>
+                      </m:acc>
+                    </m:oMath>
+                  </m:oMathPara>
+                </a14:m>
+                <a:endParaRPr lang="es-AR" dirty="0"/>
+              </a:p>
+            </p:txBody>
+          </p:sp>
+        </mc:Choice>
+        <mc:Fallback>
+          <p:sp>
+            <p:nvSpPr>
+              <p:cNvPr id="36" name="TextBox 35"/>
+              <p:cNvSpPr txBox="1">
+                <a:spLocks noRot="1" noChangeAspect="1" noMove="1" noResize="1" noEditPoints="1" noAdjustHandles="1" noChangeArrowheads="1" noChangeShapeType="1" noTextEdit="1"/>
+              </p:cNvSpPr>
+              <p:nvPr/>
+            </p:nvSpPr>
+            <p:spPr>
+              <a:xfrm>
+                <a:off x="10127540" y="1718137"/>
+                <a:ext cx="185755" cy="276999"/>
+              </a:xfrm>
+              <a:prstGeom prst="rect">
+                <a:avLst/>
+              </a:prstGeom>
+              <a:blipFill rotWithShape="0">
+                <a:blip r:embed="rId6"/>
+                <a:stretch>
+                  <a:fillRect l="-29032" r="-90323" b="-22222"/>
+                </a:stretch>
+              </a:blipFill>
+            </p:spPr>
+            <p:txBody>
+              <a:bodyPr/>
+              <a:lstStyle/>
+              <a:p>
+                <a:r>
+                  <a:rPr lang="es-AR">
+                    <a:noFill/>
+                  </a:rPr>
+                  <a:t> </a:t>
+                </a:r>
+              </a:p>
+            </p:txBody>
+          </p:sp>
+        </mc:Fallback>
+      </mc:AlternateContent>
+      <p:sp>
+        <p:nvSpPr>
+          <p:cNvPr id="39" name="Right Arrow 38"/>
+          <p:cNvSpPr/>
+          <p:nvPr/>
+        </p:nvSpPr>
+        <p:spPr>
+          <a:xfrm rot="5400000">
+            <a:off x="3495594" y="3390995"/>
+            <a:ext cx="875484" cy="672781"/>
+          </a:xfrm>
+          <a:prstGeom prst="rightArrow">
+            <a:avLst/>
+          </a:prstGeom>
+        </p:spPr>
+        <p:style>
+          <a:lnRef idx="1">
+            <a:schemeClr val="accent2"/>
+          </a:lnRef>
+          <a:fillRef idx="2">
+            <a:schemeClr val="accent2"/>
+          </a:fillRef>
+          <a:effectRef idx="1">
+            <a:schemeClr val="accent2"/>
+          </a:effectRef>
+          <a:fontRef idx="minor">
+            <a:schemeClr val="dk1"/>
+          </a:fontRef>
+        </p:style>
+        <p:txBody>
+          <a:bodyPr rtlCol="0" anchor="ctr"/>
+          <a:lstStyle/>
+          <a:p>
+            <a:pPr algn="ctr"/>
+            <a:endParaRPr lang="es-AR"/>
+          </a:p>
+        </p:txBody>
+      </p:sp>
+      <mc:AlternateContent xmlns:mc="http://schemas.openxmlformats.org/markup-compatibility/2006">
+        <mc:Choice xmlns:a14="http://schemas.microsoft.com/office/drawing/2010/main" Requires="a14">
+          <p:sp>
+            <p:nvSpPr>
+              <p:cNvPr id="18" name="TextBox 17"/>
+              <p:cNvSpPr txBox="1"/>
+              <p:nvPr/>
+            </p:nvSpPr>
+            <p:spPr>
+              <a:xfrm>
+                <a:off x="3811484" y="4442474"/>
+                <a:ext cx="207108" cy="276999"/>
+              </a:xfrm>
+              <a:prstGeom prst="rect">
+                <a:avLst/>
+              </a:prstGeom>
+              <a:noFill/>
+            </p:spPr>
+            <p:txBody>
+              <a:bodyPr wrap="none" lIns="0" tIns="0" rIns="0" bIns="0" rtlCol="0">
+                <a:spAutoFit/>
+              </a:bodyPr>
+              <a:lstStyle/>
+              <a:p>
+                <a14:m>
+                  <m:oMathPara xmlns:m="http://schemas.openxmlformats.org/officeDocument/2006/math">
+                    <m:oMathParaPr>
+                      <m:jc m:val="centerGroup"/>
+                    </m:oMathParaPr>
+                    <m:oMath xmlns:m="http://schemas.openxmlformats.org/officeDocument/2006/math">
+                      <m:acc>
+                        <m:accPr>
+                          <m:chr m:val="̅"/>
+                          <m:ctrlPr>
+                            <a:rPr lang="es-AR" i="1" smtClean="0">
+                              <a:latin typeface="Cambria Math" panose="02040503050406030204" pitchFamily="18" charset="0"/>
+                            </a:rPr>
+                          </m:ctrlPr>
+                        </m:accPr>
+                        <m:e>
+                          <m:r>
+                            <a:rPr lang="es-AR" b="0" i="1" smtClean="0">
+                              <a:latin typeface="Cambria Math" panose="02040503050406030204" pitchFamily="18" charset="0"/>
+                            </a:rPr>
+                            <m:t>𝑅</m:t>
+                          </m:r>
+                        </m:e>
+                      </m:acc>
+                    </m:oMath>
+                  </m:oMathPara>
+                </a14:m>
+                <a:endParaRPr lang="es-AR" dirty="0"/>
+              </a:p>
+            </p:txBody>
+          </p:sp>
+        </mc:Choice>
+        <mc:Fallback>
+          <p:sp>
+            <p:nvSpPr>
+              <p:cNvPr id="18" name="TextBox 17"/>
+              <p:cNvSpPr txBox="1">
+                <a:spLocks noRot="1" noChangeAspect="1" noMove="1" noResize="1" noEditPoints="1" noAdjustHandles="1" noChangeArrowheads="1" noChangeShapeType="1" noTextEdit="1"/>
+              </p:cNvSpPr>
+              <p:nvPr/>
+            </p:nvSpPr>
+            <p:spPr>
+              <a:xfrm>
+                <a:off x="3811484" y="4442474"/>
+                <a:ext cx="207108" cy="276999"/>
+              </a:xfrm>
+              <a:prstGeom prst="rect">
+                <a:avLst/>
+              </a:prstGeom>
+              <a:blipFill rotWithShape="0">
+                <a:blip r:embed="rId7"/>
+                <a:stretch>
+                  <a:fillRect l="-26471" t="-6667" r="-47059" b="-6667"/>
+                </a:stretch>
+              </a:blipFill>
+            </p:spPr>
+            <p:txBody>
+              <a:bodyPr/>
+              <a:lstStyle/>
+              <a:p>
+                <a:r>
+                  <a:rPr lang="es-AR">
+                    <a:noFill/>
+                  </a:rPr>
+                  <a:t> </a:t>
+                </a:r>
+              </a:p>
+            </p:txBody>
+          </p:sp>
+        </mc:Fallback>
+      </mc:AlternateContent>
+      <mc:AlternateContent xmlns:mc="http://schemas.openxmlformats.org/markup-compatibility/2006">
+        <mc:Choice xmlns:a14="http://schemas.microsoft.com/office/drawing/2010/main" Requires="a14">
+          <p:sp>
+            <p:nvSpPr>
+              <p:cNvPr id="44" name="TextBox 43"/>
+              <p:cNvSpPr txBox="1"/>
+              <p:nvPr/>
+            </p:nvSpPr>
+            <p:spPr>
+              <a:xfrm>
+                <a:off x="8401387" y="1328000"/>
+                <a:ext cx="896143" cy="525913"/>
+              </a:xfrm>
+              <a:prstGeom prst="rect">
+                <a:avLst/>
+              </a:prstGeom>
+              <a:noFill/>
+            </p:spPr>
+            <p:txBody>
+              <a:bodyPr wrap="none" lIns="0" tIns="0" rIns="0" bIns="0" rtlCol="0">
+                <a:spAutoFit/>
+              </a:bodyPr>
+              <a:lstStyle/>
+              <a:p>
+                <a14:m>
+                  <m:oMathPara xmlns:m="http://schemas.openxmlformats.org/officeDocument/2006/math">
+                    <m:oMathParaPr>
+                      <m:jc m:val="centerGroup"/>
+                    </m:oMathParaPr>
+                    <m:oMath xmlns:m="http://schemas.openxmlformats.org/officeDocument/2006/math">
+                      <m:r>
+                        <a:rPr lang="es-AR" b="0" i="1" smtClean="0">
+                          <a:latin typeface="Cambria Math" panose="02040503050406030204" pitchFamily="18" charset="0"/>
+                        </a:rPr>
+                        <m:t>𝜇</m:t>
+                      </m:r>
+                      <m:r>
+                        <a:rPr lang="es-AR" b="0" i="1" smtClean="0">
+                          <a:latin typeface="Cambria Math" panose="02040503050406030204" pitchFamily="18" charset="0"/>
+                        </a:rPr>
+                        <m:t>=</m:t>
+                      </m:r>
+                      <m:f>
+                        <m:fPr>
+                          <m:ctrlPr>
+                            <a:rPr lang="es-AR" i="1">
+                              <a:latin typeface="Cambria Math" panose="02040503050406030204" pitchFamily="18" charset="0"/>
+                            </a:rPr>
+                          </m:ctrlPr>
+                        </m:fPr>
+                        <m:num>
+                          <m:r>
+                            <a:rPr lang="es-AR" i="1">
+                              <a:latin typeface="Cambria Math" panose="02040503050406030204" pitchFamily="18" charset="0"/>
+                            </a:rPr>
+                            <m:t>1</m:t>
+                          </m:r>
+                        </m:num>
+                        <m:den>
+                          <m:r>
+                            <a:rPr lang="es-AR" i="1">
+                              <a:latin typeface="Cambria Math" panose="02040503050406030204" pitchFamily="18" charset="0"/>
+                            </a:rPr>
+                            <m:t>2</m:t>
+                          </m:r>
+                        </m:den>
+                      </m:f>
+                      <m:f>
+                        <m:fPr>
+                          <m:ctrlPr>
+                            <a:rPr lang="es-AR" b="0" i="1" smtClean="0">
+                              <a:latin typeface="Cambria Math" panose="02040503050406030204" pitchFamily="18" charset="0"/>
+                            </a:rPr>
+                          </m:ctrlPr>
+                        </m:fPr>
+                        <m:num>
+                          <m:r>
+                            <a:rPr lang="es-AR" b="0" i="1" smtClean="0">
+                              <a:latin typeface="Cambria Math" panose="02040503050406030204" pitchFamily="18" charset="0"/>
+                            </a:rPr>
+                            <m:t>𝑐𝑙</m:t>
+                          </m:r>
+                        </m:num>
+                        <m:den>
+                          <m:r>
+                            <a:rPr lang="es-AR" b="0" i="1" smtClean="0">
+                              <a:latin typeface="Cambria Math" panose="02040503050406030204" pitchFamily="18" charset="0"/>
+                            </a:rPr>
+                            <m:t>h𝑟</m:t>
+                          </m:r>
+                        </m:den>
+                      </m:f>
+                    </m:oMath>
+                  </m:oMathPara>
+                </a14:m>
+                <a:endParaRPr lang="es-AR" dirty="0"/>
+              </a:p>
+            </p:txBody>
+          </p:sp>
+        </mc:Choice>
+        <mc:Fallback>
+          <p:sp>
+            <p:nvSpPr>
+              <p:cNvPr id="44" name="TextBox 43"/>
+              <p:cNvSpPr txBox="1">
+                <a:spLocks noRot="1" noChangeAspect="1" noMove="1" noResize="1" noEditPoints="1" noAdjustHandles="1" noChangeArrowheads="1" noChangeShapeType="1" noTextEdit="1"/>
+              </p:cNvSpPr>
+              <p:nvPr/>
+            </p:nvSpPr>
+            <p:spPr>
+              <a:xfrm>
+                <a:off x="8401387" y="1328000"/>
+                <a:ext cx="896143" cy="525913"/>
+              </a:xfrm>
+              <a:prstGeom prst="rect">
+                <a:avLst/>
+              </a:prstGeom>
+              <a:blipFill rotWithShape="0">
+                <a:blip r:embed="rId8"/>
+                <a:stretch>
+                  <a:fillRect/>
+                </a:stretch>
+              </a:blipFill>
+            </p:spPr>
+            <p:txBody>
+              <a:bodyPr/>
+              <a:lstStyle/>
+              <a:p>
+                <a:r>
+                  <a:rPr lang="es-AR">
+                    <a:noFill/>
+                  </a:rPr>
+                  <a:t> </a:t>
+                </a:r>
+              </a:p>
+            </p:txBody>
+          </p:sp>
+        </mc:Fallback>
+      </mc:AlternateContent>
+      <mc:AlternateContent xmlns:mc="http://schemas.openxmlformats.org/markup-compatibility/2006">
+        <mc:Choice xmlns:a14="http://schemas.microsoft.com/office/drawing/2010/main" Requires="a14">
+          <p:sp>
+            <p:nvSpPr>
+              <p:cNvPr id="45" name="TextBox 44"/>
+              <p:cNvSpPr txBox="1"/>
+              <p:nvPr/>
+            </p:nvSpPr>
+            <p:spPr>
+              <a:xfrm>
+                <a:off x="3073534" y="4904139"/>
+                <a:ext cx="2363211" cy="884281"/>
+              </a:xfrm>
+              <a:prstGeom prst="rect">
+                <a:avLst/>
+              </a:prstGeom>
+              <a:noFill/>
+            </p:spPr>
+            <p:txBody>
+              <a:bodyPr wrap="none" lIns="0" tIns="0" rIns="0" bIns="0" rtlCol="0">
+                <a:spAutoFit/>
+              </a:bodyPr>
+              <a:lstStyle/>
+              <a:p>
+                <a14:m>
+                  <m:oMathPara xmlns:m="http://schemas.openxmlformats.org/officeDocument/2006/math">
+                    <m:oMathParaPr>
+                      <m:jc m:val="centerGroup"/>
+                    </m:oMathParaPr>
+                    <m:oMath xmlns:m="http://schemas.openxmlformats.org/officeDocument/2006/math">
+                      <m:r>
+                        <m:rPr>
+                          <m:sty m:val="p"/>
+                        </m:rPr>
+                        <a:rPr lang="es-AR" b="0" i="0" smtClean="0">
+                          <a:latin typeface="Cambria Math" panose="02040503050406030204" pitchFamily="18" charset="0"/>
+                        </a:rPr>
+                        <m:t>PI</m:t>
+                      </m:r>
+                      <m:d>
+                        <m:dPr>
+                          <m:ctrlPr>
+                            <a:rPr lang="es-AR" b="0" i="0" smtClean="0">
+                              <a:latin typeface="Cambria Math" panose="02040503050406030204" pitchFamily="18" charset="0"/>
+                            </a:rPr>
+                          </m:ctrlPr>
+                        </m:dPr>
+                        <m:e>
+                          <m:r>
+                            <m:rPr>
+                              <m:sty m:val="p"/>
+                            </m:rPr>
+                            <a:rPr lang="es-AR" b="0" i="0" smtClean="0">
+                              <a:latin typeface="Cambria Math" panose="02040503050406030204" pitchFamily="18" charset="0"/>
+                            </a:rPr>
+                            <m:t>N</m:t>
+                          </m:r>
+                        </m:e>
+                      </m:d>
+                      <m:r>
+                        <a:rPr lang="es-AR" b="0" i="0" smtClean="0">
+                          <a:latin typeface="Cambria Math" panose="02040503050406030204" pitchFamily="18" charset="0"/>
+                        </a:rPr>
+                        <m:t>=</m:t>
+                      </m:r>
+                      <m:d>
+                        <m:dPr>
+                          <m:begChr m:val="{"/>
+                          <m:endChr m:val=""/>
+                          <m:ctrlPr>
+                            <a:rPr lang="es-AR" i="1" smtClean="0">
+                              <a:latin typeface="Cambria Math" panose="02040503050406030204" pitchFamily="18" charset="0"/>
+                            </a:rPr>
+                          </m:ctrlPr>
+                        </m:dPr>
+                        <m:e>
+                          <m:eqArr>
+                            <m:eqArrPr>
+                              <m:ctrlPr>
+                                <a:rPr lang="es-AR" b="0" i="1" smtClean="0">
+                                  <a:latin typeface="Cambria Math" panose="02040503050406030204" pitchFamily="18" charset="0"/>
+                                </a:rPr>
+                              </m:ctrlPr>
+                            </m:eqArrPr>
+                            <m:e>
+                              <m:r>
+                                <a:rPr lang="es-AR" b="0" i="1" smtClean="0">
+                                  <a:latin typeface="Cambria Math" panose="02040503050406030204" pitchFamily="18" charset="0"/>
+                                </a:rPr>
+                                <m:t>1     </m:t>
+                              </m:r>
+                              <m:r>
+                                <a:rPr lang="es-AR" b="0" i="1" smtClean="0">
+                                  <a:latin typeface="Cambria Math" panose="02040503050406030204" pitchFamily="18" charset="0"/>
+                                </a:rPr>
+                                <m:t>𝑠𝑖</m:t>
+                              </m:r>
+                              <m:r>
+                                <a:rPr lang="es-AR" b="0" i="1" smtClean="0">
+                                  <a:latin typeface="Cambria Math" panose="02040503050406030204" pitchFamily="18" charset="0"/>
+                                </a:rPr>
+                                <m:t> </m:t>
+                              </m:r>
+                              <m:r>
+                                <a:rPr lang="es-AR" b="0" i="1" smtClean="0">
+                                  <a:latin typeface="Cambria Math" panose="02040503050406030204" pitchFamily="18" charset="0"/>
+                                </a:rPr>
+                                <m:t>𝑁</m:t>
+                              </m:r>
+                              <m:r>
+                                <a:rPr lang="es-AR" b="0" i="1" smtClean="0">
+                                  <a:latin typeface="Cambria Math" panose="02040503050406030204" pitchFamily="18" charset="0"/>
+                                </a:rPr>
+                                <m:t>&lt;3</m:t>
+                              </m:r>
+                            </m:e>
+                            <m:e>
+                              <m:r>
+                                <a:rPr lang="es-AR" b="0" i="1" smtClean="0">
+                                  <a:latin typeface="Cambria Math" panose="02040503050406030204" pitchFamily="18" charset="0"/>
+                                </a:rPr>
+                                <m:t>0,5  </m:t>
+                              </m:r>
+                              <m:r>
+                                <a:rPr lang="es-AR" b="0" i="1" smtClean="0">
+                                  <a:latin typeface="Cambria Math" panose="02040503050406030204" pitchFamily="18" charset="0"/>
+                                </a:rPr>
+                                <m:t>𝑠𝑖</m:t>
+                              </m:r>
+                              <m:r>
+                                <a:rPr lang="es-AR" b="0" i="1" smtClean="0">
+                                  <a:latin typeface="Cambria Math" panose="02040503050406030204" pitchFamily="18" charset="0"/>
+                                </a:rPr>
+                                <m:t> </m:t>
+                              </m:r>
+                              <m:r>
+                                <a:rPr lang="es-AR" b="0" i="1" smtClean="0">
+                                  <a:latin typeface="Cambria Math" panose="02040503050406030204" pitchFamily="18" charset="0"/>
+                                </a:rPr>
+                                <m:t>𝑁</m:t>
+                              </m:r>
+                              <m:r>
+                                <a:rPr lang="es-AR" b="0" i="1" smtClean="0">
+                                  <a:latin typeface="Cambria Math" panose="02040503050406030204" pitchFamily="18" charset="0"/>
+                                </a:rPr>
+                                <m:t>=3</m:t>
+                              </m:r>
+                            </m:e>
+                            <m:e>
+                              <m:r>
+                                <a:rPr lang="es-AR" b="0" i="1" smtClean="0">
+                                  <a:latin typeface="Cambria Math" panose="02040503050406030204" pitchFamily="18" charset="0"/>
+                                </a:rPr>
+                                <m:t>0     </m:t>
+                              </m:r>
+                              <m:r>
+                                <a:rPr lang="es-AR" b="0" i="1" smtClean="0">
+                                  <a:latin typeface="Cambria Math" panose="02040503050406030204" pitchFamily="18" charset="0"/>
+                                </a:rPr>
+                                <m:t>𝑠𝑖</m:t>
+                              </m:r>
+                              <m:r>
+                                <a:rPr lang="es-AR" b="0" i="1" smtClean="0">
+                                  <a:latin typeface="Cambria Math" panose="02040503050406030204" pitchFamily="18" charset="0"/>
+                                </a:rPr>
+                                <m:t> </m:t>
+                              </m:r>
+                              <m:r>
+                                <a:rPr lang="es-AR" b="0" i="1" smtClean="0">
+                                  <a:latin typeface="Cambria Math" panose="02040503050406030204" pitchFamily="18" charset="0"/>
+                                </a:rPr>
+                                <m:t>𝑁</m:t>
+                              </m:r>
+                              <m:r>
+                                <a:rPr lang="es-AR" b="0" i="1" smtClean="0">
+                                  <a:latin typeface="Cambria Math" panose="02040503050406030204" pitchFamily="18" charset="0"/>
+                                </a:rPr>
+                                <m:t>≥4</m:t>
+                              </m:r>
+                            </m:e>
+                          </m:eqArr>
+                        </m:e>
+                      </m:d>
+                    </m:oMath>
+                  </m:oMathPara>
+                </a14:m>
+                <a:endParaRPr lang="es-AR" dirty="0"/>
+              </a:p>
+            </p:txBody>
+          </p:sp>
+        </mc:Choice>
+        <mc:Fallback>
+          <p:sp>
+            <p:nvSpPr>
+              <p:cNvPr id="45" name="TextBox 44"/>
+              <p:cNvSpPr txBox="1">
+                <a:spLocks noRot="1" noChangeAspect="1" noMove="1" noResize="1" noEditPoints="1" noAdjustHandles="1" noChangeArrowheads="1" noChangeShapeType="1" noTextEdit="1"/>
+              </p:cNvSpPr>
+              <p:nvPr/>
+            </p:nvSpPr>
+            <p:spPr>
+              <a:xfrm>
+                <a:off x="3073534" y="4904139"/>
+                <a:ext cx="2363211" cy="884281"/>
+              </a:xfrm>
+              <a:prstGeom prst="rect">
+                <a:avLst/>
+              </a:prstGeom>
+              <a:blipFill rotWithShape="0">
+                <a:blip r:embed="rId9"/>
+                <a:stretch>
+                  <a:fillRect/>
+                </a:stretch>
+              </a:blipFill>
+            </p:spPr>
+            <p:txBody>
+              <a:bodyPr/>
+              <a:lstStyle/>
+              <a:p>
+                <a:r>
+                  <a:rPr lang="es-AR">
+                    <a:noFill/>
+                  </a:rPr>
+                  <a:t> </a:t>
+                </a:r>
+              </a:p>
+            </p:txBody>
+          </p:sp>
+        </mc:Fallback>
+      </mc:AlternateContent>
+      <p:sp>
+        <p:nvSpPr>
+          <p:cNvPr id="46" name="Rectangle 17"/>
+          <p:cNvSpPr/>
+          <p:nvPr/>
+        </p:nvSpPr>
+        <p:spPr>
+          <a:xfrm>
+            <a:off x="6933188" y="2273399"/>
+            <a:ext cx="1197938" cy="554208"/>
+          </a:xfrm>
+          <a:prstGeom prst="rect">
+            <a:avLst/>
+          </a:prstGeom>
+          <a:ln>
+            <a:solidFill>
+              <a:schemeClr val="tx2"/>
+            </a:solidFill>
+          </a:ln>
+        </p:spPr>
+        <p:style>
+          <a:lnRef idx="2">
+            <a:schemeClr val="accent5"/>
+          </a:lnRef>
+          <a:fillRef idx="1">
+            <a:schemeClr val="lt1"/>
+          </a:fillRef>
+          <a:effectRef idx="0">
+            <a:schemeClr val="accent5"/>
+          </a:effectRef>
+          <a:fontRef idx="minor">
+            <a:schemeClr val="dk1"/>
+          </a:fontRef>
+        </p:style>
+        <p:txBody>
+          <a:bodyPr rtlCol="0" anchor="ctr"/>
+          <a:lstStyle/>
+          <a:p>
+            <a:pPr algn="ctr"/>
+            <a:endParaRPr lang="es-AR"/>
+          </a:p>
+        </p:txBody>
+      </p:sp>
+      <p:cxnSp>
+        <p:nvCxnSpPr>
+          <p:cNvPr id="48" name="Straight Connector 47"/>
+          <p:cNvCxnSpPr/>
+          <p:nvPr/>
+        </p:nvCxnSpPr>
+        <p:spPr>
+          <a:xfrm flipH="1">
+            <a:off x="7495504" y="2273400"/>
+            <a:ext cx="12881" cy="554207"/>
+          </a:xfrm>
+          <a:prstGeom prst="line">
+            <a:avLst/>
+          </a:prstGeom>
+        </p:spPr>
+        <p:style>
+          <a:lnRef idx="1">
+            <a:schemeClr val="dk1"/>
+          </a:lnRef>
+          <a:fillRef idx="0">
+            <a:schemeClr val="dk1"/>
+          </a:fillRef>
+          <a:effectRef idx="0">
+            <a:schemeClr val="dk1"/>
+          </a:effectRef>
+          <a:fontRef idx="minor">
+            <a:schemeClr val="tx1"/>
+          </a:fontRef>
+        </p:style>
+      </p:cxnSp>
       <p:pic>
         <p:nvPicPr>
-          <p:cNvPr id="35" name="Picture 5"/>
+          <p:cNvPr id="53" name="Picture 16"/>
           <p:cNvPicPr>
-            <a:picLocks noChangeAspect="1" noChangeArrowheads="1"/>
+            <a:picLocks noChangeAspect="1"/>
           </p:cNvPicPr>
           <p:nvPr/>
         </p:nvPicPr>
         <p:blipFill>
-          <a:blip r:embed="rId5" cstate="print">
-            <a:clrChange>
-              <a:clrFrom>
-                <a:srgbClr val="FFFFFF"/>
-              </a:clrFrom>
-              <a:clrTo>
-                <a:srgbClr val="FFFFFF">
-                  <a:alpha val="0"/>
-                </a:srgbClr>
-              </a:clrTo>
-            </a:clrChange>
+          <a:blip r:embed="rId3" cstate="print">
+            <a:extLst>
+              <a:ext uri="{28A0092B-C50C-407E-A947-70E740481C1C}">
+                <a14:useLocalDpi xmlns:a14="http://schemas.microsoft.com/office/drawing/2010/main" val="0"/>
+              </a:ext>
+            </a:extLst>
           </a:blip>
-          <a:srcRect/>
           <a:stretch>
             <a:fillRect/>
           </a:stretch>
         </p:blipFill>
-        <p:spPr bwMode="auto">
-          <a:xfrm>
-            <a:off x="5129048" y="1723696"/>
-            <a:ext cx="128337" cy="304799"/>
+        <p:spPr>
+          <a:xfrm>
+            <a:off x="8552331" y="2648719"/>
+            <a:ext cx="745199" cy="745199"/>
           </a:xfrm>
           <a:prstGeom prst="rect">
             <a:avLst/>
           </a:prstGeom>
-          <a:noFill/>
         </p:spPr>
       </p:pic>
     </p:spTree>
+    <p:extLst>
+      <p:ext uri="{BB962C8B-B14F-4D97-AF65-F5344CB8AC3E}">
+        <p14:creationId xmlns:p14="http://schemas.microsoft.com/office/powerpoint/2010/main" val="3126091353"/>
+      </p:ext>
+    </p:extLst>
   </p:cSld>
   <p:clrMapOvr>
     <a:masterClrMapping/>
   </p:clrMapOvr>
+  <p:timing>
+    <p:tnLst>
+      <p:par>
+        <p:cTn id="1" dur="indefinite" restart="never" nodeType="tmRoot"/>
+      </p:par>
+    </p:tnLst>
+  </p:timing>
 </p:sld>
 </file>
 

</xml_diff>

<commit_message>
Resolucion del ej 8
</commit_message>
<xml_diff>
--- a/tp1-colas/Imagenes.pptx
+++ b/tp1-colas/Imagenes.pptx
@@ -12,6 +12,7 @@
     <p:sldId id="260" r:id="rId6"/>
     <p:sldId id="261" r:id="rId7"/>
     <p:sldId id="262" r:id="rId8"/>
+    <p:sldId id="263" r:id="rId9"/>
   </p:sldIdLst>
   <p:sldSz cx="12192000" cy="6858000"/>
   <p:notesSz cx="6858000" cy="9144000"/>
@@ -112,7 +113,7 @@
   </p:defaultTextStyle>
   <p:extLst>
     <p:ext uri="{EFAFB233-063F-42B5-8137-9DF3F51BA10A}">
-      <p15:sldGuideLst xmlns:p15="http://schemas.microsoft.com/office/powerpoint/2012/main">
+      <p15:sldGuideLst xmlns:p15="http://schemas.microsoft.com/office/powerpoint/2012/main" xmlns="">
         <p15:guide id="1" orient="horz" pos="2160">
           <p15:clr>
             <a:srgbClr val="A4A3A4"/>
@@ -261,7 +262,7 @@
             <a:fld id="{EAE7EBD3-30FD-4FAB-979E-FE0AAD4807BC}" type="datetimeFigureOut">
               <a:rPr lang="es-AR" smtClean="0"/>
               <a:pPr/>
-              <a:t>17/09/2014</a:t>
+              <a:t>24/09/2014</a:t>
             </a:fld>
             <a:endParaRPr lang="es-AR"/>
           </a:p>
@@ -304,7 +305,7 @@
             <a:fld id="{A173DF1F-6FD9-4134-ABE5-0680BC74F2FF}" type="slidenum">
               <a:rPr lang="es-AR" smtClean="0"/>
               <a:pPr/>
-              <a:t>‹#›</a:t>
+              <a:t>‹Nº›</a:t>
             </a:fld>
             <a:endParaRPr lang="es-AR"/>
           </a:p>
@@ -313,7 +314,7 @@
     </p:spTree>
     <p:extLst>
       <p:ext uri="{BB962C8B-B14F-4D97-AF65-F5344CB8AC3E}">
-        <p14:creationId xmlns:p14="http://schemas.microsoft.com/office/powerpoint/2010/main" val="1478221447"/>
+        <p14:creationId xmlns:p14="http://schemas.microsoft.com/office/powerpoint/2010/main" xmlns="" val="1478221447"/>
       </p:ext>
     </p:extLst>
   </p:cSld>
@@ -433,7 +434,7 @@
             <a:fld id="{EAE7EBD3-30FD-4FAB-979E-FE0AAD4807BC}" type="datetimeFigureOut">
               <a:rPr lang="es-AR" smtClean="0"/>
               <a:pPr/>
-              <a:t>17/09/2014</a:t>
+              <a:t>24/09/2014</a:t>
             </a:fld>
             <a:endParaRPr lang="es-AR"/>
           </a:p>
@@ -476,7 +477,7 @@
             <a:fld id="{A173DF1F-6FD9-4134-ABE5-0680BC74F2FF}" type="slidenum">
               <a:rPr lang="es-AR" smtClean="0"/>
               <a:pPr/>
-              <a:t>‹#›</a:t>
+              <a:t>‹Nº›</a:t>
             </a:fld>
             <a:endParaRPr lang="es-AR"/>
           </a:p>
@@ -485,7 +486,7 @@
     </p:spTree>
     <p:extLst>
       <p:ext uri="{BB962C8B-B14F-4D97-AF65-F5344CB8AC3E}">
-        <p14:creationId xmlns:p14="http://schemas.microsoft.com/office/powerpoint/2010/main" val="787665529"/>
+        <p14:creationId xmlns:p14="http://schemas.microsoft.com/office/powerpoint/2010/main" xmlns="" val="787665529"/>
       </p:ext>
     </p:extLst>
   </p:cSld>
@@ -615,7 +616,7 @@
             <a:fld id="{EAE7EBD3-30FD-4FAB-979E-FE0AAD4807BC}" type="datetimeFigureOut">
               <a:rPr lang="es-AR" smtClean="0"/>
               <a:pPr/>
-              <a:t>17/09/2014</a:t>
+              <a:t>24/09/2014</a:t>
             </a:fld>
             <a:endParaRPr lang="es-AR"/>
           </a:p>
@@ -658,7 +659,7 @@
             <a:fld id="{A173DF1F-6FD9-4134-ABE5-0680BC74F2FF}" type="slidenum">
               <a:rPr lang="es-AR" smtClean="0"/>
               <a:pPr/>
-              <a:t>‹#›</a:t>
+              <a:t>‹Nº›</a:t>
             </a:fld>
             <a:endParaRPr lang="es-AR"/>
           </a:p>
@@ -667,7 +668,7 @@
     </p:spTree>
     <p:extLst>
       <p:ext uri="{BB962C8B-B14F-4D97-AF65-F5344CB8AC3E}">
-        <p14:creationId xmlns:p14="http://schemas.microsoft.com/office/powerpoint/2010/main" val="3550571343"/>
+        <p14:creationId xmlns:p14="http://schemas.microsoft.com/office/powerpoint/2010/main" xmlns="" val="3550571343"/>
       </p:ext>
     </p:extLst>
   </p:cSld>
@@ -787,7 +788,7 @@
             <a:fld id="{EAE7EBD3-30FD-4FAB-979E-FE0AAD4807BC}" type="datetimeFigureOut">
               <a:rPr lang="es-AR" smtClean="0"/>
               <a:pPr/>
-              <a:t>17/09/2014</a:t>
+              <a:t>24/09/2014</a:t>
             </a:fld>
             <a:endParaRPr lang="es-AR"/>
           </a:p>
@@ -830,7 +831,7 @@
             <a:fld id="{A173DF1F-6FD9-4134-ABE5-0680BC74F2FF}" type="slidenum">
               <a:rPr lang="es-AR" smtClean="0"/>
               <a:pPr/>
-              <a:t>‹#›</a:t>
+              <a:t>‹Nº›</a:t>
             </a:fld>
             <a:endParaRPr lang="es-AR"/>
           </a:p>
@@ -839,7 +840,7 @@
     </p:spTree>
     <p:extLst>
       <p:ext uri="{BB962C8B-B14F-4D97-AF65-F5344CB8AC3E}">
-        <p14:creationId xmlns:p14="http://schemas.microsoft.com/office/powerpoint/2010/main" val="1090226818"/>
+        <p14:creationId xmlns:p14="http://schemas.microsoft.com/office/powerpoint/2010/main" xmlns="" val="1090226818"/>
       </p:ext>
     </p:extLst>
   </p:cSld>
@@ -1035,7 +1036,7 @@
             <a:fld id="{EAE7EBD3-30FD-4FAB-979E-FE0AAD4807BC}" type="datetimeFigureOut">
               <a:rPr lang="es-AR" smtClean="0"/>
               <a:pPr/>
-              <a:t>17/09/2014</a:t>
+              <a:t>24/09/2014</a:t>
             </a:fld>
             <a:endParaRPr lang="es-AR"/>
           </a:p>
@@ -1078,7 +1079,7 @@
             <a:fld id="{A173DF1F-6FD9-4134-ABE5-0680BC74F2FF}" type="slidenum">
               <a:rPr lang="es-AR" smtClean="0"/>
               <a:pPr/>
-              <a:t>‹#›</a:t>
+              <a:t>‹Nº›</a:t>
             </a:fld>
             <a:endParaRPr lang="es-AR"/>
           </a:p>
@@ -1087,7 +1088,7 @@
     </p:spTree>
     <p:extLst>
       <p:ext uri="{BB962C8B-B14F-4D97-AF65-F5344CB8AC3E}">
-        <p14:creationId xmlns:p14="http://schemas.microsoft.com/office/powerpoint/2010/main" val="1797381584"/>
+        <p14:creationId xmlns:p14="http://schemas.microsoft.com/office/powerpoint/2010/main" xmlns="" val="1797381584"/>
       </p:ext>
     </p:extLst>
   </p:cSld>
@@ -1269,7 +1270,7 @@
             <a:fld id="{EAE7EBD3-30FD-4FAB-979E-FE0AAD4807BC}" type="datetimeFigureOut">
               <a:rPr lang="es-AR" smtClean="0"/>
               <a:pPr/>
-              <a:t>17/09/2014</a:t>
+              <a:t>24/09/2014</a:t>
             </a:fld>
             <a:endParaRPr lang="es-AR"/>
           </a:p>
@@ -1312,7 +1313,7 @@
             <a:fld id="{A173DF1F-6FD9-4134-ABE5-0680BC74F2FF}" type="slidenum">
               <a:rPr lang="es-AR" smtClean="0"/>
               <a:pPr/>
-              <a:t>‹#›</a:t>
+              <a:t>‹Nº›</a:t>
             </a:fld>
             <a:endParaRPr lang="es-AR"/>
           </a:p>
@@ -1321,7 +1322,7 @@
     </p:spTree>
     <p:extLst>
       <p:ext uri="{BB962C8B-B14F-4D97-AF65-F5344CB8AC3E}">
-        <p14:creationId xmlns:p14="http://schemas.microsoft.com/office/powerpoint/2010/main" val="141320725"/>
+        <p14:creationId xmlns:p14="http://schemas.microsoft.com/office/powerpoint/2010/main" xmlns="" val="141320725"/>
       </p:ext>
     </p:extLst>
   </p:cSld>
@@ -1638,7 +1639,7 @@
             <a:fld id="{EAE7EBD3-30FD-4FAB-979E-FE0AAD4807BC}" type="datetimeFigureOut">
               <a:rPr lang="es-AR" smtClean="0"/>
               <a:pPr/>
-              <a:t>17/09/2014</a:t>
+              <a:t>24/09/2014</a:t>
             </a:fld>
             <a:endParaRPr lang="es-AR"/>
           </a:p>
@@ -1681,7 +1682,7 @@
             <a:fld id="{A173DF1F-6FD9-4134-ABE5-0680BC74F2FF}" type="slidenum">
               <a:rPr lang="es-AR" smtClean="0"/>
               <a:pPr/>
-              <a:t>‹#›</a:t>
+              <a:t>‹Nº›</a:t>
             </a:fld>
             <a:endParaRPr lang="es-AR"/>
           </a:p>
@@ -1690,7 +1691,7 @@
     </p:spTree>
     <p:extLst>
       <p:ext uri="{BB962C8B-B14F-4D97-AF65-F5344CB8AC3E}">
-        <p14:creationId xmlns:p14="http://schemas.microsoft.com/office/powerpoint/2010/main" val="898217691"/>
+        <p14:creationId xmlns:p14="http://schemas.microsoft.com/office/powerpoint/2010/main" xmlns="" val="898217691"/>
       </p:ext>
     </p:extLst>
   </p:cSld>
@@ -1758,7 +1759,7 @@
             <a:fld id="{EAE7EBD3-30FD-4FAB-979E-FE0AAD4807BC}" type="datetimeFigureOut">
               <a:rPr lang="es-AR" smtClean="0"/>
               <a:pPr/>
-              <a:t>17/09/2014</a:t>
+              <a:t>24/09/2014</a:t>
             </a:fld>
             <a:endParaRPr lang="es-AR"/>
           </a:p>
@@ -1801,7 +1802,7 @@
             <a:fld id="{A173DF1F-6FD9-4134-ABE5-0680BC74F2FF}" type="slidenum">
               <a:rPr lang="es-AR" smtClean="0"/>
               <a:pPr/>
-              <a:t>‹#›</a:t>
+              <a:t>‹Nº›</a:t>
             </a:fld>
             <a:endParaRPr lang="es-AR"/>
           </a:p>
@@ -1810,7 +1811,7 @@
     </p:spTree>
     <p:extLst>
       <p:ext uri="{BB962C8B-B14F-4D97-AF65-F5344CB8AC3E}">
-        <p14:creationId xmlns:p14="http://schemas.microsoft.com/office/powerpoint/2010/main" val="1734197303"/>
+        <p14:creationId xmlns:p14="http://schemas.microsoft.com/office/powerpoint/2010/main" xmlns="" val="1734197303"/>
       </p:ext>
     </p:extLst>
   </p:cSld>
@@ -1855,7 +1856,7 @@
             <a:fld id="{EAE7EBD3-30FD-4FAB-979E-FE0AAD4807BC}" type="datetimeFigureOut">
               <a:rPr lang="es-AR" smtClean="0"/>
               <a:pPr/>
-              <a:t>17/09/2014</a:t>
+              <a:t>24/09/2014</a:t>
             </a:fld>
             <a:endParaRPr lang="es-AR"/>
           </a:p>
@@ -1898,7 +1899,7 @@
             <a:fld id="{A173DF1F-6FD9-4134-ABE5-0680BC74F2FF}" type="slidenum">
               <a:rPr lang="es-AR" smtClean="0"/>
               <a:pPr/>
-              <a:t>‹#›</a:t>
+              <a:t>‹Nº›</a:t>
             </a:fld>
             <a:endParaRPr lang="es-AR"/>
           </a:p>
@@ -1907,7 +1908,7 @@
     </p:spTree>
     <p:extLst>
       <p:ext uri="{BB962C8B-B14F-4D97-AF65-F5344CB8AC3E}">
-        <p14:creationId xmlns:p14="http://schemas.microsoft.com/office/powerpoint/2010/main" val="2733380732"/>
+        <p14:creationId xmlns:p14="http://schemas.microsoft.com/office/powerpoint/2010/main" xmlns="" val="2733380732"/>
       </p:ext>
     </p:extLst>
   </p:cSld>
@@ -2134,7 +2135,7 @@
             <a:fld id="{EAE7EBD3-30FD-4FAB-979E-FE0AAD4807BC}" type="datetimeFigureOut">
               <a:rPr lang="es-AR" smtClean="0"/>
               <a:pPr/>
-              <a:t>17/09/2014</a:t>
+              <a:t>24/09/2014</a:t>
             </a:fld>
             <a:endParaRPr lang="es-AR"/>
           </a:p>
@@ -2177,7 +2178,7 @@
             <a:fld id="{A173DF1F-6FD9-4134-ABE5-0680BC74F2FF}" type="slidenum">
               <a:rPr lang="es-AR" smtClean="0"/>
               <a:pPr/>
-              <a:t>‹#›</a:t>
+              <a:t>‹Nº›</a:t>
             </a:fld>
             <a:endParaRPr lang="es-AR"/>
           </a:p>
@@ -2186,7 +2187,7 @@
     </p:spTree>
     <p:extLst>
       <p:ext uri="{BB962C8B-B14F-4D97-AF65-F5344CB8AC3E}">
-        <p14:creationId xmlns:p14="http://schemas.microsoft.com/office/powerpoint/2010/main" val="201515298"/>
+        <p14:creationId xmlns:p14="http://schemas.microsoft.com/office/powerpoint/2010/main" xmlns="" val="201515298"/>
       </p:ext>
     </p:extLst>
   </p:cSld>
@@ -2389,7 +2390,7 @@
             <a:fld id="{EAE7EBD3-30FD-4FAB-979E-FE0AAD4807BC}" type="datetimeFigureOut">
               <a:rPr lang="es-AR" smtClean="0"/>
               <a:pPr/>
-              <a:t>17/09/2014</a:t>
+              <a:t>24/09/2014</a:t>
             </a:fld>
             <a:endParaRPr lang="es-AR"/>
           </a:p>
@@ -2432,7 +2433,7 @@
             <a:fld id="{A173DF1F-6FD9-4134-ABE5-0680BC74F2FF}" type="slidenum">
               <a:rPr lang="es-AR" smtClean="0"/>
               <a:pPr/>
-              <a:t>‹#›</a:t>
+              <a:t>‹Nº›</a:t>
             </a:fld>
             <a:endParaRPr lang="es-AR"/>
           </a:p>
@@ -2441,7 +2442,7 @@
     </p:spTree>
     <p:extLst>
       <p:ext uri="{BB962C8B-B14F-4D97-AF65-F5344CB8AC3E}">
-        <p14:creationId xmlns:p14="http://schemas.microsoft.com/office/powerpoint/2010/main" val="976262354"/>
+        <p14:creationId xmlns:p14="http://schemas.microsoft.com/office/powerpoint/2010/main" xmlns="" val="976262354"/>
       </p:ext>
     </p:extLst>
   </p:cSld>
@@ -2604,7 +2605,7 @@
             <a:fld id="{EAE7EBD3-30FD-4FAB-979E-FE0AAD4807BC}" type="datetimeFigureOut">
               <a:rPr lang="es-AR" smtClean="0"/>
               <a:pPr/>
-              <a:t>17/09/2014</a:t>
+              <a:t>24/09/2014</a:t>
             </a:fld>
             <a:endParaRPr lang="es-AR"/>
           </a:p>
@@ -2683,7 +2684,7 @@
             <a:fld id="{A173DF1F-6FD9-4134-ABE5-0680BC74F2FF}" type="slidenum">
               <a:rPr lang="es-AR" smtClean="0"/>
               <a:pPr/>
-              <a:t>‹#›</a:t>
+              <a:t>‹Nº›</a:t>
             </a:fld>
             <a:endParaRPr lang="es-AR"/>
           </a:p>
@@ -2692,7 +2693,7 @@
     </p:spTree>
     <p:extLst>
       <p:ext uri="{BB962C8B-B14F-4D97-AF65-F5344CB8AC3E}">
-        <p14:creationId xmlns:p14="http://schemas.microsoft.com/office/powerpoint/2010/main" val="2905328256"/>
+        <p14:creationId xmlns:p14="http://schemas.microsoft.com/office/powerpoint/2010/main" xmlns="" val="2905328256"/>
       </p:ext>
     </p:extLst>
   </p:cSld>
@@ -3072,7 +3073,7 @@
           <a:blip r:embed="rId2" cstate="print">
             <a:extLst>
               <a:ext uri="{28A0092B-C50C-407E-A947-70E740481C1C}">
-                <a14:useLocalDpi xmlns:a14="http://schemas.microsoft.com/office/drawing/2010/main" val="0"/>
+                <a14:useLocalDpi xmlns:a14="http://schemas.microsoft.com/office/drawing/2010/main" xmlns="" val="0"/>
               </a:ext>
             </a:extLst>
           </a:blip>
@@ -3102,7 +3103,7 @@
           <a:blip r:embed="rId2" cstate="print">
             <a:extLst>
               <a:ext uri="{28A0092B-C50C-407E-A947-70E740481C1C}">
-                <a14:useLocalDpi xmlns:a14="http://schemas.microsoft.com/office/drawing/2010/main" val="0"/>
+                <a14:useLocalDpi xmlns:a14="http://schemas.microsoft.com/office/drawing/2010/main" xmlns="" val="0"/>
               </a:ext>
             </a:extLst>
           </a:blip>
@@ -3132,7 +3133,7 @@
           <a:blip r:embed="rId2" cstate="print">
             <a:extLst>
               <a:ext uri="{28A0092B-C50C-407E-A947-70E740481C1C}">
-                <a14:useLocalDpi xmlns:a14="http://schemas.microsoft.com/office/drawing/2010/main" val="0"/>
+                <a14:useLocalDpi xmlns:a14="http://schemas.microsoft.com/office/drawing/2010/main" xmlns="" val="0"/>
               </a:ext>
             </a:extLst>
           </a:blip>
@@ -3162,7 +3163,7 @@
           <a:blip r:embed="rId2" cstate="print">
             <a:extLst>
               <a:ext uri="{28A0092B-C50C-407E-A947-70E740481C1C}">
-                <a14:useLocalDpi xmlns:a14="http://schemas.microsoft.com/office/drawing/2010/main" val="0"/>
+                <a14:useLocalDpi xmlns:a14="http://schemas.microsoft.com/office/drawing/2010/main" xmlns="" val="0"/>
               </a:ext>
             </a:extLst>
           </a:blip>
@@ -3192,7 +3193,7 @@
           <a:blip r:embed="rId2" cstate="print">
             <a:extLst>
               <a:ext uri="{28A0092B-C50C-407E-A947-70E740481C1C}">
-                <a14:useLocalDpi xmlns:a14="http://schemas.microsoft.com/office/drawing/2010/main" val="0"/>
+                <a14:useLocalDpi xmlns:a14="http://schemas.microsoft.com/office/drawing/2010/main" xmlns="" val="0"/>
               </a:ext>
             </a:extLst>
           </a:blip>
@@ -3474,7 +3475,7 @@
           <a:blip r:embed="rId3" cstate="print">
             <a:extLst>
               <a:ext uri="{28A0092B-C50C-407E-A947-70E740481C1C}">
-                <a14:useLocalDpi xmlns:a14="http://schemas.microsoft.com/office/drawing/2010/main" val="0"/>
+                <a14:useLocalDpi xmlns:a14="http://schemas.microsoft.com/office/drawing/2010/main" xmlns="" val="0"/>
               </a:ext>
             </a:extLst>
           </a:blip>
@@ -3565,8 +3566,8 @@
           </a:p>
         </p:txBody>
       </p:sp>
-      <mc:AlternateContent xmlns:mc="http://schemas.openxmlformats.org/markup-compatibility/2006" xmlns:a14="http://schemas.microsoft.com/office/drawing/2010/main">
-        <mc:Choice Requires="a14">
+      <mc:AlternateContent xmlns:mc="http://schemas.openxmlformats.org/markup-compatibility/2006">
+        <mc:Choice xmlns:a14="http://schemas.microsoft.com/office/drawing/2010/main" xmlns="" Requires="a14">
           <p:sp>
             <p:nvSpPr>
               <p:cNvPr id="21" name="TextBox 20"/>
@@ -3610,7 +3611,7 @@
             </p:txBody>
           </p:sp>
         </mc:Choice>
-        <mc:Fallback xmlns="">
+        <mc:Fallback>
           <p:sp>
             <p:nvSpPr>
               <p:cNvPr id="21" name="TextBox 20"/>
@@ -3649,8 +3650,8 @@
           </p:sp>
         </mc:Fallback>
       </mc:AlternateContent>
-      <mc:AlternateContent xmlns:mc="http://schemas.openxmlformats.org/markup-compatibility/2006" xmlns:a14="http://schemas.microsoft.com/office/drawing/2010/main">
-        <mc:Choice Requires="a14">
+      <mc:AlternateContent xmlns:mc="http://schemas.openxmlformats.org/markup-compatibility/2006">
+        <mc:Choice xmlns:a14="http://schemas.microsoft.com/office/drawing/2010/main" xmlns="" Requires="a14">
           <p:sp>
             <p:nvSpPr>
               <p:cNvPr id="22" name="TextBox 21"/>
@@ -3706,7 +3707,7 @@
             </p:txBody>
           </p:sp>
         </mc:Choice>
-        <mc:Fallback xmlns="">
+        <mc:Fallback>
           <p:sp>
             <p:nvSpPr>
               <p:cNvPr id="22" name="TextBox 21"/>
@@ -3745,8 +3746,8 @@
           </p:sp>
         </mc:Fallback>
       </mc:AlternateContent>
-      <mc:AlternateContent xmlns:mc="http://schemas.openxmlformats.org/markup-compatibility/2006" xmlns:a14="http://schemas.microsoft.com/office/drawing/2010/main">
-        <mc:Choice Requires="a14">
+      <mc:AlternateContent xmlns:mc="http://schemas.openxmlformats.org/markup-compatibility/2006">
+        <mc:Choice xmlns:a14="http://schemas.microsoft.com/office/drawing/2010/main" xmlns="" Requires="a14">
           <p:sp>
             <p:nvSpPr>
               <p:cNvPr id="23" name="TextBox 22"/>
@@ -3790,7 +3791,7 @@
             </p:txBody>
           </p:sp>
         </mc:Choice>
-        <mc:Fallback xmlns="">
+        <mc:Fallback>
           <p:sp>
             <p:nvSpPr>
               <p:cNvPr id="23" name="TextBox 22"/>
@@ -3829,8 +3830,8 @@
           </p:sp>
         </mc:Fallback>
       </mc:AlternateContent>
-      <mc:AlternateContent xmlns:mc="http://schemas.openxmlformats.org/markup-compatibility/2006" xmlns:a14="http://schemas.microsoft.com/office/drawing/2010/main">
-        <mc:Choice Requires="a14">
+      <mc:AlternateContent xmlns:mc="http://schemas.openxmlformats.org/markup-compatibility/2006">
+        <mc:Choice xmlns:a14="http://schemas.microsoft.com/office/drawing/2010/main" xmlns="" Requires="a14">
           <p:sp>
             <p:nvSpPr>
               <p:cNvPr id="24" name="TextBox 23"/>
@@ -3886,7 +3887,7 @@
             </p:txBody>
           </p:sp>
         </mc:Choice>
-        <mc:Fallback xmlns="">
+        <mc:Fallback>
           <p:sp>
             <p:nvSpPr>
               <p:cNvPr id="24" name="TextBox 23"/>
@@ -3928,7 +3929,7 @@
     </p:spTree>
     <p:extLst>
       <p:ext uri="{BB962C8B-B14F-4D97-AF65-F5344CB8AC3E}">
-        <p14:creationId xmlns:p14="http://schemas.microsoft.com/office/powerpoint/2010/main" val="546631854"/>
+        <p14:creationId xmlns:p14="http://schemas.microsoft.com/office/powerpoint/2010/main" xmlns="" val="546631854"/>
       </p:ext>
     </p:extLst>
   </p:cSld>
@@ -4024,7 +4025,7 @@
           <a:blip r:embed="rId2" cstate="print">
             <a:extLst>
               <a:ext uri="{28A0092B-C50C-407E-A947-70E740481C1C}">
-                <a14:useLocalDpi xmlns:a14="http://schemas.microsoft.com/office/drawing/2010/main" val="0"/>
+                <a14:useLocalDpi xmlns:a14="http://schemas.microsoft.com/office/drawing/2010/main" xmlns="" val="0"/>
               </a:ext>
             </a:extLst>
           </a:blip>
@@ -4054,7 +4055,7 @@
           <a:blip r:embed="rId2" cstate="print">
             <a:extLst>
               <a:ext uri="{28A0092B-C50C-407E-A947-70E740481C1C}">
-                <a14:useLocalDpi xmlns:a14="http://schemas.microsoft.com/office/drawing/2010/main" val="0"/>
+                <a14:useLocalDpi xmlns:a14="http://schemas.microsoft.com/office/drawing/2010/main" xmlns="" val="0"/>
               </a:ext>
             </a:extLst>
           </a:blip>
@@ -4084,7 +4085,7 @@
           <a:blip r:embed="rId2" cstate="print">
             <a:extLst>
               <a:ext uri="{28A0092B-C50C-407E-A947-70E740481C1C}">
-                <a14:useLocalDpi xmlns:a14="http://schemas.microsoft.com/office/drawing/2010/main" val="0"/>
+                <a14:useLocalDpi xmlns:a14="http://schemas.microsoft.com/office/drawing/2010/main" xmlns="" val="0"/>
               </a:ext>
             </a:extLst>
           </a:blip>
@@ -4114,7 +4115,7 @@
           <a:blip r:embed="rId2" cstate="print">
             <a:extLst>
               <a:ext uri="{28A0092B-C50C-407E-A947-70E740481C1C}">
-                <a14:useLocalDpi xmlns:a14="http://schemas.microsoft.com/office/drawing/2010/main" val="0"/>
+                <a14:useLocalDpi xmlns:a14="http://schemas.microsoft.com/office/drawing/2010/main" xmlns="" val="0"/>
               </a:ext>
             </a:extLst>
           </a:blip>
@@ -4144,7 +4145,7 @@
           <a:blip r:embed="rId2" cstate="print">
             <a:extLst>
               <a:ext uri="{28A0092B-C50C-407E-A947-70E740481C1C}">
-                <a14:useLocalDpi xmlns:a14="http://schemas.microsoft.com/office/drawing/2010/main" val="0"/>
+                <a14:useLocalDpi xmlns:a14="http://schemas.microsoft.com/office/drawing/2010/main" xmlns="" val="0"/>
               </a:ext>
             </a:extLst>
           </a:blip>
@@ -4426,7 +4427,7 @@
           <a:blip r:embed="rId3" cstate="print">
             <a:extLst>
               <a:ext uri="{28A0092B-C50C-407E-A947-70E740481C1C}">
-                <a14:useLocalDpi xmlns:a14="http://schemas.microsoft.com/office/drawing/2010/main" val="0"/>
+                <a14:useLocalDpi xmlns:a14="http://schemas.microsoft.com/office/drawing/2010/main" xmlns="" val="0"/>
               </a:ext>
             </a:extLst>
           </a:blip>
@@ -4517,8 +4518,8 @@
           </a:p>
         </p:txBody>
       </p:sp>
-      <mc:AlternateContent xmlns:mc="http://schemas.openxmlformats.org/markup-compatibility/2006" xmlns:a14="http://schemas.microsoft.com/office/drawing/2010/main">
-        <mc:Choice Requires="a14">
+      <mc:AlternateContent xmlns:mc="http://schemas.openxmlformats.org/markup-compatibility/2006">
+        <mc:Choice xmlns:a14="http://schemas.microsoft.com/office/drawing/2010/main" xmlns="" Requires="a14">
           <p:sp>
             <p:nvSpPr>
               <p:cNvPr id="21" name="TextBox 20"/>
@@ -4593,7 +4594,7 @@
             </p:txBody>
           </p:sp>
         </mc:Choice>
-        <mc:Fallback xmlns="">
+        <mc:Fallback>
           <p:sp>
             <p:nvSpPr>
               <p:cNvPr id="21" name="TextBox 20"/>
@@ -4632,8 +4633,8 @@
           </p:sp>
         </mc:Fallback>
       </mc:AlternateContent>
-      <mc:AlternateContent xmlns:mc="http://schemas.openxmlformats.org/markup-compatibility/2006" xmlns:a14="http://schemas.microsoft.com/office/drawing/2010/main">
-        <mc:Choice Requires="a14">
+      <mc:AlternateContent xmlns:mc="http://schemas.openxmlformats.org/markup-compatibility/2006">
+        <mc:Choice xmlns:a14="http://schemas.microsoft.com/office/drawing/2010/main" xmlns="" Requires="a14">
           <p:sp>
             <p:nvSpPr>
               <p:cNvPr id="22" name="TextBox 21"/>
@@ -4701,7 +4702,7 @@
             </p:txBody>
           </p:sp>
         </mc:Choice>
-        <mc:Fallback xmlns="">
+        <mc:Fallback>
           <p:sp>
             <p:nvSpPr>
               <p:cNvPr id="22" name="TextBox 21"/>
@@ -4740,8 +4741,8 @@
           </p:sp>
         </mc:Fallback>
       </mc:AlternateContent>
-      <mc:AlternateContent xmlns:mc="http://schemas.openxmlformats.org/markup-compatibility/2006" xmlns:a14="http://schemas.microsoft.com/office/drawing/2010/main">
-        <mc:Choice Requires="a14">
+      <mc:AlternateContent xmlns:mc="http://schemas.openxmlformats.org/markup-compatibility/2006">
+        <mc:Choice xmlns:a14="http://schemas.microsoft.com/office/drawing/2010/main" xmlns="" Requires="a14">
           <p:sp>
             <p:nvSpPr>
               <p:cNvPr id="23" name="TextBox 22"/>
@@ -4847,7 +4848,7 @@
             </p:txBody>
           </p:sp>
         </mc:Choice>
-        <mc:Fallback xmlns="">
+        <mc:Fallback>
           <p:sp>
             <p:nvSpPr>
               <p:cNvPr id="23" name="TextBox 22"/>
@@ -4886,8 +4887,8 @@
           </p:sp>
         </mc:Fallback>
       </mc:AlternateContent>
-      <mc:AlternateContent xmlns:mc="http://schemas.openxmlformats.org/markup-compatibility/2006" xmlns:a14="http://schemas.microsoft.com/office/drawing/2010/main">
-        <mc:Choice Requires="a14">
+      <mc:AlternateContent xmlns:mc="http://schemas.openxmlformats.org/markup-compatibility/2006">
+        <mc:Choice xmlns:a14="http://schemas.microsoft.com/office/drawing/2010/main" xmlns="" Requires="a14">
           <p:sp>
             <p:nvSpPr>
               <p:cNvPr id="24" name="TextBox 23"/>
@@ -4955,7 +4956,7 @@
             </p:txBody>
           </p:sp>
         </mc:Choice>
-        <mc:Fallback xmlns="">
+        <mc:Fallback>
           <p:sp>
             <p:nvSpPr>
               <p:cNvPr id="24" name="TextBox 23"/>
@@ -4997,7 +4998,7 @@
     </p:spTree>
     <p:extLst>
       <p:ext uri="{BB962C8B-B14F-4D97-AF65-F5344CB8AC3E}">
-        <p14:creationId xmlns:p14="http://schemas.microsoft.com/office/powerpoint/2010/main" val="3368485320"/>
+        <p14:creationId xmlns:p14="http://schemas.microsoft.com/office/powerpoint/2010/main" xmlns="" val="3368485320"/>
       </p:ext>
     </p:extLst>
   </p:cSld>
@@ -5093,7 +5094,7 @@
           <a:blip r:embed="rId2" cstate="print">
             <a:extLst>
               <a:ext uri="{28A0092B-C50C-407E-A947-70E740481C1C}">
-                <a14:useLocalDpi xmlns:a14="http://schemas.microsoft.com/office/drawing/2010/main" val="0"/>
+                <a14:useLocalDpi xmlns:a14="http://schemas.microsoft.com/office/drawing/2010/main" xmlns="" val="0"/>
               </a:ext>
             </a:extLst>
           </a:blip>
@@ -5123,7 +5124,7 @@
           <a:blip r:embed="rId2" cstate="print">
             <a:extLst>
               <a:ext uri="{28A0092B-C50C-407E-A947-70E740481C1C}">
-                <a14:useLocalDpi xmlns:a14="http://schemas.microsoft.com/office/drawing/2010/main" val="0"/>
+                <a14:useLocalDpi xmlns:a14="http://schemas.microsoft.com/office/drawing/2010/main" xmlns="" val="0"/>
               </a:ext>
             </a:extLst>
           </a:blip>
@@ -5153,7 +5154,7 @@
           <a:blip r:embed="rId2" cstate="print">
             <a:extLst>
               <a:ext uri="{28A0092B-C50C-407E-A947-70E740481C1C}">
-                <a14:useLocalDpi xmlns:a14="http://schemas.microsoft.com/office/drawing/2010/main" val="0"/>
+                <a14:useLocalDpi xmlns:a14="http://schemas.microsoft.com/office/drawing/2010/main" xmlns="" val="0"/>
               </a:ext>
             </a:extLst>
           </a:blip>
@@ -5183,7 +5184,7 @@
           <a:blip r:embed="rId2" cstate="print">
             <a:extLst>
               <a:ext uri="{28A0092B-C50C-407E-A947-70E740481C1C}">
-                <a14:useLocalDpi xmlns:a14="http://schemas.microsoft.com/office/drawing/2010/main" val="0"/>
+                <a14:useLocalDpi xmlns:a14="http://schemas.microsoft.com/office/drawing/2010/main" xmlns="" val="0"/>
               </a:ext>
             </a:extLst>
           </a:blip>
@@ -5213,7 +5214,7 @@
           <a:blip r:embed="rId2" cstate="print">
             <a:extLst>
               <a:ext uri="{28A0092B-C50C-407E-A947-70E740481C1C}">
-                <a14:useLocalDpi xmlns:a14="http://schemas.microsoft.com/office/drawing/2010/main" val="0"/>
+                <a14:useLocalDpi xmlns:a14="http://schemas.microsoft.com/office/drawing/2010/main" xmlns="" val="0"/>
               </a:ext>
             </a:extLst>
           </a:blip>
@@ -5495,7 +5496,7 @@
           <a:blip r:embed="rId3" cstate="print">
             <a:extLst>
               <a:ext uri="{28A0092B-C50C-407E-A947-70E740481C1C}">
-                <a14:useLocalDpi xmlns:a14="http://schemas.microsoft.com/office/drawing/2010/main" val="0"/>
+                <a14:useLocalDpi xmlns:a14="http://schemas.microsoft.com/office/drawing/2010/main" xmlns="" val="0"/>
               </a:ext>
             </a:extLst>
           </a:blip>
@@ -5586,8 +5587,8 @@
           </a:p>
         </p:txBody>
       </p:sp>
-      <mc:AlternateContent xmlns:mc="http://schemas.openxmlformats.org/markup-compatibility/2006" xmlns:a14="http://schemas.microsoft.com/office/drawing/2010/main">
-        <mc:Choice Requires="a14">
+      <mc:AlternateContent xmlns:mc="http://schemas.openxmlformats.org/markup-compatibility/2006">
+        <mc:Choice xmlns:a14="http://schemas.microsoft.com/office/drawing/2010/main" xmlns="" Requires="a14">
           <p:sp>
             <p:nvSpPr>
               <p:cNvPr id="21" name="TextBox 20"/>
@@ -5662,7 +5663,7 @@
             </p:txBody>
           </p:sp>
         </mc:Choice>
-        <mc:Fallback xmlns="">
+        <mc:Fallback>
           <p:sp>
             <p:nvSpPr>
               <p:cNvPr id="21" name="TextBox 20"/>
@@ -5701,8 +5702,8 @@
           </p:sp>
         </mc:Fallback>
       </mc:AlternateContent>
-      <mc:AlternateContent xmlns:mc="http://schemas.openxmlformats.org/markup-compatibility/2006" xmlns:a14="http://schemas.microsoft.com/office/drawing/2010/main">
-        <mc:Choice Requires="a14">
+      <mc:AlternateContent xmlns:mc="http://schemas.openxmlformats.org/markup-compatibility/2006">
+        <mc:Choice xmlns:a14="http://schemas.microsoft.com/office/drawing/2010/main" xmlns="" Requires="a14">
           <p:sp>
             <p:nvSpPr>
               <p:cNvPr id="22" name="TextBox 21"/>
@@ -5770,7 +5771,7 @@
             </p:txBody>
           </p:sp>
         </mc:Choice>
-        <mc:Fallback xmlns="">
+        <mc:Fallback>
           <p:sp>
             <p:nvSpPr>
               <p:cNvPr id="22" name="TextBox 21"/>
@@ -5809,8 +5810,8 @@
           </p:sp>
         </mc:Fallback>
       </mc:AlternateContent>
-      <mc:AlternateContent xmlns:mc="http://schemas.openxmlformats.org/markup-compatibility/2006" xmlns:a14="http://schemas.microsoft.com/office/drawing/2010/main">
-        <mc:Choice Requires="a14">
+      <mc:AlternateContent xmlns:mc="http://schemas.openxmlformats.org/markup-compatibility/2006">
+        <mc:Choice xmlns:a14="http://schemas.microsoft.com/office/drawing/2010/main" xmlns="" Requires="a14">
           <p:sp>
             <p:nvSpPr>
               <p:cNvPr id="23" name="TextBox 22"/>
@@ -5941,7 +5942,7 @@
             </p:txBody>
           </p:sp>
         </mc:Choice>
-        <mc:Fallback xmlns="">
+        <mc:Fallback>
           <p:sp>
             <p:nvSpPr>
               <p:cNvPr id="23" name="TextBox 22"/>
@@ -5980,8 +5981,8 @@
           </p:sp>
         </mc:Fallback>
       </mc:AlternateContent>
-      <mc:AlternateContent xmlns:mc="http://schemas.openxmlformats.org/markup-compatibility/2006" xmlns:a14="http://schemas.microsoft.com/office/drawing/2010/main">
-        <mc:Choice Requires="a14">
+      <mc:AlternateContent xmlns:mc="http://schemas.openxmlformats.org/markup-compatibility/2006">
+        <mc:Choice xmlns:a14="http://schemas.microsoft.com/office/drawing/2010/main" xmlns="" Requires="a14">
           <p:sp>
             <p:nvSpPr>
               <p:cNvPr id="24" name="TextBox 23"/>
@@ -6049,7 +6050,7 @@
             </p:txBody>
           </p:sp>
         </mc:Choice>
-        <mc:Fallback xmlns="">
+        <mc:Fallback>
           <p:sp>
             <p:nvSpPr>
               <p:cNvPr id="24" name="TextBox 23"/>
@@ -6091,7 +6092,7 @@
     </p:spTree>
     <p:extLst>
       <p:ext uri="{BB962C8B-B14F-4D97-AF65-F5344CB8AC3E}">
-        <p14:creationId xmlns:p14="http://schemas.microsoft.com/office/powerpoint/2010/main" val="37058664"/>
+        <p14:creationId xmlns:p14="http://schemas.microsoft.com/office/powerpoint/2010/main" xmlns="" val="37058664"/>
       </p:ext>
     </p:extLst>
   </p:cSld>
@@ -6187,7 +6188,7 @@
           <a:blip r:embed="rId2" cstate="print">
             <a:extLst>
               <a:ext uri="{28A0092B-C50C-407E-A947-70E740481C1C}">
-                <a14:useLocalDpi xmlns:a14="http://schemas.microsoft.com/office/drawing/2010/main" val="0"/>
+                <a14:useLocalDpi xmlns:a14="http://schemas.microsoft.com/office/drawing/2010/main" xmlns="" val="0"/>
               </a:ext>
             </a:extLst>
           </a:blip>
@@ -6217,7 +6218,7 @@
           <a:blip r:embed="rId2" cstate="print">
             <a:extLst>
               <a:ext uri="{28A0092B-C50C-407E-A947-70E740481C1C}">
-                <a14:useLocalDpi xmlns:a14="http://schemas.microsoft.com/office/drawing/2010/main" val="0"/>
+                <a14:useLocalDpi xmlns:a14="http://schemas.microsoft.com/office/drawing/2010/main" xmlns="" val="0"/>
               </a:ext>
             </a:extLst>
           </a:blip>
@@ -6247,7 +6248,7 @@
           <a:blip r:embed="rId2" cstate="print">
             <a:extLst>
               <a:ext uri="{28A0092B-C50C-407E-A947-70E740481C1C}">
-                <a14:useLocalDpi xmlns:a14="http://schemas.microsoft.com/office/drawing/2010/main" val="0"/>
+                <a14:useLocalDpi xmlns:a14="http://schemas.microsoft.com/office/drawing/2010/main" xmlns="" val="0"/>
               </a:ext>
             </a:extLst>
           </a:blip>
@@ -6277,7 +6278,7 @@
           <a:blip r:embed="rId2" cstate="print">
             <a:extLst>
               <a:ext uri="{28A0092B-C50C-407E-A947-70E740481C1C}">
-                <a14:useLocalDpi xmlns:a14="http://schemas.microsoft.com/office/drawing/2010/main" val="0"/>
+                <a14:useLocalDpi xmlns:a14="http://schemas.microsoft.com/office/drawing/2010/main" xmlns="" val="0"/>
               </a:ext>
             </a:extLst>
           </a:blip>
@@ -6307,7 +6308,7 @@
           <a:blip r:embed="rId2" cstate="print">
             <a:extLst>
               <a:ext uri="{28A0092B-C50C-407E-A947-70E740481C1C}">
-                <a14:useLocalDpi xmlns:a14="http://schemas.microsoft.com/office/drawing/2010/main" val="0"/>
+                <a14:useLocalDpi xmlns:a14="http://schemas.microsoft.com/office/drawing/2010/main" xmlns="" val="0"/>
               </a:ext>
             </a:extLst>
           </a:blip>
@@ -6551,7 +6552,7 @@
           <a:blip r:embed="rId3" cstate="print">
             <a:extLst>
               <a:ext uri="{28A0092B-C50C-407E-A947-70E740481C1C}">
-                <a14:useLocalDpi xmlns:a14="http://schemas.microsoft.com/office/drawing/2010/main" val="0"/>
+                <a14:useLocalDpi xmlns:a14="http://schemas.microsoft.com/office/drawing/2010/main" xmlns="" val="0"/>
               </a:ext>
             </a:extLst>
           </a:blip>
@@ -6996,7 +6997,7 @@
           <a:blip r:embed="rId2" cstate="print">
             <a:extLst>
               <a:ext uri="{28A0092B-C50C-407E-A947-70E740481C1C}">
-                <a14:useLocalDpi xmlns:a14="http://schemas.microsoft.com/office/drawing/2010/main" val="0"/>
+                <a14:useLocalDpi xmlns:a14="http://schemas.microsoft.com/office/drawing/2010/main" xmlns="" val="0"/>
               </a:ext>
             </a:extLst>
           </a:blip>
@@ -7026,7 +7027,7 @@
           <a:blip r:embed="rId2" cstate="print">
             <a:extLst>
               <a:ext uri="{28A0092B-C50C-407E-A947-70E740481C1C}">
-                <a14:useLocalDpi xmlns:a14="http://schemas.microsoft.com/office/drawing/2010/main" val="0"/>
+                <a14:useLocalDpi xmlns:a14="http://schemas.microsoft.com/office/drawing/2010/main" xmlns="" val="0"/>
               </a:ext>
             </a:extLst>
           </a:blip>
@@ -7056,7 +7057,7 @@
           <a:blip r:embed="rId2" cstate="print">
             <a:extLst>
               <a:ext uri="{28A0092B-C50C-407E-A947-70E740481C1C}">
-                <a14:useLocalDpi xmlns:a14="http://schemas.microsoft.com/office/drawing/2010/main" val="0"/>
+                <a14:useLocalDpi xmlns:a14="http://schemas.microsoft.com/office/drawing/2010/main" xmlns="" val="0"/>
               </a:ext>
             </a:extLst>
           </a:blip>
@@ -7086,7 +7087,7 @@
           <a:blip r:embed="rId2" cstate="print">
             <a:extLst>
               <a:ext uri="{28A0092B-C50C-407E-A947-70E740481C1C}">
-                <a14:useLocalDpi xmlns:a14="http://schemas.microsoft.com/office/drawing/2010/main" val="0"/>
+                <a14:useLocalDpi xmlns:a14="http://schemas.microsoft.com/office/drawing/2010/main" xmlns="" val="0"/>
               </a:ext>
             </a:extLst>
           </a:blip>
@@ -7116,7 +7117,7 @@
           <a:blip r:embed="rId2" cstate="print">
             <a:extLst>
               <a:ext uri="{28A0092B-C50C-407E-A947-70E740481C1C}">
-                <a14:useLocalDpi xmlns:a14="http://schemas.microsoft.com/office/drawing/2010/main" val="0"/>
+                <a14:useLocalDpi xmlns:a14="http://schemas.microsoft.com/office/drawing/2010/main" xmlns="" val="0"/>
               </a:ext>
             </a:extLst>
           </a:blip>
@@ -7360,7 +7361,7 @@
           <a:blip r:embed="rId3" cstate="print">
             <a:extLst>
               <a:ext uri="{28A0092B-C50C-407E-A947-70E740481C1C}">
-                <a14:useLocalDpi xmlns:a14="http://schemas.microsoft.com/office/drawing/2010/main" val="0"/>
+                <a14:useLocalDpi xmlns:a14="http://schemas.microsoft.com/office/drawing/2010/main" xmlns="" val="0"/>
               </a:ext>
             </a:extLst>
           </a:blip>
@@ -8067,7 +8068,7 @@
           <a:blip r:embed="rId2" cstate="print">
             <a:extLst>
               <a:ext uri="{28A0092B-C50C-407E-A947-70E740481C1C}">
-                <a14:useLocalDpi xmlns:a14="http://schemas.microsoft.com/office/drawing/2010/main" val="0"/>
+                <a14:useLocalDpi xmlns:a14="http://schemas.microsoft.com/office/drawing/2010/main" xmlns="" val="0"/>
               </a:ext>
             </a:extLst>
           </a:blip>
@@ -8097,7 +8098,7 @@
           <a:blip r:embed="rId2" cstate="print">
             <a:extLst>
               <a:ext uri="{28A0092B-C50C-407E-A947-70E740481C1C}">
-                <a14:useLocalDpi xmlns:a14="http://schemas.microsoft.com/office/drawing/2010/main" val="0"/>
+                <a14:useLocalDpi xmlns:a14="http://schemas.microsoft.com/office/drawing/2010/main" xmlns="" val="0"/>
               </a:ext>
             </a:extLst>
           </a:blip>
@@ -8127,7 +8128,7 @@
           <a:blip r:embed="rId2" cstate="print">
             <a:extLst>
               <a:ext uri="{28A0092B-C50C-407E-A947-70E740481C1C}">
-                <a14:useLocalDpi xmlns:a14="http://schemas.microsoft.com/office/drawing/2010/main" val="0"/>
+                <a14:useLocalDpi xmlns:a14="http://schemas.microsoft.com/office/drawing/2010/main" xmlns="" val="0"/>
               </a:ext>
             </a:extLst>
           </a:blip>
@@ -8157,7 +8158,7 @@
           <a:blip r:embed="rId2" cstate="print">
             <a:extLst>
               <a:ext uri="{28A0092B-C50C-407E-A947-70E740481C1C}">
-                <a14:useLocalDpi xmlns:a14="http://schemas.microsoft.com/office/drawing/2010/main" val="0"/>
+                <a14:useLocalDpi xmlns:a14="http://schemas.microsoft.com/office/drawing/2010/main" xmlns="" val="0"/>
               </a:ext>
             </a:extLst>
           </a:blip>
@@ -8187,7 +8188,7 @@
           <a:blip r:embed="rId2" cstate="print">
             <a:extLst>
               <a:ext uri="{28A0092B-C50C-407E-A947-70E740481C1C}">
-                <a14:useLocalDpi xmlns:a14="http://schemas.microsoft.com/office/drawing/2010/main" val="0"/>
+                <a14:useLocalDpi xmlns:a14="http://schemas.microsoft.com/office/drawing/2010/main" xmlns="" val="0"/>
               </a:ext>
             </a:extLst>
           </a:blip>
@@ -8469,7 +8470,7 @@
           <a:blip r:embed="rId3" cstate="print">
             <a:extLst>
               <a:ext uri="{28A0092B-C50C-407E-A947-70E740481C1C}">
-                <a14:useLocalDpi xmlns:a14="http://schemas.microsoft.com/office/drawing/2010/main" val="0"/>
+                <a14:useLocalDpi xmlns:a14="http://schemas.microsoft.com/office/drawing/2010/main" xmlns="" val="0"/>
               </a:ext>
             </a:extLst>
           </a:blip>
@@ -8903,7 +8904,7 @@
         </p:txBody>
       </p:sp>
       <mc:AlternateContent xmlns:mc="http://schemas.openxmlformats.org/markup-compatibility/2006">
-        <mc:Choice xmlns:a14="http://schemas.microsoft.com/office/drawing/2010/main" Requires="a14">
+        <mc:Choice xmlns:a14="http://schemas.microsoft.com/office/drawing/2010/main" xmlns="" Requires="a14">
           <p:sp>
             <p:nvSpPr>
               <p:cNvPr id="33" name="TextBox 9"/>
@@ -8992,7 +8993,7 @@
                 <a:avLst/>
               </a:prstGeom>
               <a:blipFill rotWithShape="0">
-                <a:blip r:embed="rId4"/>
+                <a:blip r:embed="rId4" cstate="print"/>
                 <a:stretch>
                   <a:fillRect t="-6557" b="-26230"/>
                 </a:stretch>
@@ -9014,7 +9015,7 @@
         </mc:Fallback>
       </mc:AlternateContent>
       <mc:AlternateContent xmlns:mc="http://schemas.openxmlformats.org/markup-compatibility/2006">
-        <mc:Choice xmlns:a14="http://schemas.microsoft.com/office/drawing/2010/main" Requires="a14">
+        <mc:Choice xmlns:a14="http://schemas.microsoft.com/office/drawing/2010/main" xmlns="" Requires="a14">
           <p:sp>
             <p:nvSpPr>
               <p:cNvPr id="31" name="TextBox 30"/>
@@ -9087,7 +9088,7 @@
                 <a:avLst/>
               </a:prstGeom>
               <a:blipFill rotWithShape="0">
-                <a:blip r:embed="rId5"/>
+                <a:blip r:embed="rId5" cstate="print"/>
                 <a:stretch>
                   <a:fillRect l="-34483" t="-4255" r="-93103" b="-6383"/>
                 </a:stretch>
@@ -9109,7 +9110,7 @@
         </mc:Fallback>
       </mc:AlternateContent>
       <mc:AlternateContent xmlns:mc="http://schemas.openxmlformats.org/markup-compatibility/2006">
-        <mc:Choice xmlns:a14="http://schemas.microsoft.com/office/drawing/2010/main" Requires="a14">
+        <mc:Choice xmlns:a14="http://schemas.microsoft.com/office/drawing/2010/main" xmlns="" Requires="a14">
           <p:sp>
             <p:nvSpPr>
               <p:cNvPr id="36" name="TextBox 35"/>
@@ -9182,7 +9183,7 @@
                 <a:avLst/>
               </a:prstGeom>
               <a:blipFill rotWithShape="0">
-                <a:blip r:embed="rId6"/>
+                <a:blip r:embed="rId6" cstate="print"/>
                 <a:stretch>
                   <a:fillRect l="-33333" r="-93333" b="-22222"/>
                 </a:stretch>
@@ -9297,7 +9298,7 @@
           <a:blip r:embed="rId2" cstate="print">
             <a:extLst>
               <a:ext uri="{28A0092B-C50C-407E-A947-70E740481C1C}">
-                <a14:useLocalDpi xmlns:a14="http://schemas.microsoft.com/office/drawing/2010/main" val="0"/>
+                <a14:useLocalDpi xmlns:a14="http://schemas.microsoft.com/office/drawing/2010/main" xmlns="" val="0"/>
               </a:ext>
             </a:extLst>
           </a:blip>
@@ -9327,7 +9328,7 @@
           <a:blip r:embed="rId2" cstate="print">
             <a:extLst>
               <a:ext uri="{28A0092B-C50C-407E-A947-70E740481C1C}">
-                <a14:useLocalDpi xmlns:a14="http://schemas.microsoft.com/office/drawing/2010/main" val="0"/>
+                <a14:useLocalDpi xmlns:a14="http://schemas.microsoft.com/office/drawing/2010/main" xmlns="" val="0"/>
               </a:ext>
             </a:extLst>
           </a:blip>
@@ -9357,7 +9358,7 @@
           <a:blip r:embed="rId2" cstate="print">
             <a:extLst>
               <a:ext uri="{28A0092B-C50C-407E-A947-70E740481C1C}">
-                <a14:useLocalDpi xmlns:a14="http://schemas.microsoft.com/office/drawing/2010/main" val="0"/>
+                <a14:useLocalDpi xmlns:a14="http://schemas.microsoft.com/office/drawing/2010/main" xmlns="" val="0"/>
               </a:ext>
             </a:extLst>
           </a:blip>
@@ -9387,7 +9388,7 @@
           <a:blip r:embed="rId2" cstate="print">
             <a:extLst>
               <a:ext uri="{28A0092B-C50C-407E-A947-70E740481C1C}">
-                <a14:useLocalDpi xmlns:a14="http://schemas.microsoft.com/office/drawing/2010/main" val="0"/>
+                <a14:useLocalDpi xmlns:a14="http://schemas.microsoft.com/office/drawing/2010/main" xmlns="" val="0"/>
               </a:ext>
             </a:extLst>
           </a:blip>
@@ -9417,7 +9418,7 @@
           <a:blip r:embed="rId2" cstate="print">
             <a:extLst>
               <a:ext uri="{28A0092B-C50C-407E-A947-70E740481C1C}">
-                <a14:useLocalDpi xmlns:a14="http://schemas.microsoft.com/office/drawing/2010/main" val="0"/>
+                <a14:useLocalDpi xmlns:a14="http://schemas.microsoft.com/office/drawing/2010/main" xmlns="" val="0"/>
               </a:ext>
             </a:extLst>
           </a:blip>
@@ -9699,7 +9700,7 @@
           <a:blip r:embed="rId3" cstate="print">
             <a:extLst>
               <a:ext uri="{28A0092B-C50C-407E-A947-70E740481C1C}">
-                <a14:useLocalDpi xmlns:a14="http://schemas.microsoft.com/office/drawing/2010/main" val="0"/>
+                <a14:useLocalDpi xmlns:a14="http://schemas.microsoft.com/office/drawing/2010/main" xmlns="" val="0"/>
               </a:ext>
             </a:extLst>
           </a:blip>
@@ -9741,18 +9742,14 @@
           <a:p>
             <a:r>
               <a:rPr lang="es-AR" dirty="0" smtClean="0"/>
-              <a:t>Ejercicio </a:t>
-            </a:r>
-            <a:r>
-              <a:rPr lang="es-AR" dirty="0" smtClean="0"/>
-              <a:t>6</a:t>
+              <a:t>Ejercicio 6</a:t>
             </a:r>
             <a:endParaRPr lang="es-AR" dirty="0"/>
           </a:p>
         </p:txBody>
       </p:sp>
       <mc:AlternateContent xmlns:mc="http://schemas.openxmlformats.org/markup-compatibility/2006">
-        <mc:Choice xmlns:a14="http://schemas.microsoft.com/office/drawing/2010/main" Requires="a14">
+        <mc:Choice xmlns:a14="http://schemas.microsoft.com/office/drawing/2010/main" xmlns="" Requires="a14">
           <p:sp>
             <p:nvSpPr>
               <p:cNvPr id="2" name="TextBox 1"/>
@@ -9825,7 +9822,7 @@
                 <a:avLst/>
               </a:prstGeom>
               <a:blipFill rotWithShape="0">
-                <a:blip r:embed="rId4"/>
+                <a:blip r:embed="rId4" cstate="print"/>
                 <a:stretch>
                   <a:fillRect l="-34483" t="-4255" r="-96552" b="-6383"/>
                 </a:stretch>
@@ -9847,7 +9844,7 @@
         </mc:Fallback>
       </mc:AlternateContent>
       <mc:AlternateContent xmlns:mc="http://schemas.openxmlformats.org/markup-compatibility/2006">
-        <mc:Choice xmlns:a14="http://schemas.microsoft.com/office/drawing/2010/main" Requires="a14">
+        <mc:Choice xmlns:a14="http://schemas.microsoft.com/office/drawing/2010/main" xmlns="" Requires="a14">
           <p:sp>
             <p:nvSpPr>
               <p:cNvPr id="3" name="TextBox 2"/>
@@ -9939,7 +9936,7 @@
                 <a:avLst/>
               </a:prstGeom>
               <a:blipFill rotWithShape="0">
-                <a:blip r:embed="rId5"/>
+                <a:blip r:embed="rId5" cstate="print"/>
                 <a:stretch>
                   <a:fillRect/>
                 </a:stretch>
@@ -9961,7 +9958,7 @@
         </mc:Fallback>
       </mc:AlternateContent>
       <mc:AlternateContent xmlns:mc="http://schemas.openxmlformats.org/markup-compatibility/2006">
-        <mc:Choice xmlns:a14="http://schemas.microsoft.com/office/drawing/2010/main" Requires="a14">
+        <mc:Choice xmlns:a14="http://schemas.microsoft.com/office/drawing/2010/main" xmlns="" Requires="a14">
           <p:sp>
             <p:nvSpPr>
               <p:cNvPr id="36" name="TextBox 35"/>
@@ -10034,7 +10031,7 @@
                 <a:avLst/>
               </a:prstGeom>
               <a:blipFill rotWithShape="0">
-                <a:blip r:embed="rId6"/>
+                <a:blip r:embed="rId6" cstate="print"/>
                 <a:stretch>
                   <a:fillRect l="-29032" r="-90323" b="-22222"/>
                 </a:stretch>
@@ -10094,7 +10091,7 @@
         </p:txBody>
       </p:sp>
       <mc:AlternateContent xmlns:mc="http://schemas.openxmlformats.org/markup-compatibility/2006">
-        <mc:Choice xmlns:a14="http://schemas.microsoft.com/office/drawing/2010/main" Requires="a14">
+        <mc:Choice xmlns:a14="http://schemas.microsoft.com/office/drawing/2010/main" xmlns="" Requires="a14">
           <p:sp>
             <p:nvSpPr>
               <p:cNvPr id="18" name="TextBox 17"/>
@@ -10167,7 +10164,7 @@
                 <a:avLst/>
               </a:prstGeom>
               <a:blipFill rotWithShape="0">
-                <a:blip r:embed="rId7"/>
+                <a:blip r:embed="rId7" cstate="print"/>
                 <a:stretch>
                   <a:fillRect l="-26471" t="-6667" r="-47059" b="-6667"/>
                 </a:stretch>
@@ -10189,7 +10186,7 @@
         </mc:Fallback>
       </mc:AlternateContent>
       <mc:AlternateContent xmlns:mc="http://schemas.openxmlformats.org/markup-compatibility/2006">
-        <mc:Choice xmlns:a14="http://schemas.microsoft.com/office/drawing/2010/main" Requires="a14">
+        <mc:Choice xmlns:a14="http://schemas.microsoft.com/office/drawing/2010/main" xmlns="" Requires="a14">
           <p:sp>
             <p:nvSpPr>
               <p:cNvPr id="44" name="TextBox 43"/>
@@ -10306,7 +10303,7 @@
                 <a:avLst/>
               </a:prstGeom>
               <a:blipFill rotWithShape="0">
-                <a:blip r:embed="rId8"/>
+                <a:blip r:embed="rId8" cstate="print"/>
                 <a:stretch>
                   <a:fillRect/>
                 </a:stretch>
@@ -10328,7 +10325,7 @@
         </mc:Fallback>
       </mc:AlternateContent>
       <mc:AlternateContent xmlns:mc="http://schemas.openxmlformats.org/markup-compatibility/2006">
-        <mc:Choice xmlns:a14="http://schemas.microsoft.com/office/drawing/2010/main" Requires="a14">
+        <mc:Choice xmlns:a14="http://schemas.microsoft.com/office/drawing/2010/main" xmlns="" Requires="a14">
           <p:sp>
             <p:nvSpPr>
               <p:cNvPr id="45" name="TextBox 44"/>
@@ -10536,7 +10533,7 @@
                 <a:avLst/>
               </a:prstGeom>
               <a:blipFill rotWithShape="0">
-                <a:blip r:embed="rId9"/>
+                <a:blip r:embed="rId9" cstate="print"/>
                 <a:stretch>
                   <a:fillRect/>
                 </a:stretch>
@@ -10642,7 +10639,7 @@
           <a:blip r:embed="rId3" cstate="print">
             <a:extLst>
               <a:ext uri="{28A0092B-C50C-407E-A947-70E740481C1C}">
-                <a14:useLocalDpi xmlns:a14="http://schemas.microsoft.com/office/drawing/2010/main" val="0"/>
+                <a14:useLocalDpi xmlns:a14="http://schemas.microsoft.com/office/drawing/2010/main" xmlns="" val="0"/>
               </a:ext>
             </a:extLst>
           </a:blip>
@@ -10663,7 +10660,7 @@
     </p:spTree>
     <p:extLst>
       <p:ext uri="{BB962C8B-B14F-4D97-AF65-F5344CB8AC3E}">
-        <p14:creationId xmlns:p14="http://schemas.microsoft.com/office/powerpoint/2010/main" val="3126091353"/>
+        <p14:creationId xmlns:p14="http://schemas.microsoft.com/office/powerpoint/2010/main" xmlns="" val="3126091353"/>
       </p:ext>
     </p:extLst>
   </p:cSld>
@@ -10677,6 +10674,1306 @@
       </p:par>
     </p:tnLst>
   </p:timing>
+</p:sld>
+</file>
+
+<file path=ppt/slides/slide8.xml><?xml version="1.0" encoding="utf-8"?>
+<p:sld xmlns:a="http://schemas.openxmlformats.org/drawingml/2006/main" xmlns:r="http://schemas.openxmlformats.org/officeDocument/2006/relationships" xmlns:p="http://schemas.openxmlformats.org/presentationml/2006/main">
+  <p:cSld>
+    <p:spTree>
+      <p:nvGrpSpPr>
+        <p:cNvPr id="1" name=""/>
+        <p:cNvGrpSpPr/>
+        <p:nvPr/>
+      </p:nvGrpSpPr>
+      <p:grpSpPr>
+        <a:xfrm>
+          <a:off x="0" y="0"/>
+          <a:ext cx="0" cy="0"/>
+          <a:chOff x="0" y="0"/>
+          <a:chExt cx="0" cy="0"/>
+        </a:xfrm>
+      </p:grpSpPr>
+      <p:sp>
+        <p:nvSpPr>
+          <p:cNvPr id="4" name="Oval 3"/>
+          <p:cNvSpPr/>
+          <p:nvPr/>
+        </p:nvSpPr>
+        <p:spPr>
+          <a:xfrm>
+            <a:off x="928632" y="1301325"/>
+            <a:ext cx="2382592" cy="2369712"/>
+          </a:xfrm>
+          <a:prstGeom prst="ellipse">
+            <a:avLst/>
+          </a:prstGeom>
+          <a:ln>
+            <a:solidFill>
+              <a:schemeClr val="tx2"/>
+            </a:solidFill>
+          </a:ln>
+          <a:effectLst>
+            <a:outerShdw blurRad="50800" dist="38100" dir="2700000" algn="tl" rotWithShape="0">
+              <a:prstClr val="black">
+                <a:alpha val="40000"/>
+              </a:prstClr>
+            </a:outerShdw>
+          </a:effectLst>
+        </p:spPr>
+        <p:style>
+          <a:lnRef idx="2">
+            <a:schemeClr val="accent6"/>
+          </a:lnRef>
+          <a:fillRef idx="1">
+            <a:schemeClr val="lt1"/>
+          </a:fillRef>
+          <a:effectRef idx="0">
+            <a:schemeClr val="accent6"/>
+          </a:effectRef>
+          <a:fontRef idx="minor">
+            <a:schemeClr val="dk1"/>
+          </a:fontRef>
+        </p:style>
+        <p:txBody>
+          <a:bodyPr rtlCol="0" anchor="ctr"/>
+          <a:lstStyle/>
+          <a:p>
+            <a:pPr algn="ctr"/>
+            <a:endParaRPr lang="es-AR"/>
+          </a:p>
+        </p:txBody>
+      </p:sp>
+      <p:pic>
+        <p:nvPicPr>
+          <p:cNvPr id="5" name="Picture 4"/>
+          <p:cNvPicPr>
+            <a:picLocks noChangeAspect="1"/>
+          </p:cNvPicPr>
+          <p:nvPr/>
+        </p:nvPicPr>
+        <p:blipFill>
+          <a:blip r:embed="rId2" cstate="print">
+            <a:extLst>
+              <a:ext uri="{28A0092B-C50C-407E-A947-70E740481C1C}">
+                <a14:useLocalDpi xmlns:a14="http://schemas.microsoft.com/office/drawing/2010/main" xmlns="" val="0"/>
+              </a:ext>
+            </a:extLst>
+          </a:blip>
+          <a:stretch>
+            <a:fillRect/>
+          </a:stretch>
+        </p:blipFill>
+        <p:spPr>
+          <a:xfrm>
+            <a:off x="1481585" y="1635057"/>
+            <a:ext cx="425562" cy="425562"/>
+          </a:xfrm>
+          <a:prstGeom prst="rect">
+            <a:avLst/>
+          </a:prstGeom>
+        </p:spPr>
+      </p:pic>
+      <p:pic>
+        <p:nvPicPr>
+          <p:cNvPr id="6" name="Picture 5"/>
+          <p:cNvPicPr>
+            <a:picLocks noChangeAspect="1"/>
+          </p:cNvPicPr>
+          <p:nvPr/>
+        </p:nvPicPr>
+        <p:blipFill>
+          <a:blip r:embed="rId2" cstate="print">
+            <a:extLst>
+              <a:ext uri="{28A0092B-C50C-407E-A947-70E740481C1C}">
+                <a14:useLocalDpi xmlns:a14="http://schemas.microsoft.com/office/drawing/2010/main" xmlns="" val="0"/>
+              </a:ext>
+            </a:extLst>
+          </a:blip>
+          <a:stretch>
+            <a:fillRect/>
+          </a:stretch>
+        </p:blipFill>
+        <p:spPr>
+          <a:xfrm>
+            <a:off x="2427925" y="1847838"/>
+            <a:ext cx="425562" cy="425562"/>
+          </a:xfrm>
+          <a:prstGeom prst="rect">
+            <a:avLst/>
+          </a:prstGeom>
+        </p:spPr>
+      </p:pic>
+      <p:pic>
+        <p:nvPicPr>
+          <p:cNvPr id="7" name="Picture 6"/>
+          <p:cNvPicPr>
+            <a:picLocks noChangeAspect="1"/>
+          </p:cNvPicPr>
+          <p:nvPr/>
+        </p:nvPicPr>
+        <p:blipFill>
+          <a:blip r:embed="rId2" cstate="print">
+            <a:extLst>
+              <a:ext uri="{28A0092B-C50C-407E-A947-70E740481C1C}">
+                <a14:useLocalDpi xmlns:a14="http://schemas.microsoft.com/office/drawing/2010/main" xmlns="" val="0"/>
+              </a:ext>
+            </a:extLst>
+          </a:blip>
+          <a:stretch>
+            <a:fillRect/>
+          </a:stretch>
+        </p:blipFill>
+        <p:spPr>
+          <a:xfrm>
+            <a:off x="1334272" y="2273400"/>
+            <a:ext cx="425562" cy="425562"/>
+          </a:xfrm>
+          <a:prstGeom prst="rect">
+            <a:avLst/>
+          </a:prstGeom>
+        </p:spPr>
+      </p:pic>
+      <p:pic>
+        <p:nvPicPr>
+          <p:cNvPr id="8" name="Picture 7"/>
+          <p:cNvPicPr>
+            <a:picLocks noChangeAspect="1"/>
+          </p:cNvPicPr>
+          <p:nvPr/>
+        </p:nvPicPr>
+        <p:blipFill>
+          <a:blip r:embed="rId2" cstate="print">
+            <a:extLst>
+              <a:ext uri="{28A0092B-C50C-407E-A947-70E740481C1C}">
+                <a14:useLocalDpi xmlns:a14="http://schemas.microsoft.com/office/drawing/2010/main" xmlns="" val="0"/>
+              </a:ext>
+            </a:extLst>
+          </a:blip>
+          <a:stretch>
+            <a:fillRect/>
+          </a:stretch>
+        </p:blipFill>
+        <p:spPr>
+          <a:xfrm>
+            <a:off x="1694366" y="2984817"/>
+            <a:ext cx="425562" cy="425562"/>
+          </a:xfrm>
+          <a:prstGeom prst="rect">
+            <a:avLst/>
+          </a:prstGeom>
+        </p:spPr>
+      </p:pic>
+      <p:pic>
+        <p:nvPicPr>
+          <p:cNvPr id="9" name="Picture 8"/>
+          <p:cNvPicPr>
+            <a:picLocks noChangeAspect="1"/>
+          </p:cNvPicPr>
+          <p:nvPr/>
+        </p:nvPicPr>
+        <p:blipFill>
+          <a:blip r:embed="rId2" cstate="print">
+            <a:extLst>
+              <a:ext uri="{28A0092B-C50C-407E-A947-70E740481C1C}">
+                <a14:useLocalDpi xmlns:a14="http://schemas.microsoft.com/office/drawing/2010/main" xmlns="" val="0"/>
+              </a:ext>
+            </a:extLst>
+          </a:blip>
+          <a:stretch>
+            <a:fillRect/>
+          </a:stretch>
+        </p:blipFill>
+        <p:spPr>
+          <a:xfrm>
+            <a:off x="2354268" y="2520619"/>
+            <a:ext cx="425562" cy="425562"/>
+          </a:xfrm>
+          <a:prstGeom prst="rect">
+            <a:avLst/>
+          </a:prstGeom>
+        </p:spPr>
+      </p:pic>
+      <p:sp>
+        <p:nvSpPr>
+          <p:cNvPr id="10" name="TextBox 9"/>
+          <p:cNvSpPr txBox="1"/>
+          <p:nvPr/>
+        </p:nvSpPr>
+        <p:spPr>
+          <a:xfrm>
+            <a:off x="1212739" y="3980809"/>
+            <a:ext cx="1640748" cy="369332"/>
+          </a:xfrm>
+          <a:prstGeom prst="rect">
+            <a:avLst/>
+          </a:prstGeom>
+          <a:noFill/>
+        </p:spPr>
+        <p:txBody>
+          <a:bodyPr wrap="square" rtlCol="0">
+            <a:spAutoFit/>
+          </a:bodyPr>
+          <a:lstStyle/>
+          <a:p>
+            <a:pPr algn="ctr"/>
+            <a:r>
+              <a:rPr lang="es-AR" dirty="0" smtClean="0">
+                <a:latin typeface="Segoe UI" panose="020B0502040204020203" pitchFamily="34" charset="0"/>
+                <a:cs typeface="Segoe UI" panose="020B0502040204020203" pitchFamily="34" charset="0"/>
+              </a:rPr>
+              <a:t>Población</a:t>
+            </a:r>
+            <a:endParaRPr lang="es-AR" dirty="0">
+              <a:latin typeface="Segoe UI" panose="020B0502040204020203" pitchFamily="34" charset="0"/>
+              <a:cs typeface="Segoe UI" panose="020B0502040204020203" pitchFamily="34" charset="0"/>
+            </a:endParaRPr>
+          </a:p>
+        </p:txBody>
+      </p:sp>
+      <p:sp>
+        <p:nvSpPr>
+          <p:cNvPr id="11" name="Rounded Rectangle 10"/>
+          <p:cNvSpPr/>
+          <p:nvPr/>
+        </p:nvSpPr>
+        <p:spPr>
+          <a:xfrm>
+            <a:off x="4601428" y="1301325"/>
+            <a:ext cx="4971245" cy="2369712"/>
+          </a:xfrm>
+          <a:prstGeom prst="roundRect">
+            <a:avLst/>
+          </a:prstGeom>
+          <a:ln>
+            <a:solidFill>
+              <a:schemeClr val="tx2"/>
+            </a:solidFill>
+          </a:ln>
+          <a:effectLst>
+            <a:outerShdw blurRad="50800" dist="38100" dir="2700000" algn="tl" rotWithShape="0">
+              <a:prstClr val="black">
+                <a:alpha val="40000"/>
+              </a:prstClr>
+            </a:outerShdw>
+          </a:effectLst>
+        </p:spPr>
+        <p:style>
+          <a:lnRef idx="2">
+            <a:schemeClr val="accent4"/>
+          </a:lnRef>
+          <a:fillRef idx="1">
+            <a:schemeClr val="lt1"/>
+          </a:fillRef>
+          <a:effectRef idx="0">
+            <a:schemeClr val="accent4"/>
+          </a:effectRef>
+          <a:fontRef idx="minor">
+            <a:schemeClr val="dk1"/>
+          </a:fontRef>
+        </p:style>
+        <p:txBody>
+          <a:bodyPr rtlCol="0" anchor="ctr"/>
+          <a:lstStyle/>
+          <a:p>
+            <a:pPr algn="ctr"/>
+            <a:endParaRPr lang="es-AR"/>
+          </a:p>
+        </p:txBody>
+      </p:sp>
+      <p:sp>
+        <p:nvSpPr>
+          <p:cNvPr id="12" name="Right Arrow 11"/>
+          <p:cNvSpPr/>
+          <p:nvPr/>
+        </p:nvSpPr>
+        <p:spPr>
+          <a:xfrm>
+            <a:off x="3477296" y="2273400"/>
+            <a:ext cx="875484" cy="672781"/>
+          </a:xfrm>
+          <a:prstGeom prst="rightArrow">
+            <a:avLst/>
+          </a:prstGeom>
+        </p:spPr>
+        <p:style>
+          <a:lnRef idx="1">
+            <a:schemeClr val="accent2"/>
+          </a:lnRef>
+          <a:fillRef idx="2">
+            <a:schemeClr val="accent2"/>
+          </a:fillRef>
+          <a:effectRef idx="1">
+            <a:schemeClr val="accent2"/>
+          </a:effectRef>
+          <a:fontRef idx="minor">
+            <a:schemeClr val="dk1"/>
+          </a:fontRef>
+        </p:style>
+        <p:txBody>
+          <a:bodyPr rtlCol="0" anchor="ctr"/>
+          <a:lstStyle/>
+          <a:p>
+            <a:pPr algn="ctr"/>
+            <a:endParaRPr lang="es-AR"/>
+          </a:p>
+        </p:txBody>
+      </p:sp>
+      <p:sp>
+        <p:nvSpPr>
+          <p:cNvPr id="13" name="Right Arrow 12"/>
+          <p:cNvSpPr/>
+          <p:nvPr/>
+        </p:nvSpPr>
+        <p:spPr>
+          <a:xfrm>
+            <a:off x="9851481" y="2214112"/>
+            <a:ext cx="875484" cy="672781"/>
+          </a:xfrm>
+          <a:prstGeom prst="rightArrow">
+            <a:avLst/>
+          </a:prstGeom>
+        </p:spPr>
+        <p:style>
+          <a:lnRef idx="1">
+            <a:schemeClr val="accent1"/>
+          </a:lnRef>
+          <a:fillRef idx="2">
+            <a:schemeClr val="accent1"/>
+          </a:fillRef>
+          <a:effectRef idx="1">
+            <a:schemeClr val="accent1"/>
+          </a:effectRef>
+          <a:fontRef idx="minor">
+            <a:schemeClr val="dk1"/>
+          </a:fontRef>
+        </p:style>
+        <p:txBody>
+          <a:bodyPr rtlCol="0" anchor="ctr"/>
+          <a:lstStyle/>
+          <a:p>
+            <a:pPr algn="ctr"/>
+            <a:endParaRPr lang="es-AR"/>
+          </a:p>
+        </p:txBody>
+      </p:sp>
+      <p:sp>
+        <p:nvSpPr>
+          <p:cNvPr id="14" name="Right Arrow 13"/>
+          <p:cNvSpPr/>
+          <p:nvPr/>
+        </p:nvSpPr>
+        <p:spPr>
+          <a:xfrm>
+            <a:off x="4777019" y="2249530"/>
+            <a:ext cx="865965" cy="711418"/>
+          </a:xfrm>
+          <a:prstGeom prst="rightArrow">
+            <a:avLst/>
+          </a:prstGeom>
+          <a:gradFill>
+            <a:gsLst>
+              <a:gs pos="0">
+                <a:schemeClr val="accent2">
+                  <a:lumMod val="110000"/>
+                  <a:satMod val="105000"/>
+                  <a:tint val="67000"/>
+                </a:schemeClr>
+              </a:gs>
+              <a:gs pos="100000">
+                <a:schemeClr val="bg2"/>
+              </a:gs>
+            </a:gsLst>
+          </a:gradFill>
+        </p:spPr>
+        <p:style>
+          <a:lnRef idx="1">
+            <a:schemeClr val="accent2"/>
+          </a:lnRef>
+          <a:fillRef idx="2">
+            <a:schemeClr val="accent2"/>
+          </a:fillRef>
+          <a:effectRef idx="1">
+            <a:schemeClr val="accent2"/>
+          </a:effectRef>
+          <a:fontRef idx="minor">
+            <a:schemeClr val="dk1"/>
+          </a:fontRef>
+        </p:style>
+        <p:txBody>
+          <a:bodyPr rtlCol="0" anchor="ctr"/>
+          <a:lstStyle/>
+          <a:p>
+            <a:pPr algn="ctr"/>
+            <a:endParaRPr lang="es-AR"/>
+          </a:p>
+        </p:txBody>
+      </p:sp>
+      <p:sp>
+        <p:nvSpPr>
+          <p:cNvPr id="15" name="TextBox 14"/>
+          <p:cNvSpPr txBox="1"/>
+          <p:nvPr/>
+        </p:nvSpPr>
+        <p:spPr>
+          <a:xfrm>
+            <a:off x="5542671" y="3980461"/>
+            <a:ext cx="2963684" cy="369332"/>
+          </a:xfrm>
+          <a:prstGeom prst="rect">
+            <a:avLst/>
+          </a:prstGeom>
+          <a:noFill/>
+        </p:spPr>
+        <p:txBody>
+          <a:bodyPr wrap="square" rtlCol="0">
+            <a:spAutoFit/>
+          </a:bodyPr>
+          <a:lstStyle/>
+          <a:p>
+            <a:pPr algn="ctr"/>
+            <a:r>
+              <a:rPr lang="es-AR" dirty="0" smtClean="0">
+                <a:latin typeface="Segoe UI" panose="020B0502040204020203" pitchFamily="34" charset="0"/>
+                <a:cs typeface="Segoe UI" panose="020B0502040204020203" pitchFamily="34" charset="0"/>
+              </a:rPr>
+              <a:t>Sistema = cola + canales</a:t>
+            </a:r>
+            <a:endParaRPr lang="es-AR" dirty="0">
+              <a:latin typeface="Segoe UI" panose="020B0502040204020203" pitchFamily="34" charset="0"/>
+              <a:cs typeface="Segoe UI" panose="020B0502040204020203" pitchFamily="34" charset="0"/>
+            </a:endParaRPr>
+          </a:p>
+        </p:txBody>
+      </p:sp>
+      <p:pic>
+        <p:nvPicPr>
+          <p:cNvPr id="16" name="Picture 16"/>
+          <p:cNvPicPr>
+            <a:picLocks noChangeAspect="1"/>
+          </p:cNvPicPr>
+          <p:nvPr/>
+        </p:nvPicPr>
+        <p:blipFill>
+          <a:blip r:embed="rId3" cstate="print">
+            <a:extLst>
+              <a:ext uri="{28A0092B-C50C-407E-A947-70E740481C1C}">
+                <a14:useLocalDpi xmlns:a14="http://schemas.microsoft.com/office/drawing/2010/main" xmlns="" val="0"/>
+              </a:ext>
+            </a:extLst>
+          </a:blip>
+          <a:stretch>
+            <a:fillRect/>
+          </a:stretch>
+        </p:blipFill>
+        <p:spPr>
+          <a:xfrm>
+            <a:off x="8566496" y="2200980"/>
+            <a:ext cx="745199" cy="745199"/>
+          </a:xfrm>
+          <a:prstGeom prst="rect">
+            <a:avLst/>
+          </a:prstGeom>
+        </p:spPr>
+      </p:pic>
+      <p:sp>
+        <p:nvSpPr>
+          <p:cNvPr id="17" name="Rectangle 17"/>
+          <p:cNvSpPr/>
+          <p:nvPr/>
+        </p:nvSpPr>
+        <p:spPr>
+          <a:xfrm>
+            <a:off x="5866227" y="2273399"/>
+            <a:ext cx="2264899" cy="554208"/>
+          </a:xfrm>
+          <a:prstGeom prst="rect">
+            <a:avLst/>
+          </a:prstGeom>
+          <a:ln>
+            <a:solidFill>
+              <a:schemeClr val="tx2"/>
+            </a:solidFill>
+          </a:ln>
+        </p:spPr>
+        <p:style>
+          <a:lnRef idx="2">
+            <a:schemeClr val="accent5"/>
+          </a:lnRef>
+          <a:fillRef idx="1">
+            <a:schemeClr val="lt1"/>
+          </a:fillRef>
+          <a:effectRef idx="0">
+            <a:schemeClr val="accent5"/>
+          </a:effectRef>
+          <a:fontRef idx="minor">
+            <a:schemeClr val="dk1"/>
+          </a:fontRef>
+        </p:style>
+        <p:txBody>
+          <a:bodyPr rtlCol="0" anchor="ctr"/>
+          <a:lstStyle/>
+          <a:p>
+            <a:pPr algn="ctr"/>
+            <a:endParaRPr lang="es-AR"/>
+          </a:p>
+        </p:txBody>
+      </p:sp>
+      <p:sp>
+        <p:nvSpPr>
+          <p:cNvPr id="18" name="TextBox 18"/>
+          <p:cNvSpPr txBox="1"/>
+          <p:nvPr/>
+        </p:nvSpPr>
+        <p:spPr>
+          <a:xfrm>
+            <a:off x="506437" y="239151"/>
+            <a:ext cx="1136658" cy="369332"/>
+          </a:xfrm>
+          <a:prstGeom prst="rect">
+            <a:avLst/>
+          </a:prstGeom>
+          <a:noFill/>
+        </p:spPr>
+        <p:txBody>
+          <a:bodyPr wrap="none" rtlCol="0">
+            <a:spAutoFit/>
+          </a:bodyPr>
+          <a:lstStyle/>
+          <a:p>
+            <a:r>
+              <a:rPr lang="es-AR" dirty="0" smtClean="0"/>
+              <a:t>Ejercicio </a:t>
+            </a:r>
+            <a:r>
+              <a:rPr lang="es-AR" dirty="0" smtClean="0"/>
+              <a:t>8</a:t>
+            </a:r>
+            <a:endParaRPr lang="es-AR" dirty="0"/>
+          </a:p>
+        </p:txBody>
+      </p:sp>
+      <p:sp>
+        <p:nvSpPr>
+          <p:cNvPr id="19" name="Right Arrow 12"/>
+          <p:cNvSpPr/>
+          <p:nvPr/>
+        </p:nvSpPr>
+        <p:spPr>
+          <a:xfrm rot="5400000">
+            <a:off x="9877757" y="3354486"/>
+            <a:ext cx="875484" cy="672781"/>
+          </a:xfrm>
+          <a:prstGeom prst="rightArrow">
+            <a:avLst/>
+          </a:prstGeom>
+        </p:spPr>
+        <p:style>
+          <a:lnRef idx="1">
+            <a:schemeClr val="accent1"/>
+          </a:lnRef>
+          <a:fillRef idx="2">
+            <a:schemeClr val="accent1"/>
+          </a:fillRef>
+          <a:effectRef idx="1">
+            <a:schemeClr val="accent1"/>
+          </a:effectRef>
+          <a:fontRef idx="minor">
+            <a:schemeClr val="dk1"/>
+          </a:fontRef>
+        </p:style>
+        <p:txBody>
+          <a:bodyPr rtlCol="0" anchor="ctr"/>
+          <a:lstStyle/>
+          <a:p>
+            <a:pPr algn="ctr"/>
+            <a:endParaRPr lang="es-AR"/>
+          </a:p>
+        </p:txBody>
+      </p:sp>
+      <p:sp>
+        <p:nvSpPr>
+          <p:cNvPr id="20" name="Right Arrow 12"/>
+          <p:cNvSpPr/>
+          <p:nvPr/>
+        </p:nvSpPr>
+        <p:spPr>
+          <a:xfrm rot="5400000">
+            <a:off x="9883012" y="4452818"/>
+            <a:ext cx="875484" cy="672781"/>
+          </a:xfrm>
+          <a:prstGeom prst="rightArrow">
+            <a:avLst/>
+          </a:prstGeom>
+        </p:spPr>
+        <p:style>
+          <a:lnRef idx="1">
+            <a:schemeClr val="accent1"/>
+          </a:lnRef>
+          <a:fillRef idx="2">
+            <a:schemeClr val="accent1"/>
+          </a:fillRef>
+          <a:effectRef idx="1">
+            <a:schemeClr val="accent1"/>
+          </a:effectRef>
+          <a:fontRef idx="minor">
+            <a:schemeClr val="dk1"/>
+          </a:fontRef>
+        </p:style>
+        <p:txBody>
+          <a:bodyPr rtlCol="0" anchor="ctr"/>
+          <a:lstStyle/>
+          <a:p>
+            <a:pPr algn="ctr"/>
+            <a:endParaRPr lang="es-AR"/>
+          </a:p>
+        </p:txBody>
+      </p:sp>
+      <p:sp>
+        <p:nvSpPr>
+          <p:cNvPr id="21" name="Right Arrow 12"/>
+          <p:cNvSpPr/>
+          <p:nvPr/>
+        </p:nvSpPr>
+        <p:spPr>
+          <a:xfrm rot="10800000">
+            <a:off x="8700598" y="4741850"/>
+            <a:ext cx="875484" cy="672781"/>
+          </a:xfrm>
+          <a:prstGeom prst="rightArrow">
+            <a:avLst/>
+          </a:prstGeom>
+        </p:spPr>
+        <p:style>
+          <a:lnRef idx="1">
+            <a:schemeClr val="accent1"/>
+          </a:lnRef>
+          <a:fillRef idx="2">
+            <a:schemeClr val="accent1"/>
+          </a:fillRef>
+          <a:effectRef idx="1">
+            <a:schemeClr val="accent1"/>
+          </a:effectRef>
+          <a:fontRef idx="minor">
+            <a:schemeClr val="dk1"/>
+          </a:fontRef>
+        </p:style>
+        <p:txBody>
+          <a:bodyPr rtlCol="0" anchor="ctr"/>
+          <a:lstStyle/>
+          <a:p>
+            <a:pPr algn="ctr"/>
+            <a:endParaRPr lang="es-AR"/>
+          </a:p>
+        </p:txBody>
+      </p:sp>
+      <p:sp>
+        <p:nvSpPr>
+          <p:cNvPr id="22" name="Right Arrow 12"/>
+          <p:cNvSpPr/>
+          <p:nvPr/>
+        </p:nvSpPr>
+        <p:spPr>
+          <a:xfrm rot="10800000">
+            <a:off x="5268970" y="4778635"/>
+            <a:ext cx="875484" cy="672781"/>
+          </a:xfrm>
+          <a:prstGeom prst="rightArrow">
+            <a:avLst/>
+          </a:prstGeom>
+        </p:spPr>
+        <p:style>
+          <a:lnRef idx="1">
+            <a:schemeClr val="accent1"/>
+          </a:lnRef>
+          <a:fillRef idx="2">
+            <a:schemeClr val="accent1"/>
+          </a:fillRef>
+          <a:effectRef idx="1">
+            <a:schemeClr val="accent1"/>
+          </a:effectRef>
+          <a:fontRef idx="minor">
+            <a:schemeClr val="dk1"/>
+          </a:fontRef>
+        </p:style>
+        <p:txBody>
+          <a:bodyPr rtlCol="0" anchor="ctr"/>
+          <a:lstStyle/>
+          <a:p>
+            <a:pPr algn="ctr"/>
+            <a:endParaRPr lang="es-AR"/>
+          </a:p>
+        </p:txBody>
+      </p:sp>
+      <p:sp>
+        <p:nvSpPr>
+          <p:cNvPr id="23" name="Right Arrow 12"/>
+          <p:cNvSpPr/>
+          <p:nvPr/>
+        </p:nvSpPr>
+        <p:spPr>
+          <a:xfrm rot="10800000">
+            <a:off x="7628543" y="4762871"/>
+            <a:ext cx="875484" cy="672781"/>
+          </a:xfrm>
+          <a:prstGeom prst="rightArrow">
+            <a:avLst/>
+          </a:prstGeom>
+        </p:spPr>
+        <p:style>
+          <a:lnRef idx="1">
+            <a:schemeClr val="accent1"/>
+          </a:lnRef>
+          <a:fillRef idx="2">
+            <a:schemeClr val="accent1"/>
+          </a:fillRef>
+          <a:effectRef idx="1">
+            <a:schemeClr val="accent1"/>
+          </a:effectRef>
+          <a:fontRef idx="minor">
+            <a:schemeClr val="dk1"/>
+          </a:fontRef>
+        </p:style>
+        <p:txBody>
+          <a:bodyPr rtlCol="0" anchor="ctr"/>
+          <a:lstStyle/>
+          <a:p>
+            <a:pPr algn="ctr"/>
+            <a:endParaRPr lang="es-AR"/>
+          </a:p>
+        </p:txBody>
+      </p:sp>
+      <p:sp>
+        <p:nvSpPr>
+          <p:cNvPr id="24" name="Right Arrow 12"/>
+          <p:cNvSpPr/>
+          <p:nvPr/>
+        </p:nvSpPr>
+        <p:spPr>
+          <a:xfrm rot="10800000">
+            <a:off x="6383067" y="4757616"/>
+            <a:ext cx="875484" cy="672781"/>
+          </a:xfrm>
+          <a:prstGeom prst="rightArrow">
+            <a:avLst/>
+          </a:prstGeom>
+        </p:spPr>
+        <p:style>
+          <a:lnRef idx="1">
+            <a:schemeClr val="accent1"/>
+          </a:lnRef>
+          <a:fillRef idx="2">
+            <a:schemeClr val="accent1"/>
+          </a:fillRef>
+          <a:effectRef idx="1">
+            <a:schemeClr val="accent1"/>
+          </a:effectRef>
+          <a:fontRef idx="minor">
+            <a:schemeClr val="dk1"/>
+          </a:fontRef>
+        </p:style>
+        <p:txBody>
+          <a:bodyPr rtlCol="0" anchor="ctr"/>
+          <a:lstStyle/>
+          <a:p>
+            <a:pPr algn="ctr"/>
+            <a:endParaRPr lang="es-AR"/>
+          </a:p>
+        </p:txBody>
+      </p:sp>
+      <p:sp>
+        <p:nvSpPr>
+          <p:cNvPr id="25" name="Right Arrow 12"/>
+          <p:cNvSpPr/>
+          <p:nvPr/>
+        </p:nvSpPr>
+        <p:spPr>
+          <a:xfrm rot="10800000">
+            <a:off x="4286251" y="4773381"/>
+            <a:ext cx="875484" cy="672781"/>
+          </a:xfrm>
+          <a:prstGeom prst="rightArrow">
+            <a:avLst/>
+          </a:prstGeom>
+        </p:spPr>
+        <p:style>
+          <a:lnRef idx="1">
+            <a:schemeClr val="accent1"/>
+          </a:lnRef>
+          <a:fillRef idx="2">
+            <a:schemeClr val="accent1"/>
+          </a:fillRef>
+          <a:effectRef idx="1">
+            <a:schemeClr val="accent1"/>
+          </a:effectRef>
+          <a:fontRef idx="minor">
+            <a:schemeClr val="dk1"/>
+          </a:fontRef>
+        </p:style>
+        <p:txBody>
+          <a:bodyPr rtlCol="0" anchor="ctr"/>
+          <a:lstStyle/>
+          <a:p>
+            <a:pPr algn="ctr"/>
+            <a:endParaRPr lang="es-AR"/>
+          </a:p>
+        </p:txBody>
+      </p:sp>
+      <p:sp>
+        <p:nvSpPr>
+          <p:cNvPr id="26" name="Right Arrow 12"/>
+          <p:cNvSpPr/>
+          <p:nvPr/>
+        </p:nvSpPr>
+        <p:spPr>
+          <a:xfrm rot="16200000">
+            <a:off x="3366599" y="4589451"/>
+            <a:ext cx="875484" cy="672781"/>
+          </a:xfrm>
+          <a:prstGeom prst="rightArrow">
+            <a:avLst/>
+          </a:prstGeom>
+        </p:spPr>
+        <p:style>
+          <a:lnRef idx="1">
+            <a:schemeClr val="accent1"/>
+          </a:lnRef>
+          <a:fillRef idx="2">
+            <a:schemeClr val="accent1"/>
+          </a:fillRef>
+          <a:effectRef idx="1">
+            <a:schemeClr val="accent1"/>
+          </a:effectRef>
+          <a:fontRef idx="minor">
+            <a:schemeClr val="dk1"/>
+          </a:fontRef>
+        </p:style>
+        <p:txBody>
+          <a:bodyPr rtlCol="0" anchor="ctr"/>
+          <a:lstStyle/>
+          <a:p>
+            <a:pPr algn="ctr"/>
+            <a:endParaRPr lang="es-AR"/>
+          </a:p>
+        </p:txBody>
+      </p:sp>
+      <p:sp>
+        <p:nvSpPr>
+          <p:cNvPr id="30" name="TextBox 35"/>
+          <p:cNvSpPr txBox="1">
+            <a:spLocks noRot="1" noChangeAspect="1" noMove="1" noResize="1" noEditPoints="1" noAdjustHandles="1" noChangeArrowheads="1" noChangeShapeType="1" noTextEdit="1"/>
+          </p:cNvSpPr>
+          <p:nvPr/>
+        </p:nvSpPr>
+        <p:spPr>
+          <a:xfrm>
+            <a:off x="10075362" y="1656372"/>
+            <a:ext cx="185755" cy="276999"/>
+          </a:xfrm>
+          <a:prstGeom prst="rect">
+            <a:avLst/>
+          </a:prstGeom>
+          <a:blipFill rotWithShape="0">
+            <a:blip r:embed="rId4" cstate="print"/>
+            <a:stretch>
+              <a:fillRect l="-33333" r="-93333" b="-22222"/>
+            </a:stretch>
+          </a:blipFill>
+        </p:spPr>
+        <p:txBody>
+          <a:bodyPr/>
+          <a:lstStyle/>
+          <a:p>
+            <a:r>
+              <a:rPr lang="es-AR">
+                <a:noFill/>
+              </a:rPr>
+              <a:t> </a:t>
+            </a:r>
+          </a:p>
+        </p:txBody>
+      </p:sp>
+      <p:sp>
+        <p:nvSpPr>
+          <p:cNvPr id="31" name="Right Arrow 12"/>
+          <p:cNvSpPr/>
+          <p:nvPr/>
+        </p:nvSpPr>
+        <p:spPr>
+          <a:xfrm rot="16200000">
+            <a:off x="3371855" y="3480609"/>
+            <a:ext cx="875484" cy="672781"/>
+          </a:xfrm>
+          <a:prstGeom prst="rightArrow">
+            <a:avLst/>
+          </a:prstGeom>
+        </p:spPr>
+        <p:style>
+          <a:lnRef idx="1">
+            <a:schemeClr val="accent1"/>
+          </a:lnRef>
+          <a:fillRef idx="2">
+            <a:schemeClr val="accent1"/>
+          </a:fillRef>
+          <a:effectRef idx="1">
+            <a:schemeClr val="accent1"/>
+          </a:effectRef>
+          <a:fontRef idx="minor">
+            <a:schemeClr val="dk1"/>
+          </a:fontRef>
+        </p:style>
+        <p:txBody>
+          <a:bodyPr rtlCol="0" anchor="ctr"/>
+          <a:lstStyle/>
+          <a:p>
+            <a:pPr algn="ctr"/>
+            <a:endParaRPr lang="es-AR"/>
+          </a:p>
+        </p:txBody>
+      </p:sp>
+      <p:sp>
+        <p:nvSpPr>
+          <p:cNvPr id="1026" name="Rectangle 2"/>
+          <p:cNvSpPr>
+            <a:spLocks noChangeArrowheads="1"/>
+          </p:cNvSpPr>
+          <p:nvPr/>
+        </p:nvSpPr>
+        <p:spPr bwMode="auto">
+          <a:xfrm>
+            <a:off x="0" y="0"/>
+            <a:ext cx="12192000" cy="0"/>
+          </a:xfrm>
+          <a:prstGeom prst="rect">
+            <a:avLst/>
+          </a:prstGeom>
+          <a:noFill/>
+          <a:ln w="9525">
+            <a:noFill/>
+            <a:miter lim="800000"/>
+            <a:headEnd/>
+            <a:tailEnd/>
+          </a:ln>
+          <a:effectLst/>
+        </p:spPr>
+        <p:txBody>
+          <a:bodyPr vert="horz" wrap="none" lIns="91440" tIns="45720" rIns="91440" bIns="45720" numCol="1" anchor="ctr" anchorCtr="0" compatLnSpc="1">
+            <a:prstTxWarp prst="textNoShape">
+              <a:avLst/>
+            </a:prstTxWarp>
+            <a:spAutoFit/>
+          </a:bodyPr>
+          <a:lstStyle/>
+          <a:p>
+            <a:endParaRPr lang="es-AR"/>
+          </a:p>
+        </p:txBody>
+      </p:sp>
+      <p:pic>
+        <p:nvPicPr>
+          <p:cNvPr id="1025" name="Picture 1"/>
+          <p:cNvPicPr>
+            <a:picLocks noChangeAspect="1" noChangeArrowheads="1"/>
+          </p:cNvPicPr>
+          <p:nvPr/>
+        </p:nvPicPr>
+        <p:blipFill>
+          <a:blip r:embed="rId5" cstate="print">
+            <a:clrChange>
+              <a:clrFrom>
+                <a:srgbClr val="FFFFFF"/>
+              </a:clrFrom>
+              <a:clrTo>
+                <a:srgbClr val="FFFFFF">
+                  <a:alpha val="0"/>
+                </a:srgbClr>
+              </a:clrTo>
+            </a:clrChange>
+          </a:blip>
+          <a:srcRect/>
+          <a:stretch>
+            <a:fillRect/>
+          </a:stretch>
+        </p:blipFill>
+        <p:spPr bwMode="auto">
+          <a:xfrm>
+            <a:off x="4971394" y="1818289"/>
+            <a:ext cx="189185" cy="256751"/>
+          </a:xfrm>
+          <a:prstGeom prst="rect">
+            <a:avLst/>
+          </a:prstGeom>
+          <a:noFill/>
+        </p:spPr>
+      </p:pic>
+      <p:sp>
+        <p:nvSpPr>
+          <p:cNvPr id="1028" name="Rectangle 4"/>
+          <p:cNvSpPr>
+            <a:spLocks noChangeArrowheads="1"/>
+          </p:cNvSpPr>
+          <p:nvPr/>
+        </p:nvSpPr>
+        <p:spPr bwMode="auto">
+          <a:xfrm>
+            <a:off x="0" y="0"/>
+            <a:ext cx="12192000" cy="0"/>
+          </a:xfrm>
+          <a:prstGeom prst="rect">
+            <a:avLst/>
+          </a:prstGeom>
+          <a:noFill/>
+          <a:ln w="9525">
+            <a:noFill/>
+            <a:miter lim="800000"/>
+            <a:headEnd/>
+            <a:tailEnd/>
+          </a:ln>
+          <a:effectLst/>
+        </p:spPr>
+        <p:txBody>
+          <a:bodyPr vert="horz" wrap="none" lIns="91440" tIns="45720" rIns="91440" bIns="45720" numCol="1" anchor="ctr" anchorCtr="0" compatLnSpc="1">
+            <a:prstTxWarp prst="textNoShape">
+              <a:avLst/>
+            </a:prstTxWarp>
+            <a:spAutoFit/>
+          </a:bodyPr>
+          <a:lstStyle/>
+          <a:p>
+            <a:endParaRPr lang="es-AR"/>
+          </a:p>
+        </p:txBody>
+      </p:sp>
+      <p:sp>
+        <p:nvSpPr>
+          <p:cNvPr id="1030" name="Rectangle 6"/>
+          <p:cNvSpPr>
+            <a:spLocks noChangeArrowheads="1"/>
+          </p:cNvSpPr>
+          <p:nvPr/>
+        </p:nvSpPr>
+        <p:spPr bwMode="auto">
+          <a:xfrm>
+            <a:off x="0" y="0"/>
+            <a:ext cx="12192000" cy="0"/>
+          </a:xfrm>
+          <a:prstGeom prst="rect">
+            <a:avLst/>
+          </a:prstGeom>
+          <a:noFill/>
+          <a:ln w="9525">
+            <a:noFill/>
+            <a:miter lim="800000"/>
+            <a:headEnd/>
+            <a:tailEnd/>
+          </a:ln>
+          <a:effectLst/>
+        </p:spPr>
+        <p:txBody>
+          <a:bodyPr vert="horz" wrap="none" lIns="91440" tIns="45720" rIns="91440" bIns="45720" numCol="1" anchor="ctr" anchorCtr="0" compatLnSpc="1">
+            <a:prstTxWarp prst="textNoShape">
+              <a:avLst/>
+            </a:prstTxWarp>
+            <a:spAutoFit/>
+          </a:bodyPr>
+          <a:lstStyle/>
+          <a:p>
+            <a:endParaRPr lang="es-AR"/>
+          </a:p>
+        </p:txBody>
+      </p:sp>
+      <p:pic>
+        <p:nvPicPr>
+          <p:cNvPr id="1029" name="Picture 5"/>
+          <p:cNvPicPr>
+            <a:picLocks noChangeAspect="1" noChangeArrowheads="1"/>
+          </p:cNvPicPr>
+          <p:nvPr/>
+        </p:nvPicPr>
+        <p:blipFill>
+          <a:blip r:embed="rId6" cstate="print">
+            <a:clrChange>
+              <a:clrFrom>
+                <a:srgbClr val="FFFFFF"/>
+              </a:clrFrom>
+              <a:clrTo>
+                <a:srgbClr val="FFFFFF">
+                  <a:alpha val="0"/>
+                </a:srgbClr>
+              </a:clrTo>
+            </a:clrChange>
+          </a:blip>
+          <a:srcRect/>
+          <a:stretch>
+            <a:fillRect/>
+          </a:stretch>
+        </p:blipFill>
+        <p:spPr bwMode="auto">
+          <a:xfrm>
+            <a:off x="3394843" y="1692166"/>
+            <a:ext cx="1006173" cy="525517"/>
+          </a:xfrm>
+          <a:prstGeom prst="rect">
+            <a:avLst/>
+          </a:prstGeom>
+          <a:noFill/>
+        </p:spPr>
+      </p:pic>
+      <p:sp>
+        <p:nvSpPr>
+          <p:cNvPr id="1032" name="Rectangle 8"/>
+          <p:cNvSpPr>
+            <a:spLocks noChangeArrowheads="1"/>
+          </p:cNvSpPr>
+          <p:nvPr/>
+        </p:nvSpPr>
+        <p:spPr bwMode="auto">
+          <a:xfrm>
+            <a:off x="0" y="0"/>
+            <a:ext cx="12192000" cy="0"/>
+          </a:xfrm>
+          <a:prstGeom prst="rect">
+            <a:avLst/>
+          </a:prstGeom>
+          <a:noFill/>
+          <a:ln w="9525">
+            <a:noFill/>
+            <a:miter lim="800000"/>
+            <a:headEnd/>
+            <a:tailEnd/>
+          </a:ln>
+          <a:effectLst/>
+        </p:spPr>
+        <p:txBody>
+          <a:bodyPr vert="horz" wrap="none" lIns="91440" tIns="45720" rIns="91440" bIns="45720" numCol="1" anchor="ctr" anchorCtr="0" compatLnSpc="1">
+            <a:prstTxWarp prst="textNoShape">
+              <a:avLst/>
+            </a:prstTxWarp>
+            <a:spAutoFit/>
+          </a:bodyPr>
+          <a:lstStyle/>
+          <a:p>
+            <a:endParaRPr lang="es-AR"/>
+          </a:p>
+        </p:txBody>
+      </p:sp>
+      <p:pic>
+        <p:nvPicPr>
+          <p:cNvPr id="1031" name="Picture 7"/>
+          <p:cNvPicPr>
+            <a:picLocks noChangeAspect="1" noChangeArrowheads="1"/>
+          </p:cNvPicPr>
+          <p:nvPr/>
+        </p:nvPicPr>
+        <p:blipFill>
+          <a:blip r:embed="rId7" cstate="print">
+            <a:clrChange>
+              <a:clrFrom>
+                <a:srgbClr val="FFFFFF"/>
+              </a:clrFrom>
+              <a:clrTo>
+                <a:srgbClr val="FFFFFF">
+                  <a:alpha val="0"/>
+                </a:srgbClr>
+              </a:clrTo>
+            </a:clrChange>
+          </a:blip>
+          <a:srcRect/>
+          <a:stretch>
+            <a:fillRect/>
+          </a:stretch>
+        </p:blipFill>
+        <p:spPr bwMode="auto">
+          <a:xfrm>
+            <a:off x="8278347" y="1618593"/>
+            <a:ext cx="1111661" cy="515007"/>
+          </a:xfrm>
+          <a:prstGeom prst="rect">
+            <a:avLst/>
+          </a:prstGeom>
+          <a:noFill/>
+        </p:spPr>
+      </p:pic>
+      <p:sp>
+        <p:nvSpPr>
+          <p:cNvPr id="1034" name="Rectangle 10"/>
+          <p:cNvSpPr>
+            <a:spLocks noChangeArrowheads="1"/>
+          </p:cNvSpPr>
+          <p:nvPr/>
+        </p:nvSpPr>
+        <p:spPr bwMode="auto">
+          <a:xfrm>
+            <a:off x="0" y="0"/>
+            <a:ext cx="12192000" cy="0"/>
+          </a:xfrm>
+          <a:prstGeom prst="rect">
+            <a:avLst/>
+          </a:prstGeom>
+          <a:noFill/>
+          <a:ln w="9525">
+            <a:noFill/>
+            <a:miter lim="800000"/>
+            <a:headEnd/>
+            <a:tailEnd/>
+          </a:ln>
+          <a:effectLst/>
+        </p:spPr>
+        <p:txBody>
+          <a:bodyPr vert="horz" wrap="none" lIns="91440" tIns="45720" rIns="91440" bIns="45720" numCol="1" anchor="ctr" anchorCtr="0" compatLnSpc="1">
+            <a:prstTxWarp prst="textNoShape">
+              <a:avLst/>
+            </a:prstTxWarp>
+            <a:spAutoFit/>
+          </a:bodyPr>
+          <a:lstStyle/>
+          <a:p>
+            <a:endParaRPr lang="es-AR"/>
+          </a:p>
+        </p:txBody>
+      </p:sp>
+      <p:pic>
+        <p:nvPicPr>
+          <p:cNvPr id="1033" name="Picture 9"/>
+          <p:cNvPicPr>
+            <a:picLocks noChangeAspect="1" noChangeArrowheads="1"/>
+          </p:cNvPicPr>
+          <p:nvPr/>
+        </p:nvPicPr>
+        <p:blipFill>
+          <a:blip r:embed="rId8" cstate="print">
+            <a:clrChange>
+              <a:clrFrom>
+                <a:srgbClr val="FFFFFF"/>
+              </a:clrFrom>
+              <a:clrTo>
+                <a:srgbClr val="FFFFFF">
+                  <a:alpha val="0"/>
+                </a:srgbClr>
+              </a:clrTo>
+            </a:clrChange>
+          </a:blip>
+          <a:srcRect/>
+          <a:stretch>
+            <a:fillRect/>
+          </a:stretch>
+        </p:blipFill>
+        <p:spPr bwMode="auto">
+          <a:xfrm>
+            <a:off x="6726621" y="5654565"/>
+            <a:ext cx="657225" cy="419100"/>
+          </a:xfrm>
+          <a:prstGeom prst="rect">
+            <a:avLst/>
+          </a:prstGeom>
+          <a:noFill/>
+        </p:spPr>
+      </p:pic>
+    </p:spTree>
+  </p:cSld>
+  <p:clrMapOvr>
+    <a:masterClrMapping/>
+  </p:clrMapOvr>
 </p:sld>
 </file>
 
@@ -10935,7 +12232,7 @@
   <a:extraClrSchemeLst/>
   <a:extLst>
     <a:ext uri="{05A4C25C-085E-4340-85A3-A5531E510DB2}">
-      <thm15:themeFamily xmlns:thm15="http://schemas.microsoft.com/office/thememl/2012/main" name="Office Theme" id="{62F939B6-93AF-4DB8-9C6B-D6C7DFDC589F}" vid="{4A3C46E8-61CC-4603-A589-7422A47A8E4A}"/>
+      <thm15:themeFamily xmlns:thm15="http://schemas.microsoft.com/office/thememl/2012/main" xmlns="" name="Office Theme" id="{62F939B6-93AF-4DB8-9C6B-D6C7DFDC589F}" vid="{4A3C46E8-61CC-4603-A589-7422A47A8E4A}"/>
     </a:ext>
   </a:extLst>
 </a:theme>

</xml_diff>

<commit_message>
Subo pdf final. Imágenes para ejercicios 9 y 10. Agrego enunciado ejercicio 9 y 10.
</commit_message>
<xml_diff>
--- a/tp1-colas/Imagenes.pptx
+++ b/tp1-colas/Imagenes.pptx
@@ -14,6 +14,8 @@
     <p:sldId id="262" r:id="rId8"/>
     <p:sldId id="264" r:id="rId9"/>
     <p:sldId id="263" r:id="rId10"/>
+    <p:sldId id="265" r:id="rId11"/>
+    <p:sldId id="266" r:id="rId12"/>
   </p:sldIdLst>
   <p:sldSz cx="12192000" cy="6858000"/>
   <p:notesSz cx="6858000" cy="9144000"/>
@@ -114,7 +116,7 @@
   </p:defaultTextStyle>
   <p:extLst>
     <p:ext uri="{EFAFB233-063F-42B5-8137-9DF3F51BA10A}">
-      <p15:sldGuideLst xmlns="" xmlns:p15="http://schemas.microsoft.com/office/powerpoint/2012/main">
+      <p15:sldGuideLst xmlns:p15="http://schemas.microsoft.com/office/powerpoint/2012/main" xmlns="">
         <p15:guide id="1" orient="horz" pos="2160">
           <p15:clr>
             <a:srgbClr val="A4A3A4"/>
@@ -315,7 +317,7 @@
     </p:spTree>
     <p:extLst>
       <p:ext uri="{BB962C8B-B14F-4D97-AF65-F5344CB8AC3E}">
-        <p14:creationId xmlns:p14="http://schemas.microsoft.com/office/powerpoint/2010/main" val="1478221447"/>
+        <p14:creationId xmlns:p14="http://schemas.microsoft.com/office/powerpoint/2010/main" xmlns="" val="1478221447"/>
       </p:ext>
     </p:extLst>
   </p:cSld>
@@ -487,7 +489,7 @@
     </p:spTree>
     <p:extLst>
       <p:ext uri="{BB962C8B-B14F-4D97-AF65-F5344CB8AC3E}">
-        <p14:creationId xmlns:p14="http://schemas.microsoft.com/office/powerpoint/2010/main" val="787665529"/>
+        <p14:creationId xmlns:p14="http://schemas.microsoft.com/office/powerpoint/2010/main" xmlns="" val="787665529"/>
       </p:ext>
     </p:extLst>
   </p:cSld>
@@ -669,7 +671,7 @@
     </p:spTree>
     <p:extLst>
       <p:ext uri="{BB962C8B-B14F-4D97-AF65-F5344CB8AC3E}">
-        <p14:creationId xmlns:p14="http://schemas.microsoft.com/office/powerpoint/2010/main" val="3550571343"/>
+        <p14:creationId xmlns:p14="http://schemas.microsoft.com/office/powerpoint/2010/main" xmlns="" val="3550571343"/>
       </p:ext>
     </p:extLst>
   </p:cSld>
@@ -841,7 +843,7 @@
     </p:spTree>
     <p:extLst>
       <p:ext uri="{BB962C8B-B14F-4D97-AF65-F5344CB8AC3E}">
-        <p14:creationId xmlns:p14="http://schemas.microsoft.com/office/powerpoint/2010/main" val="1090226818"/>
+        <p14:creationId xmlns:p14="http://schemas.microsoft.com/office/powerpoint/2010/main" xmlns="" val="1090226818"/>
       </p:ext>
     </p:extLst>
   </p:cSld>
@@ -1089,7 +1091,7 @@
     </p:spTree>
     <p:extLst>
       <p:ext uri="{BB962C8B-B14F-4D97-AF65-F5344CB8AC3E}">
-        <p14:creationId xmlns:p14="http://schemas.microsoft.com/office/powerpoint/2010/main" val="1797381584"/>
+        <p14:creationId xmlns:p14="http://schemas.microsoft.com/office/powerpoint/2010/main" xmlns="" val="1797381584"/>
       </p:ext>
     </p:extLst>
   </p:cSld>
@@ -1323,7 +1325,7 @@
     </p:spTree>
     <p:extLst>
       <p:ext uri="{BB962C8B-B14F-4D97-AF65-F5344CB8AC3E}">
-        <p14:creationId xmlns:p14="http://schemas.microsoft.com/office/powerpoint/2010/main" val="141320725"/>
+        <p14:creationId xmlns:p14="http://schemas.microsoft.com/office/powerpoint/2010/main" xmlns="" val="141320725"/>
       </p:ext>
     </p:extLst>
   </p:cSld>
@@ -1692,7 +1694,7 @@
     </p:spTree>
     <p:extLst>
       <p:ext uri="{BB962C8B-B14F-4D97-AF65-F5344CB8AC3E}">
-        <p14:creationId xmlns:p14="http://schemas.microsoft.com/office/powerpoint/2010/main" val="898217691"/>
+        <p14:creationId xmlns:p14="http://schemas.microsoft.com/office/powerpoint/2010/main" xmlns="" val="898217691"/>
       </p:ext>
     </p:extLst>
   </p:cSld>
@@ -1812,7 +1814,7 @@
     </p:spTree>
     <p:extLst>
       <p:ext uri="{BB962C8B-B14F-4D97-AF65-F5344CB8AC3E}">
-        <p14:creationId xmlns:p14="http://schemas.microsoft.com/office/powerpoint/2010/main" val="1734197303"/>
+        <p14:creationId xmlns:p14="http://schemas.microsoft.com/office/powerpoint/2010/main" xmlns="" val="1734197303"/>
       </p:ext>
     </p:extLst>
   </p:cSld>
@@ -1909,7 +1911,7 @@
     </p:spTree>
     <p:extLst>
       <p:ext uri="{BB962C8B-B14F-4D97-AF65-F5344CB8AC3E}">
-        <p14:creationId xmlns:p14="http://schemas.microsoft.com/office/powerpoint/2010/main" val="2733380732"/>
+        <p14:creationId xmlns:p14="http://schemas.microsoft.com/office/powerpoint/2010/main" xmlns="" val="2733380732"/>
       </p:ext>
     </p:extLst>
   </p:cSld>
@@ -2188,7 +2190,7 @@
     </p:spTree>
     <p:extLst>
       <p:ext uri="{BB962C8B-B14F-4D97-AF65-F5344CB8AC3E}">
-        <p14:creationId xmlns:p14="http://schemas.microsoft.com/office/powerpoint/2010/main" val="201515298"/>
+        <p14:creationId xmlns:p14="http://schemas.microsoft.com/office/powerpoint/2010/main" xmlns="" val="201515298"/>
       </p:ext>
     </p:extLst>
   </p:cSld>
@@ -2443,7 +2445,7 @@
     </p:spTree>
     <p:extLst>
       <p:ext uri="{BB962C8B-B14F-4D97-AF65-F5344CB8AC3E}">
-        <p14:creationId xmlns:p14="http://schemas.microsoft.com/office/powerpoint/2010/main" val="976262354"/>
+        <p14:creationId xmlns:p14="http://schemas.microsoft.com/office/powerpoint/2010/main" xmlns="" val="976262354"/>
       </p:ext>
     </p:extLst>
   </p:cSld>
@@ -2694,7 +2696,7 @@
     </p:spTree>
     <p:extLst>
       <p:ext uri="{BB962C8B-B14F-4D97-AF65-F5344CB8AC3E}">
-        <p14:creationId xmlns:p14="http://schemas.microsoft.com/office/powerpoint/2010/main" val="2905328256"/>
+        <p14:creationId xmlns:p14="http://schemas.microsoft.com/office/powerpoint/2010/main" xmlns="" val="2905328256"/>
       </p:ext>
     </p:extLst>
   </p:cSld>
@@ -3074,7 +3076,7 @@
           <a:blip r:embed="rId2" cstate="print">
             <a:extLst>
               <a:ext uri="{28A0092B-C50C-407E-A947-70E740481C1C}">
-                <a14:useLocalDpi xmlns:a14="http://schemas.microsoft.com/office/drawing/2010/main" val="0"/>
+                <a14:useLocalDpi xmlns:a14="http://schemas.microsoft.com/office/drawing/2010/main" xmlns="" val="0"/>
               </a:ext>
             </a:extLst>
           </a:blip>
@@ -3104,7 +3106,7 @@
           <a:blip r:embed="rId2" cstate="print">
             <a:extLst>
               <a:ext uri="{28A0092B-C50C-407E-A947-70E740481C1C}">
-                <a14:useLocalDpi xmlns:a14="http://schemas.microsoft.com/office/drawing/2010/main" val="0"/>
+                <a14:useLocalDpi xmlns:a14="http://schemas.microsoft.com/office/drawing/2010/main" xmlns="" val="0"/>
               </a:ext>
             </a:extLst>
           </a:blip>
@@ -3134,7 +3136,7 @@
           <a:blip r:embed="rId2" cstate="print">
             <a:extLst>
               <a:ext uri="{28A0092B-C50C-407E-A947-70E740481C1C}">
-                <a14:useLocalDpi xmlns:a14="http://schemas.microsoft.com/office/drawing/2010/main" val="0"/>
+                <a14:useLocalDpi xmlns:a14="http://schemas.microsoft.com/office/drawing/2010/main" xmlns="" val="0"/>
               </a:ext>
             </a:extLst>
           </a:blip>
@@ -3164,7 +3166,7 @@
           <a:blip r:embed="rId2" cstate="print">
             <a:extLst>
               <a:ext uri="{28A0092B-C50C-407E-A947-70E740481C1C}">
-                <a14:useLocalDpi xmlns:a14="http://schemas.microsoft.com/office/drawing/2010/main" val="0"/>
+                <a14:useLocalDpi xmlns:a14="http://schemas.microsoft.com/office/drawing/2010/main" xmlns="" val="0"/>
               </a:ext>
             </a:extLst>
           </a:blip>
@@ -3194,7 +3196,7 @@
           <a:blip r:embed="rId2" cstate="print">
             <a:extLst>
               <a:ext uri="{28A0092B-C50C-407E-A947-70E740481C1C}">
-                <a14:useLocalDpi xmlns:a14="http://schemas.microsoft.com/office/drawing/2010/main" val="0"/>
+                <a14:useLocalDpi xmlns:a14="http://schemas.microsoft.com/office/drawing/2010/main" xmlns="" val="0"/>
               </a:ext>
             </a:extLst>
           </a:blip>
@@ -3476,7 +3478,7 @@
           <a:blip r:embed="rId3" cstate="print">
             <a:extLst>
               <a:ext uri="{28A0092B-C50C-407E-A947-70E740481C1C}">
-                <a14:useLocalDpi xmlns:a14="http://schemas.microsoft.com/office/drawing/2010/main" val="0"/>
+                <a14:useLocalDpi xmlns:a14="http://schemas.microsoft.com/office/drawing/2010/main" xmlns="" val="0"/>
               </a:ext>
             </a:extLst>
           </a:blip>
@@ -3567,8 +3569,8 @@
           </a:p>
         </p:txBody>
       </p:sp>
-      <mc:AlternateContent xmlns:mc="http://schemas.openxmlformats.org/markup-compatibility/2006" xmlns:a14="http://schemas.microsoft.com/office/drawing/2010/main">
-        <mc:Choice Requires="a14">
+      <mc:AlternateContent xmlns:mc="http://schemas.openxmlformats.org/markup-compatibility/2006">
+        <mc:Choice xmlns:a14="http://schemas.microsoft.com/office/drawing/2010/main" xmlns="" Requires="a14">
           <p:sp>
             <p:nvSpPr>
               <p:cNvPr id="21" name="TextBox 20"/>
@@ -3612,7 +3614,7 @@
             </p:txBody>
           </p:sp>
         </mc:Choice>
-        <mc:Fallback xmlns="">
+        <mc:Fallback>
           <p:sp>
             <p:nvSpPr>
               <p:cNvPr id="21" name="TextBox 20"/>
@@ -3651,8 +3653,8 @@
           </p:sp>
         </mc:Fallback>
       </mc:AlternateContent>
-      <mc:AlternateContent xmlns:mc="http://schemas.openxmlformats.org/markup-compatibility/2006" xmlns:a14="http://schemas.microsoft.com/office/drawing/2010/main">
-        <mc:Choice Requires="a14">
+      <mc:AlternateContent xmlns:mc="http://schemas.openxmlformats.org/markup-compatibility/2006">
+        <mc:Choice xmlns:a14="http://schemas.microsoft.com/office/drawing/2010/main" xmlns="" Requires="a14">
           <p:sp>
             <p:nvSpPr>
               <p:cNvPr id="22" name="TextBox 21"/>
@@ -3708,7 +3710,7 @@
             </p:txBody>
           </p:sp>
         </mc:Choice>
-        <mc:Fallback xmlns="">
+        <mc:Fallback>
           <p:sp>
             <p:nvSpPr>
               <p:cNvPr id="22" name="TextBox 21"/>
@@ -3747,8 +3749,8 @@
           </p:sp>
         </mc:Fallback>
       </mc:AlternateContent>
-      <mc:AlternateContent xmlns:mc="http://schemas.openxmlformats.org/markup-compatibility/2006" xmlns:a14="http://schemas.microsoft.com/office/drawing/2010/main">
-        <mc:Choice Requires="a14">
+      <mc:AlternateContent xmlns:mc="http://schemas.openxmlformats.org/markup-compatibility/2006">
+        <mc:Choice xmlns:a14="http://schemas.microsoft.com/office/drawing/2010/main" xmlns="" Requires="a14">
           <p:sp>
             <p:nvSpPr>
               <p:cNvPr id="23" name="TextBox 22"/>
@@ -3792,7 +3794,7 @@
             </p:txBody>
           </p:sp>
         </mc:Choice>
-        <mc:Fallback xmlns="">
+        <mc:Fallback>
           <p:sp>
             <p:nvSpPr>
               <p:cNvPr id="23" name="TextBox 22"/>
@@ -3831,8 +3833,8 @@
           </p:sp>
         </mc:Fallback>
       </mc:AlternateContent>
-      <mc:AlternateContent xmlns:mc="http://schemas.openxmlformats.org/markup-compatibility/2006" xmlns:a14="http://schemas.microsoft.com/office/drawing/2010/main">
-        <mc:Choice Requires="a14">
+      <mc:AlternateContent xmlns:mc="http://schemas.openxmlformats.org/markup-compatibility/2006">
+        <mc:Choice xmlns:a14="http://schemas.microsoft.com/office/drawing/2010/main" xmlns="" Requires="a14">
           <p:sp>
             <p:nvSpPr>
               <p:cNvPr id="24" name="TextBox 23"/>
@@ -3888,7 +3890,7 @@
             </p:txBody>
           </p:sp>
         </mc:Choice>
-        <mc:Fallback xmlns="">
+        <mc:Fallback>
           <p:sp>
             <p:nvSpPr>
               <p:cNvPr id="24" name="TextBox 23"/>
@@ -3930,7 +3932,2396 @@
     </p:spTree>
     <p:extLst>
       <p:ext uri="{BB962C8B-B14F-4D97-AF65-F5344CB8AC3E}">
-        <p14:creationId xmlns:p14="http://schemas.microsoft.com/office/powerpoint/2010/main" val="546631854"/>
+        <p14:creationId xmlns:p14="http://schemas.microsoft.com/office/powerpoint/2010/main" xmlns="" val="546631854"/>
+      </p:ext>
+    </p:extLst>
+  </p:cSld>
+  <p:clrMapOvr>
+    <a:masterClrMapping/>
+  </p:clrMapOvr>
+  <p:timing>
+    <p:tnLst>
+      <p:par>
+        <p:cTn id="1" dur="indefinite" restart="never" nodeType="tmRoot"/>
+      </p:par>
+    </p:tnLst>
+  </p:timing>
+</p:sld>
+</file>
+
+<file path=ppt/slides/slide10.xml><?xml version="1.0" encoding="utf-8"?>
+<p:sld xmlns:a="http://schemas.openxmlformats.org/drawingml/2006/main" xmlns:r="http://schemas.openxmlformats.org/officeDocument/2006/relationships" xmlns:p="http://schemas.openxmlformats.org/presentationml/2006/main">
+  <p:cSld>
+    <p:spTree>
+      <p:nvGrpSpPr>
+        <p:cNvPr id="1" name=""/>
+        <p:cNvGrpSpPr/>
+        <p:nvPr/>
+      </p:nvGrpSpPr>
+      <p:grpSpPr>
+        <a:xfrm>
+          <a:off x="0" y="0"/>
+          <a:ext cx="0" cy="0"/>
+          <a:chOff x="0" y="0"/>
+          <a:chExt cx="0" cy="0"/>
+        </a:xfrm>
+      </p:grpSpPr>
+      <p:sp>
+        <p:nvSpPr>
+          <p:cNvPr id="4" name="Oval 3"/>
+          <p:cNvSpPr/>
+          <p:nvPr/>
+        </p:nvSpPr>
+        <p:spPr>
+          <a:xfrm>
+            <a:off x="928632" y="1301325"/>
+            <a:ext cx="2382592" cy="2369712"/>
+          </a:xfrm>
+          <a:prstGeom prst="ellipse">
+            <a:avLst/>
+          </a:prstGeom>
+          <a:ln>
+            <a:solidFill>
+              <a:schemeClr val="tx2"/>
+            </a:solidFill>
+          </a:ln>
+          <a:effectLst>
+            <a:outerShdw blurRad="50800" dist="38100" dir="2700000" algn="tl" rotWithShape="0">
+              <a:prstClr val="black">
+                <a:alpha val="40000"/>
+              </a:prstClr>
+            </a:outerShdw>
+          </a:effectLst>
+        </p:spPr>
+        <p:style>
+          <a:lnRef idx="2">
+            <a:schemeClr val="accent6"/>
+          </a:lnRef>
+          <a:fillRef idx="1">
+            <a:schemeClr val="lt1"/>
+          </a:fillRef>
+          <a:effectRef idx="0">
+            <a:schemeClr val="accent6"/>
+          </a:effectRef>
+          <a:fontRef idx="minor">
+            <a:schemeClr val="dk1"/>
+          </a:fontRef>
+        </p:style>
+        <p:txBody>
+          <a:bodyPr rtlCol="0" anchor="ctr"/>
+          <a:lstStyle/>
+          <a:p>
+            <a:pPr algn="ctr"/>
+            <a:endParaRPr lang="es-AR"/>
+          </a:p>
+        </p:txBody>
+      </p:sp>
+      <p:pic>
+        <p:nvPicPr>
+          <p:cNvPr id="5" name="Picture 4"/>
+          <p:cNvPicPr>
+            <a:picLocks noChangeAspect="1"/>
+          </p:cNvPicPr>
+          <p:nvPr/>
+        </p:nvPicPr>
+        <p:blipFill>
+          <a:blip r:embed="rId2" cstate="print">
+            <a:extLst>
+              <a:ext uri="{28A0092B-C50C-407E-A947-70E740481C1C}">
+                <a14:useLocalDpi xmlns:a14="http://schemas.microsoft.com/office/drawing/2010/main" xmlns="" val="0"/>
+              </a:ext>
+            </a:extLst>
+          </a:blip>
+          <a:stretch>
+            <a:fillRect/>
+          </a:stretch>
+        </p:blipFill>
+        <p:spPr>
+          <a:xfrm>
+            <a:off x="1481585" y="1635057"/>
+            <a:ext cx="425562" cy="425562"/>
+          </a:xfrm>
+          <a:prstGeom prst="rect">
+            <a:avLst/>
+          </a:prstGeom>
+        </p:spPr>
+      </p:pic>
+      <p:pic>
+        <p:nvPicPr>
+          <p:cNvPr id="6" name="Picture 5"/>
+          <p:cNvPicPr>
+            <a:picLocks noChangeAspect="1"/>
+          </p:cNvPicPr>
+          <p:nvPr/>
+        </p:nvPicPr>
+        <p:blipFill>
+          <a:blip r:embed="rId2" cstate="print">
+            <a:extLst>
+              <a:ext uri="{28A0092B-C50C-407E-A947-70E740481C1C}">
+                <a14:useLocalDpi xmlns:a14="http://schemas.microsoft.com/office/drawing/2010/main" xmlns="" val="0"/>
+              </a:ext>
+            </a:extLst>
+          </a:blip>
+          <a:stretch>
+            <a:fillRect/>
+          </a:stretch>
+        </p:blipFill>
+        <p:spPr>
+          <a:xfrm>
+            <a:off x="2427925" y="1847838"/>
+            <a:ext cx="425562" cy="425562"/>
+          </a:xfrm>
+          <a:prstGeom prst="rect">
+            <a:avLst/>
+          </a:prstGeom>
+        </p:spPr>
+      </p:pic>
+      <p:pic>
+        <p:nvPicPr>
+          <p:cNvPr id="7" name="Picture 6"/>
+          <p:cNvPicPr>
+            <a:picLocks noChangeAspect="1"/>
+          </p:cNvPicPr>
+          <p:nvPr/>
+        </p:nvPicPr>
+        <p:blipFill>
+          <a:blip r:embed="rId2" cstate="print">
+            <a:extLst>
+              <a:ext uri="{28A0092B-C50C-407E-A947-70E740481C1C}">
+                <a14:useLocalDpi xmlns:a14="http://schemas.microsoft.com/office/drawing/2010/main" xmlns="" val="0"/>
+              </a:ext>
+            </a:extLst>
+          </a:blip>
+          <a:stretch>
+            <a:fillRect/>
+          </a:stretch>
+        </p:blipFill>
+        <p:spPr>
+          <a:xfrm>
+            <a:off x="1334272" y="2273400"/>
+            <a:ext cx="425562" cy="425562"/>
+          </a:xfrm>
+          <a:prstGeom prst="rect">
+            <a:avLst/>
+          </a:prstGeom>
+        </p:spPr>
+      </p:pic>
+      <p:pic>
+        <p:nvPicPr>
+          <p:cNvPr id="8" name="Picture 7"/>
+          <p:cNvPicPr>
+            <a:picLocks noChangeAspect="1"/>
+          </p:cNvPicPr>
+          <p:nvPr/>
+        </p:nvPicPr>
+        <p:blipFill>
+          <a:blip r:embed="rId2" cstate="print">
+            <a:extLst>
+              <a:ext uri="{28A0092B-C50C-407E-A947-70E740481C1C}">
+                <a14:useLocalDpi xmlns:a14="http://schemas.microsoft.com/office/drawing/2010/main" xmlns="" val="0"/>
+              </a:ext>
+            </a:extLst>
+          </a:blip>
+          <a:stretch>
+            <a:fillRect/>
+          </a:stretch>
+        </p:blipFill>
+        <p:spPr>
+          <a:xfrm>
+            <a:off x="1694366" y="2984817"/>
+            <a:ext cx="425562" cy="425562"/>
+          </a:xfrm>
+          <a:prstGeom prst="rect">
+            <a:avLst/>
+          </a:prstGeom>
+        </p:spPr>
+      </p:pic>
+      <p:pic>
+        <p:nvPicPr>
+          <p:cNvPr id="9" name="Picture 8"/>
+          <p:cNvPicPr>
+            <a:picLocks noChangeAspect="1"/>
+          </p:cNvPicPr>
+          <p:nvPr/>
+        </p:nvPicPr>
+        <p:blipFill>
+          <a:blip r:embed="rId2" cstate="print">
+            <a:extLst>
+              <a:ext uri="{28A0092B-C50C-407E-A947-70E740481C1C}">
+                <a14:useLocalDpi xmlns:a14="http://schemas.microsoft.com/office/drawing/2010/main" xmlns="" val="0"/>
+              </a:ext>
+            </a:extLst>
+          </a:blip>
+          <a:stretch>
+            <a:fillRect/>
+          </a:stretch>
+        </p:blipFill>
+        <p:spPr>
+          <a:xfrm>
+            <a:off x="2354268" y="2520619"/>
+            <a:ext cx="425562" cy="425562"/>
+          </a:xfrm>
+          <a:prstGeom prst="rect">
+            <a:avLst/>
+          </a:prstGeom>
+        </p:spPr>
+      </p:pic>
+      <p:sp>
+        <p:nvSpPr>
+          <p:cNvPr id="10" name="TextBox 9"/>
+          <p:cNvSpPr txBox="1"/>
+          <p:nvPr/>
+        </p:nvSpPr>
+        <p:spPr>
+          <a:xfrm>
+            <a:off x="1212739" y="3980809"/>
+            <a:ext cx="1640748" cy="369332"/>
+          </a:xfrm>
+          <a:prstGeom prst="rect">
+            <a:avLst/>
+          </a:prstGeom>
+          <a:noFill/>
+        </p:spPr>
+        <p:txBody>
+          <a:bodyPr wrap="square" rtlCol="0">
+            <a:spAutoFit/>
+          </a:bodyPr>
+          <a:lstStyle/>
+          <a:p>
+            <a:pPr algn="ctr"/>
+            <a:r>
+              <a:rPr lang="es-AR" dirty="0" smtClean="0">
+                <a:latin typeface="Segoe UI" panose="020B0502040204020203" pitchFamily="34" charset="0"/>
+                <a:cs typeface="Segoe UI" panose="020B0502040204020203" pitchFamily="34" charset="0"/>
+              </a:rPr>
+              <a:t>Población</a:t>
+            </a:r>
+            <a:endParaRPr lang="es-AR" dirty="0">
+              <a:latin typeface="Segoe UI" panose="020B0502040204020203" pitchFamily="34" charset="0"/>
+              <a:cs typeface="Segoe UI" panose="020B0502040204020203" pitchFamily="34" charset="0"/>
+            </a:endParaRPr>
+          </a:p>
+        </p:txBody>
+      </p:sp>
+      <p:sp>
+        <p:nvSpPr>
+          <p:cNvPr id="11" name="Rounded Rectangle 10"/>
+          <p:cNvSpPr/>
+          <p:nvPr/>
+        </p:nvSpPr>
+        <p:spPr>
+          <a:xfrm>
+            <a:off x="4601428" y="1301325"/>
+            <a:ext cx="4971245" cy="2369712"/>
+          </a:xfrm>
+          <a:prstGeom prst="roundRect">
+            <a:avLst/>
+          </a:prstGeom>
+          <a:ln>
+            <a:solidFill>
+              <a:schemeClr val="tx2"/>
+            </a:solidFill>
+          </a:ln>
+          <a:effectLst>
+            <a:outerShdw blurRad="50800" dist="38100" dir="2700000" algn="tl" rotWithShape="0">
+              <a:prstClr val="black">
+                <a:alpha val="40000"/>
+              </a:prstClr>
+            </a:outerShdw>
+          </a:effectLst>
+        </p:spPr>
+        <p:style>
+          <a:lnRef idx="2">
+            <a:schemeClr val="accent4"/>
+          </a:lnRef>
+          <a:fillRef idx="1">
+            <a:schemeClr val="lt1"/>
+          </a:fillRef>
+          <a:effectRef idx="0">
+            <a:schemeClr val="accent4"/>
+          </a:effectRef>
+          <a:fontRef idx="minor">
+            <a:schemeClr val="dk1"/>
+          </a:fontRef>
+        </p:style>
+        <p:txBody>
+          <a:bodyPr rtlCol="0" anchor="ctr"/>
+          <a:lstStyle/>
+          <a:p>
+            <a:pPr algn="ctr"/>
+            <a:endParaRPr lang="es-AR"/>
+          </a:p>
+        </p:txBody>
+      </p:sp>
+      <p:sp>
+        <p:nvSpPr>
+          <p:cNvPr id="12" name="Right Arrow 11"/>
+          <p:cNvSpPr/>
+          <p:nvPr/>
+        </p:nvSpPr>
+        <p:spPr>
+          <a:xfrm>
+            <a:off x="3477296" y="2273400"/>
+            <a:ext cx="875484" cy="672781"/>
+          </a:xfrm>
+          <a:prstGeom prst="rightArrow">
+            <a:avLst/>
+          </a:prstGeom>
+        </p:spPr>
+        <p:style>
+          <a:lnRef idx="1">
+            <a:schemeClr val="accent2"/>
+          </a:lnRef>
+          <a:fillRef idx="2">
+            <a:schemeClr val="accent2"/>
+          </a:fillRef>
+          <a:effectRef idx="1">
+            <a:schemeClr val="accent2"/>
+          </a:effectRef>
+          <a:fontRef idx="minor">
+            <a:schemeClr val="dk1"/>
+          </a:fontRef>
+        </p:style>
+        <p:txBody>
+          <a:bodyPr rtlCol="0" anchor="ctr"/>
+          <a:lstStyle/>
+          <a:p>
+            <a:pPr algn="ctr"/>
+            <a:endParaRPr lang="es-AR"/>
+          </a:p>
+        </p:txBody>
+      </p:sp>
+      <p:sp>
+        <p:nvSpPr>
+          <p:cNvPr id="13" name="Right Arrow 12"/>
+          <p:cNvSpPr/>
+          <p:nvPr/>
+        </p:nvSpPr>
+        <p:spPr>
+          <a:xfrm>
+            <a:off x="9851481" y="1482592"/>
+            <a:ext cx="875484" cy="672781"/>
+          </a:xfrm>
+          <a:prstGeom prst="rightArrow">
+            <a:avLst/>
+          </a:prstGeom>
+        </p:spPr>
+        <p:style>
+          <a:lnRef idx="1">
+            <a:schemeClr val="accent1"/>
+          </a:lnRef>
+          <a:fillRef idx="2">
+            <a:schemeClr val="accent1"/>
+          </a:fillRef>
+          <a:effectRef idx="1">
+            <a:schemeClr val="accent1"/>
+          </a:effectRef>
+          <a:fontRef idx="minor">
+            <a:schemeClr val="dk1"/>
+          </a:fontRef>
+        </p:style>
+        <p:txBody>
+          <a:bodyPr rtlCol="0" anchor="ctr"/>
+          <a:lstStyle/>
+          <a:p>
+            <a:pPr algn="ctr"/>
+            <a:endParaRPr lang="es-AR"/>
+          </a:p>
+        </p:txBody>
+      </p:sp>
+      <p:sp>
+        <p:nvSpPr>
+          <p:cNvPr id="14" name="Right Arrow 13"/>
+          <p:cNvSpPr/>
+          <p:nvPr/>
+        </p:nvSpPr>
+        <p:spPr>
+          <a:xfrm rot="19442521">
+            <a:off x="4855399" y="2037805"/>
+            <a:ext cx="813884" cy="296125"/>
+          </a:xfrm>
+          <a:prstGeom prst="rightArrow">
+            <a:avLst/>
+          </a:prstGeom>
+          <a:gradFill>
+            <a:gsLst>
+              <a:gs pos="0">
+                <a:schemeClr val="accent2">
+                  <a:lumMod val="110000"/>
+                  <a:satMod val="105000"/>
+                  <a:tint val="67000"/>
+                </a:schemeClr>
+              </a:gs>
+              <a:gs pos="100000">
+                <a:schemeClr val="bg2"/>
+              </a:gs>
+            </a:gsLst>
+          </a:gradFill>
+        </p:spPr>
+        <p:style>
+          <a:lnRef idx="1">
+            <a:schemeClr val="accent2"/>
+          </a:lnRef>
+          <a:fillRef idx="2">
+            <a:schemeClr val="accent2"/>
+          </a:fillRef>
+          <a:effectRef idx="1">
+            <a:schemeClr val="accent2"/>
+          </a:effectRef>
+          <a:fontRef idx="minor">
+            <a:schemeClr val="dk1"/>
+          </a:fontRef>
+        </p:style>
+        <p:txBody>
+          <a:bodyPr rtlCol="0" anchor="ctr"/>
+          <a:lstStyle/>
+          <a:p>
+            <a:pPr algn="ctr"/>
+            <a:endParaRPr lang="es-AR"/>
+          </a:p>
+        </p:txBody>
+      </p:sp>
+      <p:sp>
+        <p:nvSpPr>
+          <p:cNvPr id="15" name="TextBox 14"/>
+          <p:cNvSpPr txBox="1"/>
+          <p:nvPr/>
+        </p:nvSpPr>
+        <p:spPr>
+          <a:xfrm>
+            <a:off x="5542671" y="3980461"/>
+            <a:ext cx="2963684" cy="369332"/>
+          </a:xfrm>
+          <a:prstGeom prst="rect">
+            <a:avLst/>
+          </a:prstGeom>
+          <a:noFill/>
+        </p:spPr>
+        <p:txBody>
+          <a:bodyPr wrap="square" rtlCol="0">
+            <a:spAutoFit/>
+          </a:bodyPr>
+          <a:lstStyle/>
+          <a:p>
+            <a:pPr algn="ctr"/>
+            <a:r>
+              <a:rPr lang="es-AR" dirty="0" smtClean="0">
+                <a:latin typeface="Segoe UI" panose="020B0502040204020203" pitchFamily="34" charset="0"/>
+                <a:cs typeface="Segoe UI" panose="020B0502040204020203" pitchFamily="34" charset="0"/>
+              </a:rPr>
+              <a:t>Sistema = cola + canales</a:t>
+            </a:r>
+            <a:endParaRPr lang="es-AR" dirty="0">
+              <a:latin typeface="Segoe UI" panose="020B0502040204020203" pitchFamily="34" charset="0"/>
+              <a:cs typeface="Segoe UI" panose="020B0502040204020203" pitchFamily="34" charset="0"/>
+            </a:endParaRPr>
+          </a:p>
+        </p:txBody>
+      </p:sp>
+      <p:pic>
+        <p:nvPicPr>
+          <p:cNvPr id="17" name="Picture 16"/>
+          <p:cNvPicPr>
+            <a:picLocks noChangeAspect="1"/>
+          </p:cNvPicPr>
+          <p:nvPr/>
+        </p:nvPicPr>
+        <p:blipFill>
+          <a:blip r:embed="rId3" cstate="print">
+            <a:extLst>
+              <a:ext uri="{28A0092B-C50C-407E-A947-70E740481C1C}">
+                <a14:useLocalDpi xmlns:a14="http://schemas.microsoft.com/office/drawing/2010/main" xmlns="" val="0"/>
+              </a:ext>
+            </a:extLst>
+          </a:blip>
+          <a:stretch>
+            <a:fillRect/>
+          </a:stretch>
+        </p:blipFill>
+        <p:spPr>
+          <a:xfrm>
+            <a:off x="5953925" y="1573963"/>
+            <a:ext cx="745199" cy="745199"/>
+          </a:xfrm>
+          <a:prstGeom prst="rect">
+            <a:avLst/>
+          </a:prstGeom>
+        </p:spPr>
+      </p:pic>
+      <mc:AlternateContent xmlns:mc="http://schemas.openxmlformats.org/markup-compatibility/2006">
+        <mc:Choice xmlns:a14="http://schemas.microsoft.com/office/drawing/2010/main" xmlns="" Requires="a14">
+          <p:sp>
+            <p:nvSpPr>
+              <p:cNvPr id="21" name="TextBox 20"/>
+              <p:cNvSpPr txBox="1"/>
+              <p:nvPr/>
+            </p:nvSpPr>
+            <p:spPr>
+              <a:xfrm>
+                <a:off x="3715560" y="1831648"/>
+                <a:ext cx="177100" cy="276999"/>
+              </a:xfrm>
+              <a:prstGeom prst="rect">
+                <a:avLst/>
+              </a:prstGeom>
+              <a:noFill/>
+            </p:spPr>
+            <p:txBody>
+              <a:bodyPr wrap="none" lIns="0" tIns="0" rIns="0" bIns="0" rtlCol="0">
+                <a:spAutoFit/>
+              </a:bodyPr>
+              <a:lstStyle/>
+              <a:p>
+                <a:pPr/>
+                <a14:m>
+                  <m:oMathPara xmlns:m="http://schemas.openxmlformats.org/officeDocument/2006/math">
+                    <m:oMathParaPr>
+                      <m:jc m:val="centerGroup"/>
+                    </m:oMathParaPr>
+                    <m:oMath xmlns:m="http://schemas.openxmlformats.org/officeDocument/2006/math">
+                      <m:r>
+                        <a:rPr lang="es-AR" b="0" i="1" smtClean="0">
+                          <a:latin typeface="Cambria Math" panose="02040503050406030204" pitchFamily="18" charset="0"/>
+                        </a:rPr>
+                        <m:t>𝜆</m:t>
+                      </m:r>
+                    </m:oMath>
+                  </m:oMathPara>
+                </a14:m>
+                <a:endParaRPr lang="es-AR" dirty="0"/>
+              </a:p>
+            </p:txBody>
+          </p:sp>
+        </mc:Choice>
+        <mc:Fallback>
+          <p:sp>
+            <p:nvSpPr>
+              <p:cNvPr id="21" name="TextBox 20"/>
+              <p:cNvSpPr txBox="1">
+                <a:spLocks noRot="1" noChangeAspect="1" noMove="1" noResize="1" noEditPoints="1" noAdjustHandles="1" noChangeArrowheads="1" noChangeShapeType="1" noTextEdit="1"/>
+              </p:cNvSpPr>
+              <p:nvPr/>
+            </p:nvSpPr>
+            <p:spPr>
+              <a:xfrm>
+                <a:off x="3715560" y="1831648"/>
+                <a:ext cx="177100" cy="276999"/>
+              </a:xfrm>
+              <a:prstGeom prst="rect">
+                <a:avLst/>
+              </a:prstGeom>
+              <a:blipFill rotWithShape="0">
+                <a:blip r:embed="rId4" cstate="print"/>
+                <a:stretch>
+                  <a:fillRect l="-34483" r="-31034" b="-6522"/>
+                </a:stretch>
+              </a:blipFill>
+            </p:spPr>
+            <p:txBody>
+              <a:bodyPr/>
+              <a:lstStyle/>
+              <a:p>
+                <a:r>
+                  <a:rPr lang="es-AR">
+                    <a:noFill/>
+                  </a:rPr>
+                  <a:t> </a:t>
+                </a:r>
+              </a:p>
+            </p:txBody>
+          </p:sp>
+        </mc:Fallback>
+      </mc:AlternateContent>
+      <p:sp>
+        <p:nvSpPr>
+          <p:cNvPr id="25" name="Right Arrow 12"/>
+          <p:cNvSpPr/>
+          <p:nvPr/>
+        </p:nvSpPr>
+        <p:spPr>
+          <a:xfrm>
+            <a:off x="9860188" y="2732272"/>
+            <a:ext cx="875484" cy="672781"/>
+          </a:xfrm>
+          <a:prstGeom prst="rightArrow">
+            <a:avLst/>
+          </a:prstGeom>
+        </p:spPr>
+        <p:style>
+          <a:lnRef idx="1">
+            <a:schemeClr val="accent1"/>
+          </a:lnRef>
+          <a:fillRef idx="2">
+            <a:schemeClr val="accent1"/>
+          </a:fillRef>
+          <a:effectRef idx="1">
+            <a:schemeClr val="accent1"/>
+          </a:effectRef>
+          <a:fontRef idx="minor">
+            <a:schemeClr val="dk1"/>
+          </a:fontRef>
+        </p:style>
+        <p:txBody>
+          <a:bodyPr rtlCol="0" anchor="ctr"/>
+          <a:lstStyle/>
+          <a:p>
+            <a:pPr algn="ctr"/>
+            <a:endParaRPr lang="es-AR"/>
+          </a:p>
+        </p:txBody>
+      </p:sp>
+      <p:sp>
+        <p:nvSpPr>
+          <p:cNvPr id="1026" name="Rectangle 2"/>
+          <p:cNvSpPr>
+            <a:spLocks noChangeArrowheads="1"/>
+          </p:cNvSpPr>
+          <p:nvPr/>
+        </p:nvSpPr>
+        <p:spPr bwMode="auto">
+          <a:xfrm>
+            <a:off x="0" y="0"/>
+            <a:ext cx="12192000" cy="0"/>
+          </a:xfrm>
+          <a:prstGeom prst="rect">
+            <a:avLst/>
+          </a:prstGeom>
+          <a:noFill/>
+          <a:ln w="9525">
+            <a:noFill/>
+            <a:miter lim="800000"/>
+            <a:headEnd/>
+            <a:tailEnd/>
+          </a:ln>
+          <a:effectLst/>
+        </p:spPr>
+        <p:txBody>
+          <a:bodyPr vert="horz" wrap="none" lIns="91440" tIns="45720" rIns="91440" bIns="45720" numCol="1" anchor="ctr" anchorCtr="0" compatLnSpc="1">
+            <a:prstTxWarp prst="textNoShape">
+              <a:avLst/>
+            </a:prstTxWarp>
+            <a:spAutoFit/>
+          </a:bodyPr>
+          <a:lstStyle/>
+          <a:p>
+            <a:endParaRPr lang="es-AR"/>
+          </a:p>
+        </p:txBody>
+      </p:sp>
+      <p:sp>
+        <p:nvSpPr>
+          <p:cNvPr id="1028" name="Rectangle 4"/>
+          <p:cNvSpPr>
+            <a:spLocks noChangeArrowheads="1"/>
+          </p:cNvSpPr>
+          <p:nvPr/>
+        </p:nvSpPr>
+        <p:spPr bwMode="auto">
+          <a:xfrm>
+            <a:off x="0" y="0"/>
+            <a:ext cx="12192000" cy="0"/>
+          </a:xfrm>
+          <a:prstGeom prst="rect">
+            <a:avLst/>
+          </a:prstGeom>
+          <a:noFill/>
+          <a:ln w="9525">
+            <a:noFill/>
+            <a:miter lim="800000"/>
+            <a:headEnd/>
+            <a:tailEnd/>
+          </a:ln>
+          <a:effectLst/>
+        </p:spPr>
+        <p:txBody>
+          <a:bodyPr vert="horz" wrap="none" lIns="91440" tIns="45720" rIns="91440" bIns="45720" numCol="1" anchor="ctr" anchorCtr="0" compatLnSpc="1">
+            <a:prstTxWarp prst="textNoShape">
+              <a:avLst/>
+            </a:prstTxWarp>
+            <a:spAutoFit/>
+          </a:bodyPr>
+          <a:lstStyle/>
+          <a:p>
+            <a:endParaRPr lang="es-AR"/>
+          </a:p>
+        </p:txBody>
+      </p:sp>
+      <p:pic>
+        <p:nvPicPr>
+          <p:cNvPr id="1027" name="Picture 3"/>
+          <p:cNvPicPr>
+            <a:picLocks noChangeAspect="1" noChangeArrowheads="1"/>
+          </p:cNvPicPr>
+          <p:nvPr/>
+        </p:nvPicPr>
+        <p:blipFill>
+          <a:blip r:embed="rId5" cstate="print">
+            <a:clrChange>
+              <a:clrFrom>
+                <a:srgbClr val="FFFFFF"/>
+              </a:clrFrom>
+              <a:clrTo>
+                <a:srgbClr val="FFFFFF">
+                  <a:alpha val="0"/>
+                </a:srgbClr>
+              </a:clrTo>
+            </a:clrChange>
+          </a:blip>
+          <a:srcRect/>
+          <a:stretch>
+            <a:fillRect/>
+          </a:stretch>
+        </p:blipFill>
+        <p:spPr bwMode="auto">
+          <a:xfrm>
+            <a:off x="6244045" y="1246533"/>
+            <a:ext cx="235131" cy="319106"/>
+          </a:xfrm>
+          <a:prstGeom prst="rect">
+            <a:avLst/>
+          </a:prstGeom>
+          <a:noFill/>
+        </p:spPr>
+      </p:pic>
+      <p:pic>
+        <p:nvPicPr>
+          <p:cNvPr id="26" name="Picture 16"/>
+          <p:cNvPicPr>
+            <a:picLocks noChangeAspect="1"/>
+          </p:cNvPicPr>
+          <p:nvPr/>
+        </p:nvPicPr>
+        <p:blipFill>
+          <a:blip r:embed="rId3" cstate="print">
+            <a:extLst>
+              <a:ext uri="{28A0092B-C50C-407E-A947-70E740481C1C}">
+                <a14:useLocalDpi xmlns:a14="http://schemas.microsoft.com/office/drawing/2010/main" xmlns="" val="0"/>
+              </a:ext>
+            </a:extLst>
+          </a:blip>
+          <a:stretch>
+            <a:fillRect/>
+          </a:stretch>
+        </p:blipFill>
+        <p:spPr>
+          <a:xfrm>
+            <a:off x="6001822" y="2849769"/>
+            <a:ext cx="745199" cy="745199"/>
+          </a:xfrm>
+          <a:prstGeom prst="rect">
+            <a:avLst/>
+          </a:prstGeom>
+        </p:spPr>
+      </p:pic>
+      <p:pic>
+        <p:nvPicPr>
+          <p:cNvPr id="27" name="Picture 16"/>
+          <p:cNvPicPr>
+            <a:picLocks noChangeAspect="1"/>
+          </p:cNvPicPr>
+          <p:nvPr/>
+        </p:nvPicPr>
+        <p:blipFill>
+          <a:blip r:embed="rId3" cstate="print">
+            <a:extLst>
+              <a:ext uri="{28A0092B-C50C-407E-A947-70E740481C1C}">
+                <a14:useLocalDpi xmlns:a14="http://schemas.microsoft.com/office/drawing/2010/main" xmlns="" val="0"/>
+              </a:ext>
+            </a:extLst>
+          </a:blip>
+          <a:stretch>
+            <a:fillRect/>
+          </a:stretch>
+        </p:blipFill>
+        <p:spPr>
+          <a:xfrm>
+            <a:off x="8431514" y="1543483"/>
+            <a:ext cx="745199" cy="745199"/>
+          </a:xfrm>
+          <a:prstGeom prst="rect">
+            <a:avLst/>
+          </a:prstGeom>
+        </p:spPr>
+      </p:pic>
+      <p:pic>
+        <p:nvPicPr>
+          <p:cNvPr id="28" name="Picture 16"/>
+          <p:cNvPicPr>
+            <a:picLocks noChangeAspect="1"/>
+          </p:cNvPicPr>
+          <p:nvPr/>
+        </p:nvPicPr>
+        <p:blipFill>
+          <a:blip r:embed="rId3" cstate="print">
+            <a:extLst>
+              <a:ext uri="{28A0092B-C50C-407E-A947-70E740481C1C}">
+                <a14:useLocalDpi xmlns:a14="http://schemas.microsoft.com/office/drawing/2010/main" xmlns="" val="0"/>
+              </a:ext>
+            </a:extLst>
+          </a:blip>
+          <a:stretch>
+            <a:fillRect/>
+          </a:stretch>
+        </p:blipFill>
+        <p:spPr>
+          <a:xfrm>
+            <a:off x="8431513" y="2875895"/>
+            <a:ext cx="745199" cy="745199"/>
+          </a:xfrm>
+          <a:prstGeom prst="rect">
+            <a:avLst/>
+          </a:prstGeom>
+        </p:spPr>
+      </p:pic>
+      <p:sp>
+        <p:nvSpPr>
+          <p:cNvPr id="1030" name="Rectangle 6"/>
+          <p:cNvSpPr>
+            <a:spLocks noChangeArrowheads="1"/>
+          </p:cNvSpPr>
+          <p:nvPr/>
+        </p:nvSpPr>
+        <p:spPr bwMode="auto">
+          <a:xfrm>
+            <a:off x="0" y="0"/>
+            <a:ext cx="12192000" cy="0"/>
+          </a:xfrm>
+          <a:prstGeom prst="rect">
+            <a:avLst/>
+          </a:prstGeom>
+          <a:noFill/>
+          <a:ln w="9525">
+            <a:noFill/>
+            <a:miter lim="800000"/>
+            <a:headEnd/>
+            <a:tailEnd/>
+          </a:ln>
+          <a:effectLst/>
+        </p:spPr>
+        <p:txBody>
+          <a:bodyPr vert="horz" wrap="none" lIns="91440" tIns="45720" rIns="91440" bIns="45720" numCol="1" anchor="ctr" anchorCtr="0" compatLnSpc="1">
+            <a:prstTxWarp prst="textNoShape">
+              <a:avLst/>
+            </a:prstTxWarp>
+            <a:spAutoFit/>
+          </a:bodyPr>
+          <a:lstStyle/>
+          <a:p>
+            <a:endParaRPr lang="es-AR"/>
+          </a:p>
+        </p:txBody>
+      </p:sp>
+      <p:pic>
+        <p:nvPicPr>
+          <p:cNvPr id="1029" name="Picture 5"/>
+          <p:cNvPicPr>
+            <a:picLocks noChangeAspect="1" noChangeArrowheads="1"/>
+          </p:cNvPicPr>
+          <p:nvPr/>
+        </p:nvPicPr>
+        <p:blipFill>
+          <a:blip r:embed="rId6" cstate="print">
+            <a:clrChange>
+              <a:clrFrom>
+                <a:srgbClr val="FFFFFF"/>
+              </a:clrFrom>
+              <a:clrTo>
+                <a:srgbClr val="FFFFFF">
+                  <a:alpha val="0"/>
+                </a:srgbClr>
+              </a:clrTo>
+            </a:clrChange>
+          </a:blip>
+          <a:srcRect/>
+          <a:stretch>
+            <a:fillRect/>
+          </a:stretch>
+        </p:blipFill>
+        <p:spPr bwMode="auto">
+          <a:xfrm>
+            <a:off x="8647611" y="2560320"/>
+            <a:ext cx="235131" cy="297833"/>
+          </a:xfrm>
+          <a:prstGeom prst="rect">
+            <a:avLst/>
+          </a:prstGeom>
+          <a:noFill/>
+        </p:spPr>
+      </p:pic>
+      <p:sp>
+        <p:nvSpPr>
+          <p:cNvPr id="1032" name="Rectangle 8"/>
+          <p:cNvSpPr>
+            <a:spLocks noChangeArrowheads="1"/>
+          </p:cNvSpPr>
+          <p:nvPr/>
+        </p:nvSpPr>
+        <p:spPr bwMode="auto">
+          <a:xfrm>
+            <a:off x="0" y="0"/>
+            <a:ext cx="12192000" cy="0"/>
+          </a:xfrm>
+          <a:prstGeom prst="rect">
+            <a:avLst/>
+          </a:prstGeom>
+          <a:noFill/>
+          <a:ln w="9525">
+            <a:noFill/>
+            <a:miter lim="800000"/>
+            <a:headEnd/>
+            <a:tailEnd/>
+          </a:ln>
+          <a:effectLst/>
+        </p:spPr>
+        <p:txBody>
+          <a:bodyPr vert="horz" wrap="none" lIns="91440" tIns="45720" rIns="91440" bIns="45720" numCol="1" anchor="ctr" anchorCtr="0" compatLnSpc="1">
+            <a:prstTxWarp prst="textNoShape">
+              <a:avLst/>
+            </a:prstTxWarp>
+            <a:spAutoFit/>
+          </a:bodyPr>
+          <a:lstStyle/>
+          <a:p>
+            <a:endParaRPr lang="es-AR"/>
+          </a:p>
+        </p:txBody>
+      </p:sp>
+      <p:pic>
+        <p:nvPicPr>
+          <p:cNvPr id="1031" name="Picture 7"/>
+          <p:cNvPicPr>
+            <a:picLocks noChangeAspect="1" noChangeArrowheads="1"/>
+          </p:cNvPicPr>
+          <p:nvPr/>
+        </p:nvPicPr>
+        <p:blipFill>
+          <a:blip r:embed="rId7" cstate="print">
+            <a:clrChange>
+              <a:clrFrom>
+                <a:srgbClr val="FFFFFF"/>
+              </a:clrFrom>
+              <a:clrTo>
+                <a:srgbClr val="FFFFFF">
+                  <a:alpha val="0"/>
+                </a:srgbClr>
+              </a:clrTo>
+            </a:clrChange>
+          </a:blip>
+          <a:srcRect/>
+          <a:stretch>
+            <a:fillRect/>
+          </a:stretch>
+        </p:blipFill>
+        <p:spPr bwMode="auto">
+          <a:xfrm>
+            <a:off x="8673737" y="1280160"/>
+            <a:ext cx="268132" cy="339634"/>
+          </a:xfrm>
+          <a:prstGeom prst="rect">
+            <a:avLst/>
+          </a:prstGeom>
+          <a:noFill/>
+        </p:spPr>
+      </p:pic>
+      <p:sp>
+        <p:nvSpPr>
+          <p:cNvPr id="1034" name="Rectangle 10"/>
+          <p:cNvSpPr>
+            <a:spLocks noChangeArrowheads="1"/>
+          </p:cNvSpPr>
+          <p:nvPr/>
+        </p:nvSpPr>
+        <p:spPr bwMode="auto">
+          <a:xfrm>
+            <a:off x="0" y="0"/>
+            <a:ext cx="12192000" cy="0"/>
+          </a:xfrm>
+          <a:prstGeom prst="rect">
+            <a:avLst/>
+          </a:prstGeom>
+          <a:noFill/>
+          <a:ln w="9525">
+            <a:noFill/>
+            <a:miter lim="800000"/>
+            <a:headEnd/>
+            <a:tailEnd/>
+          </a:ln>
+          <a:effectLst/>
+        </p:spPr>
+        <p:txBody>
+          <a:bodyPr vert="horz" wrap="none" lIns="91440" tIns="45720" rIns="91440" bIns="45720" numCol="1" anchor="ctr" anchorCtr="0" compatLnSpc="1">
+            <a:prstTxWarp prst="textNoShape">
+              <a:avLst/>
+            </a:prstTxWarp>
+            <a:spAutoFit/>
+          </a:bodyPr>
+          <a:lstStyle/>
+          <a:p>
+            <a:endParaRPr lang="es-AR"/>
+          </a:p>
+        </p:txBody>
+      </p:sp>
+      <p:pic>
+        <p:nvPicPr>
+          <p:cNvPr id="1033" name="Picture 9"/>
+          <p:cNvPicPr>
+            <a:picLocks noChangeAspect="1" noChangeArrowheads="1"/>
+          </p:cNvPicPr>
+          <p:nvPr/>
+        </p:nvPicPr>
+        <p:blipFill>
+          <a:blip r:embed="rId8" cstate="print">
+            <a:clrChange>
+              <a:clrFrom>
+                <a:srgbClr val="FFFFFF"/>
+              </a:clrFrom>
+              <a:clrTo>
+                <a:srgbClr val="FFFFFF">
+                  <a:alpha val="0"/>
+                </a:srgbClr>
+              </a:clrTo>
+            </a:clrChange>
+          </a:blip>
+          <a:srcRect/>
+          <a:stretch>
+            <a:fillRect/>
+          </a:stretch>
+        </p:blipFill>
+        <p:spPr bwMode="auto">
+          <a:xfrm>
+            <a:off x="6270171" y="2586445"/>
+            <a:ext cx="226881" cy="287383"/>
+          </a:xfrm>
+          <a:prstGeom prst="rect">
+            <a:avLst/>
+          </a:prstGeom>
+          <a:noFill/>
+        </p:spPr>
+      </p:pic>
+      <p:sp>
+        <p:nvSpPr>
+          <p:cNvPr id="1036" name="Rectangle 12"/>
+          <p:cNvSpPr>
+            <a:spLocks noChangeArrowheads="1"/>
+          </p:cNvSpPr>
+          <p:nvPr/>
+        </p:nvSpPr>
+        <p:spPr bwMode="auto">
+          <a:xfrm>
+            <a:off x="0" y="0"/>
+            <a:ext cx="12192000" cy="0"/>
+          </a:xfrm>
+          <a:prstGeom prst="rect">
+            <a:avLst/>
+          </a:prstGeom>
+          <a:noFill/>
+          <a:ln w="9525">
+            <a:noFill/>
+            <a:miter lim="800000"/>
+            <a:headEnd/>
+            <a:tailEnd/>
+          </a:ln>
+          <a:effectLst/>
+        </p:spPr>
+        <p:txBody>
+          <a:bodyPr vert="horz" wrap="none" lIns="91440" tIns="45720" rIns="91440" bIns="45720" numCol="1" anchor="ctr" anchorCtr="0" compatLnSpc="1">
+            <a:prstTxWarp prst="textNoShape">
+              <a:avLst/>
+            </a:prstTxWarp>
+            <a:spAutoFit/>
+          </a:bodyPr>
+          <a:lstStyle/>
+          <a:p>
+            <a:endParaRPr lang="es-AR"/>
+          </a:p>
+        </p:txBody>
+      </p:sp>
+      <p:sp>
+        <p:nvSpPr>
+          <p:cNvPr id="37" name="Right Arrow 13"/>
+          <p:cNvSpPr/>
+          <p:nvPr/>
+        </p:nvSpPr>
+        <p:spPr>
+          <a:xfrm rot="2342758">
+            <a:off x="4929422" y="2791097"/>
+            <a:ext cx="813884" cy="296125"/>
+          </a:xfrm>
+          <a:prstGeom prst="rightArrow">
+            <a:avLst/>
+          </a:prstGeom>
+          <a:gradFill>
+            <a:gsLst>
+              <a:gs pos="0">
+                <a:schemeClr val="accent2">
+                  <a:lumMod val="110000"/>
+                  <a:satMod val="105000"/>
+                  <a:tint val="67000"/>
+                </a:schemeClr>
+              </a:gs>
+              <a:gs pos="100000">
+                <a:schemeClr val="bg2"/>
+              </a:gs>
+            </a:gsLst>
+          </a:gradFill>
+        </p:spPr>
+        <p:style>
+          <a:lnRef idx="1">
+            <a:schemeClr val="accent2"/>
+          </a:lnRef>
+          <a:fillRef idx="2">
+            <a:schemeClr val="accent2"/>
+          </a:fillRef>
+          <a:effectRef idx="1">
+            <a:schemeClr val="accent2"/>
+          </a:effectRef>
+          <a:fontRef idx="minor">
+            <a:schemeClr val="dk1"/>
+          </a:fontRef>
+        </p:style>
+        <p:txBody>
+          <a:bodyPr rtlCol="0" anchor="ctr"/>
+          <a:lstStyle/>
+          <a:p>
+            <a:pPr algn="ctr"/>
+            <a:endParaRPr lang="es-AR"/>
+          </a:p>
+        </p:txBody>
+      </p:sp>
+      <p:sp>
+        <p:nvSpPr>
+          <p:cNvPr id="38" name="Right Arrow 13"/>
+          <p:cNvSpPr/>
+          <p:nvPr/>
+        </p:nvSpPr>
+        <p:spPr>
+          <a:xfrm>
+            <a:off x="6810472" y="1841863"/>
+            <a:ext cx="1549757" cy="235132"/>
+          </a:xfrm>
+          <a:prstGeom prst="rightArrow">
+            <a:avLst/>
+          </a:prstGeom>
+          <a:gradFill>
+            <a:gsLst>
+              <a:gs pos="0">
+                <a:schemeClr val="accent2">
+                  <a:lumMod val="110000"/>
+                  <a:satMod val="105000"/>
+                  <a:tint val="67000"/>
+                </a:schemeClr>
+              </a:gs>
+              <a:gs pos="100000">
+                <a:schemeClr val="bg2"/>
+              </a:gs>
+            </a:gsLst>
+          </a:gradFill>
+        </p:spPr>
+        <p:style>
+          <a:lnRef idx="1">
+            <a:schemeClr val="accent2"/>
+          </a:lnRef>
+          <a:fillRef idx="2">
+            <a:schemeClr val="accent2"/>
+          </a:fillRef>
+          <a:effectRef idx="1">
+            <a:schemeClr val="accent2"/>
+          </a:effectRef>
+          <a:fontRef idx="minor">
+            <a:schemeClr val="dk1"/>
+          </a:fontRef>
+        </p:style>
+        <p:txBody>
+          <a:bodyPr rtlCol="0" anchor="ctr"/>
+          <a:lstStyle/>
+          <a:p>
+            <a:pPr algn="ctr"/>
+            <a:endParaRPr lang="es-AR"/>
+          </a:p>
+        </p:txBody>
+      </p:sp>
+      <p:sp>
+        <p:nvSpPr>
+          <p:cNvPr id="39" name="Right Arrow 13"/>
+          <p:cNvSpPr/>
+          <p:nvPr/>
+        </p:nvSpPr>
+        <p:spPr>
+          <a:xfrm>
+            <a:off x="6806118" y="3117669"/>
+            <a:ext cx="1549757" cy="235132"/>
+          </a:xfrm>
+          <a:prstGeom prst="rightArrow">
+            <a:avLst/>
+          </a:prstGeom>
+          <a:gradFill>
+            <a:gsLst>
+              <a:gs pos="0">
+                <a:schemeClr val="accent2">
+                  <a:lumMod val="110000"/>
+                  <a:satMod val="105000"/>
+                  <a:tint val="67000"/>
+                </a:schemeClr>
+              </a:gs>
+              <a:gs pos="100000">
+                <a:schemeClr val="bg2"/>
+              </a:gs>
+            </a:gsLst>
+          </a:gradFill>
+        </p:spPr>
+        <p:style>
+          <a:lnRef idx="1">
+            <a:schemeClr val="accent2"/>
+          </a:lnRef>
+          <a:fillRef idx="2">
+            <a:schemeClr val="accent2"/>
+          </a:fillRef>
+          <a:effectRef idx="1">
+            <a:schemeClr val="accent2"/>
+          </a:effectRef>
+          <a:fontRef idx="minor">
+            <a:schemeClr val="dk1"/>
+          </a:fontRef>
+        </p:style>
+        <p:txBody>
+          <a:bodyPr rtlCol="0" anchor="ctr"/>
+          <a:lstStyle/>
+          <a:p>
+            <a:pPr algn="ctr"/>
+            <a:endParaRPr lang="es-AR"/>
+          </a:p>
+        </p:txBody>
+      </p:sp>
+      <p:sp>
+        <p:nvSpPr>
+          <p:cNvPr id="40" name="Right Arrow 13"/>
+          <p:cNvSpPr/>
+          <p:nvPr/>
+        </p:nvSpPr>
+        <p:spPr>
+          <a:xfrm rot="19546697">
+            <a:off x="6749513" y="2512425"/>
+            <a:ext cx="1549757" cy="235132"/>
+          </a:xfrm>
+          <a:prstGeom prst="rightArrow">
+            <a:avLst/>
+          </a:prstGeom>
+          <a:gradFill>
+            <a:gsLst>
+              <a:gs pos="0">
+                <a:schemeClr val="accent2">
+                  <a:lumMod val="110000"/>
+                  <a:satMod val="105000"/>
+                  <a:tint val="67000"/>
+                </a:schemeClr>
+              </a:gs>
+              <a:gs pos="100000">
+                <a:schemeClr val="bg2"/>
+              </a:gs>
+            </a:gsLst>
+          </a:gradFill>
+        </p:spPr>
+        <p:style>
+          <a:lnRef idx="1">
+            <a:schemeClr val="accent2"/>
+          </a:lnRef>
+          <a:fillRef idx="2">
+            <a:schemeClr val="accent2"/>
+          </a:fillRef>
+          <a:effectRef idx="1">
+            <a:schemeClr val="accent2"/>
+          </a:effectRef>
+          <a:fontRef idx="minor">
+            <a:schemeClr val="dk1"/>
+          </a:fontRef>
+        </p:style>
+        <p:txBody>
+          <a:bodyPr rtlCol="0" anchor="ctr"/>
+          <a:lstStyle/>
+          <a:p>
+            <a:pPr algn="ctr"/>
+            <a:endParaRPr lang="es-AR"/>
+          </a:p>
+        </p:txBody>
+      </p:sp>
+      <p:sp>
+        <p:nvSpPr>
+          <p:cNvPr id="41" name="Right Arrow 13"/>
+          <p:cNvSpPr/>
+          <p:nvPr/>
+        </p:nvSpPr>
+        <p:spPr>
+          <a:xfrm rot="1753788">
+            <a:off x="6775637" y="2460172"/>
+            <a:ext cx="1549757" cy="235132"/>
+          </a:xfrm>
+          <a:prstGeom prst="rightArrow">
+            <a:avLst/>
+          </a:prstGeom>
+          <a:gradFill>
+            <a:gsLst>
+              <a:gs pos="0">
+                <a:schemeClr val="accent2">
+                  <a:lumMod val="110000"/>
+                  <a:satMod val="105000"/>
+                  <a:tint val="67000"/>
+                </a:schemeClr>
+              </a:gs>
+              <a:gs pos="100000">
+                <a:schemeClr val="bg2"/>
+              </a:gs>
+            </a:gsLst>
+          </a:gradFill>
+        </p:spPr>
+        <p:style>
+          <a:lnRef idx="1">
+            <a:schemeClr val="accent2"/>
+          </a:lnRef>
+          <a:fillRef idx="2">
+            <a:schemeClr val="accent2"/>
+          </a:fillRef>
+          <a:effectRef idx="1">
+            <a:schemeClr val="accent2"/>
+          </a:effectRef>
+          <a:fontRef idx="minor">
+            <a:schemeClr val="dk1"/>
+          </a:fontRef>
+        </p:style>
+        <p:txBody>
+          <a:bodyPr rtlCol="0" anchor="ctr"/>
+          <a:lstStyle/>
+          <a:p>
+            <a:pPr algn="ctr"/>
+            <a:endParaRPr lang="es-AR"/>
+          </a:p>
+        </p:txBody>
+      </p:sp>
+      <p:sp>
+        <p:nvSpPr>
+          <p:cNvPr id="42" name="TextBox 18"/>
+          <p:cNvSpPr txBox="1"/>
+          <p:nvPr/>
+        </p:nvSpPr>
+        <p:spPr>
+          <a:xfrm>
+            <a:off x="506437" y="239151"/>
+            <a:ext cx="1136658" cy="369332"/>
+          </a:xfrm>
+          <a:prstGeom prst="rect">
+            <a:avLst/>
+          </a:prstGeom>
+          <a:noFill/>
+        </p:spPr>
+        <p:txBody>
+          <a:bodyPr wrap="none" rtlCol="0">
+            <a:spAutoFit/>
+          </a:bodyPr>
+          <a:lstStyle/>
+          <a:p>
+            <a:r>
+              <a:rPr lang="es-AR" dirty="0" smtClean="0"/>
+              <a:t>Ejercicio </a:t>
+            </a:r>
+            <a:r>
+              <a:rPr lang="es-AR" dirty="0" smtClean="0"/>
+              <a:t>9</a:t>
+            </a:r>
+            <a:endParaRPr lang="es-AR" dirty="0"/>
+          </a:p>
+        </p:txBody>
+      </p:sp>
+    </p:spTree>
+    <p:extLst>
+      <p:ext uri="{BB962C8B-B14F-4D97-AF65-F5344CB8AC3E}">
+        <p14:creationId xmlns:p14="http://schemas.microsoft.com/office/powerpoint/2010/main" xmlns="" val="546631854"/>
+      </p:ext>
+    </p:extLst>
+  </p:cSld>
+  <p:clrMapOvr>
+    <a:masterClrMapping/>
+  </p:clrMapOvr>
+  <p:timing>
+    <p:tnLst>
+      <p:par>
+        <p:cTn id="1" dur="indefinite" restart="never" nodeType="tmRoot"/>
+      </p:par>
+    </p:tnLst>
+  </p:timing>
+</p:sld>
+</file>
+
+<file path=ppt/slides/slide11.xml><?xml version="1.0" encoding="utf-8"?>
+<p:sld xmlns:a="http://schemas.openxmlformats.org/drawingml/2006/main" xmlns:r="http://schemas.openxmlformats.org/officeDocument/2006/relationships" xmlns:p="http://schemas.openxmlformats.org/presentationml/2006/main">
+  <p:cSld>
+    <p:spTree>
+      <p:nvGrpSpPr>
+        <p:cNvPr id="1" name=""/>
+        <p:cNvGrpSpPr/>
+        <p:nvPr/>
+      </p:nvGrpSpPr>
+      <p:grpSpPr>
+        <a:xfrm>
+          <a:off x="0" y="0"/>
+          <a:ext cx="0" cy="0"/>
+          <a:chOff x="0" y="0"/>
+          <a:chExt cx="0" cy="0"/>
+        </a:xfrm>
+      </p:grpSpPr>
+      <p:sp>
+        <p:nvSpPr>
+          <p:cNvPr id="4" name="Oval 3"/>
+          <p:cNvSpPr/>
+          <p:nvPr/>
+        </p:nvSpPr>
+        <p:spPr>
+          <a:xfrm>
+            <a:off x="928632" y="1301325"/>
+            <a:ext cx="2382592" cy="2369712"/>
+          </a:xfrm>
+          <a:prstGeom prst="ellipse">
+            <a:avLst/>
+          </a:prstGeom>
+          <a:ln>
+            <a:solidFill>
+              <a:schemeClr val="tx2"/>
+            </a:solidFill>
+          </a:ln>
+          <a:effectLst>
+            <a:outerShdw blurRad="50800" dist="38100" dir="2700000" algn="tl" rotWithShape="0">
+              <a:prstClr val="black">
+                <a:alpha val="40000"/>
+              </a:prstClr>
+            </a:outerShdw>
+          </a:effectLst>
+        </p:spPr>
+        <p:style>
+          <a:lnRef idx="2">
+            <a:schemeClr val="accent6"/>
+          </a:lnRef>
+          <a:fillRef idx="1">
+            <a:schemeClr val="lt1"/>
+          </a:fillRef>
+          <a:effectRef idx="0">
+            <a:schemeClr val="accent6"/>
+          </a:effectRef>
+          <a:fontRef idx="minor">
+            <a:schemeClr val="dk1"/>
+          </a:fontRef>
+        </p:style>
+        <p:txBody>
+          <a:bodyPr rtlCol="0" anchor="ctr"/>
+          <a:lstStyle/>
+          <a:p>
+            <a:pPr algn="ctr"/>
+            <a:endParaRPr lang="es-AR"/>
+          </a:p>
+        </p:txBody>
+      </p:sp>
+      <p:pic>
+        <p:nvPicPr>
+          <p:cNvPr id="5" name="Picture 4"/>
+          <p:cNvPicPr>
+            <a:picLocks noChangeAspect="1"/>
+          </p:cNvPicPr>
+          <p:nvPr/>
+        </p:nvPicPr>
+        <p:blipFill>
+          <a:blip r:embed="rId2" cstate="print">
+            <a:extLst>
+              <a:ext uri="{28A0092B-C50C-407E-A947-70E740481C1C}">
+                <a14:useLocalDpi xmlns:a14="http://schemas.microsoft.com/office/drawing/2010/main" xmlns="" val="0"/>
+              </a:ext>
+            </a:extLst>
+          </a:blip>
+          <a:stretch>
+            <a:fillRect/>
+          </a:stretch>
+        </p:blipFill>
+        <p:spPr>
+          <a:xfrm>
+            <a:off x="1481585" y="1635057"/>
+            <a:ext cx="425562" cy="425562"/>
+          </a:xfrm>
+          <a:prstGeom prst="rect">
+            <a:avLst/>
+          </a:prstGeom>
+        </p:spPr>
+      </p:pic>
+      <p:pic>
+        <p:nvPicPr>
+          <p:cNvPr id="6" name="Picture 5"/>
+          <p:cNvPicPr>
+            <a:picLocks noChangeAspect="1"/>
+          </p:cNvPicPr>
+          <p:nvPr/>
+        </p:nvPicPr>
+        <p:blipFill>
+          <a:blip r:embed="rId2" cstate="print">
+            <a:extLst>
+              <a:ext uri="{28A0092B-C50C-407E-A947-70E740481C1C}">
+                <a14:useLocalDpi xmlns:a14="http://schemas.microsoft.com/office/drawing/2010/main" xmlns="" val="0"/>
+              </a:ext>
+            </a:extLst>
+          </a:blip>
+          <a:stretch>
+            <a:fillRect/>
+          </a:stretch>
+        </p:blipFill>
+        <p:spPr>
+          <a:xfrm>
+            <a:off x="2427925" y="1847838"/>
+            <a:ext cx="425562" cy="425562"/>
+          </a:xfrm>
+          <a:prstGeom prst="rect">
+            <a:avLst/>
+          </a:prstGeom>
+        </p:spPr>
+      </p:pic>
+      <p:pic>
+        <p:nvPicPr>
+          <p:cNvPr id="7" name="Picture 6"/>
+          <p:cNvPicPr>
+            <a:picLocks noChangeAspect="1"/>
+          </p:cNvPicPr>
+          <p:nvPr/>
+        </p:nvPicPr>
+        <p:blipFill>
+          <a:blip r:embed="rId2" cstate="print">
+            <a:extLst>
+              <a:ext uri="{28A0092B-C50C-407E-A947-70E740481C1C}">
+                <a14:useLocalDpi xmlns:a14="http://schemas.microsoft.com/office/drawing/2010/main" xmlns="" val="0"/>
+              </a:ext>
+            </a:extLst>
+          </a:blip>
+          <a:stretch>
+            <a:fillRect/>
+          </a:stretch>
+        </p:blipFill>
+        <p:spPr>
+          <a:xfrm>
+            <a:off x="1334272" y="2273400"/>
+            <a:ext cx="425562" cy="425562"/>
+          </a:xfrm>
+          <a:prstGeom prst="rect">
+            <a:avLst/>
+          </a:prstGeom>
+        </p:spPr>
+      </p:pic>
+      <p:pic>
+        <p:nvPicPr>
+          <p:cNvPr id="8" name="Picture 7"/>
+          <p:cNvPicPr>
+            <a:picLocks noChangeAspect="1"/>
+          </p:cNvPicPr>
+          <p:nvPr/>
+        </p:nvPicPr>
+        <p:blipFill>
+          <a:blip r:embed="rId2" cstate="print">
+            <a:extLst>
+              <a:ext uri="{28A0092B-C50C-407E-A947-70E740481C1C}">
+                <a14:useLocalDpi xmlns:a14="http://schemas.microsoft.com/office/drawing/2010/main" xmlns="" val="0"/>
+              </a:ext>
+            </a:extLst>
+          </a:blip>
+          <a:stretch>
+            <a:fillRect/>
+          </a:stretch>
+        </p:blipFill>
+        <p:spPr>
+          <a:xfrm>
+            <a:off x="1694366" y="2984817"/>
+            <a:ext cx="425562" cy="425562"/>
+          </a:xfrm>
+          <a:prstGeom prst="rect">
+            <a:avLst/>
+          </a:prstGeom>
+        </p:spPr>
+      </p:pic>
+      <p:pic>
+        <p:nvPicPr>
+          <p:cNvPr id="9" name="Picture 8"/>
+          <p:cNvPicPr>
+            <a:picLocks noChangeAspect="1"/>
+          </p:cNvPicPr>
+          <p:nvPr/>
+        </p:nvPicPr>
+        <p:blipFill>
+          <a:blip r:embed="rId2" cstate="print">
+            <a:extLst>
+              <a:ext uri="{28A0092B-C50C-407E-A947-70E740481C1C}">
+                <a14:useLocalDpi xmlns:a14="http://schemas.microsoft.com/office/drawing/2010/main" xmlns="" val="0"/>
+              </a:ext>
+            </a:extLst>
+          </a:blip>
+          <a:stretch>
+            <a:fillRect/>
+          </a:stretch>
+        </p:blipFill>
+        <p:spPr>
+          <a:xfrm>
+            <a:off x="2354268" y="2520619"/>
+            <a:ext cx="425562" cy="425562"/>
+          </a:xfrm>
+          <a:prstGeom prst="rect">
+            <a:avLst/>
+          </a:prstGeom>
+        </p:spPr>
+      </p:pic>
+      <p:sp>
+        <p:nvSpPr>
+          <p:cNvPr id="10" name="TextBox 9"/>
+          <p:cNvSpPr txBox="1"/>
+          <p:nvPr/>
+        </p:nvSpPr>
+        <p:spPr>
+          <a:xfrm>
+            <a:off x="1212739" y="3980809"/>
+            <a:ext cx="1640748" cy="369332"/>
+          </a:xfrm>
+          <a:prstGeom prst="rect">
+            <a:avLst/>
+          </a:prstGeom>
+          <a:noFill/>
+        </p:spPr>
+        <p:txBody>
+          <a:bodyPr wrap="square" rtlCol="0">
+            <a:spAutoFit/>
+          </a:bodyPr>
+          <a:lstStyle/>
+          <a:p>
+            <a:pPr algn="ctr"/>
+            <a:r>
+              <a:rPr lang="es-AR" dirty="0" smtClean="0">
+                <a:latin typeface="Segoe UI" panose="020B0502040204020203" pitchFamily="34" charset="0"/>
+                <a:cs typeface="Segoe UI" panose="020B0502040204020203" pitchFamily="34" charset="0"/>
+              </a:rPr>
+              <a:t>Población</a:t>
+            </a:r>
+            <a:endParaRPr lang="es-AR" dirty="0">
+              <a:latin typeface="Segoe UI" panose="020B0502040204020203" pitchFamily="34" charset="0"/>
+              <a:cs typeface="Segoe UI" panose="020B0502040204020203" pitchFamily="34" charset="0"/>
+            </a:endParaRPr>
+          </a:p>
+        </p:txBody>
+      </p:sp>
+      <p:sp>
+        <p:nvSpPr>
+          <p:cNvPr id="11" name="Rounded Rectangle 10"/>
+          <p:cNvSpPr/>
+          <p:nvPr/>
+        </p:nvSpPr>
+        <p:spPr>
+          <a:xfrm>
+            <a:off x="4601428" y="1301325"/>
+            <a:ext cx="4971245" cy="2369712"/>
+          </a:xfrm>
+          <a:prstGeom prst="roundRect">
+            <a:avLst/>
+          </a:prstGeom>
+          <a:ln>
+            <a:solidFill>
+              <a:schemeClr val="tx2"/>
+            </a:solidFill>
+          </a:ln>
+          <a:effectLst>
+            <a:outerShdw blurRad="50800" dist="38100" dir="2700000" algn="tl" rotWithShape="0">
+              <a:prstClr val="black">
+                <a:alpha val="40000"/>
+              </a:prstClr>
+            </a:outerShdw>
+          </a:effectLst>
+        </p:spPr>
+        <p:style>
+          <a:lnRef idx="2">
+            <a:schemeClr val="accent4"/>
+          </a:lnRef>
+          <a:fillRef idx="1">
+            <a:schemeClr val="lt1"/>
+          </a:fillRef>
+          <a:effectRef idx="0">
+            <a:schemeClr val="accent4"/>
+          </a:effectRef>
+          <a:fontRef idx="minor">
+            <a:schemeClr val="dk1"/>
+          </a:fontRef>
+        </p:style>
+        <p:txBody>
+          <a:bodyPr rtlCol="0" anchor="ctr"/>
+          <a:lstStyle/>
+          <a:p>
+            <a:pPr algn="ctr"/>
+            <a:endParaRPr lang="es-AR"/>
+          </a:p>
+        </p:txBody>
+      </p:sp>
+      <p:sp>
+        <p:nvSpPr>
+          <p:cNvPr id="12" name="Right Arrow 11"/>
+          <p:cNvSpPr/>
+          <p:nvPr/>
+        </p:nvSpPr>
+        <p:spPr>
+          <a:xfrm>
+            <a:off x="3477296" y="2273400"/>
+            <a:ext cx="875484" cy="672781"/>
+          </a:xfrm>
+          <a:prstGeom prst="rightArrow">
+            <a:avLst/>
+          </a:prstGeom>
+        </p:spPr>
+        <p:style>
+          <a:lnRef idx="1">
+            <a:schemeClr val="accent2"/>
+          </a:lnRef>
+          <a:fillRef idx="2">
+            <a:schemeClr val="accent2"/>
+          </a:fillRef>
+          <a:effectRef idx="1">
+            <a:schemeClr val="accent2"/>
+          </a:effectRef>
+          <a:fontRef idx="minor">
+            <a:schemeClr val="dk1"/>
+          </a:fontRef>
+        </p:style>
+        <p:txBody>
+          <a:bodyPr rtlCol="0" anchor="ctr"/>
+          <a:lstStyle/>
+          <a:p>
+            <a:pPr algn="ctr"/>
+            <a:endParaRPr lang="es-AR"/>
+          </a:p>
+        </p:txBody>
+      </p:sp>
+      <p:sp>
+        <p:nvSpPr>
+          <p:cNvPr id="13" name="Right Arrow 12"/>
+          <p:cNvSpPr/>
+          <p:nvPr/>
+        </p:nvSpPr>
+        <p:spPr>
+          <a:xfrm>
+            <a:off x="9851481" y="2214112"/>
+            <a:ext cx="875484" cy="672781"/>
+          </a:xfrm>
+          <a:prstGeom prst="rightArrow">
+            <a:avLst/>
+          </a:prstGeom>
+        </p:spPr>
+        <p:style>
+          <a:lnRef idx="1">
+            <a:schemeClr val="accent1"/>
+          </a:lnRef>
+          <a:fillRef idx="2">
+            <a:schemeClr val="accent1"/>
+          </a:fillRef>
+          <a:effectRef idx="1">
+            <a:schemeClr val="accent1"/>
+          </a:effectRef>
+          <a:fontRef idx="minor">
+            <a:schemeClr val="dk1"/>
+          </a:fontRef>
+        </p:style>
+        <p:txBody>
+          <a:bodyPr rtlCol="0" anchor="ctr"/>
+          <a:lstStyle/>
+          <a:p>
+            <a:pPr algn="ctr"/>
+            <a:endParaRPr lang="es-AR"/>
+          </a:p>
+        </p:txBody>
+      </p:sp>
+      <p:sp>
+        <p:nvSpPr>
+          <p:cNvPr id="15" name="TextBox 14"/>
+          <p:cNvSpPr txBox="1"/>
+          <p:nvPr/>
+        </p:nvSpPr>
+        <p:spPr>
+          <a:xfrm>
+            <a:off x="5542671" y="3980461"/>
+            <a:ext cx="2963684" cy="369332"/>
+          </a:xfrm>
+          <a:prstGeom prst="rect">
+            <a:avLst/>
+          </a:prstGeom>
+          <a:noFill/>
+        </p:spPr>
+        <p:txBody>
+          <a:bodyPr wrap="square" rtlCol="0">
+            <a:spAutoFit/>
+          </a:bodyPr>
+          <a:lstStyle/>
+          <a:p>
+            <a:pPr algn="ctr"/>
+            <a:r>
+              <a:rPr lang="es-AR" dirty="0" smtClean="0">
+                <a:latin typeface="Segoe UI" panose="020B0502040204020203" pitchFamily="34" charset="0"/>
+                <a:cs typeface="Segoe UI" panose="020B0502040204020203" pitchFamily="34" charset="0"/>
+              </a:rPr>
+              <a:t>Sistema = cola + canales</a:t>
+            </a:r>
+            <a:endParaRPr lang="es-AR" dirty="0">
+              <a:latin typeface="Segoe UI" panose="020B0502040204020203" pitchFamily="34" charset="0"/>
+              <a:cs typeface="Segoe UI" panose="020B0502040204020203" pitchFamily="34" charset="0"/>
+            </a:endParaRPr>
+          </a:p>
+        </p:txBody>
+      </p:sp>
+      <p:pic>
+        <p:nvPicPr>
+          <p:cNvPr id="17" name="Picture 16"/>
+          <p:cNvPicPr>
+            <a:picLocks noChangeAspect="1"/>
+          </p:cNvPicPr>
+          <p:nvPr/>
+        </p:nvPicPr>
+        <p:blipFill>
+          <a:blip r:embed="rId3" cstate="print">
+            <a:extLst>
+              <a:ext uri="{28A0092B-C50C-407E-A947-70E740481C1C}">
+                <a14:useLocalDpi xmlns:a14="http://schemas.microsoft.com/office/drawing/2010/main" xmlns="" val="0"/>
+              </a:ext>
+            </a:extLst>
+          </a:blip>
+          <a:stretch>
+            <a:fillRect/>
+          </a:stretch>
+        </p:blipFill>
+        <p:spPr>
+          <a:xfrm>
+            <a:off x="4739079" y="2187917"/>
+            <a:ext cx="745199" cy="745199"/>
+          </a:xfrm>
+          <a:prstGeom prst="rect">
+            <a:avLst/>
+          </a:prstGeom>
+        </p:spPr>
+      </p:pic>
+      <p:sp>
+        <p:nvSpPr>
+          <p:cNvPr id="19" name="TextBox 18"/>
+          <p:cNvSpPr txBox="1"/>
+          <p:nvPr/>
+        </p:nvSpPr>
+        <p:spPr>
+          <a:xfrm>
+            <a:off x="506437" y="239151"/>
+            <a:ext cx="1253677" cy="369332"/>
+          </a:xfrm>
+          <a:prstGeom prst="rect">
+            <a:avLst/>
+          </a:prstGeom>
+          <a:noFill/>
+        </p:spPr>
+        <p:txBody>
+          <a:bodyPr wrap="none" rtlCol="0">
+            <a:spAutoFit/>
+          </a:bodyPr>
+          <a:lstStyle/>
+          <a:p>
+            <a:r>
+              <a:rPr lang="es-AR" dirty="0" smtClean="0"/>
+              <a:t>Ejercicio 10</a:t>
+            </a:r>
+            <a:endParaRPr lang="es-AR" dirty="0"/>
+          </a:p>
+        </p:txBody>
+      </p:sp>
+      <mc:AlternateContent xmlns:mc="http://schemas.openxmlformats.org/markup-compatibility/2006">
+        <mc:Choice xmlns:a14="http://schemas.microsoft.com/office/drawing/2010/main" xmlns="" Requires="a14">
+          <p:sp>
+            <p:nvSpPr>
+              <p:cNvPr id="21" name="TextBox 20"/>
+              <p:cNvSpPr txBox="1"/>
+              <p:nvPr/>
+            </p:nvSpPr>
+            <p:spPr>
+              <a:xfrm>
+                <a:off x="3715560" y="1831648"/>
+                <a:ext cx="177100" cy="276999"/>
+              </a:xfrm>
+              <a:prstGeom prst="rect">
+                <a:avLst/>
+              </a:prstGeom>
+              <a:noFill/>
+            </p:spPr>
+            <p:txBody>
+              <a:bodyPr wrap="none" lIns="0" tIns="0" rIns="0" bIns="0" rtlCol="0">
+                <a:spAutoFit/>
+              </a:bodyPr>
+              <a:lstStyle/>
+              <a:p>
+                <a:pPr/>
+                <a14:m>
+                  <m:oMathPara xmlns:m="http://schemas.openxmlformats.org/officeDocument/2006/math">
+                    <m:oMathParaPr>
+                      <m:jc m:val="centerGroup"/>
+                    </m:oMathParaPr>
+                    <m:oMath xmlns:m="http://schemas.openxmlformats.org/officeDocument/2006/math">
+                      <m:r>
+                        <a:rPr lang="es-AR" b="0" i="1" smtClean="0">
+                          <a:latin typeface="Cambria Math" panose="02040503050406030204" pitchFamily="18" charset="0"/>
+                        </a:rPr>
+                        <m:t>𝜆</m:t>
+                      </m:r>
+                    </m:oMath>
+                  </m:oMathPara>
+                </a14:m>
+                <a:endParaRPr lang="es-AR" dirty="0"/>
+              </a:p>
+            </p:txBody>
+          </p:sp>
+        </mc:Choice>
+        <mc:Fallback>
+          <p:sp>
+            <p:nvSpPr>
+              <p:cNvPr id="21" name="TextBox 20"/>
+              <p:cNvSpPr txBox="1">
+                <a:spLocks noRot="1" noChangeAspect="1" noMove="1" noResize="1" noEditPoints="1" noAdjustHandles="1" noChangeArrowheads="1" noChangeShapeType="1" noTextEdit="1"/>
+              </p:cNvSpPr>
+              <p:nvPr/>
+            </p:nvSpPr>
+            <p:spPr>
+              <a:xfrm>
+                <a:off x="3715560" y="1831648"/>
+                <a:ext cx="177100" cy="276999"/>
+              </a:xfrm>
+              <a:prstGeom prst="rect">
+                <a:avLst/>
+              </a:prstGeom>
+              <a:blipFill rotWithShape="0">
+                <a:blip r:embed="rId4" cstate="print"/>
+                <a:stretch>
+                  <a:fillRect l="-34483" r="-31034" b="-6522"/>
+                </a:stretch>
+              </a:blipFill>
+            </p:spPr>
+            <p:txBody>
+              <a:bodyPr/>
+              <a:lstStyle/>
+              <a:p>
+                <a:r>
+                  <a:rPr lang="es-AR">
+                    <a:noFill/>
+                  </a:rPr>
+                  <a:t> </a:t>
+                </a:r>
+              </a:p>
+            </p:txBody>
+          </p:sp>
+        </mc:Fallback>
+      </mc:AlternateContent>
+      <p:pic>
+        <p:nvPicPr>
+          <p:cNvPr id="25" name="Picture 16"/>
+          <p:cNvPicPr>
+            <a:picLocks noChangeAspect="1"/>
+          </p:cNvPicPr>
+          <p:nvPr/>
+        </p:nvPicPr>
+        <p:blipFill>
+          <a:blip r:embed="rId3" cstate="print">
+            <a:extLst>
+              <a:ext uri="{28A0092B-C50C-407E-A947-70E740481C1C}">
+                <a14:useLocalDpi xmlns:a14="http://schemas.microsoft.com/office/drawing/2010/main" xmlns="" val="0"/>
+              </a:ext>
+            </a:extLst>
+          </a:blip>
+          <a:stretch>
+            <a:fillRect/>
+          </a:stretch>
+        </p:blipFill>
+        <p:spPr>
+          <a:xfrm>
+            <a:off x="6580939" y="2200981"/>
+            <a:ext cx="745199" cy="745199"/>
+          </a:xfrm>
+          <a:prstGeom prst="rect">
+            <a:avLst/>
+          </a:prstGeom>
+        </p:spPr>
+      </p:pic>
+      <p:pic>
+        <p:nvPicPr>
+          <p:cNvPr id="26" name="Picture 16"/>
+          <p:cNvPicPr>
+            <a:picLocks noChangeAspect="1"/>
+          </p:cNvPicPr>
+          <p:nvPr/>
+        </p:nvPicPr>
+        <p:blipFill>
+          <a:blip r:embed="rId3" cstate="print">
+            <a:extLst>
+              <a:ext uri="{28A0092B-C50C-407E-A947-70E740481C1C}">
+                <a14:useLocalDpi xmlns:a14="http://schemas.microsoft.com/office/drawing/2010/main" xmlns="" val="0"/>
+              </a:ext>
+            </a:extLst>
+          </a:blip>
+          <a:stretch>
+            <a:fillRect/>
+          </a:stretch>
+        </p:blipFill>
+        <p:spPr>
+          <a:xfrm>
+            <a:off x="8435867" y="2174855"/>
+            <a:ext cx="745199" cy="745199"/>
+          </a:xfrm>
+          <a:prstGeom prst="rect">
+            <a:avLst/>
+          </a:prstGeom>
+        </p:spPr>
+      </p:pic>
+      <p:cxnSp>
+        <p:nvCxnSpPr>
+          <p:cNvPr id="38" name="37 Conector recto de flecha"/>
+          <p:cNvCxnSpPr/>
+          <p:nvPr/>
+        </p:nvCxnSpPr>
+        <p:spPr>
+          <a:xfrm>
+            <a:off x="5669280" y="2560320"/>
+            <a:ext cx="836023" cy="0"/>
+          </a:xfrm>
+          <a:prstGeom prst="straightConnector1">
+            <a:avLst/>
+          </a:prstGeom>
+          <a:ln w="47625" cmpd="sng">
+            <a:tailEnd type="arrow"/>
+          </a:ln>
+        </p:spPr>
+        <p:style>
+          <a:lnRef idx="1">
+            <a:schemeClr val="accent1"/>
+          </a:lnRef>
+          <a:fillRef idx="0">
+            <a:schemeClr val="accent1"/>
+          </a:fillRef>
+          <a:effectRef idx="0">
+            <a:schemeClr val="accent1"/>
+          </a:effectRef>
+          <a:fontRef idx="minor">
+            <a:schemeClr val="tx1"/>
+          </a:fontRef>
+        </p:style>
+      </p:cxnSp>
+      <p:cxnSp>
+        <p:nvCxnSpPr>
+          <p:cNvPr id="39" name="38 Conector recto de flecha"/>
+          <p:cNvCxnSpPr/>
+          <p:nvPr/>
+        </p:nvCxnSpPr>
+        <p:spPr>
+          <a:xfrm>
+            <a:off x="7441474" y="2529840"/>
+            <a:ext cx="836023" cy="0"/>
+          </a:xfrm>
+          <a:prstGeom prst="straightConnector1">
+            <a:avLst/>
+          </a:prstGeom>
+          <a:ln w="47625" cmpd="sng">
+            <a:tailEnd type="arrow"/>
+          </a:ln>
+        </p:spPr>
+        <p:style>
+          <a:lnRef idx="1">
+            <a:schemeClr val="accent1"/>
+          </a:lnRef>
+          <a:fillRef idx="0">
+            <a:schemeClr val="accent1"/>
+          </a:fillRef>
+          <a:effectRef idx="0">
+            <a:schemeClr val="accent1"/>
+          </a:effectRef>
+          <a:fontRef idx="minor">
+            <a:schemeClr val="tx1"/>
+          </a:fontRef>
+        </p:style>
+      </p:cxnSp>
+      <p:cxnSp>
+        <p:nvCxnSpPr>
+          <p:cNvPr id="54" name="53 Conector recto"/>
+          <p:cNvCxnSpPr/>
+          <p:nvPr/>
+        </p:nvCxnSpPr>
+        <p:spPr>
+          <a:xfrm>
+            <a:off x="5695406" y="2717074"/>
+            <a:ext cx="0" cy="705395"/>
+          </a:xfrm>
+          <a:prstGeom prst="line">
+            <a:avLst/>
+          </a:prstGeom>
+          <a:ln w="38100"/>
+        </p:spPr>
+        <p:style>
+          <a:lnRef idx="1">
+            <a:schemeClr val="accent1"/>
+          </a:lnRef>
+          <a:fillRef idx="0">
+            <a:schemeClr val="accent1"/>
+          </a:fillRef>
+          <a:effectRef idx="0">
+            <a:schemeClr val="accent1"/>
+          </a:effectRef>
+          <a:fontRef idx="minor">
+            <a:schemeClr val="tx1"/>
+          </a:fontRef>
+        </p:style>
+      </p:cxnSp>
+      <p:cxnSp>
+        <p:nvCxnSpPr>
+          <p:cNvPr id="56" name="55 Conector recto"/>
+          <p:cNvCxnSpPr/>
+          <p:nvPr/>
+        </p:nvCxnSpPr>
+        <p:spPr>
+          <a:xfrm>
+            <a:off x="5695406" y="3422469"/>
+            <a:ext cx="3082834" cy="0"/>
+          </a:xfrm>
+          <a:prstGeom prst="line">
+            <a:avLst/>
+          </a:prstGeom>
+          <a:ln w="38100"/>
+        </p:spPr>
+        <p:style>
+          <a:lnRef idx="1">
+            <a:schemeClr val="accent1"/>
+          </a:lnRef>
+          <a:fillRef idx="0">
+            <a:schemeClr val="accent1"/>
+          </a:fillRef>
+          <a:effectRef idx="0">
+            <a:schemeClr val="accent1"/>
+          </a:effectRef>
+          <a:fontRef idx="minor">
+            <a:schemeClr val="tx1"/>
+          </a:fontRef>
+        </p:style>
+      </p:cxnSp>
+      <p:cxnSp>
+        <p:nvCxnSpPr>
+          <p:cNvPr id="58" name="57 Conector recto de flecha"/>
+          <p:cNvCxnSpPr>
+            <a:endCxn id="26" idx="2"/>
+          </p:cNvCxnSpPr>
+          <p:nvPr/>
+        </p:nvCxnSpPr>
+        <p:spPr>
+          <a:xfrm flipV="1">
+            <a:off x="8778240" y="2920054"/>
+            <a:ext cx="30227" cy="502416"/>
+          </a:xfrm>
+          <a:prstGeom prst="straightConnector1">
+            <a:avLst/>
+          </a:prstGeom>
+          <a:ln w="38100">
+            <a:tailEnd type="arrow"/>
+          </a:ln>
+        </p:spPr>
+        <p:style>
+          <a:lnRef idx="1">
+            <a:schemeClr val="accent1"/>
+          </a:lnRef>
+          <a:fillRef idx="0">
+            <a:schemeClr val="accent1"/>
+          </a:fillRef>
+          <a:effectRef idx="0">
+            <a:schemeClr val="accent1"/>
+          </a:effectRef>
+          <a:fontRef idx="minor">
+            <a:schemeClr val="tx1"/>
+          </a:fontRef>
+        </p:style>
+      </p:cxnSp>
+      <p:sp>
+        <p:nvSpPr>
+          <p:cNvPr id="60" name="59 Rectángulo"/>
+          <p:cNvSpPr/>
+          <p:nvPr/>
+        </p:nvSpPr>
+        <p:spPr>
+          <a:xfrm>
+            <a:off x="5751841" y="1938049"/>
+            <a:ext cx="583814" cy="369332"/>
+          </a:xfrm>
+          <a:prstGeom prst="rect">
+            <a:avLst/>
+          </a:prstGeom>
+        </p:spPr>
+        <p:txBody>
+          <a:bodyPr wrap="none">
+            <a:spAutoFit/>
+          </a:bodyPr>
+          <a:lstStyle/>
+          <a:p>
+            <a:r>
+              <a:rPr lang="es-AR" dirty="0" smtClean="0"/>
+              <a:t>80%</a:t>
+            </a:r>
+            <a:endParaRPr lang="es-AR" dirty="0"/>
+          </a:p>
+        </p:txBody>
+      </p:sp>
+      <p:sp>
+        <p:nvSpPr>
+          <p:cNvPr id="61" name="60 Rectángulo"/>
+          <p:cNvSpPr/>
+          <p:nvPr/>
+        </p:nvSpPr>
+        <p:spPr>
+          <a:xfrm>
+            <a:off x="6783261" y="2983076"/>
+            <a:ext cx="583814" cy="369332"/>
+          </a:xfrm>
+          <a:prstGeom prst="rect">
+            <a:avLst/>
+          </a:prstGeom>
+        </p:spPr>
+        <p:txBody>
+          <a:bodyPr wrap="none">
+            <a:spAutoFit/>
+          </a:bodyPr>
+          <a:lstStyle/>
+          <a:p>
+            <a:pPr lvl="0" fontAlgn="base">
+              <a:spcBef>
+                <a:spcPct val="0"/>
+              </a:spcBef>
+              <a:spcAft>
+                <a:spcPct val="0"/>
+              </a:spcAft>
+            </a:pPr>
+            <a:r>
+              <a:rPr lang="es-AR" dirty="0" smtClean="0">
+                <a:latin typeface="Calibri" pitchFamily="34" charset="0"/>
+                <a:ea typeface="Calibri" pitchFamily="34" charset="0"/>
+                <a:cs typeface="Times New Roman" pitchFamily="18" charset="0"/>
+              </a:rPr>
+              <a:t>20%</a:t>
+            </a:r>
+            <a:endParaRPr lang="es-AR" sz="3200" dirty="0" smtClean="0">
+              <a:latin typeface="Arial" pitchFamily="34" charset="0"/>
+              <a:cs typeface="Arial" pitchFamily="34" charset="0"/>
+            </a:endParaRPr>
+          </a:p>
+        </p:txBody>
+      </p:sp>
+      <p:pic>
+        <p:nvPicPr>
+          <p:cNvPr id="62" name="Picture 3"/>
+          <p:cNvPicPr>
+            <a:picLocks noChangeAspect="1" noChangeArrowheads="1"/>
+          </p:cNvPicPr>
+          <p:nvPr/>
+        </p:nvPicPr>
+        <p:blipFill>
+          <a:blip r:embed="rId5" cstate="print">
+            <a:clrChange>
+              <a:clrFrom>
+                <a:srgbClr val="FFFFFF"/>
+              </a:clrFrom>
+              <a:clrTo>
+                <a:srgbClr val="FFFFFF">
+                  <a:alpha val="0"/>
+                </a:srgbClr>
+              </a:clrTo>
+            </a:clrChange>
+          </a:blip>
+          <a:srcRect/>
+          <a:stretch>
+            <a:fillRect/>
+          </a:stretch>
+        </p:blipFill>
+        <p:spPr bwMode="auto">
+          <a:xfrm>
+            <a:off x="5016137" y="1795173"/>
+            <a:ext cx="235131" cy="319106"/>
+          </a:xfrm>
+          <a:prstGeom prst="rect">
+            <a:avLst/>
+          </a:prstGeom>
+          <a:noFill/>
+        </p:spPr>
+      </p:pic>
+      <p:pic>
+        <p:nvPicPr>
+          <p:cNvPr id="63" name="Picture 9"/>
+          <p:cNvPicPr>
+            <a:picLocks noChangeAspect="1" noChangeArrowheads="1"/>
+          </p:cNvPicPr>
+          <p:nvPr/>
+        </p:nvPicPr>
+        <p:blipFill>
+          <a:blip r:embed="rId6" cstate="print">
+            <a:clrChange>
+              <a:clrFrom>
+                <a:srgbClr val="FFFFFF"/>
+              </a:clrFrom>
+              <a:clrTo>
+                <a:srgbClr val="FFFFFF">
+                  <a:alpha val="0"/>
+                </a:srgbClr>
+              </a:clrTo>
+            </a:clrChange>
+          </a:blip>
+          <a:srcRect/>
+          <a:stretch>
+            <a:fillRect/>
+          </a:stretch>
+        </p:blipFill>
+        <p:spPr bwMode="auto">
+          <a:xfrm>
+            <a:off x="6844937" y="1854925"/>
+            <a:ext cx="226881" cy="287383"/>
+          </a:xfrm>
+          <a:prstGeom prst="rect">
+            <a:avLst/>
+          </a:prstGeom>
+          <a:noFill/>
+        </p:spPr>
+      </p:pic>
+      <p:pic>
+        <p:nvPicPr>
+          <p:cNvPr id="64" name="Picture 7"/>
+          <p:cNvPicPr>
+            <a:picLocks noChangeAspect="1" noChangeArrowheads="1"/>
+          </p:cNvPicPr>
+          <p:nvPr/>
+        </p:nvPicPr>
+        <p:blipFill>
+          <a:blip r:embed="rId7" cstate="print">
+            <a:clrChange>
+              <a:clrFrom>
+                <a:srgbClr val="FFFFFF"/>
+              </a:clrFrom>
+              <a:clrTo>
+                <a:srgbClr val="FFFFFF">
+                  <a:alpha val="0"/>
+                </a:srgbClr>
+              </a:clrTo>
+            </a:clrChange>
+          </a:blip>
+          <a:srcRect/>
+          <a:stretch>
+            <a:fillRect/>
+          </a:stretch>
+        </p:blipFill>
+        <p:spPr bwMode="auto">
+          <a:xfrm>
+            <a:off x="8725989" y="1828800"/>
+            <a:ext cx="268132" cy="339634"/>
+          </a:xfrm>
+          <a:prstGeom prst="rect">
+            <a:avLst/>
+          </a:prstGeom>
+          <a:noFill/>
+        </p:spPr>
+      </p:pic>
+    </p:spTree>
+    <p:extLst>
+      <p:ext uri="{BB962C8B-B14F-4D97-AF65-F5344CB8AC3E}">
+        <p14:creationId xmlns:p14="http://schemas.microsoft.com/office/powerpoint/2010/main" xmlns="" val="546631854"/>
       </p:ext>
     </p:extLst>
   </p:cSld>
@@ -4026,7 +6417,7 @@
           <a:blip r:embed="rId2" cstate="print">
             <a:extLst>
               <a:ext uri="{28A0092B-C50C-407E-A947-70E740481C1C}">
-                <a14:useLocalDpi xmlns:a14="http://schemas.microsoft.com/office/drawing/2010/main" val="0"/>
+                <a14:useLocalDpi xmlns:a14="http://schemas.microsoft.com/office/drawing/2010/main" xmlns="" val="0"/>
               </a:ext>
             </a:extLst>
           </a:blip>
@@ -4056,7 +6447,7 @@
           <a:blip r:embed="rId2" cstate="print">
             <a:extLst>
               <a:ext uri="{28A0092B-C50C-407E-A947-70E740481C1C}">
-                <a14:useLocalDpi xmlns:a14="http://schemas.microsoft.com/office/drawing/2010/main" val="0"/>
+                <a14:useLocalDpi xmlns:a14="http://schemas.microsoft.com/office/drawing/2010/main" xmlns="" val="0"/>
               </a:ext>
             </a:extLst>
           </a:blip>
@@ -4086,7 +6477,7 @@
           <a:blip r:embed="rId2" cstate="print">
             <a:extLst>
               <a:ext uri="{28A0092B-C50C-407E-A947-70E740481C1C}">
-                <a14:useLocalDpi xmlns:a14="http://schemas.microsoft.com/office/drawing/2010/main" val="0"/>
+                <a14:useLocalDpi xmlns:a14="http://schemas.microsoft.com/office/drawing/2010/main" xmlns="" val="0"/>
               </a:ext>
             </a:extLst>
           </a:blip>
@@ -4116,7 +6507,7 @@
           <a:blip r:embed="rId2" cstate="print">
             <a:extLst>
               <a:ext uri="{28A0092B-C50C-407E-A947-70E740481C1C}">
-                <a14:useLocalDpi xmlns:a14="http://schemas.microsoft.com/office/drawing/2010/main" val="0"/>
+                <a14:useLocalDpi xmlns:a14="http://schemas.microsoft.com/office/drawing/2010/main" xmlns="" val="0"/>
               </a:ext>
             </a:extLst>
           </a:blip>
@@ -4146,7 +6537,7 @@
           <a:blip r:embed="rId2" cstate="print">
             <a:extLst>
               <a:ext uri="{28A0092B-C50C-407E-A947-70E740481C1C}">
-                <a14:useLocalDpi xmlns:a14="http://schemas.microsoft.com/office/drawing/2010/main" val="0"/>
+                <a14:useLocalDpi xmlns:a14="http://schemas.microsoft.com/office/drawing/2010/main" xmlns="" val="0"/>
               </a:ext>
             </a:extLst>
           </a:blip>
@@ -4428,7 +6819,7 @@
           <a:blip r:embed="rId3" cstate="print">
             <a:extLst>
               <a:ext uri="{28A0092B-C50C-407E-A947-70E740481C1C}">
-                <a14:useLocalDpi xmlns:a14="http://schemas.microsoft.com/office/drawing/2010/main" val="0"/>
+                <a14:useLocalDpi xmlns:a14="http://schemas.microsoft.com/office/drawing/2010/main" xmlns="" val="0"/>
               </a:ext>
             </a:extLst>
           </a:blip>
@@ -4519,8 +6910,8 @@
           </a:p>
         </p:txBody>
       </p:sp>
-      <mc:AlternateContent xmlns:mc="http://schemas.openxmlformats.org/markup-compatibility/2006" xmlns:a14="http://schemas.microsoft.com/office/drawing/2010/main">
-        <mc:Choice Requires="a14">
+      <mc:AlternateContent xmlns:mc="http://schemas.openxmlformats.org/markup-compatibility/2006">
+        <mc:Choice xmlns:a14="http://schemas.microsoft.com/office/drawing/2010/main" xmlns="" Requires="a14">
           <p:sp>
             <p:nvSpPr>
               <p:cNvPr id="21" name="TextBox 20"/>
@@ -4595,7 +6986,7 @@
             </p:txBody>
           </p:sp>
         </mc:Choice>
-        <mc:Fallback xmlns="">
+        <mc:Fallback>
           <p:sp>
             <p:nvSpPr>
               <p:cNvPr id="21" name="TextBox 20"/>
@@ -4634,8 +7025,8 @@
           </p:sp>
         </mc:Fallback>
       </mc:AlternateContent>
-      <mc:AlternateContent xmlns:mc="http://schemas.openxmlformats.org/markup-compatibility/2006" xmlns:a14="http://schemas.microsoft.com/office/drawing/2010/main">
-        <mc:Choice Requires="a14">
+      <mc:AlternateContent xmlns:mc="http://schemas.openxmlformats.org/markup-compatibility/2006">
+        <mc:Choice xmlns:a14="http://schemas.microsoft.com/office/drawing/2010/main" xmlns="" Requires="a14">
           <p:sp>
             <p:nvSpPr>
               <p:cNvPr id="22" name="TextBox 21"/>
@@ -4703,7 +7094,7 @@
             </p:txBody>
           </p:sp>
         </mc:Choice>
-        <mc:Fallback xmlns="">
+        <mc:Fallback>
           <p:sp>
             <p:nvSpPr>
               <p:cNvPr id="22" name="TextBox 21"/>
@@ -4742,8 +7133,8 @@
           </p:sp>
         </mc:Fallback>
       </mc:AlternateContent>
-      <mc:AlternateContent xmlns:mc="http://schemas.openxmlformats.org/markup-compatibility/2006" xmlns:a14="http://schemas.microsoft.com/office/drawing/2010/main">
-        <mc:Choice Requires="a14">
+      <mc:AlternateContent xmlns:mc="http://schemas.openxmlformats.org/markup-compatibility/2006">
+        <mc:Choice xmlns:a14="http://schemas.microsoft.com/office/drawing/2010/main" xmlns="" Requires="a14">
           <p:sp>
             <p:nvSpPr>
               <p:cNvPr id="23" name="TextBox 22"/>
@@ -4849,7 +7240,7 @@
             </p:txBody>
           </p:sp>
         </mc:Choice>
-        <mc:Fallback xmlns="">
+        <mc:Fallback>
           <p:sp>
             <p:nvSpPr>
               <p:cNvPr id="23" name="TextBox 22"/>
@@ -4888,8 +7279,8 @@
           </p:sp>
         </mc:Fallback>
       </mc:AlternateContent>
-      <mc:AlternateContent xmlns:mc="http://schemas.openxmlformats.org/markup-compatibility/2006" xmlns:a14="http://schemas.microsoft.com/office/drawing/2010/main">
-        <mc:Choice Requires="a14">
+      <mc:AlternateContent xmlns:mc="http://schemas.openxmlformats.org/markup-compatibility/2006">
+        <mc:Choice xmlns:a14="http://schemas.microsoft.com/office/drawing/2010/main" xmlns="" Requires="a14">
           <p:sp>
             <p:nvSpPr>
               <p:cNvPr id="24" name="TextBox 23"/>
@@ -4957,7 +7348,7 @@
             </p:txBody>
           </p:sp>
         </mc:Choice>
-        <mc:Fallback xmlns="">
+        <mc:Fallback>
           <p:sp>
             <p:nvSpPr>
               <p:cNvPr id="24" name="TextBox 23"/>
@@ -4999,7 +7390,7 @@
     </p:spTree>
     <p:extLst>
       <p:ext uri="{BB962C8B-B14F-4D97-AF65-F5344CB8AC3E}">
-        <p14:creationId xmlns:p14="http://schemas.microsoft.com/office/powerpoint/2010/main" val="3368485320"/>
+        <p14:creationId xmlns:p14="http://schemas.microsoft.com/office/powerpoint/2010/main" xmlns="" val="3368485320"/>
       </p:ext>
     </p:extLst>
   </p:cSld>
@@ -5095,7 +7486,7 @@
           <a:blip r:embed="rId2" cstate="print">
             <a:extLst>
               <a:ext uri="{28A0092B-C50C-407E-A947-70E740481C1C}">
-                <a14:useLocalDpi xmlns:a14="http://schemas.microsoft.com/office/drawing/2010/main" val="0"/>
+                <a14:useLocalDpi xmlns:a14="http://schemas.microsoft.com/office/drawing/2010/main" xmlns="" val="0"/>
               </a:ext>
             </a:extLst>
           </a:blip>
@@ -5125,7 +7516,7 @@
           <a:blip r:embed="rId2" cstate="print">
             <a:extLst>
               <a:ext uri="{28A0092B-C50C-407E-A947-70E740481C1C}">
-                <a14:useLocalDpi xmlns:a14="http://schemas.microsoft.com/office/drawing/2010/main" val="0"/>
+                <a14:useLocalDpi xmlns:a14="http://schemas.microsoft.com/office/drawing/2010/main" xmlns="" val="0"/>
               </a:ext>
             </a:extLst>
           </a:blip>
@@ -5155,7 +7546,7 @@
           <a:blip r:embed="rId2" cstate="print">
             <a:extLst>
               <a:ext uri="{28A0092B-C50C-407E-A947-70E740481C1C}">
-                <a14:useLocalDpi xmlns:a14="http://schemas.microsoft.com/office/drawing/2010/main" val="0"/>
+                <a14:useLocalDpi xmlns:a14="http://schemas.microsoft.com/office/drawing/2010/main" xmlns="" val="0"/>
               </a:ext>
             </a:extLst>
           </a:blip>
@@ -5185,7 +7576,7 @@
           <a:blip r:embed="rId2" cstate="print">
             <a:extLst>
               <a:ext uri="{28A0092B-C50C-407E-A947-70E740481C1C}">
-                <a14:useLocalDpi xmlns:a14="http://schemas.microsoft.com/office/drawing/2010/main" val="0"/>
+                <a14:useLocalDpi xmlns:a14="http://schemas.microsoft.com/office/drawing/2010/main" xmlns="" val="0"/>
               </a:ext>
             </a:extLst>
           </a:blip>
@@ -5215,7 +7606,7 @@
           <a:blip r:embed="rId2" cstate="print">
             <a:extLst>
               <a:ext uri="{28A0092B-C50C-407E-A947-70E740481C1C}">
-                <a14:useLocalDpi xmlns:a14="http://schemas.microsoft.com/office/drawing/2010/main" val="0"/>
+                <a14:useLocalDpi xmlns:a14="http://schemas.microsoft.com/office/drawing/2010/main" xmlns="" val="0"/>
               </a:ext>
             </a:extLst>
           </a:blip>
@@ -5497,7 +7888,7 @@
           <a:blip r:embed="rId3" cstate="print">
             <a:extLst>
               <a:ext uri="{28A0092B-C50C-407E-A947-70E740481C1C}">
-                <a14:useLocalDpi xmlns:a14="http://schemas.microsoft.com/office/drawing/2010/main" val="0"/>
+                <a14:useLocalDpi xmlns:a14="http://schemas.microsoft.com/office/drawing/2010/main" xmlns="" val="0"/>
               </a:ext>
             </a:extLst>
           </a:blip>
@@ -5588,8 +7979,8 @@
           </a:p>
         </p:txBody>
       </p:sp>
-      <mc:AlternateContent xmlns:mc="http://schemas.openxmlformats.org/markup-compatibility/2006" xmlns:a14="http://schemas.microsoft.com/office/drawing/2010/main">
-        <mc:Choice Requires="a14">
+      <mc:AlternateContent xmlns:mc="http://schemas.openxmlformats.org/markup-compatibility/2006">
+        <mc:Choice xmlns:a14="http://schemas.microsoft.com/office/drawing/2010/main" xmlns="" Requires="a14">
           <p:sp>
             <p:nvSpPr>
               <p:cNvPr id="21" name="TextBox 20"/>
@@ -5664,7 +8055,7 @@
             </p:txBody>
           </p:sp>
         </mc:Choice>
-        <mc:Fallback xmlns="">
+        <mc:Fallback>
           <p:sp>
             <p:nvSpPr>
               <p:cNvPr id="21" name="TextBox 20"/>
@@ -5703,8 +8094,8 @@
           </p:sp>
         </mc:Fallback>
       </mc:AlternateContent>
-      <mc:AlternateContent xmlns:mc="http://schemas.openxmlformats.org/markup-compatibility/2006" xmlns:a14="http://schemas.microsoft.com/office/drawing/2010/main">
-        <mc:Choice Requires="a14">
+      <mc:AlternateContent xmlns:mc="http://schemas.openxmlformats.org/markup-compatibility/2006">
+        <mc:Choice xmlns:a14="http://schemas.microsoft.com/office/drawing/2010/main" xmlns="" Requires="a14">
           <p:sp>
             <p:nvSpPr>
               <p:cNvPr id="22" name="TextBox 21"/>
@@ -5772,7 +8163,7 @@
             </p:txBody>
           </p:sp>
         </mc:Choice>
-        <mc:Fallback xmlns="">
+        <mc:Fallback>
           <p:sp>
             <p:nvSpPr>
               <p:cNvPr id="22" name="TextBox 21"/>
@@ -5811,8 +8202,8 @@
           </p:sp>
         </mc:Fallback>
       </mc:AlternateContent>
-      <mc:AlternateContent xmlns:mc="http://schemas.openxmlformats.org/markup-compatibility/2006" xmlns:a14="http://schemas.microsoft.com/office/drawing/2010/main">
-        <mc:Choice Requires="a14">
+      <mc:AlternateContent xmlns:mc="http://schemas.openxmlformats.org/markup-compatibility/2006">
+        <mc:Choice xmlns:a14="http://schemas.microsoft.com/office/drawing/2010/main" xmlns="" Requires="a14">
           <p:sp>
             <p:nvSpPr>
               <p:cNvPr id="23" name="TextBox 22"/>
@@ -5943,7 +8334,7 @@
             </p:txBody>
           </p:sp>
         </mc:Choice>
-        <mc:Fallback xmlns="">
+        <mc:Fallback>
           <p:sp>
             <p:nvSpPr>
               <p:cNvPr id="23" name="TextBox 22"/>
@@ -5982,8 +8373,8 @@
           </p:sp>
         </mc:Fallback>
       </mc:AlternateContent>
-      <mc:AlternateContent xmlns:mc="http://schemas.openxmlformats.org/markup-compatibility/2006" xmlns:a14="http://schemas.microsoft.com/office/drawing/2010/main">
-        <mc:Choice Requires="a14">
+      <mc:AlternateContent xmlns:mc="http://schemas.openxmlformats.org/markup-compatibility/2006">
+        <mc:Choice xmlns:a14="http://schemas.microsoft.com/office/drawing/2010/main" xmlns="" Requires="a14">
           <p:sp>
             <p:nvSpPr>
               <p:cNvPr id="24" name="TextBox 23"/>
@@ -6051,7 +8442,7 @@
             </p:txBody>
           </p:sp>
         </mc:Choice>
-        <mc:Fallback xmlns="">
+        <mc:Fallback>
           <p:sp>
             <p:nvSpPr>
               <p:cNvPr id="24" name="TextBox 23"/>
@@ -6093,7 +8484,7 @@
     </p:spTree>
     <p:extLst>
       <p:ext uri="{BB962C8B-B14F-4D97-AF65-F5344CB8AC3E}">
-        <p14:creationId xmlns:p14="http://schemas.microsoft.com/office/powerpoint/2010/main" val="37058664"/>
+        <p14:creationId xmlns:p14="http://schemas.microsoft.com/office/powerpoint/2010/main" xmlns="" val="37058664"/>
       </p:ext>
     </p:extLst>
   </p:cSld>
@@ -6189,7 +8580,7 @@
           <a:blip r:embed="rId2" cstate="print">
             <a:extLst>
               <a:ext uri="{28A0092B-C50C-407E-A947-70E740481C1C}">
-                <a14:useLocalDpi xmlns:a14="http://schemas.microsoft.com/office/drawing/2010/main" val="0"/>
+                <a14:useLocalDpi xmlns:a14="http://schemas.microsoft.com/office/drawing/2010/main" xmlns="" val="0"/>
               </a:ext>
             </a:extLst>
           </a:blip>
@@ -6219,7 +8610,7 @@
           <a:blip r:embed="rId2" cstate="print">
             <a:extLst>
               <a:ext uri="{28A0092B-C50C-407E-A947-70E740481C1C}">
-                <a14:useLocalDpi xmlns:a14="http://schemas.microsoft.com/office/drawing/2010/main" val="0"/>
+                <a14:useLocalDpi xmlns:a14="http://schemas.microsoft.com/office/drawing/2010/main" xmlns="" val="0"/>
               </a:ext>
             </a:extLst>
           </a:blip>
@@ -6249,7 +8640,7 @@
           <a:blip r:embed="rId2" cstate="print">
             <a:extLst>
               <a:ext uri="{28A0092B-C50C-407E-A947-70E740481C1C}">
-                <a14:useLocalDpi xmlns:a14="http://schemas.microsoft.com/office/drawing/2010/main" val="0"/>
+                <a14:useLocalDpi xmlns:a14="http://schemas.microsoft.com/office/drawing/2010/main" xmlns="" val="0"/>
               </a:ext>
             </a:extLst>
           </a:blip>
@@ -6279,7 +8670,7 @@
           <a:blip r:embed="rId2" cstate="print">
             <a:extLst>
               <a:ext uri="{28A0092B-C50C-407E-A947-70E740481C1C}">
-                <a14:useLocalDpi xmlns:a14="http://schemas.microsoft.com/office/drawing/2010/main" val="0"/>
+                <a14:useLocalDpi xmlns:a14="http://schemas.microsoft.com/office/drawing/2010/main" xmlns="" val="0"/>
               </a:ext>
             </a:extLst>
           </a:blip>
@@ -6309,7 +8700,7 @@
           <a:blip r:embed="rId2" cstate="print">
             <a:extLst>
               <a:ext uri="{28A0092B-C50C-407E-A947-70E740481C1C}">
-                <a14:useLocalDpi xmlns:a14="http://schemas.microsoft.com/office/drawing/2010/main" val="0"/>
+                <a14:useLocalDpi xmlns:a14="http://schemas.microsoft.com/office/drawing/2010/main" xmlns="" val="0"/>
               </a:ext>
             </a:extLst>
           </a:blip>
@@ -6553,7 +8944,7 @@
           <a:blip r:embed="rId3" cstate="print">
             <a:extLst>
               <a:ext uri="{28A0092B-C50C-407E-A947-70E740481C1C}">
-                <a14:useLocalDpi xmlns:a14="http://schemas.microsoft.com/office/drawing/2010/main" val="0"/>
+                <a14:useLocalDpi xmlns:a14="http://schemas.microsoft.com/office/drawing/2010/main" xmlns="" val="0"/>
               </a:ext>
             </a:extLst>
           </a:blip>
@@ -6998,7 +9389,7 @@
           <a:blip r:embed="rId2" cstate="print">
             <a:extLst>
               <a:ext uri="{28A0092B-C50C-407E-A947-70E740481C1C}">
-                <a14:useLocalDpi xmlns:a14="http://schemas.microsoft.com/office/drawing/2010/main" val="0"/>
+                <a14:useLocalDpi xmlns:a14="http://schemas.microsoft.com/office/drawing/2010/main" xmlns="" val="0"/>
               </a:ext>
             </a:extLst>
           </a:blip>
@@ -7028,7 +9419,7 @@
           <a:blip r:embed="rId2" cstate="print">
             <a:extLst>
               <a:ext uri="{28A0092B-C50C-407E-A947-70E740481C1C}">
-                <a14:useLocalDpi xmlns:a14="http://schemas.microsoft.com/office/drawing/2010/main" val="0"/>
+                <a14:useLocalDpi xmlns:a14="http://schemas.microsoft.com/office/drawing/2010/main" xmlns="" val="0"/>
               </a:ext>
             </a:extLst>
           </a:blip>
@@ -7058,7 +9449,7 @@
           <a:blip r:embed="rId2" cstate="print">
             <a:extLst>
               <a:ext uri="{28A0092B-C50C-407E-A947-70E740481C1C}">
-                <a14:useLocalDpi xmlns:a14="http://schemas.microsoft.com/office/drawing/2010/main" val="0"/>
+                <a14:useLocalDpi xmlns:a14="http://schemas.microsoft.com/office/drawing/2010/main" xmlns="" val="0"/>
               </a:ext>
             </a:extLst>
           </a:blip>
@@ -7088,7 +9479,7 @@
           <a:blip r:embed="rId2" cstate="print">
             <a:extLst>
               <a:ext uri="{28A0092B-C50C-407E-A947-70E740481C1C}">
-                <a14:useLocalDpi xmlns:a14="http://schemas.microsoft.com/office/drawing/2010/main" val="0"/>
+                <a14:useLocalDpi xmlns:a14="http://schemas.microsoft.com/office/drawing/2010/main" xmlns="" val="0"/>
               </a:ext>
             </a:extLst>
           </a:blip>
@@ -7118,7 +9509,7 @@
           <a:blip r:embed="rId2" cstate="print">
             <a:extLst>
               <a:ext uri="{28A0092B-C50C-407E-A947-70E740481C1C}">
-                <a14:useLocalDpi xmlns:a14="http://schemas.microsoft.com/office/drawing/2010/main" val="0"/>
+                <a14:useLocalDpi xmlns:a14="http://schemas.microsoft.com/office/drawing/2010/main" xmlns="" val="0"/>
               </a:ext>
             </a:extLst>
           </a:blip>
@@ -7362,7 +9753,7 @@
           <a:blip r:embed="rId3" cstate="print">
             <a:extLst>
               <a:ext uri="{28A0092B-C50C-407E-A947-70E740481C1C}">
-                <a14:useLocalDpi xmlns:a14="http://schemas.microsoft.com/office/drawing/2010/main" val="0"/>
+                <a14:useLocalDpi xmlns:a14="http://schemas.microsoft.com/office/drawing/2010/main" xmlns="" val="0"/>
               </a:ext>
             </a:extLst>
           </a:blip>
@@ -8069,7 +10460,7 @@
           <a:blip r:embed="rId2" cstate="print">
             <a:extLst>
               <a:ext uri="{28A0092B-C50C-407E-A947-70E740481C1C}">
-                <a14:useLocalDpi xmlns:a14="http://schemas.microsoft.com/office/drawing/2010/main" val="0"/>
+                <a14:useLocalDpi xmlns:a14="http://schemas.microsoft.com/office/drawing/2010/main" xmlns="" val="0"/>
               </a:ext>
             </a:extLst>
           </a:blip>
@@ -8099,7 +10490,7 @@
           <a:blip r:embed="rId2" cstate="print">
             <a:extLst>
               <a:ext uri="{28A0092B-C50C-407E-A947-70E740481C1C}">
-                <a14:useLocalDpi xmlns:a14="http://schemas.microsoft.com/office/drawing/2010/main" val="0"/>
+                <a14:useLocalDpi xmlns:a14="http://schemas.microsoft.com/office/drawing/2010/main" xmlns="" val="0"/>
               </a:ext>
             </a:extLst>
           </a:blip>
@@ -8129,7 +10520,7 @@
           <a:blip r:embed="rId2" cstate="print">
             <a:extLst>
               <a:ext uri="{28A0092B-C50C-407E-A947-70E740481C1C}">
-                <a14:useLocalDpi xmlns:a14="http://schemas.microsoft.com/office/drawing/2010/main" val="0"/>
+                <a14:useLocalDpi xmlns:a14="http://schemas.microsoft.com/office/drawing/2010/main" xmlns="" val="0"/>
               </a:ext>
             </a:extLst>
           </a:blip>
@@ -8159,7 +10550,7 @@
           <a:blip r:embed="rId2" cstate="print">
             <a:extLst>
               <a:ext uri="{28A0092B-C50C-407E-A947-70E740481C1C}">
-                <a14:useLocalDpi xmlns:a14="http://schemas.microsoft.com/office/drawing/2010/main" val="0"/>
+                <a14:useLocalDpi xmlns:a14="http://schemas.microsoft.com/office/drawing/2010/main" xmlns="" val="0"/>
               </a:ext>
             </a:extLst>
           </a:blip>
@@ -8189,7 +10580,7 @@
           <a:blip r:embed="rId2" cstate="print">
             <a:extLst>
               <a:ext uri="{28A0092B-C50C-407E-A947-70E740481C1C}">
-                <a14:useLocalDpi xmlns:a14="http://schemas.microsoft.com/office/drawing/2010/main" val="0"/>
+                <a14:useLocalDpi xmlns:a14="http://schemas.microsoft.com/office/drawing/2010/main" xmlns="" val="0"/>
               </a:ext>
             </a:extLst>
           </a:blip>
@@ -8471,7 +10862,7 @@
           <a:blip r:embed="rId3" cstate="print">
             <a:extLst>
               <a:ext uri="{28A0092B-C50C-407E-A947-70E740481C1C}">
-                <a14:useLocalDpi xmlns:a14="http://schemas.microsoft.com/office/drawing/2010/main" val="0"/>
+                <a14:useLocalDpi xmlns:a14="http://schemas.microsoft.com/office/drawing/2010/main" xmlns="" val="0"/>
               </a:ext>
             </a:extLst>
           </a:blip>
@@ -8904,8 +11295,8 @@
           </a:p>
         </p:txBody>
       </p:sp>
-      <mc:AlternateContent xmlns:mc="http://schemas.openxmlformats.org/markup-compatibility/2006" xmlns:a14="http://schemas.microsoft.com/office/drawing/2010/main">
-        <mc:Choice Requires="a14">
+      <mc:AlternateContent xmlns:mc="http://schemas.openxmlformats.org/markup-compatibility/2006">
+        <mc:Choice xmlns:a14="http://schemas.microsoft.com/office/drawing/2010/main" xmlns="" Requires="a14">
           <p:sp>
             <p:nvSpPr>
               <p:cNvPr id="33" name="TextBox 9"/>
@@ -8969,7 +11360,7 @@
             </p:txBody>
           </p:sp>
         </mc:Choice>
-        <mc:Fallback xmlns="">
+        <mc:Fallback>
           <p:sp>
             <p:nvSpPr>
               <p:cNvPr id="33" name="TextBox 9"/>
@@ -9008,8 +11399,8 @@
           </p:sp>
         </mc:Fallback>
       </mc:AlternateContent>
-      <mc:AlternateContent xmlns:mc="http://schemas.openxmlformats.org/markup-compatibility/2006" xmlns:a14="http://schemas.microsoft.com/office/drawing/2010/main">
-        <mc:Choice Requires="a14">
+      <mc:AlternateContent xmlns:mc="http://schemas.openxmlformats.org/markup-compatibility/2006">
+        <mc:Choice xmlns:a14="http://schemas.microsoft.com/office/drawing/2010/main" xmlns="" Requires="a14">
           <p:sp>
             <p:nvSpPr>
               <p:cNvPr id="31" name="TextBox 30"/>
@@ -9065,7 +11456,7 @@
             </p:txBody>
           </p:sp>
         </mc:Choice>
-        <mc:Fallback xmlns="">
+        <mc:Fallback>
           <p:sp>
             <p:nvSpPr>
               <p:cNvPr id="31" name="TextBox 30"/>
@@ -9104,8 +11495,8 @@
           </p:sp>
         </mc:Fallback>
       </mc:AlternateContent>
-      <mc:AlternateContent xmlns:mc="http://schemas.openxmlformats.org/markup-compatibility/2006" xmlns:a14="http://schemas.microsoft.com/office/drawing/2010/main">
-        <mc:Choice Requires="a14">
+      <mc:AlternateContent xmlns:mc="http://schemas.openxmlformats.org/markup-compatibility/2006">
+        <mc:Choice xmlns:a14="http://schemas.microsoft.com/office/drawing/2010/main" xmlns="" Requires="a14">
           <p:sp>
             <p:nvSpPr>
               <p:cNvPr id="36" name="TextBox 35"/>
@@ -9161,7 +11552,7 @@
             </p:txBody>
           </p:sp>
         </mc:Choice>
-        <mc:Fallback xmlns="">
+        <mc:Fallback>
           <p:sp>
             <p:nvSpPr>
               <p:cNvPr id="36" name="TextBox 35"/>
@@ -9294,7 +11685,7 @@
           <a:blip r:embed="rId2" cstate="print">
             <a:extLst>
               <a:ext uri="{28A0092B-C50C-407E-A947-70E740481C1C}">
-                <a14:useLocalDpi xmlns:a14="http://schemas.microsoft.com/office/drawing/2010/main" val="0"/>
+                <a14:useLocalDpi xmlns:a14="http://schemas.microsoft.com/office/drawing/2010/main" xmlns="" val="0"/>
               </a:ext>
             </a:extLst>
           </a:blip>
@@ -9324,7 +11715,7 @@
           <a:blip r:embed="rId2" cstate="print">
             <a:extLst>
               <a:ext uri="{28A0092B-C50C-407E-A947-70E740481C1C}">
-                <a14:useLocalDpi xmlns:a14="http://schemas.microsoft.com/office/drawing/2010/main" val="0"/>
+                <a14:useLocalDpi xmlns:a14="http://schemas.microsoft.com/office/drawing/2010/main" xmlns="" val="0"/>
               </a:ext>
             </a:extLst>
           </a:blip>
@@ -9354,7 +11745,7 @@
           <a:blip r:embed="rId2" cstate="print">
             <a:extLst>
               <a:ext uri="{28A0092B-C50C-407E-A947-70E740481C1C}">
-                <a14:useLocalDpi xmlns:a14="http://schemas.microsoft.com/office/drawing/2010/main" val="0"/>
+                <a14:useLocalDpi xmlns:a14="http://schemas.microsoft.com/office/drawing/2010/main" xmlns="" val="0"/>
               </a:ext>
             </a:extLst>
           </a:blip>
@@ -9384,7 +11775,7 @@
           <a:blip r:embed="rId2" cstate="print">
             <a:extLst>
               <a:ext uri="{28A0092B-C50C-407E-A947-70E740481C1C}">
-                <a14:useLocalDpi xmlns:a14="http://schemas.microsoft.com/office/drawing/2010/main" val="0"/>
+                <a14:useLocalDpi xmlns:a14="http://schemas.microsoft.com/office/drawing/2010/main" xmlns="" val="0"/>
               </a:ext>
             </a:extLst>
           </a:blip>
@@ -9414,7 +11805,7 @@
           <a:blip r:embed="rId2" cstate="print">
             <a:extLst>
               <a:ext uri="{28A0092B-C50C-407E-A947-70E740481C1C}">
-                <a14:useLocalDpi xmlns:a14="http://schemas.microsoft.com/office/drawing/2010/main" val="0"/>
+                <a14:useLocalDpi xmlns:a14="http://schemas.microsoft.com/office/drawing/2010/main" xmlns="" val="0"/>
               </a:ext>
             </a:extLst>
           </a:blip>
@@ -9696,7 +12087,7 @@
           <a:blip r:embed="rId3" cstate="print">
             <a:extLst>
               <a:ext uri="{28A0092B-C50C-407E-A947-70E740481C1C}">
-                <a14:useLocalDpi xmlns:a14="http://schemas.microsoft.com/office/drawing/2010/main" val="0"/>
+                <a14:useLocalDpi xmlns:a14="http://schemas.microsoft.com/office/drawing/2010/main" xmlns="" val="0"/>
               </a:ext>
             </a:extLst>
           </a:blip>
@@ -9744,8 +12135,8 @@
           </a:p>
         </p:txBody>
       </p:sp>
-      <mc:AlternateContent xmlns:mc="http://schemas.openxmlformats.org/markup-compatibility/2006" xmlns:a14="http://schemas.microsoft.com/office/drawing/2010/main">
-        <mc:Choice Requires="a14">
+      <mc:AlternateContent xmlns:mc="http://schemas.openxmlformats.org/markup-compatibility/2006">
+        <mc:Choice xmlns:a14="http://schemas.microsoft.com/office/drawing/2010/main" xmlns="" Requires="a14">
           <p:sp>
             <p:nvSpPr>
               <p:cNvPr id="2" name="TextBox 1"/>
@@ -9801,7 +12192,7 @@
             </p:txBody>
           </p:sp>
         </mc:Choice>
-        <mc:Fallback xmlns="">
+        <mc:Fallback>
           <p:sp>
             <p:nvSpPr>
               <p:cNvPr id="2" name="TextBox 1"/>
@@ -9840,8 +12231,8 @@
           </p:sp>
         </mc:Fallback>
       </mc:AlternateContent>
-      <mc:AlternateContent xmlns:mc="http://schemas.openxmlformats.org/markup-compatibility/2006" xmlns:a14="http://schemas.microsoft.com/office/drawing/2010/main">
-        <mc:Choice Requires="a14">
+      <mc:AlternateContent xmlns:mc="http://schemas.openxmlformats.org/markup-compatibility/2006">
+        <mc:Choice xmlns:a14="http://schemas.microsoft.com/office/drawing/2010/main" xmlns="" Requires="a14">
           <p:sp>
             <p:nvSpPr>
               <p:cNvPr id="3" name="TextBox 2"/>
@@ -9916,7 +12307,7 @@
             </p:txBody>
           </p:sp>
         </mc:Choice>
-        <mc:Fallback xmlns="">
+        <mc:Fallback>
           <p:sp>
             <p:nvSpPr>
               <p:cNvPr id="3" name="TextBox 2"/>
@@ -9955,8 +12346,8 @@
           </p:sp>
         </mc:Fallback>
       </mc:AlternateContent>
-      <mc:AlternateContent xmlns:mc="http://schemas.openxmlformats.org/markup-compatibility/2006" xmlns:a14="http://schemas.microsoft.com/office/drawing/2010/main">
-        <mc:Choice Requires="a14">
+      <mc:AlternateContent xmlns:mc="http://schemas.openxmlformats.org/markup-compatibility/2006">
+        <mc:Choice xmlns:a14="http://schemas.microsoft.com/office/drawing/2010/main" xmlns="" Requires="a14">
           <p:sp>
             <p:nvSpPr>
               <p:cNvPr id="36" name="TextBox 35"/>
@@ -10012,7 +12403,7 @@
             </p:txBody>
           </p:sp>
         </mc:Choice>
-        <mc:Fallback xmlns="">
+        <mc:Fallback>
           <p:sp>
             <p:nvSpPr>
               <p:cNvPr id="36" name="TextBox 35"/>
@@ -10089,8 +12480,8 @@
           </a:p>
         </p:txBody>
       </p:sp>
-      <mc:AlternateContent xmlns:mc="http://schemas.openxmlformats.org/markup-compatibility/2006" xmlns:a14="http://schemas.microsoft.com/office/drawing/2010/main">
-        <mc:Choice Requires="a14">
+      <mc:AlternateContent xmlns:mc="http://schemas.openxmlformats.org/markup-compatibility/2006">
+        <mc:Choice xmlns:a14="http://schemas.microsoft.com/office/drawing/2010/main" xmlns="" Requires="a14">
           <p:sp>
             <p:nvSpPr>
               <p:cNvPr id="18" name="TextBox 17"/>
@@ -10146,7 +12537,7 @@
             </p:txBody>
           </p:sp>
         </mc:Choice>
-        <mc:Fallback xmlns="">
+        <mc:Fallback>
           <p:sp>
             <p:nvSpPr>
               <p:cNvPr id="18" name="TextBox 17"/>
@@ -10185,8 +12576,8 @@
           </p:sp>
         </mc:Fallback>
       </mc:AlternateContent>
-      <mc:AlternateContent xmlns:mc="http://schemas.openxmlformats.org/markup-compatibility/2006" xmlns:a14="http://schemas.microsoft.com/office/drawing/2010/main">
-        <mc:Choice Requires="a14">
+      <mc:AlternateContent xmlns:mc="http://schemas.openxmlformats.org/markup-compatibility/2006">
+        <mc:Choice xmlns:a14="http://schemas.microsoft.com/office/drawing/2010/main" xmlns="" Requires="a14">
           <p:sp>
             <p:nvSpPr>
               <p:cNvPr id="44" name="TextBox 43"/>
@@ -10286,7 +12677,7 @@
             </p:txBody>
           </p:sp>
         </mc:Choice>
-        <mc:Fallback xmlns="">
+        <mc:Fallback>
           <p:sp>
             <p:nvSpPr>
               <p:cNvPr id="44" name="TextBox 43"/>
@@ -10325,8 +12716,8 @@
           </p:sp>
         </mc:Fallback>
       </mc:AlternateContent>
-      <mc:AlternateContent xmlns:mc="http://schemas.openxmlformats.org/markup-compatibility/2006" xmlns:a14="http://schemas.microsoft.com/office/drawing/2010/main">
-        <mc:Choice Requires="a14">
+      <mc:AlternateContent xmlns:mc="http://schemas.openxmlformats.org/markup-compatibility/2006">
+        <mc:Choice xmlns:a14="http://schemas.microsoft.com/office/drawing/2010/main" xmlns="" Requires="a14">
           <p:sp>
             <p:nvSpPr>
               <p:cNvPr id="45" name="TextBox 44"/>
@@ -10517,7 +12908,7 @@
             </p:txBody>
           </p:sp>
         </mc:Choice>
-        <mc:Fallback xmlns="">
+        <mc:Fallback>
           <p:sp>
             <p:nvSpPr>
               <p:cNvPr id="45" name="TextBox 44"/>
@@ -10641,7 +13032,7 @@
           <a:blip r:embed="rId3" cstate="print">
             <a:extLst>
               <a:ext uri="{28A0092B-C50C-407E-A947-70E740481C1C}">
-                <a14:useLocalDpi xmlns:a14="http://schemas.microsoft.com/office/drawing/2010/main" val="0"/>
+                <a14:useLocalDpi xmlns:a14="http://schemas.microsoft.com/office/drawing/2010/main" xmlns="" val="0"/>
               </a:ext>
             </a:extLst>
           </a:blip>
@@ -10662,7 +13053,7 @@
     </p:spTree>
     <p:extLst>
       <p:ext uri="{BB962C8B-B14F-4D97-AF65-F5344CB8AC3E}">
-        <p14:creationId xmlns:p14="http://schemas.microsoft.com/office/powerpoint/2010/main" val="3126091353"/>
+        <p14:creationId xmlns:p14="http://schemas.microsoft.com/office/powerpoint/2010/main" xmlns="" val="3126091353"/>
       </p:ext>
     </p:extLst>
   </p:cSld>
@@ -11010,7 +13401,7 @@
           <a:blip r:embed="rId2" cstate="print">
             <a:extLst>
               <a:ext uri="{28A0092B-C50C-407E-A947-70E740481C1C}">
-                <a14:useLocalDpi xmlns:a14="http://schemas.microsoft.com/office/drawing/2010/main" val="0"/>
+                <a14:useLocalDpi xmlns:a14="http://schemas.microsoft.com/office/drawing/2010/main" xmlns="" val="0"/>
               </a:ext>
             </a:extLst>
           </a:blip>
@@ -11072,7 +13463,7 @@
         </p:txBody>
       </p:sp>
       <mc:AlternateContent xmlns:mc="http://schemas.openxmlformats.org/markup-compatibility/2006">
-        <mc:Choice xmlns:a14="http://schemas.microsoft.com/office/drawing/2010/main" Requires="a14">
+        <mc:Choice xmlns:a14="http://schemas.microsoft.com/office/drawing/2010/main" xmlns="" Requires="a14">
           <p:sp>
             <p:nvSpPr>
               <p:cNvPr id="13" name="TextBox 20"/>
@@ -11165,7 +13556,7 @@
                 <a:avLst/>
               </a:prstGeom>
               <a:blipFill rotWithShape="1">
-                <a:blip r:embed="rId3"/>
+                <a:blip r:embed="rId3" cstate="print"/>
                 <a:stretch>
                   <a:fillRect/>
                 </a:stretch>
@@ -11187,7 +13578,7 @@
         </mc:Fallback>
       </mc:AlternateContent>
       <mc:AlternateContent xmlns:mc="http://schemas.openxmlformats.org/markup-compatibility/2006">
-        <mc:Choice xmlns:a14="http://schemas.microsoft.com/office/drawing/2010/main" Requires="a14">
+        <mc:Choice xmlns:a14="http://schemas.microsoft.com/office/drawing/2010/main" xmlns="" Requires="a14">
           <p:sp>
             <p:nvSpPr>
               <p:cNvPr id="14" name="TextBox 21"/>
@@ -11261,7 +13652,7 @@
                 <a:avLst/>
               </a:prstGeom>
               <a:blipFill rotWithShape="1">
-                <a:blip r:embed="rId4"/>
+                <a:blip r:embed="rId4" cstate="print"/>
                 <a:stretch>
                   <a:fillRect l="-34483" t="-4255" r="-93103" b="-6383"/>
                 </a:stretch>
@@ -11283,7 +13674,7 @@
         </mc:Fallback>
       </mc:AlternateContent>
       <mc:AlternateContent xmlns:mc="http://schemas.openxmlformats.org/markup-compatibility/2006">
-        <mc:Choice xmlns:a14="http://schemas.microsoft.com/office/drawing/2010/main" Requires="a14">
+        <mc:Choice xmlns:a14="http://schemas.microsoft.com/office/drawing/2010/main" xmlns="" Requires="a14">
           <p:sp>
             <p:nvSpPr>
               <p:cNvPr id="15" name="TextBox 22"/>
@@ -11364,7 +13755,7 @@
                 <a:avLst/>
               </a:prstGeom>
               <a:blipFill rotWithShape="1">
-                <a:blip r:embed="rId5"/>
+                <a:blip r:embed="rId5" cstate="print"/>
                 <a:stretch>
                   <a:fillRect l="-18000" r="-8000" b="-22222"/>
                 </a:stretch>
@@ -11386,7 +13777,7 @@
         </mc:Fallback>
       </mc:AlternateContent>
       <mc:AlternateContent xmlns:mc="http://schemas.openxmlformats.org/markup-compatibility/2006">
-        <mc:Choice xmlns:a14="http://schemas.microsoft.com/office/drawing/2010/main" Requires="a14">
+        <mc:Choice xmlns:a14="http://schemas.microsoft.com/office/drawing/2010/main" xmlns="" Requires="a14">
           <p:sp>
             <p:nvSpPr>
               <p:cNvPr id="16" name="TextBox 23"/>
@@ -11460,7 +13851,7 @@
                 <a:avLst/>
               </a:prstGeom>
               <a:blipFill rotWithShape="1">
-                <a:blip r:embed="rId6"/>
+                <a:blip r:embed="rId6" cstate="print"/>
                 <a:stretch>
                   <a:fillRect l="-29032" r="-90323" b="-22222"/>
                 </a:stretch>
@@ -11493,7 +13884,7 @@
           <a:blip r:embed="rId7" cstate="print">
             <a:extLst>
               <a:ext uri="{28A0092B-C50C-407E-A947-70E740481C1C}">
-                <a14:useLocalDpi xmlns:a14="http://schemas.microsoft.com/office/drawing/2010/main" val="0"/>
+                <a14:useLocalDpi xmlns:a14="http://schemas.microsoft.com/office/drawing/2010/main" xmlns="" val="0"/>
               </a:ext>
             </a:extLst>
           </a:blip>
@@ -11523,7 +13914,7 @@
           <a:blip r:embed="rId7" cstate="print">
             <a:extLst>
               <a:ext uri="{28A0092B-C50C-407E-A947-70E740481C1C}">
-                <a14:useLocalDpi xmlns:a14="http://schemas.microsoft.com/office/drawing/2010/main" val="0"/>
+                <a14:useLocalDpi xmlns:a14="http://schemas.microsoft.com/office/drawing/2010/main" xmlns="" val="0"/>
               </a:ext>
             </a:extLst>
           </a:blip>
@@ -11553,7 +13944,7 @@
           <a:blip r:embed="rId7" cstate="print">
             <a:extLst>
               <a:ext uri="{28A0092B-C50C-407E-A947-70E740481C1C}">
-                <a14:useLocalDpi xmlns:a14="http://schemas.microsoft.com/office/drawing/2010/main" val="0"/>
+                <a14:useLocalDpi xmlns:a14="http://schemas.microsoft.com/office/drawing/2010/main" xmlns="" val="0"/>
               </a:ext>
             </a:extLst>
           </a:blip>
@@ -11583,7 +13974,7 @@
           <a:blip r:embed="rId7" cstate="print">
             <a:extLst>
               <a:ext uri="{28A0092B-C50C-407E-A947-70E740481C1C}">
-                <a14:useLocalDpi xmlns:a14="http://schemas.microsoft.com/office/drawing/2010/main" val="0"/>
+                <a14:useLocalDpi xmlns:a14="http://schemas.microsoft.com/office/drawing/2010/main" xmlns="" val="0"/>
               </a:ext>
             </a:extLst>
           </a:blip>
@@ -11613,7 +14004,7 @@
           <a:blip r:embed="rId7" cstate="print">
             <a:extLst>
               <a:ext uri="{28A0092B-C50C-407E-A947-70E740481C1C}">
-                <a14:useLocalDpi xmlns:a14="http://schemas.microsoft.com/office/drawing/2010/main" val="0"/>
+                <a14:useLocalDpi xmlns:a14="http://schemas.microsoft.com/office/drawing/2010/main" xmlns="" val="0"/>
               </a:ext>
             </a:extLst>
           </a:blip>
@@ -11695,7 +14086,7 @@
           <a:blip r:embed="rId2" cstate="print">
             <a:extLst>
               <a:ext uri="{28A0092B-C50C-407E-A947-70E740481C1C}">
-                <a14:useLocalDpi xmlns:a14="http://schemas.microsoft.com/office/drawing/2010/main" val="0"/>
+                <a14:useLocalDpi xmlns:a14="http://schemas.microsoft.com/office/drawing/2010/main" xmlns="" val="0"/>
               </a:ext>
             </a:extLst>
           </a:blip>
@@ -11725,7 +14116,7 @@
           <a:blip r:embed="rId2" cstate="print">
             <a:extLst>
               <a:ext uri="{28A0092B-C50C-407E-A947-70E740481C1C}">
-                <a14:useLocalDpi xmlns:a14="http://schemas.microsoft.com/office/drawing/2010/main" val="0"/>
+                <a14:useLocalDpi xmlns:a14="http://schemas.microsoft.com/office/drawing/2010/main" xmlns="" val="0"/>
               </a:ext>
             </a:extLst>
           </a:blip>
@@ -11976,7 +14367,7 @@
         </p:txBody>
       </p:sp>
       <mc:AlternateContent xmlns:mc="http://schemas.openxmlformats.org/markup-compatibility/2006">
-        <mc:Choice xmlns:a14="http://schemas.microsoft.com/office/drawing/2010/main" Requires="a14">
+        <mc:Choice xmlns:a14="http://schemas.microsoft.com/office/drawing/2010/main" xmlns="" Requires="a14">
           <p:sp>
             <p:nvSpPr>
               <p:cNvPr id="36" name="35 Rectángulo"/>
@@ -12233,7 +14624,7 @@
                 <a:avLst/>
               </a:prstGeom>
               <a:blipFill rotWithShape="1">
-                <a:blip r:embed="rId8"/>
+                <a:blip r:embed="rId8" cstate="print"/>
                 <a:stretch>
                   <a:fillRect/>
                 </a:stretch>
@@ -12255,7 +14646,7 @@
         </mc:Fallback>
       </mc:AlternateContent>
       <mc:AlternateContent xmlns:mc="http://schemas.openxmlformats.org/markup-compatibility/2006">
-        <mc:Choice xmlns:a14="http://schemas.microsoft.com/office/drawing/2010/main" Requires="a14">
+        <mc:Choice xmlns:a14="http://schemas.microsoft.com/office/drawing/2010/main" xmlns="" Requires="a14">
           <p:sp>
             <p:nvSpPr>
               <p:cNvPr id="37" name="36 Rectángulo"/>
@@ -12327,7 +14718,7 @@
                 <a:avLst/>
               </a:prstGeom>
               <a:blipFill rotWithShape="1">
-                <a:blip r:embed="rId9"/>
+                <a:blip r:embed="rId9" cstate="print"/>
                 <a:stretch>
                   <a:fillRect r="-3125"/>
                 </a:stretch>
@@ -12382,7 +14773,7 @@
         </p:txBody>
       </p:sp>
       <mc:AlternateContent xmlns:mc="http://schemas.openxmlformats.org/markup-compatibility/2006">
-        <mc:Choice xmlns:a14="http://schemas.microsoft.com/office/drawing/2010/main" Requires="a14">
+        <mc:Choice xmlns:a14="http://schemas.microsoft.com/office/drawing/2010/main" xmlns="" Requires="a14">
           <p:sp>
             <p:nvSpPr>
               <p:cNvPr id="39" name="38 Rectángulo"/>
@@ -12461,7 +14852,7 @@
                 <a:avLst/>
               </a:prstGeom>
               <a:blipFill rotWithShape="1">
-                <a:blip r:embed="rId10"/>
+                <a:blip r:embed="rId10" cstate="print"/>
                 <a:stretch>
                   <a:fillRect b="-3279"/>
                 </a:stretch>
@@ -12483,7 +14874,7 @@
         </mc:Fallback>
       </mc:AlternateContent>
       <mc:AlternateContent xmlns:mc="http://schemas.openxmlformats.org/markup-compatibility/2006">
-        <mc:Choice xmlns:a14="http://schemas.microsoft.com/office/drawing/2010/main" Requires="a14">
+        <mc:Choice xmlns:a14="http://schemas.microsoft.com/office/drawing/2010/main" xmlns="" Requires="a14">
           <p:sp>
             <p:nvSpPr>
               <p:cNvPr id="40" name="39 Rectángulo"/>
@@ -12562,7 +14953,7 @@
                 <a:avLst/>
               </a:prstGeom>
               <a:blipFill rotWithShape="1">
-                <a:blip r:embed="rId11"/>
+                <a:blip r:embed="rId11" cstate="print"/>
                 <a:stretch>
                   <a:fillRect b="-3279"/>
                 </a:stretch>
@@ -12641,7 +15032,6 @@
               <a:rPr lang="es-AR" dirty="0"/>
               <a:t>%</a:t>
             </a:r>
-            <a:endParaRPr lang="es-AR" dirty="0"/>
           </a:p>
         </p:txBody>
       </p:sp>
@@ -12727,7 +15117,7 @@
     </p:spTree>
     <p:extLst>
       <p:ext uri="{BB962C8B-B14F-4D97-AF65-F5344CB8AC3E}">
-        <p14:creationId xmlns:p14="http://schemas.microsoft.com/office/powerpoint/2010/main" val="2344222424"/>
+        <p14:creationId xmlns:p14="http://schemas.microsoft.com/office/powerpoint/2010/main" xmlns="" val="2344222424"/>
       </p:ext>
     </p:extLst>
   </p:cSld>
@@ -12816,7 +15206,7 @@
           <a:blip r:embed="rId2" cstate="print">
             <a:extLst>
               <a:ext uri="{28A0092B-C50C-407E-A947-70E740481C1C}">
-                <a14:useLocalDpi xmlns:a14="http://schemas.microsoft.com/office/drawing/2010/main" val="0"/>
+                <a14:useLocalDpi xmlns:a14="http://schemas.microsoft.com/office/drawing/2010/main" xmlns="" val="0"/>
               </a:ext>
             </a:extLst>
           </a:blip>
@@ -12846,7 +15236,7 @@
           <a:blip r:embed="rId2" cstate="print">
             <a:extLst>
               <a:ext uri="{28A0092B-C50C-407E-A947-70E740481C1C}">
-                <a14:useLocalDpi xmlns:a14="http://schemas.microsoft.com/office/drawing/2010/main" val="0"/>
+                <a14:useLocalDpi xmlns:a14="http://schemas.microsoft.com/office/drawing/2010/main" xmlns="" val="0"/>
               </a:ext>
             </a:extLst>
           </a:blip>
@@ -12876,7 +15266,7 @@
           <a:blip r:embed="rId2" cstate="print">
             <a:extLst>
               <a:ext uri="{28A0092B-C50C-407E-A947-70E740481C1C}">
-                <a14:useLocalDpi xmlns:a14="http://schemas.microsoft.com/office/drawing/2010/main" val="0"/>
+                <a14:useLocalDpi xmlns:a14="http://schemas.microsoft.com/office/drawing/2010/main" xmlns="" val="0"/>
               </a:ext>
             </a:extLst>
           </a:blip>
@@ -12906,7 +15296,7 @@
           <a:blip r:embed="rId2" cstate="print">
             <a:extLst>
               <a:ext uri="{28A0092B-C50C-407E-A947-70E740481C1C}">
-                <a14:useLocalDpi xmlns:a14="http://schemas.microsoft.com/office/drawing/2010/main" val="0"/>
+                <a14:useLocalDpi xmlns:a14="http://schemas.microsoft.com/office/drawing/2010/main" xmlns="" val="0"/>
               </a:ext>
             </a:extLst>
           </a:blip>
@@ -12936,7 +15326,7 @@
           <a:blip r:embed="rId2" cstate="print">
             <a:extLst>
               <a:ext uri="{28A0092B-C50C-407E-A947-70E740481C1C}">
-                <a14:useLocalDpi xmlns:a14="http://schemas.microsoft.com/office/drawing/2010/main" val="0"/>
+                <a14:useLocalDpi xmlns:a14="http://schemas.microsoft.com/office/drawing/2010/main" xmlns="" val="0"/>
               </a:ext>
             </a:extLst>
           </a:blip>
@@ -13218,7 +15608,7 @@
           <a:blip r:embed="rId3" cstate="print">
             <a:extLst>
               <a:ext uri="{28A0092B-C50C-407E-A947-70E740481C1C}">
-                <a14:useLocalDpi xmlns:a14="http://schemas.microsoft.com/office/drawing/2010/main" val="0"/>
+                <a14:useLocalDpi xmlns:a14="http://schemas.microsoft.com/office/drawing/2010/main" xmlns="" val="0"/>
               </a:ext>
             </a:extLst>
           </a:blip>
@@ -14288,7 +16678,7 @@
   <a:extraClrSchemeLst/>
   <a:extLst>
     <a:ext uri="{05A4C25C-085E-4340-85A3-A5531E510DB2}">
-      <thm15:themeFamily xmlns="" xmlns:thm15="http://schemas.microsoft.com/office/thememl/2012/main" name="Office Theme" id="{62F939B6-93AF-4DB8-9C6B-D6C7DFDC589F}" vid="{4A3C46E8-61CC-4603-A589-7422A47A8E4A}"/>
+      <thm15:themeFamily xmlns:thm15="http://schemas.microsoft.com/office/thememl/2012/main" xmlns="" name="Office Theme" id="{62F939B6-93AF-4DB8-9C6B-D6C7DFDC589F}" vid="{4A3C46E8-61CC-4603-A589-7422A47A8E4A}"/>
     </a:ext>
   </a:extLst>
 </a:theme>

</xml_diff>